<commit_message>
ajustements propagation d'incertitude à 150 N
</commit_message>
<xml_diff>
--- a/Rapport_Projet_V1.pptx
+++ b/Rapport_Projet_V1.pptx
@@ -15,8 +15,8 @@
     <p:sldId id="264" r:id="rId9"/>
     <p:sldId id="262" r:id="rId10"/>
     <p:sldId id="268" r:id="rId11"/>
-    <p:sldId id="269" r:id="rId12"/>
-    <p:sldId id="276" r:id="rId13"/>
+    <p:sldId id="281" r:id="rId12"/>
+    <p:sldId id="280" r:id="rId13"/>
     <p:sldId id="270" r:id="rId14"/>
     <p:sldId id="274" r:id="rId15"/>
     <p:sldId id="273" r:id="rId16"/>
@@ -2480,8 +2480,8 @@
       <pc:docMk xmlns:pc="http://schemas.microsoft.com/office/powerpoint/2013/main/command"/>
       <pc:sldMk xmlns:pc="http://schemas.microsoft.com/office/powerpoint/2013/main/command" cId="2767786287" sldId="257"/>
       <ac:spMk id="3" creationId="{57846E6E-541E-C380-2EC3-91AF5BEE61F6}"/>
-      <ac:txMk cp="581" len="55">
-        <ac:context len="1227" hash="768600176"/>
+      <ac:txMk cp="580" len="55">
+        <ac:context len="1223" hash="775906197"/>
       </ac:txMk>
     </ac:txMkLst>
     <p188:pos x="10500360" y="1635760"/>
@@ -2525,32 +2525,6 @@
 </p188:cmLst>
 </file>
 
-<file path=ppt/comments/modernComment_10B_22F9F6A7.xml><?xml version="1.0" encoding="utf-8"?>
-<p188:cmLst xmlns:a="http://schemas.openxmlformats.org/drawingml/2006/main" xmlns:r="http://schemas.openxmlformats.org/officeDocument/2006/relationships" xmlns:p188="http://schemas.microsoft.com/office/powerpoint/2018/8/main">
-  <p188:cm id="{ED1E7CC7-23DC-409A-ADBD-8DFA31D60112}" authorId="{4BB11620-EFBC-D13A-7B93-45F2C922ABDE}" created="2024-04-06T22:11:07.088">
-    <ac:txMkLst xmlns:ac="http://schemas.microsoft.com/office/drawing/2013/main/command">
-      <pc:docMk xmlns:pc="http://schemas.microsoft.com/office/powerpoint/2013/main/command"/>
-      <pc:sldMk xmlns:pc="http://schemas.microsoft.com/office/powerpoint/2013/main/command" cId="586806951" sldId="267"/>
-      <ac:spMk id="3" creationId="{57846E6E-541E-C380-2EC3-91AF5BEE61F6}"/>
-      <ac:txMk cp="90" len="4">
-        <ac:context len="725" hash="820362600"/>
-      </ac:txMk>
-    </ac:txMkLst>
-    <p188:pos x="9528313" y="281609"/>
-    <p188:txBody>
-      <a:bodyPr/>
-      <a:lstStyle/>
-      <a:p>
-        <a:r>
-          <a:rPr lang="en-CA"/>
-          <a:t>Right?</a:t>
-        </a:r>
-      </a:p>
-    </p188:txBody>
-  </p188:cm>
-</p188:cmLst>
-</file>
-
 <file path=ppt/comments/modernComment_10C_2EECC42B.xml><?xml version="1.0" encoding="utf-8"?>
 <p188:cmLst xmlns:a="http://schemas.openxmlformats.org/drawingml/2006/main" xmlns:r="http://schemas.openxmlformats.org/officeDocument/2006/relationships" xmlns:p188="http://schemas.microsoft.com/office/powerpoint/2018/8/main">
   <p188:cm id="{FB552410-3568-487C-A036-1B1A7AA6A6BA}" authorId="{4BB11620-EFBC-D13A-7B93-45F2C922ABDE}" created="2024-04-06T22:20:24.107">
@@ -2577,53 +2551,6 @@
 </p188:cmLst>
 </file>
 
-<file path=ppt/comments/modernComment_10D_7E349E36.xml><?xml version="1.0" encoding="utf-8"?>
-<p188:cmLst xmlns:a="http://schemas.openxmlformats.org/drawingml/2006/main" xmlns:r="http://schemas.openxmlformats.org/officeDocument/2006/relationships" xmlns:p188="http://schemas.microsoft.com/office/powerpoint/2018/8/main">
-  <p188:cm id="{E5CD4D06-CBC4-4BBD-8A2F-2389111330B6}" authorId="{4BB11620-EFBC-D13A-7B93-45F2C922ABDE}" created="2024-04-06T22:52:32.116">
-    <ac:txMkLst xmlns:ac="http://schemas.microsoft.com/office/drawing/2013/main/command">
-      <pc:docMk xmlns:pc="http://schemas.microsoft.com/office/powerpoint/2013/main/command"/>
-      <pc:sldMk xmlns:pc="http://schemas.microsoft.com/office/powerpoint/2013/main/command" cId="2117377590" sldId="269"/>
-      <ac:spMk id="3" creationId="{57846E6E-541E-C380-2EC3-91AF5BEE61F6}"/>
-      <ac:txMk cp="1128" len="139">
-        <ac:context len="1357" hash="2915259097"/>
-      </ac:txMk>
-    </ac:txMkLst>
-    <p188:pos x="10184296" y="4306209"/>
-    <p188:txBody>
-      <a:bodyPr/>
-      <a:lstStyle/>
-      <a:p>
-        <a:r>
-          <a:rPr lang="en-CA"/>
-          <a:t>Est ce d'apres l'ordre des elements ou la formule de tomishenko qu'on a l'ordre 2?</a:t>
-        </a:r>
-      </a:p>
-    </p188:txBody>
-  </p188:cm>
-  <p188:cm id="{37F27A8D-EFA0-4410-B6C6-D9B44291E8C0}" authorId="{4BB11620-EFBC-D13A-7B93-45F2C922ABDE}" created="2024-04-06T23:02:52.806">
-    <ac:txMkLst xmlns:ac="http://schemas.microsoft.com/office/drawing/2013/main/command">
-      <pc:docMk xmlns:pc="http://schemas.microsoft.com/office/powerpoint/2013/main/command"/>
-      <pc:sldMk xmlns:pc="http://schemas.microsoft.com/office/powerpoint/2013/main/command" cId="2117377590" sldId="269"/>
-      <ac:spMk id="3" creationId="{57846E6E-541E-C380-2EC3-91AF5BEE61F6}"/>
-      <ac:txMk cp="255" len="67">
-        <ac:context len="1357" hash="2915259097"/>
-      </ac:txMk>
-    </ac:txMkLst>
-    <p188:pos x="8564217" y="748000"/>
-    <p188:txBody>
-      <a:bodyPr/>
-      <a:lstStyle/>
-      <a:p>
-        <a:r>
-          <a:rPr lang="en-CA"/>
-          <a:t>Qq1 peut confirmer?</a:t>
-        </a:r>
-      </a:p>
-    </p188:txBody>
-  </p188:cm>
-</p188:cmLst>
-</file>
-
 <file path=ppt/comments/modernComment_116_FD4FE663.xml><?xml version="1.0" encoding="utf-8"?>
 <p188:cmLst xmlns:a="http://schemas.openxmlformats.org/drawingml/2006/main" xmlns:r="http://schemas.openxmlformats.org/officeDocument/2006/relationships" xmlns:p188="http://schemas.microsoft.com/office/powerpoint/2018/8/main">
   <p188:cm id="{F2F0F44A-F931-466A-8B0E-614C350DBF7A}" authorId="{4BB11620-EFBC-D13A-7B93-45F2C922ABDE}" created="2024-04-07T04:29:07.183">
@@ -2633,8 +2560,8 @@
       <ac:graphicFrameMk id="4" creationId="{D67ADBAC-41C2-11B1-F6EC-DFFF95454C8C}"/>
       <ac:tblMk/>
       <ac:tcMk rowId="833508316" colId="4265653216"/>
-      <ac:txMk cp="0" len="2">
-        <ac:context len="3" hash="134653"/>
+      <ac:txMk cp="0" len="1">
+        <ac:context len="9" hash="1769128075"/>
       </ac:txMk>
     </ac:txMkLst>
     <p188:pos x="1871649" y="650240"/>
@@ -2666,6 +2593,67 @@
         <a:r>
           <a:rPr lang="en-CA"/>
           <a:t>@Alexandre je n'ai pas trouv l'info dans l'article, y a t-t-il une autre source? Ou bien j'ai mal lu</a:t>
+        </a:r>
+      </a:p>
+    </p188:txBody>
+  </p188:cm>
+</p188:cmLst>
+</file>
+
+<file path=ppt/comments/modernComment_119_D4A1683D.xml><?xml version="1.0" encoding="utf-8"?>
+<p188:cmLst xmlns:a="http://schemas.openxmlformats.org/drawingml/2006/main" xmlns:r="http://schemas.openxmlformats.org/officeDocument/2006/relationships" xmlns:p188="http://schemas.microsoft.com/office/powerpoint/2018/8/main">
+  <p188:cm id="{E5CD4D06-CBC4-4BBD-8A2F-2389111330B6}" authorId="{4BB11620-EFBC-D13A-7B93-45F2C922ABDE}" created="2024-04-06T22:52:32.116">
+    <ac:txMkLst xmlns:ac="http://schemas.microsoft.com/office/drawing/2013/main/command">
+      <pc:docMk xmlns:pc="http://schemas.microsoft.com/office/powerpoint/2013/main/command"/>
+      <pc:sldMk xmlns:pc="http://schemas.microsoft.com/office/powerpoint/2013/main/command" cId="3567347773" sldId="281"/>
+      <ac:spMk id="3" creationId="{57846E6E-541E-C380-2EC3-91AF5BEE61F6}"/>
+      <ac:txMk cp="1128" len="139">
+        <ac:context len="1357" hash="2915259097"/>
+      </ac:txMk>
+    </ac:txMkLst>
+    <p188:pos x="10184296" y="4306209"/>
+    <p188:replyLst>
+      <p188:reply id="{5BB1BFE5-C6BD-4BCE-B02D-C23A120FE53D}" authorId="{E68F2F47-82E5-2BC7-0FEC-4F4EC863DDC3}" created="2024-04-07T20:42:42.607">
+        <p188:txBody>
+          <a:bodyPr/>
+          <a:lstStyle/>
+          <a:p>
+            <a:r>
+              <a:rPr lang="fr-FR"/>
+              <a:t>L'ordre des elements +1</a:t>
+            </a:r>
+          </a:p>
+        </p188:txBody>
+      </p188:reply>
+    </p188:replyLst>
+    <p188:txBody>
+      <a:bodyPr/>
+      <a:lstStyle/>
+      <a:p>
+        <a:r>
+          <a:rPr lang="en-CA"/>
+          <a:t>Est ce d'apres l'ordre des elements ou la formule de tomishenko qu'on a l'ordre 2?</a:t>
+        </a:r>
+      </a:p>
+    </p188:txBody>
+  </p188:cm>
+  <p188:cm id="{37F27A8D-EFA0-4410-B6C6-D9B44291E8C0}" authorId="{4BB11620-EFBC-D13A-7B93-45F2C922ABDE}" created="2024-04-06T23:02:52.806">
+    <ac:txMkLst xmlns:ac="http://schemas.microsoft.com/office/drawing/2013/main/command">
+      <pc:docMk xmlns:pc="http://schemas.microsoft.com/office/powerpoint/2013/main/command"/>
+      <pc:sldMk xmlns:pc="http://schemas.microsoft.com/office/powerpoint/2013/main/command" cId="3567347773" sldId="281"/>
+      <ac:spMk id="3" creationId="{57846E6E-541E-C380-2EC3-91AF5BEE61F6}"/>
+      <ac:txMk cp="255" len="67">
+        <ac:context len="1357" hash="2915259097"/>
+      </ac:txMk>
+    </ac:txMkLst>
+    <p188:pos x="8564217" y="748000"/>
+    <p188:txBody>
+      <a:bodyPr/>
+      <a:lstStyle/>
+      <a:p>
+        <a:r>
+          <a:rPr lang="en-CA"/>
+          <a:t>Qq1 peut confirmer?</a:t>
         </a:r>
       </a:p>
     </p188:txBody>
@@ -2755,7 +2743,7 @@
           <a:p>
             <a:fld id="{DAB5DE69-65B2-445A-B9D2-BC2BC199D49F}" type="datetimeFigureOut">
               <a:rPr lang="en-CA" smtClean="0"/>
-              <a:t>2024-04-07</a:t>
+              <a:t>2024-04-08</a:t>
             </a:fld>
             <a:endParaRPr lang="en-CA"/>
           </a:p>
@@ -3172,7 +3160,7 @@
           <a:p>
             <a:fld id="{CF633E34-DD75-4254-AB88-C9D2090F6CC5}" type="datetimeFigureOut">
               <a:rPr lang="en-CA" smtClean="0"/>
-              <a:t>2024-04-07</a:t>
+              <a:t>2024-04-08</a:t>
             </a:fld>
             <a:endParaRPr lang="en-CA"/>
           </a:p>
@@ -3372,7 +3360,7 @@
           <a:p>
             <a:fld id="{CF633E34-DD75-4254-AB88-C9D2090F6CC5}" type="datetimeFigureOut">
               <a:rPr lang="en-CA" smtClean="0"/>
-              <a:t>2024-04-07</a:t>
+              <a:t>2024-04-08</a:t>
             </a:fld>
             <a:endParaRPr lang="en-CA"/>
           </a:p>
@@ -3582,7 +3570,7 @@
           <a:p>
             <a:fld id="{CF633E34-DD75-4254-AB88-C9D2090F6CC5}" type="datetimeFigureOut">
               <a:rPr lang="en-CA" smtClean="0"/>
-              <a:t>2024-04-07</a:t>
+              <a:t>2024-04-08</a:t>
             </a:fld>
             <a:endParaRPr lang="en-CA"/>
           </a:p>
@@ -3782,7 +3770,7 @@
           <a:p>
             <a:fld id="{CF633E34-DD75-4254-AB88-C9D2090F6CC5}" type="datetimeFigureOut">
               <a:rPr lang="en-CA" smtClean="0"/>
-              <a:t>2024-04-07</a:t>
+              <a:t>2024-04-08</a:t>
             </a:fld>
             <a:endParaRPr lang="en-CA"/>
           </a:p>
@@ -4058,7 +4046,7 @@
           <a:p>
             <a:fld id="{CF633E34-DD75-4254-AB88-C9D2090F6CC5}" type="datetimeFigureOut">
               <a:rPr lang="en-CA" smtClean="0"/>
-              <a:t>2024-04-07</a:t>
+              <a:t>2024-04-08</a:t>
             </a:fld>
             <a:endParaRPr lang="en-CA"/>
           </a:p>
@@ -4326,7 +4314,7 @@
           <a:p>
             <a:fld id="{CF633E34-DD75-4254-AB88-C9D2090F6CC5}" type="datetimeFigureOut">
               <a:rPr lang="en-CA" smtClean="0"/>
-              <a:t>2024-04-07</a:t>
+              <a:t>2024-04-08</a:t>
             </a:fld>
             <a:endParaRPr lang="en-CA"/>
           </a:p>
@@ -4741,7 +4729,7 @@
           <a:p>
             <a:fld id="{CF633E34-DD75-4254-AB88-C9D2090F6CC5}" type="datetimeFigureOut">
               <a:rPr lang="en-CA" smtClean="0"/>
-              <a:t>2024-04-07</a:t>
+              <a:t>2024-04-08</a:t>
             </a:fld>
             <a:endParaRPr lang="en-CA"/>
           </a:p>
@@ -4883,7 +4871,7 @@
           <a:p>
             <a:fld id="{CF633E34-DD75-4254-AB88-C9D2090F6CC5}" type="datetimeFigureOut">
               <a:rPr lang="en-CA" smtClean="0"/>
-              <a:t>2024-04-07</a:t>
+              <a:t>2024-04-08</a:t>
             </a:fld>
             <a:endParaRPr lang="en-CA"/>
           </a:p>
@@ -4996,7 +4984,7 @@
           <a:p>
             <a:fld id="{CF633E34-DD75-4254-AB88-C9D2090F6CC5}" type="datetimeFigureOut">
               <a:rPr lang="en-CA" smtClean="0"/>
-              <a:t>2024-04-07</a:t>
+              <a:t>2024-04-08</a:t>
             </a:fld>
             <a:endParaRPr lang="en-CA"/>
           </a:p>
@@ -5309,7 +5297,7 @@
           <a:p>
             <a:fld id="{CF633E34-DD75-4254-AB88-C9D2090F6CC5}" type="datetimeFigureOut">
               <a:rPr lang="en-CA" smtClean="0"/>
-              <a:t>2024-04-07</a:t>
+              <a:t>2024-04-08</a:t>
             </a:fld>
             <a:endParaRPr lang="en-CA"/>
           </a:p>
@@ -5598,7 +5586,7 @@
           <a:p>
             <a:fld id="{CF633E34-DD75-4254-AB88-C9D2090F6CC5}" type="datetimeFigureOut">
               <a:rPr lang="en-CA" smtClean="0"/>
-              <a:t>2024-04-07</a:t>
+              <a:t>2024-04-08</a:t>
             </a:fld>
             <a:endParaRPr lang="en-CA"/>
           </a:p>
@@ -5841,7 +5829,7 @@
           <a:p>
             <a:fld id="{CF633E34-DD75-4254-AB88-C9D2090F6CC5}" type="datetimeFigureOut">
               <a:rPr lang="en-CA" smtClean="0"/>
-              <a:t>2024-04-07</a:t>
+              <a:t>2024-04-08</a:t>
             </a:fld>
             <a:endParaRPr lang="en-CA"/>
           </a:p>
@@ -7637,8 +7625,8 @@
           </a:p>
         </p:txBody>
       </p:sp>
-      <mc:AlternateContent xmlns:mc="http://schemas.openxmlformats.org/markup-compatibility/2006">
-        <mc:Choice xmlns:a14="http://schemas.microsoft.com/office/drawing/2010/main" Requires="a14">
+      <mc:AlternateContent xmlns:mc="http://schemas.openxmlformats.org/markup-compatibility/2006" xmlns:a14="http://schemas.microsoft.com/office/drawing/2010/main">
+        <mc:Choice Requires="a14">
           <p:sp>
             <p:nvSpPr>
               <p:cNvPr id="3" name="Content Placeholder 2">
@@ -8257,7 +8245,7 @@
             </p:txBody>
           </p:sp>
         </mc:Choice>
-        <mc:Fallback>
+        <mc:Fallback xmlns="">
           <p:sp>
             <p:nvSpPr>
               <p:cNvPr id="3" name="Content Placeholder 2">
@@ -9409,8 +9397,8 @@
           </a:p>
         </p:txBody>
       </p:sp>
-      <mc:AlternateContent xmlns:mc="http://schemas.openxmlformats.org/markup-compatibility/2006" xmlns:a14="http://schemas.microsoft.com/office/drawing/2010/main">
-        <mc:Choice Requires="a14">
+      <mc:AlternateContent xmlns:mc="http://schemas.openxmlformats.org/markup-compatibility/2006">
+        <mc:Choice xmlns:a14="http://schemas.microsoft.com/office/drawing/2010/main" Requires="a14">
           <p:sp>
             <p:nvSpPr>
               <p:cNvPr id="3" name="Content Placeholder 2">
@@ -9479,7 +9467,19 @@
                 </a:pPr>
                 <a:r>
                   <a:rPr lang="fr-FR" sz="1700" dirty="0"/>
-                  <a:t>On compare le résultat de la déflexion obtenue par simulation pour F=200N, avec la valeur expérimentale  de la déflexion mesurée à cette même force (résultat figurant dans l’article de référence):</a:t>
+                  <a:t>On compare le résultat de la déflexion obtenue par simulation pour </a:t>
+                </a:r>
+                <a:r>
+                  <a:rPr lang="fr-FR" sz="1700" dirty="0">
+                    <a:solidFill>
+                      <a:srgbClr val="FF0000"/>
+                    </a:solidFill>
+                  </a:rPr>
+                  <a:t>F=150N</a:t>
+                </a:r>
+                <a:r>
+                  <a:rPr lang="fr-FR" sz="1700" dirty="0"/>
+                  <a:t>, avec la valeur expérimentale  de la déflexion mesurée à cette même force (résultat figurant dans l’article de référence):</a:t>
                 </a:r>
               </a:p>
               <a:p>
@@ -10088,7 +10088,7 @@
             </p:txBody>
           </p:sp>
         </mc:Choice>
-        <mc:Fallback xmlns="">
+        <mc:Fallback>
           <p:sp>
             <p:nvSpPr>
               <p:cNvPr id="3" name="Content Placeholder 2">
@@ -10149,7 +10149,7 @@
               <p:nvPr>
                 <p:extLst>
                   <p:ext uri="{D42A27DB-BD31-4B8C-83A1-F6EECF244321}">
-                    <p14:modId xmlns:p14="http://schemas.microsoft.com/office/powerpoint/2010/main" val="3659098673"/>
+                    <p14:modId xmlns:p14="http://schemas.microsoft.com/office/powerpoint/2010/main" val="138240644"/>
                   </p:ext>
                 </p:extLst>
               </p:nvPr>
@@ -10195,6 +10195,9 @@
                               <m:oMath xmlns:m="http://schemas.openxmlformats.org/officeDocument/2006/math">
                                 <m:r>
                                   <a:rPr lang="en-CA" i="1" dirty="0" smtClean="0">
+                                    <a:solidFill>
+                                      <a:srgbClr val="FF0000"/>
+                                    </a:solidFill>
                                     <a:latin typeface="Cambria Math" panose="02040503050406030204" pitchFamily="18" charset="0"/>
                                   </a:rPr>
                                   <m:t>𝑆</m:t>
@@ -10202,7 +10205,11 @@
                               </m:oMath>
                             </m:oMathPara>
                           </a14:m>
-                          <a:endParaRPr lang="en-CA" dirty="0"/>
+                          <a:endParaRPr lang="en-CA" dirty="0">
+                            <a:solidFill>
+                              <a:srgbClr val="FF0000"/>
+                            </a:solidFill>
+                          </a:endParaRPr>
                         </a:p>
                       </a:txBody>
                       <a:tcPr/>
@@ -10214,11 +10221,14 @@
                         <a:p>
                           <a:r>
                             <a:rPr lang="en-CA" b="1" dirty="0">
+                              <a:solidFill>
+                                <a:srgbClr val="FF0000"/>
+                              </a:solidFill>
                               <a:highlight>
                                 <a:srgbClr val="FFFF00"/>
                               </a:highlight>
                             </a:rPr>
-                            <a:t>xx</a:t>
+                            <a:t>18.88 mm</a:t>
                           </a:r>
                         </a:p>
                       </a:txBody>
@@ -10268,7 +10278,7 @@
                                 <a:srgbClr val="FFFF00"/>
                               </a:highlight>
                             </a:rPr>
-                            <a:t>xx</a:t>
+                            <a:t>17.86 mm</a:t>
                           </a:r>
                         </a:p>
                       </a:txBody>
@@ -10391,7 +10401,7 @@
               <p:nvPr>
                 <p:extLst>
                   <p:ext uri="{D42A27DB-BD31-4B8C-83A1-F6EECF244321}">
-                    <p14:modId xmlns:p14="http://schemas.microsoft.com/office/powerpoint/2010/main" val="3659098673"/>
+                    <p14:modId xmlns:p14="http://schemas.microsoft.com/office/powerpoint/2010/main" val="138240644"/>
                   </p:ext>
                 </p:extLst>
               </p:nvPr>
@@ -10447,11 +10457,14 @@
                         <a:p>
                           <a:r>
                             <a:rPr lang="en-CA" b="1" dirty="0">
+                              <a:solidFill>
+                                <a:srgbClr val="FF0000"/>
+                              </a:solidFill>
                               <a:highlight>
                                 <a:srgbClr val="FFFF00"/>
                               </a:highlight>
                             </a:rPr>
-                            <a:t>xx</a:t>
+                            <a:t>18.88 mm</a:t>
                           </a:r>
                         </a:p>
                       </a:txBody>
@@ -10492,7 +10505,7 @@
                                 <a:srgbClr val="FFFF00"/>
                               </a:highlight>
                             </a:rPr>
-                            <a:t>xx</a:t>
+                            <a:t>17.86 mm</a:t>
                           </a:r>
                         </a:p>
                       </a:txBody>
@@ -10786,7 +10799,7 @@
             </a:r>
             <a:r>
               <a:rPr lang="en-US" sz="1600" i="1" dirty="0"/>
-              <a:t> Stability of the human spine in  neutral postures. European Spine Journal</a:t>
+              <a:t> Stability of the human spine in neutral postures. European Spine Journal</a:t>
             </a:r>
             <a:r>
               <a:rPr lang="fr-FR" sz="1600" i="1" dirty="0"/>
@@ -10834,15 +10847,7 @@
             </a:pPr>
             <a:r>
               <a:rPr lang="fr-CA" sz="1600" dirty="0"/>
-              <a:t>En guise de validation lors du PI3, le membre de l’équipe avait simplement comparé visuellement l’allure et les ordres de grandeur des réponses obtenues par son modèle avec les courbes Force-</a:t>
-            </a:r>
-            <a:r>
-              <a:rPr lang="fr-CA" sz="1600" dirty="0" err="1"/>
-              <a:t>Déplacment</a:t>
-            </a:r>
-            <a:r>
-              <a:rPr lang="fr-CA" sz="1600" dirty="0"/>
-              <a:t> de l’article scientifique. Le projet final de MEC8211 est ainsi l’occasion idéale pour appliquer les acquis du cours et mettre à l’épreuve la validité de son modèle.</a:t>
+              <a:t>En guise de validation lors du PI3, le membre de l’équipe avait simplement comparé visuellement l’allure et les ordres de grandeur des réponses obtenues par son modèle avec les courbes Force-Déplacement de l’article scientifique. Le projet final de MEC8211 est ainsi l’occasion idéale pour appliquer les acquis du cours et mettre à l’épreuve la validité du modèle.</a:t>
             </a:r>
           </a:p>
           <a:p>
@@ -11023,8 +11028,8 @@
           <a:chExt cx="0" cy="0"/>
         </a:xfrm>
       </p:grpSpPr>
-      <mc:AlternateContent xmlns:mc="http://schemas.openxmlformats.org/markup-compatibility/2006" xmlns:a14="http://schemas.microsoft.com/office/drawing/2010/main">
-        <mc:Choice Requires="a14">
+      <mc:AlternateContent xmlns:mc="http://schemas.openxmlformats.org/markup-compatibility/2006">
+        <mc:Choice xmlns:a14="http://schemas.microsoft.com/office/drawing/2010/main" Requires="a14">
           <p:sp>
             <p:nvSpPr>
               <p:cNvPr id="3" name="Content Placeholder 2">
@@ -11063,7 +11068,7 @@
                   <a:rPr lang="fr-CA" sz="1600" dirty="0">
                     <a:latin typeface="Aptos "/>
                   </a:rPr>
-                  <a:t>La modélisation de la colonne vertébrale a été réalisée sur le logiciel SimCenter 3D en utilisant des éléments de type poutre (BEAM) ainsi que des éléments RBE2 permettant d’ajouter une rigidité infinie entre deux nœuds. La modélisation de la colonne vertébrale ce fait donc par un agencement d’éléments poutre et d’éléments RBE2.</a:t>
+                  <a:t>La modélisation de la colonne vertébrale a été réalisée sur le logiciel SimCenter 3D en utilisant des éléments de type poutre (BEAM) ainsi que des éléments RBE2 permettant d’ajouter une rigidité infinie entre deux nœuds. La modélisation de la colonne vertébrale se fait donc par un agencement d’éléments poutre et d’éléments RBE2.</a:t>
                 </a:r>
                 <a:endParaRPr lang="en-CA" sz="1600" dirty="0">
                   <a:latin typeface="Aptos "/>
@@ -11074,6 +11079,9 @@
                   <a:lnSpc>
                     <a:spcPct val="110000"/>
                   </a:lnSpc>
+                  <a:spcAft>
+                    <a:spcPts val="800"/>
+                  </a:spcAft>
                   <a:buNone/>
                 </a:pPr>
                 <a:r>
@@ -11110,7 +11118,7 @@
                   <a:rPr lang="fr-CA" sz="1600" dirty="0">
                     <a:latin typeface="Aptos "/>
                   </a:rPr>
-                  <a:t>utilisé pour la modélisation des éléments poutre (PBEAM) sur SimCenter 3D est le modèle de poutre de Timoshenko soit:</a:t>
+                  <a:t>utilisé pour la modélisation des éléments poutre (PBEAM) sur SimCenter 3D est le modèle de poutre de Timoshenko dont l’équation différentielle est d’ordre 2:</a:t>
                 </a:r>
               </a:p>
               <a:p>
@@ -11616,7 +11624,7 @@
             </p:txBody>
           </p:sp>
         </mc:Choice>
-        <mc:Fallback xmlns="">
+        <mc:Fallback>
           <p:sp>
             <p:nvSpPr>
               <p:cNvPr id="3" name="Content Placeholder 2">
@@ -11641,7 +11649,7 @@
               <a:blipFill>
                 <a:blip r:embed="rId2"/>
                 <a:stretch>
-                  <a:fillRect l="-232" t="-223" r="-174"/>
+                  <a:fillRect l="-232" t="-223" r="-174" b="-111"/>
                 </a:stretch>
               </a:blipFill>
             </p:spPr>
@@ -11841,7 +11849,7 @@
           <p:nvPr/>
         </p:nvPicPr>
         <p:blipFill>
-          <a:blip r:embed="rId3"/>
+          <a:blip r:embed="rId2"/>
           <a:stretch>
             <a:fillRect/>
           </a:stretch>
@@ -11922,7 +11930,7 @@
           <p:nvPr/>
         </p:nvPicPr>
         <p:blipFill>
-          <a:blip r:embed="rId4">
+          <a:blip r:embed="rId3">
             <a:extLst>
               <a:ext uri="{28A0092B-C50C-407E-A947-70E740481C1C}">
                 <a14:useLocalDpi xmlns:a14="http://schemas.microsoft.com/office/drawing/2010/main" val="0"/>
@@ -11964,11 +11972,6 @@
   <p:clrMapOvr>
     <a:masterClrMapping/>
   </p:clrMapOvr>
-  <p:extLst>
-    <p:ext uri="{6950BFC3-D8DA-4A85-94F7-54DA5524770B}">
-      <p188:commentRel xmlns:p188="http://schemas.microsoft.com/office/powerpoint/2018/8/main" r:id="rId2"/>
-    </p:ext>
-  </p:extLst>
 </p:sld>
 </file>
 
@@ -12336,7 +12339,7 @@
               <a:buNone/>
             </a:pPr>
             <a:r>
-              <a:rPr lang="en-CA" sz="1800">
+              <a:rPr lang="en-CA" sz="1800" dirty="0">
                 <a:highlight>
                   <a:srgbClr val="FFFF00"/>
                 </a:highlight>
@@ -12344,7 +12347,7 @@
               <a:t>Elements </a:t>
             </a:r>
             <a:r>
-              <a:rPr lang="en-CA" sz="1800" err="1">
+              <a:rPr lang="en-CA" sz="1800" dirty="0" err="1">
                 <a:highlight>
                   <a:srgbClr val="FFFF00"/>
                 </a:highlight>
@@ -12352,7 +12355,7 @@
               <a:t>d'ordre</a:t>
             </a:r>
             <a:r>
-              <a:rPr lang="en-CA" sz="1800">
+              <a:rPr lang="en-CA" sz="1800" dirty="0">
                 <a:highlight>
                   <a:srgbClr val="FFFF00"/>
                 </a:highlight>
@@ -12360,7 +12363,7 @@
               <a:t> 2 avec interpolation </a:t>
             </a:r>
             <a:r>
-              <a:rPr lang="en-CA" sz="1800" err="1">
+              <a:rPr lang="en-CA" sz="1800" dirty="0" err="1">
                 <a:highlight>
                   <a:srgbClr val="FFFF00"/>
                 </a:highlight>
@@ -12368,7 +12371,7 @@
               <a:t>lineaire</a:t>
             </a:r>
             <a:r>
-              <a:rPr lang="en-CA" sz="1800">
+              <a:rPr lang="en-CA" sz="1800" dirty="0">
                 <a:highlight>
                   <a:srgbClr val="FFFF00"/>
                 </a:highlight>
@@ -12376,13 +12379,18 @@
               <a:t> entre les </a:t>
             </a:r>
             <a:r>
-              <a:rPr lang="en-CA" sz="1800" err="1">
+              <a:rPr lang="en-CA" sz="1800" dirty="0" err="1">
                 <a:highlight>
                   <a:srgbClr val="FFFF00"/>
                 </a:highlight>
               </a:rPr>
               <a:t>noeuds</a:t>
             </a:r>
+            <a:endParaRPr lang="en-CA" sz="1800" dirty="0">
+              <a:highlight>
+                <a:srgbClr val="FFFF00"/>
+              </a:highlight>
+            </a:endParaRPr>
           </a:p>
         </p:txBody>
       </p:sp>
@@ -12497,7 +12505,7 @@
             </a:r>
           </a:p>
           <a:p>
-            <a:pPr marL="0" indent="0">
+            <a:pPr marL="0" indent="0" algn="just">
               <a:buNone/>
             </a:pPr>
             <a:r>
@@ -12604,8 +12612,8 @@
           </a:p>
         </p:txBody>
       </p:sp>
-      <mc:AlternateContent xmlns:mc="http://schemas.openxmlformats.org/markup-compatibility/2006">
-        <mc:Choice xmlns:a14="http://schemas.microsoft.com/office/drawing/2010/main" Requires="a14">
+      <mc:AlternateContent xmlns:mc="http://schemas.openxmlformats.org/markup-compatibility/2006" xmlns:a14="http://schemas.microsoft.com/office/drawing/2010/main">
+        <mc:Choice Requires="a14">
           <p:sp>
             <p:nvSpPr>
               <p:cNvPr id="3" name="Content Placeholder 2">
@@ -12642,19 +12650,7 @@
                 </a:pPr>
                 <a:r>
                   <a:rPr lang="fr-CA" sz="1800" dirty="0"/>
-                  <a:t>Afin d’effectuer la vérification de solution et trouver la meilleure solution ou donner un intervalle d’incertitude sur la solution, il faut commencer par établir l’ordre de convergence observée pour le cas de la partie lombaire de la colonne vertébrale. On fixe la donnée d’entrée à</a:t>
-                </a:r>
-                <a:r>
-                  <a:rPr lang="fr-CA" sz="1800" dirty="0">
-                    <a:highlight>
-                      <a:srgbClr val="FFFF00"/>
-                    </a:highlight>
-                  </a:rPr>
-                  <a:t> F=200N </a:t>
-                </a:r>
-                <a:r>
-                  <a:rPr lang="fr-CA" sz="1800" dirty="0"/>
-                  <a:t>pour effectuer la vérification.</a:t>
+                  <a:t>Afin d’effectuer la vérification de solution et trouver la meilleure solution ou donner un intervalle d’incertitude sur la solution, il faut commencer par établir l’ordre de convergence observée pour le cas de la partie lombaire de la colonne vertébrale. On fixe la donnée d’entrée à F=200N pour effectuer la vérification.</a:t>
                 </a:r>
               </a:p>
               <a:p>
@@ -13152,7 +13148,7 @@
             </p:txBody>
           </p:sp>
         </mc:Choice>
-        <mc:Fallback>
+        <mc:Fallback xmlns="">
           <p:sp>
             <p:nvSpPr>
               <p:cNvPr id="3" name="Content Placeholder 2">
@@ -13208,17 +13204,11 @@
           <p:cNvGraphicFramePr>
             <a:graphicFrameLocks noGrp="1"/>
           </p:cNvGraphicFramePr>
-          <p:nvPr>
-            <p:extLst>
-              <p:ext uri="{D42A27DB-BD31-4B8C-83A1-F6EECF244321}">
-                <p14:modId xmlns:p14="http://schemas.microsoft.com/office/powerpoint/2010/main" val="1157605058"/>
-              </p:ext>
-            </p:extLst>
-          </p:nvPr>
+          <p:nvPr/>
         </p:nvGraphicFramePr>
         <p:xfrm>
-          <a:off x="947528" y="4172647"/>
-          <a:ext cx="4220819" cy="2293128"/>
+          <a:off x="838200" y="4172647"/>
+          <a:ext cx="4038600" cy="2113935"/>
         </p:xfrm>
         <a:graphic>
           <a:graphicData uri="http://schemas.openxmlformats.org/drawingml/2006/table">
@@ -13227,21 +13217,14 @@
                 <a:tableStyleId>{073A0DAA-6AF3-43AB-8588-CEC1D06C72B9}</a:tableStyleId>
               </a:tblPr>
               <a:tblGrid>
-                <a:gridCol w="1200190">
-                  <a:extLst>
-                    <a:ext uri="{9D8B030D-6E8A-4147-A177-3AD203B41FA5}">
-                      <a16:colId xmlns:a16="http://schemas.microsoft.com/office/drawing/2014/main" val="492793411"/>
-                    </a:ext>
-                  </a:extLst>
-                </a:gridCol>
-                <a:gridCol w="1330978">
+                <a:gridCol w="1404731">
                   <a:extLst>
                     <a:ext uri="{9D8B030D-6E8A-4147-A177-3AD203B41FA5}">
                       <a16:colId xmlns:a16="http://schemas.microsoft.com/office/drawing/2014/main" val="3415350444"/>
                     </a:ext>
                   </a:extLst>
                 </a:gridCol>
-                <a:gridCol w="1689651">
+                <a:gridCol w="2633869">
                   <a:extLst>
                     <a:ext uri="{9D8B030D-6E8A-4147-A177-3AD203B41FA5}">
                       <a16:colId xmlns:a16="http://schemas.microsoft.com/office/drawing/2014/main" val="2443206338"/>
@@ -13257,40 +13240,13 @@
                     <a:p>
                       <a:pPr algn="ctr" fontAlgn="ctr"/>
                       <a:r>
-                        <a:rPr lang="fr-CA" sz="1300" b="1" i="0" u="none" strike="noStrike" dirty="0">
-                          <a:solidFill>
-                            <a:schemeClr val="bg1"/>
-                          </a:solidFill>
-                          <a:effectLst/>
-                          <a:latin typeface="Calibri" panose="020F0502020204030204" pitchFamily="34" charset="0"/>
-                        </a:rPr>
-                        <a:t>Nombre d’éléments</a:t>
-                      </a:r>
-                    </a:p>
-                  </a:txBody>
-                  <a:tcPr marL="7620" marR="7620" marT="7620" marB="0" anchor="ctr">
-                    <a:solidFill>
-                      <a:schemeClr val="tx1">
-                        <a:lumMod val="50000"/>
-                        <a:lumOff val="50000"/>
-                      </a:schemeClr>
-                    </a:solidFill>
-                  </a:tcPr>
-                </a:tc>
-                <a:tc>
-                  <a:txBody>
-                    <a:bodyPr/>
-                    <a:lstStyle/>
-                    <a:p>
-                      <a:pPr algn="ctr" fontAlgn="ctr"/>
-                      <a:r>
                         <a:rPr lang="fr-CA" sz="1300" b="1" u="none" strike="noStrike" dirty="0">
                           <a:solidFill>
                             <a:schemeClr val="bg1"/>
                           </a:solidFill>
                           <a:effectLst/>
                         </a:rPr>
-                        <a:t>Taille d’élément (mm)</a:t>
+                        <a:t>Taille d’élément</a:t>
                       </a:r>
                       <a:endParaRPr lang="fr-CA" sz="1300" b="1" i="0" u="none" strike="noStrike" dirty="0">
                         <a:solidFill>
@@ -13323,7 +13279,7 @@
                           </a:solidFill>
                           <a:effectLst/>
                         </a:rPr>
-                        <a:t>Magnitude du déplacement de L1 (mm)</a:t>
+                        <a:t>Magnitude du déplacement de L1</a:t>
                       </a:r>
                       <a:endParaRPr lang="fr-FR" sz="1300" b="1" i="0" u="none" strike="noStrike" dirty="0">
                         <a:solidFill>
@@ -13357,29 +13313,6 @@
                     <a:p>
                       <a:pPr algn="ctr" fontAlgn="ctr"/>
                       <a:r>
-                        <a:rPr lang="fr-CA" sz="1300" b="0" i="0" u="none" strike="noStrike" dirty="0">
-                          <a:solidFill>
-                            <a:srgbClr val="000000"/>
-                          </a:solidFill>
-                          <a:effectLst/>
-                          <a:highlight>
-                            <a:srgbClr val="FFFF00"/>
-                          </a:highlight>
-                          <a:latin typeface="Calibri" panose="020F0502020204030204" pitchFamily="34" charset="0"/>
-                        </a:rPr>
-                        <a:t>x</a:t>
-                      </a:r>
-                    </a:p>
-                  </a:txBody>
-                  <a:tcPr marL="7620" marR="7620" marT="7620" marB="0" anchor="ctr"/>
-                </a:tc>
-                <a:tc>
-                  <a:txBody>
-                    <a:bodyPr/>
-                    <a:lstStyle/>
-                    <a:p>
-                      <a:pPr algn="ctr" fontAlgn="ctr"/>
-                      <a:r>
                         <a:rPr lang="fr-CA" sz="1300" u="none" strike="noStrike" dirty="0">
                           <a:effectLst/>
                         </a:rPr>
@@ -13406,7 +13339,7 @@
                         <a:rPr lang="fr-CA" sz="1300" u="none" strike="noStrike" dirty="0">
                           <a:effectLst/>
                         </a:rPr>
-                        <a:t>45,5</a:t>
+                        <a:t>41,54</a:t>
                       </a:r>
                       <a:endParaRPr lang="fr-CA" sz="1300" b="0" i="0" u="none" strike="noStrike" dirty="0">
                         <a:solidFill>
@@ -13426,29 +13359,6 @@
                 </a:extLst>
               </a:tr>
               <a:tr h="422787">
-                <a:tc>
-                  <a:txBody>
-                    <a:bodyPr/>
-                    <a:lstStyle/>
-                    <a:p>
-                      <a:pPr algn="ctr" fontAlgn="ctr"/>
-                      <a:r>
-                        <a:rPr lang="fr-CA" sz="1300" b="0" i="0" u="none" strike="noStrike" dirty="0">
-                          <a:solidFill>
-                            <a:srgbClr val="000000"/>
-                          </a:solidFill>
-                          <a:effectLst/>
-                          <a:highlight>
-                            <a:srgbClr val="FFFF00"/>
-                          </a:highlight>
-                          <a:latin typeface="Calibri" panose="020F0502020204030204" pitchFamily="34" charset="0"/>
-                        </a:rPr>
-                        <a:t>x</a:t>
-                      </a:r>
-                    </a:p>
-                  </a:txBody>
-                  <a:tcPr marL="7620" marR="7620" marT="7620" marB="0" anchor="ctr"/>
-                </a:tc>
                 <a:tc>
                   <a:txBody>
                     <a:bodyPr/>
@@ -13482,15 +13392,8 @@
                         <a:rPr lang="fr-CA" sz="1300" u="none" strike="noStrike" dirty="0">
                           <a:effectLst/>
                         </a:rPr>
-                        <a:t>45,71489</a:t>
+                        <a:t>41,54752469</a:t>
                       </a:r>
-                      <a:endParaRPr lang="fr-CA" sz="1300" b="0" i="0" u="none" strike="noStrike" dirty="0">
-                        <a:solidFill>
-                          <a:srgbClr val="000000"/>
-                        </a:solidFill>
-                        <a:effectLst/>
-                        <a:latin typeface="Calibri" panose="020F0502020204030204" pitchFamily="34" charset="0"/>
-                      </a:endParaRPr>
                     </a:p>
                   </a:txBody>
                   <a:tcPr marL="7620" marR="7620" marT="7620" marB="0" anchor="ctr"/>
@@ -13509,35 +13412,12 @@
                     <a:p>
                       <a:pPr algn="ctr" fontAlgn="ctr"/>
                       <a:r>
-                        <a:rPr lang="fr-CA" sz="1300" b="0" i="0" u="none" strike="noStrike" dirty="0">
-                          <a:solidFill>
-                            <a:srgbClr val="000000"/>
-                          </a:solidFill>
-                          <a:effectLst/>
-                          <a:highlight>
-                            <a:srgbClr val="FFFF00"/>
-                          </a:highlight>
-                          <a:latin typeface="Calibri" panose="020F0502020204030204" pitchFamily="34" charset="0"/>
-                        </a:rPr>
-                        <a:t>x</a:t>
-                      </a:r>
-                    </a:p>
-                  </a:txBody>
-                  <a:tcPr marL="7620" marR="7620" marT="7620" marB="0" anchor="ctr"/>
-                </a:tc>
-                <a:tc>
-                  <a:txBody>
-                    <a:bodyPr/>
-                    <a:lstStyle/>
-                    <a:p>
-                      <a:pPr algn="ctr" fontAlgn="ctr"/>
-                      <a:r>
-                        <a:rPr lang="fr-CA" sz="1300" u="none" strike="noStrike" dirty="0">
+                        <a:rPr lang="fr-CA" sz="1300" u="none" strike="noStrike">
                           <a:effectLst/>
                         </a:rPr>
                         <a:t>0,1</a:t>
                       </a:r>
-                      <a:endParaRPr lang="fr-CA" sz="1300" b="0" i="0" u="none" strike="noStrike" dirty="0">
+                      <a:endParaRPr lang="fr-CA" sz="1300" b="0" i="0" u="none" strike="noStrike">
                         <a:solidFill>
                           <a:srgbClr val="000000"/>
                         </a:solidFill>
@@ -13558,15 +13438,8 @@
                         <a:rPr lang="fr-CA" sz="1300" u="none" strike="noStrike" dirty="0">
                           <a:effectLst/>
                         </a:rPr>
-                        <a:t>45,717048</a:t>
+                        <a:t>41,54968269</a:t>
                       </a:r>
-                      <a:endParaRPr lang="fr-CA" sz="1300" b="0" i="0" u="none" strike="noStrike" dirty="0">
-                        <a:solidFill>
-                          <a:srgbClr val="000000"/>
-                        </a:solidFill>
-                        <a:effectLst/>
-                        <a:latin typeface="Calibri" panose="020F0502020204030204" pitchFamily="34" charset="0"/>
-                      </a:endParaRPr>
                     </a:p>
                   </a:txBody>
                   <a:tcPr marL="7620" marR="7620" marT="7620" marB="0" anchor="ctr"/>
@@ -13585,35 +13458,12 @@
                     <a:p>
                       <a:pPr algn="ctr" fontAlgn="ctr"/>
                       <a:r>
-                        <a:rPr lang="fr-CA" sz="1300" b="0" i="0" u="none" strike="noStrike" dirty="0">
-                          <a:solidFill>
-                            <a:srgbClr val="000000"/>
-                          </a:solidFill>
-                          <a:effectLst/>
-                          <a:highlight>
-                            <a:srgbClr val="FFFF00"/>
-                          </a:highlight>
-                          <a:latin typeface="Calibri" panose="020F0502020204030204" pitchFamily="34" charset="0"/>
-                        </a:rPr>
-                        <a:t>x</a:t>
-                      </a:r>
-                    </a:p>
-                  </a:txBody>
-                  <a:tcPr marL="7620" marR="7620" marT="7620" marB="0" anchor="ctr"/>
-                </a:tc>
-                <a:tc>
-                  <a:txBody>
-                    <a:bodyPr/>
-                    <a:lstStyle/>
-                    <a:p>
-                      <a:pPr algn="ctr" fontAlgn="ctr"/>
-                      <a:r>
-                        <a:rPr lang="fr-CA" sz="1300" u="none" strike="noStrike" dirty="0">
+                        <a:rPr lang="fr-CA" sz="1300" u="none" strike="noStrike">
                           <a:effectLst/>
                         </a:rPr>
                         <a:t>0,01</a:t>
                       </a:r>
-                      <a:endParaRPr lang="fr-CA" sz="1300" b="0" i="0" u="none" strike="noStrike" dirty="0">
+                      <a:endParaRPr lang="fr-CA" sz="1300" b="0" i="0" u="none" strike="noStrike">
                         <a:solidFill>
                           <a:srgbClr val="000000"/>
                         </a:solidFill>
@@ -13634,15 +13484,8 @@
                         <a:rPr lang="fr-CA" sz="1300" u="none" strike="noStrike" dirty="0">
                           <a:effectLst/>
                         </a:rPr>
-                        <a:t>45,717067</a:t>
+                        <a:t>41,54970169</a:t>
                       </a:r>
-                      <a:endParaRPr lang="fr-CA" sz="1300" b="0" i="0" u="none" strike="noStrike" dirty="0">
-                        <a:solidFill>
-                          <a:srgbClr val="000000"/>
-                        </a:solidFill>
-                        <a:effectLst/>
-                        <a:latin typeface="Calibri" panose="020F0502020204030204" pitchFamily="34" charset="0"/>
-                      </a:endParaRPr>
                     </a:p>
                   </a:txBody>
                   <a:tcPr marL="7620" marR="7620" marT="7620" marB="0" anchor="ctr"/>
@@ -13716,7 +13559,7 @@
     </p:spTree>
     <p:extLst>
       <p:ext uri="{BB962C8B-B14F-4D97-AF65-F5344CB8AC3E}">
-        <p14:creationId xmlns:p14="http://schemas.microsoft.com/office/powerpoint/2010/main" val="2117377590"/>
+        <p14:creationId xmlns:p14="http://schemas.microsoft.com/office/powerpoint/2010/main" val="3567347773"/>
       </p:ext>
     </p:extLst>
   </p:cSld>
@@ -14314,22 +14157,10 @@
                       <a:rPr lang="fr-FR" sz="1600" i="1">
                         <a:latin typeface="Cambria Math" panose="02040503050406030204" pitchFamily="18" charset="0"/>
                       </a:rPr>
-                      <m:t>=</m:t>
+                      <m:t>=41,54970169±</m:t>
                     </m:r>
                     <m:r>
-                      <a:rPr lang="fr-CA" sz="1600">
-                        <a:latin typeface="Cambria Math" panose="02040503050406030204" pitchFamily="18" charset="0"/>
-                      </a:rPr>
-                      <m:t>45,717067</m:t>
-                    </m:r>
-                    <m:r>
-                      <a:rPr lang="fr-FR" sz="1600" i="1">
-                        <a:latin typeface="Cambria Math" panose="02040503050406030204" pitchFamily="18" charset="0"/>
-                      </a:rPr>
-                      <m:t>±</m:t>
-                    </m:r>
-                    <m:r>
-                      <a:rPr lang="en-CA" sz="1600" b="0" i="1" smtClean="0">
+                      <a:rPr lang="fr-CA" sz="1600" i="1">
                         <a:latin typeface="Cambria Math" panose="02040503050406030204" pitchFamily="18" charset="0"/>
                       </a:rPr>
                       <m:t>2,399 . </m:t>
@@ -14415,13 +14246,13 @@
                     </m:oMathParaPr>
                     <m:oMath xmlns:m="http://schemas.openxmlformats.org/officeDocument/2006/math">
                       <m:r>
-                        <a:rPr lang="fr-FR" sz="1600" i="1">
+                        <a:rPr lang="fr-FR" sz="1600">
                           <a:latin typeface="Cambria Math" panose="02040503050406030204" pitchFamily="18" charset="0"/>
                         </a:rPr>
                         <m:t>𝑓</m:t>
                       </m:r>
                       <m:r>
-                        <a:rPr lang="fr-FR" sz="1600" i="1">
+                        <a:rPr lang="fr-FR" sz="1600">
                           <a:latin typeface="Cambria Math" panose="02040503050406030204" pitchFamily="18" charset="0"/>
                         </a:rPr>
                         <m:t>=</m:t>
@@ -14436,7 +14267,7 @@
                         </m:sSubPr>
                         <m:e>
                           <m:r>
-                            <a:rPr lang="fr-FR" sz="1600" i="1">
+                            <a:rPr lang="fr-FR" sz="1600">
                               <a:latin typeface="Cambria Math" panose="02040503050406030204" pitchFamily="18" charset="0"/>
                             </a:rPr>
                             <m:t>𝑓</m:t>
@@ -14444,7 +14275,7 @@
                         </m:e>
                         <m:sub>
                           <m:r>
-                            <a:rPr lang="fr-FR" sz="1600" i="1">
+                            <a:rPr lang="fr-FR" sz="1600">
                               <a:latin typeface="Cambria Math" panose="02040503050406030204" pitchFamily="18" charset="0"/>
                             </a:rPr>
                             <m:t>h</m:t>
@@ -14452,7 +14283,7 @@
                         </m:sub>
                       </m:sSub>
                       <m:r>
-                        <a:rPr lang="fr-FR" sz="1600" i="1">
+                        <a:rPr lang="fr-FR" sz="1600">
                           <a:latin typeface="Cambria Math" panose="02040503050406030204" pitchFamily="18" charset="0"/>
                         </a:rPr>
                         <m:t>+</m:t>
@@ -14476,7 +14307,7 @@
                             </m:sSubPr>
                             <m:e>
                               <m:r>
-                                <a:rPr lang="fr-FR" sz="1600" i="1">
+                                <a:rPr lang="fr-FR" sz="1600">
                                   <a:latin typeface="Cambria Math" panose="02040503050406030204" pitchFamily="18" charset="0"/>
                                 </a:rPr>
                                 <m:t>𝑓</m:t>
@@ -14484,7 +14315,7 @@
                             </m:e>
                             <m:sub>
                               <m:r>
-                                <a:rPr lang="fr-FR" sz="1600" i="1">
+                                <a:rPr lang="fr-FR" sz="1600">
                                   <a:latin typeface="Cambria Math" panose="02040503050406030204" pitchFamily="18" charset="0"/>
                                 </a:rPr>
                                 <m:t>h</m:t>
@@ -14492,7 +14323,7 @@
                             </m:sub>
                           </m:sSub>
                           <m:r>
-                            <a:rPr lang="fr-FR" sz="1600" i="1">
+                            <a:rPr lang="fr-FR" sz="1600">
                               <a:latin typeface="Cambria Math" panose="02040503050406030204" pitchFamily="18" charset="0"/>
                             </a:rPr>
                             <m:t>−</m:t>
@@ -14507,7 +14338,7 @@
                             </m:sSubPr>
                             <m:e>
                               <m:r>
-                                <a:rPr lang="fr-FR" sz="1600" i="1">
+                                <a:rPr lang="fr-FR" sz="1600">
                                   <a:latin typeface="Cambria Math" panose="02040503050406030204" pitchFamily="18" charset="0"/>
                                 </a:rPr>
                                 <m:t>𝑓</m:t>
@@ -14515,7 +14346,7 @@
                             </m:e>
                             <m:sub>
                               <m:r>
-                                <a:rPr lang="fr-FR" sz="1600" i="1">
+                                <a:rPr lang="fr-FR" sz="1600">
                                   <a:latin typeface="Cambria Math" panose="02040503050406030204" pitchFamily="18" charset="0"/>
                                 </a:rPr>
                                 <m:t>𝑟h</m:t>
@@ -14534,7 +14365,7 @@
                             </m:sSupPr>
                             <m:e>
                               <m:r>
-                                <a:rPr lang="fr-FR" sz="1600" i="1">
+                                <a:rPr lang="fr-FR" sz="1600">
                                   <a:latin typeface="Cambria Math" panose="02040503050406030204" pitchFamily="18" charset="0"/>
                                 </a:rPr>
                                 <m:t>𝑟</m:t>
@@ -14551,7 +14382,7 @@
                                 </m:sSubPr>
                                 <m:e>
                                   <m:r>
-                                    <a:rPr lang="fr-FR" sz="1600" i="1">
+                                    <a:rPr lang="fr-FR" sz="1600">
                                       <a:latin typeface="Cambria Math" panose="02040503050406030204" pitchFamily="18" charset="0"/>
                                     </a:rPr>
                                     <m:t>𝑝</m:t>
@@ -14559,7 +14390,7 @@
                                 </m:e>
                                 <m:sub>
                                   <m:r>
-                                    <a:rPr lang="fr-FR" sz="1600" i="1">
+                                    <a:rPr lang="fr-FR" sz="1600">
                                       <a:latin typeface="Cambria Math" panose="02040503050406030204" pitchFamily="18" charset="0"/>
                                     </a:rPr>
                                     <m:t>𝑓</m:t>
@@ -14569,7 +14400,7 @@
                             </m:sup>
                           </m:sSup>
                           <m:r>
-                            <a:rPr lang="fr-FR" sz="1600" i="1">
+                            <a:rPr lang="fr-FR" sz="1600">
                               <a:latin typeface="Cambria Math" panose="02040503050406030204" pitchFamily="18" charset="0"/>
                             </a:rPr>
                             <m:t>−1</m:t>
@@ -14577,13 +14408,22 @@
                         </m:den>
                       </m:f>
                       <m:r>
-                        <a:rPr lang="en-CA" sz="1600" b="0" i="1" smtClean="0">
+                        <a:rPr lang="en-CA" sz="1600">
                           <a:latin typeface="Cambria Math" panose="02040503050406030204" pitchFamily="18" charset="0"/>
                         </a:rPr>
-                        <m:t>=45.71706719 </m:t>
+                        <m:t>=</m:t>
                       </m:r>
                       <m:r>
-                        <a:rPr lang="en-CA" sz="1600" b="0" i="1" smtClean="0">
+                        <m:rPr>
+                          <m:nor/>
+                        </m:rPr>
+                        <a:rPr lang="fr-CA" sz="1600">
+                          <a:latin typeface="Cambria Math" panose="02040503050406030204" pitchFamily="18" charset="0"/>
+                        </a:rPr>
+                        <m:t>41,54970188</m:t>
+                      </m:r>
+                      <m:r>
+                        <a:rPr lang="en-CA" sz="1600">
                           <a:latin typeface="Cambria Math" panose="02040503050406030204" pitchFamily="18" charset="0"/>
                         </a:rPr>
                         <m:t>𝑚</m:t>
@@ -14591,8 +14431,8 @@
                     </m:oMath>
                   </m:oMathPara>
                 </a14:m>
-                <a:endParaRPr lang="en-CA" sz="1600" b="0" dirty="0">
-                  <a:latin typeface="Aptos "/>
+                <a:endParaRPr lang="en-CA" sz="1600" dirty="0">
+                  <a:latin typeface="Cambria Math" panose="02040503050406030204" pitchFamily="18" charset="0"/>
                 </a:endParaRPr>
               </a:p>
               <a:p>
@@ -14762,7 +14602,7 @@
               <a:lstStyle/>
               <a:p>
                 <a:r>
-                  <a:rPr lang="en-CA">
+                  <a:rPr lang="en-GB">
                     <a:noFill/>
                   </a:rPr>
                   <a:t> </a:t>
@@ -14775,7 +14615,7 @@
     </p:spTree>
     <p:extLst>
       <p:ext uri="{BB962C8B-B14F-4D97-AF65-F5344CB8AC3E}">
-        <p14:creationId xmlns:p14="http://schemas.microsoft.com/office/powerpoint/2010/main" val="2002662924"/>
+        <p14:creationId xmlns:p14="http://schemas.microsoft.com/office/powerpoint/2010/main" val="2006935131"/>
       </p:ext>
     </p:extLst>
   </p:cSld>
@@ -15416,6 +15256,15 @@
 </file>
 
 <file path=customXml/item1.xml><?xml version="1.0" encoding="utf-8"?>
+<?mso-contentType ?>
+<FormTemplates xmlns="http://schemas.microsoft.com/sharepoint/v3/contenttype/forms">
+  <Display>DocumentLibraryForm</Display>
+  <Edit>DocumentLibraryForm</Edit>
+  <New>DocumentLibraryForm</New>
+</FormTemplates>
+</file>
+
+<file path=customXml/item2.xml><?xml version="1.0" encoding="utf-8"?>
 <ct:contentTypeSchema xmlns:ct="http://schemas.microsoft.com/office/2006/metadata/contentType" xmlns:ma="http://schemas.microsoft.com/office/2006/metadata/properties/metaAttributes" ct:_="" ma:_="" ma:contentTypeName="Document" ma:contentTypeID="0x010100744768CFAF743F4A83B0523C20156377" ma:contentTypeVersion="11" ma:contentTypeDescription="Create a new document." ma:contentTypeScope="" ma:versionID="aafa440e1ffbdaf1b0956f4ac1c916a8">
   <xsd:schema xmlns:xsd="http://www.w3.org/2001/XMLSchema" xmlns:xs="http://www.w3.org/2001/XMLSchema" xmlns:p="http://schemas.microsoft.com/office/2006/metadata/properties" xmlns:ns2="ec825916-6f01-4646-bf11-4e97fdd06dc8" xmlns:ns3="10202d72-3646-4d36-9cf4-1feba2c78df0" targetNamespace="http://schemas.microsoft.com/office/2006/metadata/properties" ma:root="true" ma:fieldsID="7a73fe93b8aa32af4ca50956a2221801" ns2:_="" ns3:_="">
     <xsd:import namespace="ec825916-6f01-4646-bf11-4e97fdd06dc8"/>
@@ -15610,15 +15459,6 @@
 </ct:contentTypeSchema>
 </file>
 
-<file path=customXml/item2.xml><?xml version="1.0" encoding="utf-8"?>
-<?mso-contentType ?>
-<FormTemplates xmlns="http://schemas.microsoft.com/sharepoint/v3/contenttype/forms">
-  <Display>DocumentLibraryForm</Display>
-  <Edit>DocumentLibraryForm</Edit>
-  <New>DocumentLibraryForm</New>
-</FormTemplates>
-</file>
-
 <file path=customXml/item3.xml><?xml version="1.0" encoding="utf-8"?>
 <p:properties xmlns:p="http://schemas.microsoft.com/office/2006/metadata/properties" xmlns:xsi="http://www.w3.org/2001/XMLSchema-instance" xmlns:pc="http://schemas.microsoft.com/office/infopath/2007/PartnerControls">
   <documentManagement>
@@ -15631,6 +15471,14 @@
 </file>
 
 <file path=customXml/itemProps1.xml><?xml version="1.0" encoding="utf-8"?>
+<ds:datastoreItem xmlns:ds="http://schemas.openxmlformats.org/officeDocument/2006/customXml" ds:itemID="{73F4A501-0066-4B8E-9AA2-A07CF344BF69}">
+  <ds:schemaRefs>
+    <ds:schemaRef ds:uri="http://schemas.microsoft.com/sharepoint/v3/contenttype/forms"/>
+  </ds:schemaRefs>
+</ds:datastoreItem>
+</file>
+
+<file path=customXml/itemProps2.xml><?xml version="1.0" encoding="utf-8"?>
 <ds:datastoreItem xmlns:ds="http://schemas.openxmlformats.org/officeDocument/2006/customXml" ds:itemID="{4AB5C90D-8262-4EAC-95BF-2CC4C44D50EC}">
   <ds:schemaRefs>
     <ds:schemaRef ds:uri="10202d72-3646-4d36-9cf4-1feba2c78df0"/>
@@ -15645,14 +15493,6 @@
     <ds:schemaRef ds:uri="http://schemas.microsoft.com/office/infopath/2007/PartnerControls"/>
     <ds:schemaRef ds:uri="http://schemas.openxmlformats.org/package/2006/metadata/core-properties"/>
     <ds:schemaRef ds:uri="http://www.w3.org/2001/XMLSchema"/>
-  </ds:schemaRefs>
-</ds:datastoreItem>
-</file>
-
-<file path=customXml/itemProps2.xml><?xml version="1.0" encoding="utf-8"?>
-<ds:datastoreItem xmlns:ds="http://schemas.openxmlformats.org/officeDocument/2006/customXml" ds:itemID="{73F4A501-0066-4B8E-9AA2-A07CF344BF69}">
-  <ds:schemaRefs>
-    <ds:schemaRef ds:uri="http://schemas.microsoft.com/sharepoint/v3/contenttype/forms"/>
   </ds:schemaRefs>
 </ds:datastoreItem>
 </file>

</xml_diff>

<commit_message>
generer distribution pour force 150 N
</commit_message>
<xml_diff>
--- a/Rapport_Projet_V1.pptx
+++ b/Rapport_Projet_V1.pptx
@@ -8355,8 +8355,8 @@
           </a:p>
         </p:txBody>
       </p:sp>
-      <mc:AlternateContent xmlns:mc="http://schemas.openxmlformats.org/markup-compatibility/2006" xmlns:a14="http://schemas.microsoft.com/office/drawing/2010/main">
-        <mc:Choice Requires="a14">
+      <mc:AlternateContent xmlns:mc="http://schemas.openxmlformats.org/markup-compatibility/2006">
+        <mc:Choice xmlns:a14="http://schemas.microsoft.com/office/drawing/2010/main" Requires="a14">
           <p:sp>
             <p:nvSpPr>
               <p:cNvPr id="3" name="Content Placeholder 2">
@@ -8818,7 +8818,7 @@
                 </a:pPr>
                 <a:r>
                   <a:rPr lang="fr-FR" sz="1600" dirty="0"/>
-                  <a:t>On peut alors considérer qu’une erreur de 0.1% sur la variation de tension se reflète par une erreur de 0.1% sur l’allongement mesuré. Ainsi selon les données expérimentales de l’article pour F=200N on mesure un déplacement de </a:t>
+                  <a:t>On peut alors considérer qu’une erreur de 0.1% sur la variation de tension se reflète par une erreur de 0.1% sur l’allongement mesuré. Ainsi selon les données expérimentales de l’article pour F=150N on mesure un déplacement de </a:t>
                 </a:r>
                 <a:r>
                   <a:rPr lang="fr-FR" sz="1600" dirty="0">
@@ -9282,7 +9282,7 @@
             </p:txBody>
           </p:sp>
         </mc:Choice>
-        <mc:Fallback xmlns="">
+        <mc:Fallback>
           <p:sp>
             <p:nvSpPr>
               <p:cNvPr id="3" name="Content Placeholder 2">
@@ -9397,8 +9397,8 @@
           </a:p>
         </p:txBody>
       </p:sp>
-      <mc:AlternateContent xmlns:mc="http://schemas.openxmlformats.org/markup-compatibility/2006">
-        <mc:Choice xmlns:a14="http://schemas.microsoft.com/office/drawing/2010/main" Requires="a14">
+      <mc:AlternateContent xmlns:mc="http://schemas.openxmlformats.org/markup-compatibility/2006" xmlns:a14="http://schemas.microsoft.com/office/drawing/2010/main">
+        <mc:Choice Requires="a14">
           <p:sp>
             <p:nvSpPr>
               <p:cNvPr id="3" name="Content Placeholder 2">
@@ -10088,7 +10088,7 @@
             </p:txBody>
           </p:sp>
         </mc:Choice>
-        <mc:Fallback>
+        <mc:Fallback xmlns="">
           <p:sp>
             <p:nvSpPr>
               <p:cNvPr id="3" name="Content Placeholder 2">
@@ -10132,8 +10132,8 @@
           </p:sp>
         </mc:Fallback>
       </mc:AlternateContent>
-      <mc:AlternateContent xmlns:mc="http://schemas.openxmlformats.org/markup-compatibility/2006">
-        <mc:Choice xmlns:a14="http://schemas.microsoft.com/office/drawing/2010/main" Requires="a14">
+      <mc:AlternateContent xmlns:mc="http://schemas.openxmlformats.org/markup-compatibility/2006" xmlns:a14="http://schemas.microsoft.com/office/drawing/2010/main">
+        <mc:Choice Requires="a14">
           <p:graphicFrame>
             <p:nvGraphicFramePr>
               <p:cNvPr id="4" name="Table 3">
@@ -10385,7 +10385,7 @@
             </a:graphic>
           </p:graphicFrame>
         </mc:Choice>
-        <mc:Fallback>
+        <mc:Fallback xmlns="">
           <p:graphicFrame>
             <p:nvGraphicFramePr>
               <p:cNvPr id="4" name="Table 3">
@@ -11028,8 +11028,8 @@
           <a:chExt cx="0" cy="0"/>
         </a:xfrm>
       </p:grpSpPr>
-      <mc:AlternateContent xmlns:mc="http://schemas.openxmlformats.org/markup-compatibility/2006">
-        <mc:Choice xmlns:a14="http://schemas.microsoft.com/office/drawing/2010/main" Requires="a14">
+      <mc:AlternateContent xmlns:mc="http://schemas.openxmlformats.org/markup-compatibility/2006" xmlns:a14="http://schemas.microsoft.com/office/drawing/2010/main">
+        <mc:Choice Requires="a14">
           <p:sp>
             <p:nvSpPr>
               <p:cNvPr id="3" name="Content Placeholder 2">
@@ -11624,7 +11624,7 @@
             </p:txBody>
           </p:sp>
         </mc:Choice>
-        <mc:Fallback>
+        <mc:Fallback xmlns="">
           <p:sp>
             <p:nvSpPr>
               <p:cNvPr id="3" name="Content Placeholder 2">
@@ -14157,13 +14157,13 @@
                       <a:rPr lang="fr-FR" sz="1600" i="1">
                         <a:latin typeface="Cambria Math" panose="02040503050406030204" pitchFamily="18" charset="0"/>
                       </a:rPr>
-                      <m:t>=41,54970169±</m:t>
+                      <m:t>=41,54970169±2,39</m:t>
                     </m:r>
                     <m:r>
                       <a:rPr lang="fr-CA" sz="1600" i="1">
                         <a:latin typeface="Cambria Math" panose="02040503050406030204" pitchFamily="18" charset="0"/>
                       </a:rPr>
-                      <m:t>2,399 . </m:t>
+                      <m:t>9 . </m:t>
                     </m:r>
                     <m:sSup>
                       <m:sSupPr>
@@ -15256,15 +15256,6 @@
 </file>
 
 <file path=customXml/item1.xml><?xml version="1.0" encoding="utf-8"?>
-<?mso-contentType ?>
-<FormTemplates xmlns="http://schemas.microsoft.com/sharepoint/v3/contenttype/forms">
-  <Display>DocumentLibraryForm</Display>
-  <Edit>DocumentLibraryForm</Edit>
-  <New>DocumentLibraryForm</New>
-</FormTemplates>
-</file>
-
-<file path=customXml/item2.xml><?xml version="1.0" encoding="utf-8"?>
 <ct:contentTypeSchema xmlns:ct="http://schemas.microsoft.com/office/2006/metadata/contentType" xmlns:ma="http://schemas.microsoft.com/office/2006/metadata/properties/metaAttributes" ct:_="" ma:_="" ma:contentTypeName="Document" ma:contentTypeID="0x010100744768CFAF743F4A83B0523C20156377" ma:contentTypeVersion="11" ma:contentTypeDescription="Create a new document." ma:contentTypeScope="" ma:versionID="aafa440e1ffbdaf1b0956f4ac1c916a8">
   <xsd:schema xmlns:xsd="http://www.w3.org/2001/XMLSchema" xmlns:xs="http://www.w3.org/2001/XMLSchema" xmlns:p="http://schemas.microsoft.com/office/2006/metadata/properties" xmlns:ns2="ec825916-6f01-4646-bf11-4e97fdd06dc8" xmlns:ns3="10202d72-3646-4d36-9cf4-1feba2c78df0" targetNamespace="http://schemas.microsoft.com/office/2006/metadata/properties" ma:root="true" ma:fieldsID="7a73fe93b8aa32af4ca50956a2221801" ns2:_="" ns3:_="">
     <xsd:import namespace="ec825916-6f01-4646-bf11-4e97fdd06dc8"/>
@@ -15459,6 +15450,15 @@
 </ct:contentTypeSchema>
 </file>
 
+<file path=customXml/item2.xml><?xml version="1.0" encoding="utf-8"?>
+<?mso-contentType ?>
+<FormTemplates xmlns="http://schemas.microsoft.com/sharepoint/v3/contenttype/forms">
+  <Display>DocumentLibraryForm</Display>
+  <Edit>DocumentLibraryForm</Edit>
+  <New>DocumentLibraryForm</New>
+</FormTemplates>
+</file>
+
 <file path=customXml/item3.xml><?xml version="1.0" encoding="utf-8"?>
 <p:properties xmlns:p="http://schemas.microsoft.com/office/2006/metadata/properties" xmlns:xsi="http://www.w3.org/2001/XMLSchema-instance" xmlns:pc="http://schemas.microsoft.com/office/infopath/2007/PartnerControls">
   <documentManagement>
@@ -15471,14 +15471,6 @@
 </file>
 
 <file path=customXml/itemProps1.xml><?xml version="1.0" encoding="utf-8"?>
-<ds:datastoreItem xmlns:ds="http://schemas.openxmlformats.org/officeDocument/2006/customXml" ds:itemID="{73F4A501-0066-4B8E-9AA2-A07CF344BF69}">
-  <ds:schemaRefs>
-    <ds:schemaRef ds:uri="http://schemas.microsoft.com/sharepoint/v3/contenttype/forms"/>
-  </ds:schemaRefs>
-</ds:datastoreItem>
-</file>
-
-<file path=customXml/itemProps2.xml><?xml version="1.0" encoding="utf-8"?>
 <ds:datastoreItem xmlns:ds="http://schemas.openxmlformats.org/officeDocument/2006/customXml" ds:itemID="{4AB5C90D-8262-4EAC-95BF-2CC4C44D50EC}">
   <ds:schemaRefs>
     <ds:schemaRef ds:uri="10202d72-3646-4d36-9cf4-1feba2c78df0"/>
@@ -15493,6 +15485,14 @@
     <ds:schemaRef ds:uri="http://schemas.microsoft.com/office/infopath/2007/PartnerControls"/>
     <ds:schemaRef ds:uri="http://schemas.openxmlformats.org/package/2006/metadata/core-properties"/>
     <ds:schemaRef ds:uri="http://www.w3.org/2001/XMLSchema"/>
+  </ds:schemaRefs>
+</ds:datastoreItem>
+</file>
+
+<file path=customXml/itemProps2.xml><?xml version="1.0" encoding="utf-8"?>
+<ds:datastoreItem xmlns:ds="http://schemas.openxmlformats.org/officeDocument/2006/customXml" ds:itemID="{73F4A501-0066-4B8E-9AA2-A07CF344BF69}">
+  <ds:schemaRefs>
+    <ds:schemaRef ds:uri="http://schemas.microsoft.com/sharepoint/v3/contenttype/forms"/>
   </ds:schemaRefs>
 </ds:datastoreItem>
 </file>

</xml_diff>

<commit_message>
reponses aux  reponses aux commentaires
</commit_message>
<xml_diff>
--- a/Rapport_Projet_V1.pptx
+++ b/Rapport_Projet_V1.pptx
@@ -954,7 +954,7 @@
 <file path=ppt/charts/chart1.xml><?xml version="1.0" encoding="utf-8"?>
 <c:chartSpace xmlns:c="http://schemas.openxmlformats.org/drawingml/2006/chart" xmlns:a="http://schemas.openxmlformats.org/drawingml/2006/main" xmlns:r="http://schemas.openxmlformats.org/officeDocument/2006/relationships" xmlns:c16r2="http://schemas.microsoft.com/office/drawing/2015/06/chart">
   <c:date1904 val="0"/>
-  <c:lang val="fr-FR"/>
+  <c:lang val="en-US"/>
   <c:roundedCorners val="0"/>
   <mc:AlternateContent xmlns:mc="http://schemas.openxmlformats.org/markup-compatibility/2006">
     <mc:Choice xmlns:c14="http://schemas.microsoft.com/office/drawing/2007/8/2/chart" Requires="c14">
@@ -2080,7 +2080,7 @@
                   <a:cs typeface="+mn-cs"/>
                 </a:defRPr>
               </a:pPr>
-              <a:endParaRPr lang="fr-FR"/>
+              <a:endParaRPr lang="en-US"/>
             </a:p>
           </c:txPr>
         </c:title>
@@ -2118,7 +2118,7 @@
                 <a:cs typeface="+mn-cs"/>
               </a:defRPr>
             </a:pPr>
-            <a:endParaRPr lang="fr-FR"/>
+            <a:endParaRPr lang="en-US"/>
           </a:p>
         </c:txPr>
         <c:crossAx val="477271791"/>
@@ -2202,7 +2202,7 @@
                   <a:cs typeface="+mn-cs"/>
                 </a:defRPr>
               </a:pPr>
-              <a:endParaRPr lang="fr-FR"/>
+              <a:endParaRPr lang="en-US"/>
             </a:p>
           </c:txPr>
         </c:title>
@@ -2240,7 +2240,7 @@
                 <a:cs typeface="+mn-cs"/>
               </a:defRPr>
             </a:pPr>
-            <a:endParaRPr lang="fr-FR"/>
+            <a:endParaRPr lang="en-US"/>
           </a:p>
         </c:txPr>
         <c:crossAx val="477280911"/>
@@ -2292,7 +2292,7 @@
               <a:cs typeface="+mn-cs"/>
             </a:defRPr>
           </a:pPr>
-          <a:endParaRPr lang="fr-FR"/>
+          <a:endParaRPr lang="en-US"/>
         </a:p>
       </c:txPr>
     </c:legend>
@@ -2321,7 +2321,7 @@
       <a:pPr>
         <a:defRPr/>
       </a:pPr>
-      <a:endParaRPr lang="fr-FR"/>
+      <a:endParaRPr lang="en-US"/>
     </a:p>
   </c:txPr>
   <c:externalData r:id="rId3">
@@ -2333,7 +2333,7 @@
 <file path=ppt/charts/chart2.xml><?xml version="1.0" encoding="utf-8"?>
 <c:chartSpace xmlns:c="http://schemas.openxmlformats.org/drawingml/2006/chart" xmlns:a="http://schemas.openxmlformats.org/drawingml/2006/main" xmlns:r="http://schemas.openxmlformats.org/officeDocument/2006/relationships" xmlns:c16r2="http://schemas.microsoft.com/office/drawing/2015/06/chart">
   <c:date1904 val="0"/>
-  <c:lang val="fr-FR"/>
+  <c:lang val="en-US"/>
   <c:roundedCorners val="0"/>
   <mc:AlternateContent xmlns:mc="http://schemas.openxmlformats.org/markup-compatibility/2006">
     <mc:Choice xmlns:c14="http://schemas.microsoft.com/office/drawing/2007/8/2/chart" Requires="c14">
@@ -2408,7 +2408,7 @@
               <a:cs typeface="+mn-cs"/>
             </a:defRPr>
           </a:pPr>
-          <a:endParaRPr lang="fr-FR"/>
+          <a:endParaRPr lang="en-US"/>
         </a:p>
       </c:txPr>
     </c:title>
@@ -2499,7 +2499,7 @@
                       <a:cs typeface="+mn-cs"/>
                     </a:defRPr>
                   </a:pPr>
-                  <a:endParaRPr lang="fr-FR"/>
+                  <a:endParaRPr lang="en-US"/>
                 </a:p>
               </c:txPr>
             </c:trendlineLbl>
@@ -2642,7 +2642,7 @@
                             <a:cs typeface="+mn-cs"/>
                           </a:defRPr>
                         </a:pPr>
-                        <a:endParaRPr lang="fr-FR"/>
+                        <a:endParaRPr lang="en-US"/>
                       </a:p>
                     </c:txPr>
                   </c:trendlineLbl>
@@ -2784,7 +2784,7 @@
                   <a:cs typeface="+mn-cs"/>
                 </a:defRPr>
               </a:pPr>
-              <a:endParaRPr lang="fr-FR"/>
+              <a:endParaRPr lang="en-US"/>
             </a:p>
           </c:txPr>
         </c:title>
@@ -2822,7 +2822,7 @@
                 <a:cs typeface="+mn-cs"/>
               </a:defRPr>
             </a:pPr>
-            <a:endParaRPr lang="fr-FR"/>
+            <a:endParaRPr lang="en-US"/>
           </a:p>
         </c:txPr>
         <c:crossAx val="1420657695"/>
@@ -2906,7 +2906,7 @@
                   <a:cs typeface="+mn-cs"/>
                 </a:defRPr>
               </a:pPr>
-              <a:endParaRPr lang="fr-FR"/>
+              <a:endParaRPr lang="en-US"/>
             </a:p>
           </c:txPr>
         </c:title>
@@ -2944,7 +2944,7 @@
                 <a:cs typeface="+mn-cs"/>
               </a:defRPr>
             </a:pPr>
-            <a:endParaRPr lang="fr-FR"/>
+            <a:endParaRPr lang="en-US"/>
           </a:p>
         </c:txPr>
         <c:crossAx val="1911372511"/>
@@ -2984,7 +2984,7 @@
       <a:pPr>
         <a:defRPr/>
       </a:pPr>
-      <a:endParaRPr lang="fr-FR"/>
+      <a:endParaRPr lang="en-US"/>
     </a:p>
   </c:txPr>
   <c:externalData r:id="rId3">
@@ -2996,7 +2996,7 @@
 <file path=ppt/charts/chart3.xml><?xml version="1.0" encoding="utf-8"?>
 <c:chartSpace xmlns:c="http://schemas.openxmlformats.org/drawingml/2006/chart" xmlns:a="http://schemas.openxmlformats.org/drawingml/2006/main" xmlns:r="http://schemas.openxmlformats.org/officeDocument/2006/relationships" xmlns:c16r2="http://schemas.microsoft.com/office/drawing/2015/06/chart">
   <c:date1904 val="0"/>
-  <c:lang val="fr-FR"/>
+  <c:lang val="en-US"/>
   <c:roundedCorners val="0"/>
   <mc:AlternateContent xmlns:mc="http://schemas.openxmlformats.org/markup-compatibility/2006">
     <mc:Choice xmlns:c14="http://schemas.microsoft.com/office/drawing/2007/8/2/chart" Requires="c14">
@@ -3757,7 +3757,7 @@
                   <a:cs typeface="+mn-cs"/>
                 </a:defRPr>
               </a:pPr>
-              <a:endParaRPr lang="fr-FR"/>
+              <a:endParaRPr lang="en-US"/>
             </a:p>
           </c:txPr>
         </c:title>
@@ -3795,7 +3795,7 @@
                 <a:cs typeface="+mn-cs"/>
               </a:defRPr>
             </a:pPr>
-            <a:endParaRPr lang="fr-FR"/>
+            <a:endParaRPr lang="en-US"/>
           </a:p>
         </c:txPr>
         <c:crossAx val="1457253920"/>
@@ -3875,7 +3875,7 @@
                   <a:cs typeface="+mn-cs"/>
                 </a:defRPr>
               </a:pPr>
-              <a:endParaRPr lang="fr-FR"/>
+              <a:endParaRPr lang="en-US"/>
             </a:p>
           </c:txPr>
         </c:title>
@@ -3913,7 +3913,7 @@
                 <a:cs typeface="+mn-cs"/>
               </a:defRPr>
             </a:pPr>
-            <a:endParaRPr lang="fr-FR"/>
+            <a:endParaRPr lang="en-US"/>
           </a:p>
         </c:txPr>
         <c:crossAx val="1457258720"/>
@@ -3953,7 +3953,7 @@
       <a:pPr>
         <a:defRPr/>
       </a:pPr>
-      <a:endParaRPr lang="fr-FR"/>
+      <a:endParaRPr lang="en-US"/>
     </a:p>
   </c:txPr>
   <c:externalData r:id="rId3">
@@ -3965,7 +3965,7 @@
 <file path=ppt/charts/chart4.xml><?xml version="1.0" encoding="utf-8"?>
 <c:chartSpace xmlns:c="http://schemas.openxmlformats.org/drawingml/2006/chart" xmlns:a="http://schemas.openxmlformats.org/drawingml/2006/main" xmlns:r="http://schemas.openxmlformats.org/officeDocument/2006/relationships" xmlns:c16r2="http://schemas.microsoft.com/office/drawing/2015/06/chart">
   <c:date1904 val="0"/>
-  <c:lang val="fr-FR"/>
+  <c:lang val="en-US"/>
   <c:roundedCorners val="0"/>
   <mc:AlternateContent xmlns:mc="http://schemas.openxmlformats.org/markup-compatibility/2006">
     <mc:Choice xmlns:c14="http://schemas.microsoft.com/office/drawing/2007/8/2/chart" Requires="c14">
@@ -4738,7 +4738,7 @@
                   <a:cs typeface="+mn-cs"/>
                 </a:defRPr>
               </a:pPr>
-              <a:endParaRPr lang="fr-FR"/>
+              <a:endParaRPr lang="en-US"/>
             </a:p>
           </c:txPr>
         </c:title>
@@ -4776,7 +4776,7 @@
                 <a:cs typeface="+mn-cs"/>
               </a:defRPr>
             </a:pPr>
-            <a:endParaRPr lang="fr-FR"/>
+            <a:endParaRPr lang="en-US"/>
           </a:p>
         </c:txPr>
         <c:crossAx val="2041938592"/>
@@ -4856,7 +4856,7 @@
                   <a:cs typeface="+mn-cs"/>
                 </a:defRPr>
               </a:pPr>
-              <a:endParaRPr lang="fr-FR"/>
+              <a:endParaRPr lang="en-US"/>
             </a:p>
           </c:txPr>
         </c:title>
@@ -4894,7 +4894,7 @@
                 <a:cs typeface="+mn-cs"/>
               </a:defRPr>
             </a:pPr>
-            <a:endParaRPr lang="fr-FR"/>
+            <a:endParaRPr lang="en-US"/>
           </a:p>
         </c:txPr>
         <c:crossAx val="2041944352"/>
@@ -4934,7 +4934,7 @@
       <a:pPr>
         <a:defRPr/>
       </a:pPr>
-      <a:endParaRPr lang="fr-FR"/>
+      <a:endParaRPr lang="en-US"/>
     </a:p>
   </c:txPr>
   <c:externalData r:id="rId3">
@@ -4946,7 +4946,7 @@
 <file path=ppt/charts/chart5.xml><?xml version="1.0" encoding="utf-8"?>
 <c:chartSpace xmlns:c="http://schemas.openxmlformats.org/drawingml/2006/chart" xmlns:a="http://schemas.openxmlformats.org/drawingml/2006/main" xmlns:r="http://schemas.openxmlformats.org/officeDocument/2006/relationships" xmlns:c16r2="http://schemas.microsoft.com/office/drawing/2015/06/chart">
   <c:date1904 val="0"/>
-  <c:lang val="fr-FR"/>
+  <c:lang val="en-US"/>
   <c:roundedCorners val="0"/>
   <mc:AlternateContent xmlns:mc="http://schemas.openxmlformats.org/markup-compatibility/2006">
     <mc:Choice xmlns:c14="http://schemas.microsoft.com/office/drawing/2007/8/2/chart" Requires="c14">
@@ -5753,7 +5753,7 @@
                   <a:cs typeface="+mn-cs"/>
                 </a:defRPr>
               </a:pPr>
-              <a:endParaRPr lang="fr-FR"/>
+              <a:endParaRPr lang="en-US"/>
             </a:p>
           </c:txPr>
         </c:title>
@@ -5791,7 +5791,7 @@
                 <a:cs typeface="+mn-cs"/>
               </a:defRPr>
             </a:pPr>
-            <a:endParaRPr lang="fr-FR"/>
+            <a:endParaRPr lang="en-US"/>
           </a:p>
         </c:txPr>
         <c:crossAx val="2041041472"/>
@@ -5871,7 +5871,7 @@
                   <a:cs typeface="+mn-cs"/>
                 </a:defRPr>
               </a:pPr>
-              <a:endParaRPr lang="fr-FR"/>
+              <a:endParaRPr lang="en-US"/>
             </a:p>
           </c:txPr>
         </c:title>
@@ -5909,7 +5909,7 @@
                 <a:cs typeface="+mn-cs"/>
               </a:defRPr>
             </a:pPr>
-            <a:endParaRPr lang="fr-FR"/>
+            <a:endParaRPr lang="en-US"/>
           </a:p>
         </c:txPr>
         <c:crossAx val="2041040032"/>
@@ -5949,7 +5949,7 @@
       <a:pPr>
         <a:defRPr/>
       </a:pPr>
-      <a:endParaRPr lang="fr-FR"/>
+      <a:endParaRPr lang="en-US"/>
     </a:p>
   </c:txPr>
   <c:externalData r:id="rId3">
@@ -5961,7 +5961,7 @@
 <file path=ppt/charts/chart6.xml><?xml version="1.0" encoding="utf-8"?>
 <c:chartSpace xmlns:c="http://schemas.openxmlformats.org/drawingml/2006/chart" xmlns:a="http://schemas.openxmlformats.org/drawingml/2006/main" xmlns:r="http://schemas.openxmlformats.org/officeDocument/2006/relationships" xmlns:c16r2="http://schemas.microsoft.com/office/drawing/2015/06/chart">
   <c:date1904 val="0"/>
-  <c:lang val="fr-FR"/>
+  <c:lang val="en-US"/>
   <c:roundedCorners val="0"/>
   <mc:AlternateContent xmlns:mc="http://schemas.openxmlformats.org/markup-compatibility/2006">
     <mc:Choice xmlns:c14="http://schemas.microsoft.com/office/drawing/2007/8/2/chart" Requires="c14">
@@ -6209,7 +6209,7 @@
                   <a:cs typeface="+mn-cs"/>
                 </a:defRPr>
               </a:pPr>
-              <a:endParaRPr lang="fr-FR"/>
+              <a:endParaRPr lang="en-US"/>
             </a:p>
           </c:txPr>
         </c:title>
@@ -6247,7 +6247,7 @@
                 <a:cs typeface="+mn-cs"/>
               </a:defRPr>
             </a:pPr>
-            <a:endParaRPr lang="fr-FR"/>
+            <a:endParaRPr lang="en-US"/>
           </a:p>
         </c:txPr>
         <c:crossAx val="1632011967"/>
@@ -6287,7 +6287,7 @@
       <a:pPr>
         <a:defRPr/>
       </a:pPr>
-      <a:endParaRPr lang="fr-FR"/>
+      <a:endParaRPr lang="en-US"/>
     </a:p>
   </c:txPr>
   <c:externalData r:id="rId3">
@@ -9683,6 +9683,18 @@
           </a:p>
         </p188:txBody>
       </p188:reply>
+      <p188:reply id="{ED1DFAE6-706E-4F5A-9066-E3A5E6431B52}" authorId="{4BB11620-EFBC-D13A-7B93-45F2C922ABDE}" created="2024-04-11T04:53:01.967">
+        <p188:txBody>
+          <a:bodyPr/>
+          <a:lstStyle/>
+          <a:p>
+            <a:r>
+              <a:rPr lang="en-CA"/>
+              <a:t>Oui je sais qu' "une force" est en general une condition de neumann mais dans ce cas particulier je ne crois pas que le role de la force soit une condition frontiere car on l'utilise aussi comme variable d'entrée qui varie</a:t>
+            </a:r>
+          </a:p>
+        </p188:txBody>
+      </p188:reply>
     </p188:replyLst>
     <p188:txBody>
       <a:bodyPr/>
@@ -9722,6 +9734,15 @@
             </a:r>
           </a:p>
         </p188:txBody>
+        <p188:extLst>
+          <p:ext xmlns:p="http://schemas.openxmlformats.org/presentationml/2006/main" uri="{57CB4572-C831-44C2-8A1C-0ADB6CCDFE69}">
+            <p223:reactions xmlns:p223="http://schemas.microsoft.com/office/powerpoint/2022/03/main">
+              <p223:rxn type="👍">
+                <p223:instance time="2024-04-11T04:53:19.686" authorId="{4BB11620-EFBC-D13A-7B93-45F2C922ABDE}"/>
+              </p223:rxn>
+            </p223:reactions>
+          </p:ext>
+        </p188:extLst>
       </p188:reply>
     </p188:replyLst>
     <p188:txBody>
@@ -9861,6 +9882,18 @@
           </a:p>
         </p188:txBody>
       </p188:reply>
+      <p188:reply id="{BC82CEF8-FA9E-4B11-85B2-C869687F2122}" authorId="{4BB11620-EFBC-D13A-7B93-45F2C922ABDE}" created="2024-04-11T04:55:25.070">
+        <p188:txBody>
+          <a:bodyPr/>
+          <a:lstStyle/>
+          <a:p>
+            <a:r>
+              <a:rPr lang="en-CA"/>
+              <a:t>Pourquoi? Il ne faut pas preciser qu'on travaille à des conditions fixes pour la convergence?</a:t>
+            </a:r>
+          </a:p>
+        </p188:txBody>
+      </p188:reply>
     </p188:replyLst>
     <p188:txBody>
       <a:bodyPr/>
@@ -9896,7 +9929,7 @@
           <a:p>
             <a:r>
               <a:rPr lang="en-CA"/>
-              <a:t>Ajouté la diapo precedente</a:t>
+              <a:t>Ajouté à la diapo precedente</a:t>
             </a:r>
           </a:p>
         </p188:txBody>
@@ -9998,7 +10031,7 @@
           <a:p>
             <a:fld id="{DAB5DE69-65B2-445A-B9D2-BC2BC199D49F}" type="datetimeFigureOut">
               <a:rPr lang="en-CA" smtClean="0"/>
-              <a:t>2024-04-10</a:t>
+              <a:t>2024-04-11</a:t>
             </a:fld>
             <a:endParaRPr lang="en-CA"/>
           </a:p>
@@ -10157,7 +10190,7 @@
           <a:p>
             <a:fld id="{603E9730-38DB-4F77-A139-6CE923099591}" type="slidenum">
               <a:rPr lang="en-CA" smtClean="0"/>
-              <a:t>‹N°›</a:t>
+              <a:t>‹#›</a:t>
             </a:fld>
             <a:endParaRPr lang="en-CA"/>
           </a:p>
@@ -10415,7 +10448,7 @@
           <a:p>
             <a:fld id="{CF633E34-DD75-4254-AB88-C9D2090F6CC5}" type="datetimeFigureOut">
               <a:rPr lang="en-CA" smtClean="0"/>
-              <a:t>2024-04-10</a:t>
+              <a:t>2024-04-11</a:t>
             </a:fld>
             <a:endParaRPr lang="en-CA"/>
           </a:p>
@@ -10469,7 +10502,7 @@
           <a:p>
             <a:fld id="{4BD3201E-7DF8-462B-AC18-61E63795AE0D}" type="slidenum">
               <a:rPr lang="en-CA" smtClean="0"/>
-              <a:t>‹N°›</a:t>
+              <a:t>‹#›</a:t>
             </a:fld>
             <a:endParaRPr lang="en-CA"/>
           </a:p>
@@ -10615,7 +10648,7 @@
           <a:p>
             <a:fld id="{CF633E34-DD75-4254-AB88-C9D2090F6CC5}" type="datetimeFigureOut">
               <a:rPr lang="en-CA" smtClean="0"/>
-              <a:t>2024-04-10</a:t>
+              <a:t>2024-04-11</a:t>
             </a:fld>
             <a:endParaRPr lang="en-CA"/>
           </a:p>
@@ -10669,7 +10702,7 @@
           <a:p>
             <a:fld id="{4BD3201E-7DF8-462B-AC18-61E63795AE0D}" type="slidenum">
               <a:rPr lang="en-CA" smtClean="0"/>
-              <a:t>‹N°›</a:t>
+              <a:t>‹#›</a:t>
             </a:fld>
             <a:endParaRPr lang="en-CA"/>
           </a:p>
@@ -10825,7 +10858,7 @@
           <a:p>
             <a:fld id="{CF633E34-DD75-4254-AB88-C9D2090F6CC5}" type="datetimeFigureOut">
               <a:rPr lang="en-CA" smtClean="0"/>
-              <a:t>2024-04-10</a:t>
+              <a:t>2024-04-11</a:t>
             </a:fld>
             <a:endParaRPr lang="en-CA"/>
           </a:p>
@@ -10879,7 +10912,7 @@
           <a:p>
             <a:fld id="{4BD3201E-7DF8-462B-AC18-61E63795AE0D}" type="slidenum">
               <a:rPr lang="en-CA" smtClean="0"/>
-              <a:t>‹N°›</a:t>
+              <a:t>‹#›</a:t>
             </a:fld>
             <a:endParaRPr lang="en-CA"/>
           </a:p>
@@ -11025,7 +11058,7 @@
           <a:p>
             <a:fld id="{CF633E34-DD75-4254-AB88-C9D2090F6CC5}" type="datetimeFigureOut">
               <a:rPr lang="en-CA" smtClean="0"/>
-              <a:t>2024-04-10</a:t>
+              <a:t>2024-04-11</a:t>
             </a:fld>
             <a:endParaRPr lang="en-CA"/>
           </a:p>
@@ -11079,7 +11112,7 @@
           <a:p>
             <a:fld id="{4BD3201E-7DF8-462B-AC18-61E63795AE0D}" type="slidenum">
               <a:rPr lang="en-CA" smtClean="0"/>
-              <a:t>‹N°›</a:t>
+              <a:t>‹#›</a:t>
             </a:fld>
             <a:endParaRPr lang="en-CA"/>
           </a:p>
@@ -11301,7 +11334,7 @@
           <a:p>
             <a:fld id="{CF633E34-DD75-4254-AB88-C9D2090F6CC5}" type="datetimeFigureOut">
               <a:rPr lang="en-CA" smtClean="0"/>
-              <a:t>2024-04-10</a:t>
+              <a:t>2024-04-11</a:t>
             </a:fld>
             <a:endParaRPr lang="en-CA"/>
           </a:p>
@@ -11355,7 +11388,7 @@
           <a:p>
             <a:fld id="{4BD3201E-7DF8-462B-AC18-61E63795AE0D}" type="slidenum">
               <a:rPr lang="en-CA" smtClean="0"/>
-              <a:t>‹N°›</a:t>
+              <a:t>‹#›</a:t>
             </a:fld>
             <a:endParaRPr lang="en-CA"/>
           </a:p>
@@ -11569,7 +11602,7 @@
           <a:p>
             <a:fld id="{CF633E34-DD75-4254-AB88-C9D2090F6CC5}" type="datetimeFigureOut">
               <a:rPr lang="en-CA" smtClean="0"/>
-              <a:t>2024-04-10</a:t>
+              <a:t>2024-04-11</a:t>
             </a:fld>
             <a:endParaRPr lang="en-CA"/>
           </a:p>
@@ -11623,7 +11656,7 @@
           <a:p>
             <a:fld id="{4BD3201E-7DF8-462B-AC18-61E63795AE0D}" type="slidenum">
               <a:rPr lang="en-CA" smtClean="0"/>
-              <a:t>‹N°›</a:t>
+              <a:t>‹#›</a:t>
             </a:fld>
             <a:endParaRPr lang="en-CA"/>
           </a:p>
@@ -11984,7 +12017,7 @@
           <a:p>
             <a:fld id="{CF633E34-DD75-4254-AB88-C9D2090F6CC5}" type="datetimeFigureOut">
               <a:rPr lang="en-CA" smtClean="0"/>
-              <a:t>2024-04-10</a:t>
+              <a:t>2024-04-11</a:t>
             </a:fld>
             <a:endParaRPr lang="en-CA"/>
           </a:p>
@@ -12038,7 +12071,7 @@
           <a:p>
             <a:fld id="{4BD3201E-7DF8-462B-AC18-61E63795AE0D}" type="slidenum">
               <a:rPr lang="en-CA" smtClean="0"/>
-              <a:t>‹N°›</a:t>
+              <a:t>‹#›</a:t>
             </a:fld>
             <a:endParaRPr lang="en-CA"/>
           </a:p>
@@ -12126,7 +12159,7 @@
           <a:p>
             <a:fld id="{CF633E34-DD75-4254-AB88-C9D2090F6CC5}" type="datetimeFigureOut">
               <a:rPr lang="en-CA" smtClean="0"/>
-              <a:t>2024-04-10</a:t>
+              <a:t>2024-04-11</a:t>
             </a:fld>
             <a:endParaRPr lang="en-CA"/>
           </a:p>
@@ -12180,7 +12213,7 @@
           <a:p>
             <a:fld id="{4BD3201E-7DF8-462B-AC18-61E63795AE0D}" type="slidenum">
               <a:rPr lang="en-CA" smtClean="0"/>
-              <a:t>‹N°›</a:t>
+              <a:t>‹#›</a:t>
             </a:fld>
             <a:endParaRPr lang="en-CA"/>
           </a:p>
@@ -12239,7 +12272,7 @@
           <a:p>
             <a:fld id="{CF633E34-DD75-4254-AB88-C9D2090F6CC5}" type="datetimeFigureOut">
               <a:rPr lang="en-CA" smtClean="0"/>
-              <a:t>2024-04-10</a:t>
+              <a:t>2024-04-11</a:t>
             </a:fld>
             <a:endParaRPr lang="en-CA"/>
           </a:p>
@@ -12293,7 +12326,7 @@
           <a:p>
             <a:fld id="{4BD3201E-7DF8-462B-AC18-61E63795AE0D}" type="slidenum">
               <a:rPr lang="en-CA" smtClean="0"/>
-              <a:t>‹N°›</a:t>
+              <a:t>‹#›</a:t>
             </a:fld>
             <a:endParaRPr lang="en-CA"/>
           </a:p>
@@ -12552,7 +12585,7 @@
           <a:p>
             <a:fld id="{CF633E34-DD75-4254-AB88-C9D2090F6CC5}" type="datetimeFigureOut">
               <a:rPr lang="en-CA" smtClean="0"/>
-              <a:t>2024-04-10</a:t>
+              <a:t>2024-04-11</a:t>
             </a:fld>
             <a:endParaRPr lang="en-CA"/>
           </a:p>
@@ -12606,7 +12639,7 @@
           <a:p>
             <a:fld id="{4BD3201E-7DF8-462B-AC18-61E63795AE0D}" type="slidenum">
               <a:rPr lang="en-CA" smtClean="0"/>
-              <a:t>‹N°›</a:t>
+              <a:t>‹#›</a:t>
             </a:fld>
             <a:endParaRPr lang="en-CA"/>
           </a:p>
@@ -12841,7 +12874,7 @@
           <a:p>
             <a:fld id="{CF633E34-DD75-4254-AB88-C9D2090F6CC5}" type="datetimeFigureOut">
               <a:rPr lang="en-CA" smtClean="0"/>
-              <a:t>2024-04-10</a:t>
+              <a:t>2024-04-11</a:t>
             </a:fld>
             <a:endParaRPr lang="en-CA"/>
           </a:p>
@@ -12895,7 +12928,7 @@
           <a:p>
             <a:fld id="{4BD3201E-7DF8-462B-AC18-61E63795AE0D}" type="slidenum">
               <a:rPr lang="en-CA" smtClean="0"/>
-              <a:t>‹N°›</a:t>
+              <a:t>‹#›</a:t>
             </a:fld>
             <a:endParaRPr lang="en-CA"/>
           </a:p>
@@ -13084,7 +13117,7 @@
           <a:p>
             <a:fld id="{CF633E34-DD75-4254-AB88-C9D2090F6CC5}" type="datetimeFigureOut">
               <a:rPr lang="en-CA" smtClean="0"/>
-              <a:t>2024-04-10</a:t>
+              <a:t>2024-04-11</a:t>
             </a:fld>
             <a:endParaRPr lang="en-CA"/>
           </a:p>
@@ -13174,7 +13207,7 @@
           <a:p>
             <a:fld id="{4BD3201E-7DF8-462B-AC18-61E63795AE0D}" type="slidenum">
               <a:rPr lang="en-CA" smtClean="0"/>
-              <a:t>‹N°›</a:t>
+              <a:t>‹#›</a:t>
             </a:fld>
             <a:endParaRPr lang="en-CA"/>
           </a:p>
@@ -14420,8 +14453,8 @@
           </a:p>
         </p:txBody>
       </p:sp>
-      <mc:AlternateContent xmlns:mc="http://schemas.openxmlformats.org/markup-compatibility/2006">
-        <mc:Choice xmlns:a14="http://schemas.microsoft.com/office/drawing/2010/main" Requires="a14">
+      <mc:AlternateContent xmlns:mc="http://schemas.openxmlformats.org/markup-compatibility/2006" xmlns:a14="http://schemas.microsoft.com/office/drawing/2010/main">
+        <mc:Choice Requires="a14">
           <p:sp>
             <p:nvSpPr>
               <p:cNvPr id="3" name="Content Placeholder 2">
@@ -14964,7 +14997,7 @@
             </p:txBody>
           </p:sp>
         </mc:Choice>
-        <mc:Fallback>
+        <mc:Fallback xmlns="">
           <p:sp>
             <p:nvSpPr>
               <p:cNvPr id="3" name="Content Placeholder 2">
@@ -26846,15 +26879,6 @@
 </file>
 
 <file path=customXml/item1.xml><?xml version="1.0" encoding="utf-8"?>
-<?mso-contentType ?>
-<FormTemplates xmlns="http://schemas.microsoft.com/sharepoint/v3/contenttype/forms">
-  <Display>DocumentLibraryForm</Display>
-  <Edit>DocumentLibraryForm</Edit>
-  <New>DocumentLibraryForm</New>
-</FormTemplates>
-</file>
-
-<file path=customXml/item2.xml><?xml version="1.0" encoding="utf-8"?>
 <p:properties xmlns:p="http://schemas.microsoft.com/office/2006/metadata/properties" xmlns:xsi="http://www.w3.org/2001/XMLSchema-instance" xmlns:pc="http://schemas.microsoft.com/office/infopath/2007/PartnerControls">
   <documentManagement>
     <lcf76f155ced4ddcb4097134ff3c332f xmlns="ec825916-6f01-4646-bf11-4e97fdd06dc8">
@@ -26863,6 +26887,15 @@
     <TaxCatchAll xmlns="10202d72-3646-4d36-9cf4-1feba2c78df0" xsi:nil="true"/>
   </documentManagement>
 </p:properties>
+</file>
+
+<file path=customXml/item2.xml><?xml version="1.0" encoding="utf-8"?>
+<?mso-contentType ?>
+<FormTemplates xmlns="http://schemas.microsoft.com/sharepoint/v3/contenttype/forms">
+  <Display>DocumentLibraryForm</Display>
+  <Edit>DocumentLibraryForm</Edit>
+  <New>DocumentLibraryForm</New>
+</FormTemplates>
 </file>
 
 <file path=customXml/item3.xml><?xml version="1.0" encoding="utf-8"?>
@@ -27061,14 +27094,6 @@
 </file>
 
 <file path=customXml/itemProps1.xml><?xml version="1.0" encoding="utf-8"?>
-<ds:datastoreItem xmlns:ds="http://schemas.openxmlformats.org/officeDocument/2006/customXml" ds:itemID="{73F4A501-0066-4B8E-9AA2-A07CF344BF69}">
-  <ds:schemaRefs>
-    <ds:schemaRef ds:uri="http://schemas.microsoft.com/sharepoint/v3/contenttype/forms"/>
-  </ds:schemaRefs>
-</ds:datastoreItem>
-</file>
-
-<file path=customXml/itemProps2.xml><?xml version="1.0" encoding="utf-8"?>
 <ds:datastoreItem xmlns:ds="http://schemas.openxmlformats.org/officeDocument/2006/customXml" ds:itemID="{CC0D4AF6-CA21-4510-812C-479171907BC9}">
   <ds:schemaRefs>
     <ds:schemaRef ds:uri="ec825916-6f01-4646-bf11-4e97fdd06dc8"/>
@@ -27081,6 +27106,14 @@
     <ds:schemaRef ds:uri="http://schemas.microsoft.com/office/2006/metadata/properties"/>
     <ds:schemaRef ds:uri="http://schemas.openxmlformats.org/package/2006/metadata/core-properties"/>
     <ds:schemaRef ds:uri="http://purl.org/dc/elements/1.1/"/>
+  </ds:schemaRefs>
+</ds:datastoreItem>
+</file>
+
+<file path=customXml/itemProps2.xml><?xml version="1.0" encoding="utf-8"?>
+<ds:datastoreItem xmlns:ds="http://schemas.openxmlformats.org/officeDocument/2006/customXml" ds:itemID="{73F4A501-0066-4B8E-9AA2-A07CF344BF69}">
+  <ds:schemaRefs>
+    <ds:schemaRef ds:uri="http://schemas.microsoft.com/sharepoint/v3/contenttype/forms"/>
   </ds:schemaRefs>
 </ds:datastoreItem>
 </file>

</xml_diff>

<commit_message>
Ajouter la vérification dans ppt
</commit_message>
<xml_diff>
--- a/Rapport_Projet_V1.pptx
+++ b/Rapport_Projet_V1.pptx
@@ -5,7 +5,7 @@
     <p:sldMasterId id="2147483648" r:id="rId4"/>
   </p:sldMasterIdLst>
   <p:notesMasterIdLst>
-    <p:notesMasterId r:id="rId27"/>
+    <p:notesMasterId r:id="rId30"/>
   </p:notesMasterIdLst>
   <p:sldIdLst>
     <p:sldId id="256" r:id="rId5"/>
@@ -19,17 +19,20 @@
     <p:sldId id="285" r:id="rId13"/>
     <p:sldId id="288" r:id="rId14"/>
     <p:sldId id="286" r:id="rId15"/>
-    <p:sldId id="281" r:id="rId16"/>
-    <p:sldId id="280" r:id="rId17"/>
-    <p:sldId id="270" r:id="rId18"/>
-    <p:sldId id="274" r:id="rId19"/>
-    <p:sldId id="273" r:id="rId20"/>
-    <p:sldId id="277" r:id="rId21"/>
-    <p:sldId id="279" r:id="rId22"/>
-    <p:sldId id="278" r:id="rId23"/>
-    <p:sldId id="271" r:id="rId24"/>
-    <p:sldId id="283" r:id="rId25"/>
-    <p:sldId id="282" r:id="rId26"/>
+    <p:sldId id="289" r:id="rId16"/>
+    <p:sldId id="291" r:id="rId17"/>
+    <p:sldId id="290" r:id="rId18"/>
+    <p:sldId id="281" r:id="rId19"/>
+    <p:sldId id="280" r:id="rId20"/>
+    <p:sldId id="270" r:id="rId21"/>
+    <p:sldId id="274" r:id="rId22"/>
+    <p:sldId id="273" r:id="rId23"/>
+    <p:sldId id="277" r:id="rId24"/>
+    <p:sldId id="279" r:id="rId25"/>
+    <p:sldId id="278" r:id="rId26"/>
+    <p:sldId id="271" r:id="rId27"/>
+    <p:sldId id="283" r:id="rId28"/>
+    <p:sldId id="282" r:id="rId29"/>
   </p:sldIdLst>
   <p:sldSz cx="12192000" cy="6858000"/>
   <p:notesSz cx="6858000" cy="9144000"/>
@@ -954,7 +957,7 @@
 <file path=ppt/charts/chart1.xml><?xml version="1.0" encoding="utf-8"?>
 <c:chartSpace xmlns:c="http://schemas.openxmlformats.org/drawingml/2006/chart" xmlns:a="http://schemas.openxmlformats.org/drawingml/2006/main" xmlns:r="http://schemas.openxmlformats.org/officeDocument/2006/relationships" xmlns:c16r2="http://schemas.microsoft.com/office/drawing/2015/06/chart">
   <c:date1904 val="0"/>
-  <c:lang val="fr-FR"/>
+  <c:lang val="en-US"/>
   <c:roundedCorners val="0"/>
   <mc:AlternateContent xmlns:mc="http://schemas.openxmlformats.org/markup-compatibility/2006">
     <mc:Choice xmlns:c14="http://schemas.microsoft.com/office/drawing/2007/8/2/chart" Requires="c14">
@@ -2080,7 +2083,7 @@
                   <a:cs typeface="+mn-cs"/>
                 </a:defRPr>
               </a:pPr>
-              <a:endParaRPr lang="fr-FR"/>
+              <a:endParaRPr lang="en-US"/>
             </a:p>
           </c:txPr>
         </c:title>
@@ -2118,7 +2121,7 @@
                 <a:cs typeface="+mn-cs"/>
               </a:defRPr>
             </a:pPr>
-            <a:endParaRPr lang="fr-FR"/>
+            <a:endParaRPr lang="en-US"/>
           </a:p>
         </c:txPr>
         <c:crossAx val="477271791"/>
@@ -2202,7 +2205,7 @@
                   <a:cs typeface="+mn-cs"/>
                 </a:defRPr>
               </a:pPr>
-              <a:endParaRPr lang="fr-FR"/>
+              <a:endParaRPr lang="en-US"/>
             </a:p>
           </c:txPr>
         </c:title>
@@ -2240,7 +2243,7 @@
                 <a:cs typeface="+mn-cs"/>
               </a:defRPr>
             </a:pPr>
-            <a:endParaRPr lang="fr-FR"/>
+            <a:endParaRPr lang="en-US"/>
           </a:p>
         </c:txPr>
         <c:crossAx val="477280911"/>
@@ -2292,7 +2295,7 @@
               <a:cs typeface="+mn-cs"/>
             </a:defRPr>
           </a:pPr>
-          <a:endParaRPr lang="fr-FR"/>
+          <a:endParaRPr lang="en-US"/>
         </a:p>
       </c:txPr>
     </c:legend>
@@ -2321,7 +2324,7 @@
       <a:pPr>
         <a:defRPr/>
       </a:pPr>
-      <a:endParaRPr lang="fr-FR"/>
+      <a:endParaRPr lang="en-US"/>
     </a:p>
   </c:txPr>
   <c:externalData r:id="rId3">
@@ -2333,7 +2336,7 @@
 <file path=ppt/charts/chart2.xml><?xml version="1.0" encoding="utf-8"?>
 <c:chartSpace xmlns:c="http://schemas.openxmlformats.org/drawingml/2006/chart" xmlns:a="http://schemas.openxmlformats.org/drawingml/2006/main" xmlns:r="http://schemas.openxmlformats.org/officeDocument/2006/relationships" xmlns:c16r2="http://schemas.microsoft.com/office/drawing/2015/06/chart">
   <c:date1904 val="0"/>
-  <c:lang val="fr-FR"/>
+  <c:lang val="en-US"/>
   <c:roundedCorners val="0"/>
   <mc:AlternateContent xmlns:mc="http://schemas.openxmlformats.org/markup-compatibility/2006">
     <mc:Choice xmlns:c14="http://schemas.microsoft.com/office/drawing/2007/8/2/chart" Requires="c14">
@@ -2408,7 +2411,7 @@
               <a:cs typeface="+mn-cs"/>
             </a:defRPr>
           </a:pPr>
-          <a:endParaRPr lang="fr-FR"/>
+          <a:endParaRPr lang="en-US"/>
         </a:p>
       </c:txPr>
     </c:title>
@@ -2499,7 +2502,7 @@
                       <a:cs typeface="+mn-cs"/>
                     </a:defRPr>
                   </a:pPr>
-                  <a:endParaRPr lang="fr-FR"/>
+                  <a:endParaRPr lang="en-US"/>
                 </a:p>
               </c:txPr>
             </c:trendlineLbl>
@@ -2642,7 +2645,7 @@
                             <a:cs typeface="+mn-cs"/>
                           </a:defRPr>
                         </a:pPr>
-                        <a:endParaRPr lang="fr-FR"/>
+                        <a:endParaRPr lang="en-US"/>
                       </a:p>
                     </c:txPr>
                   </c:trendlineLbl>
@@ -2784,7 +2787,7 @@
                   <a:cs typeface="+mn-cs"/>
                 </a:defRPr>
               </a:pPr>
-              <a:endParaRPr lang="fr-FR"/>
+              <a:endParaRPr lang="en-US"/>
             </a:p>
           </c:txPr>
         </c:title>
@@ -2822,7 +2825,7 @@
                 <a:cs typeface="+mn-cs"/>
               </a:defRPr>
             </a:pPr>
-            <a:endParaRPr lang="fr-FR"/>
+            <a:endParaRPr lang="en-US"/>
           </a:p>
         </c:txPr>
         <c:crossAx val="1420657695"/>
@@ -2906,7 +2909,7 @@
                   <a:cs typeface="+mn-cs"/>
                 </a:defRPr>
               </a:pPr>
-              <a:endParaRPr lang="fr-FR"/>
+              <a:endParaRPr lang="en-US"/>
             </a:p>
           </c:txPr>
         </c:title>
@@ -2944,7 +2947,7 @@
                 <a:cs typeface="+mn-cs"/>
               </a:defRPr>
             </a:pPr>
-            <a:endParaRPr lang="fr-FR"/>
+            <a:endParaRPr lang="en-US"/>
           </a:p>
         </c:txPr>
         <c:crossAx val="1911372511"/>
@@ -2984,7 +2987,7 @@
       <a:pPr>
         <a:defRPr/>
       </a:pPr>
-      <a:endParaRPr lang="fr-FR"/>
+      <a:endParaRPr lang="en-US"/>
     </a:p>
   </c:txPr>
   <c:externalData r:id="rId3">
@@ -2996,7 +2999,411 @@
 <file path=ppt/charts/chart3.xml><?xml version="1.0" encoding="utf-8"?>
 <c:chartSpace xmlns:c="http://schemas.openxmlformats.org/drawingml/2006/chart" xmlns:a="http://schemas.openxmlformats.org/drawingml/2006/main" xmlns:r="http://schemas.openxmlformats.org/officeDocument/2006/relationships" xmlns:c16r2="http://schemas.microsoft.com/office/drawing/2015/06/chart">
   <c:date1904 val="0"/>
-  <c:lang val="fr-FR"/>
+  <c:lang val="en-US"/>
+  <c:roundedCorners val="0"/>
+  <mc:AlternateContent xmlns:mc="http://schemas.openxmlformats.org/markup-compatibility/2006">
+    <mc:Choice xmlns:c14="http://schemas.microsoft.com/office/drawing/2007/8/2/chart" Requires="c14">
+      <c14:style val="102"/>
+    </mc:Choice>
+    <mc:Fallback>
+      <c:style val="2"/>
+    </mc:Fallback>
+  </mc:AlternateContent>
+  <c:chart>
+    <c:title>
+      <c:tx>
+        <c:rich>
+          <a:bodyPr rot="0" spcFirstLastPara="1" vertOverflow="ellipsis" vert="horz" wrap="square" anchor="ctr" anchorCtr="1"/>
+          <a:lstStyle/>
+          <a:p>
+            <a:pPr>
+              <a:defRPr sz="1400" b="0" i="0" u="none" strike="noStrike" kern="1200" spc="0" baseline="0">
+                <a:solidFill>
+                  <a:schemeClr val="tx1">
+                    <a:lumMod val="65000"/>
+                    <a:lumOff val="35000"/>
+                  </a:schemeClr>
+                </a:solidFill>
+                <a:latin typeface="+mn-lt"/>
+                <a:ea typeface="+mn-ea"/>
+                <a:cs typeface="+mn-cs"/>
+              </a:defRPr>
+            </a:pPr>
+            <a:r>
+              <a:rPr lang="en-CA"/>
+              <a:t>Convergence de l'erreur</a:t>
+            </a:r>
+            <a:r>
+              <a:rPr lang="en-CA" baseline="0"/>
+              <a:t> de déformation en fonction de h</a:t>
+            </a:r>
+            <a:endParaRPr lang="en-CA"/>
+          </a:p>
+        </c:rich>
+      </c:tx>
+      <c:overlay val="0"/>
+      <c:spPr>
+        <a:noFill/>
+        <a:ln>
+          <a:noFill/>
+        </a:ln>
+        <a:effectLst/>
+      </c:spPr>
+      <c:txPr>
+        <a:bodyPr rot="0" spcFirstLastPara="1" vertOverflow="ellipsis" vert="horz" wrap="square" anchor="ctr" anchorCtr="1"/>
+        <a:lstStyle/>
+        <a:p>
+          <a:pPr>
+            <a:defRPr sz="1400" b="0" i="0" u="none" strike="noStrike" kern="1200" spc="0" baseline="0">
+              <a:solidFill>
+                <a:schemeClr val="tx1">
+                  <a:lumMod val="65000"/>
+                  <a:lumOff val="35000"/>
+                </a:schemeClr>
+              </a:solidFill>
+              <a:latin typeface="+mn-lt"/>
+              <a:ea typeface="+mn-ea"/>
+              <a:cs typeface="+mn-cs"/>
+            </a:defRPr>
+          </a:pPr>
+          <a:endParaRPr lang="en-US"/>
+        </a:p>
+      </c:txPr>
+    </c:title>
+    <c:autoTitleDeleted val="0"/>
+    <c:plotArea>
+      <c:layout/>
+      <c:scatterChart>
+        <c:scatterStyle val="lineMarker"/>
+        <c:varyColors val="0"/>
+        <c:ser>
+          <c:idx val="0"/>
+          <c:order val="0"/>
+          <c:tx>
+            <c:v>Erreur de déformation</c:v>
+          </c:tx>
+          <c:spPr>
+            <a:ln w="25400" cap="rnd">
+              <a:noFill/>
+              <a:round/>
+            </a:ln>
+            <a:effectLst/>
+          </c:spPr>
+          <c:marker>
+            <c:symbol val="circle"/>
+            <c:size val="5"/>
+            <c:spPr>
+              <a:solidFill>
+                <a:schemeClr val="accent1"/>
+              </a:solidFill>
+              <a:ln w="9525">
+                <a:solidFill>
+                  <a:schemeClr val="accent1"/>
+                </a:solidFill>
+              </a:ln>
+              <a:effectLst/>
+            </c:spPr>
+          </c:marker>
+          <c:trendline>
+            <c:spPr>
+              <a:ln w="19050" cap="rnd">
+                <a:solidFill>
+                  <a:schemeClr val="accent1"/>
+                </a:solidFill>
+                <a:prstDash val="sysDot"/>
+              </a:ln>
+              <a:effectLst/>
+            </c:spPr>
+            <c:trendlineType val="power"/>
+            <c:dispRSqr val="1"/>
+            <c:dispEq val="1"/>
+            <c:trendlineLbl>
+              <c:numFmt formatCode="General" sourceLinked="0"/>
+              <c:spPr>
+                <a:noFill/>
+                <a:ln>
+                  <a:noFill/>
+                </a:ln>
+                <a:effectLst/>
+              </c:spPr>
+              <c:txPr>
+                <a:bodyPr rot="0" spcFirstLastPara="1" vertOverflow="ellipsis" vert="horz" wrap="square" anchor="ctr" anchorCtr="1"/>
+                <a:lstStyle/>
+                <a:p>
+                  <a:pPr>
+                    <a:defRPr sz="900" b="0" i="0" u="none" strike="noStrike" kern="1200" baseline="0">
+                      <a:solidFill>
+                        <a:schemeClr val="tx1">
+                          <a:lumMod val="65000"/>
+                          <a:lumOff val="35000"/>
+                        </a:schemeClr>
+                      </a:solidFill>
+                      <a:latin typeface="+mn-lt"/>
+                      <a:ea typeface="+mn-ea"/>
+                      <a:cs typeface="+mn-cs"/>
+                    </a:defRPr>
+                  </a:pPr>
+                  <a:endParaRPr lang="en-US"/>
+                </a:p>
+              </c:txPr>
+            </c:trendlineLbl>
+          </c:trendline>
+          <c:xVal>
+            <c:numRef>
+              <c:f>Sheet1!$AB$3:$AI$3</c:f>
+              <c:numCache>
+                <c:formatCode>General</c:formatCode>
+                <c:ptCount val="8"/>
+                <c:pt idx="0">
+                  <c:v>500</c:v>
+                </c:pt>
+                <c:pt idx="1">
+                  <c:v>250</c:v>
+                </c:pt>
+                <c:pt idx="2">
+                  <c:v>125</c:v>
+                </c:pt>
+                <c:pt idx="3">
+                  <c:v>62.5</c:v>
+                </c:pt>
+                <c:pt idx="4">
+                  <c:v>31.25</c:v>
+                </c:pt>
+                <c:pt idx="5">
+                  <c:v>15.625</c:v>
+                </c:pt>
+                <c:pt idx="6">
+                  <c:v>7.8125</c:v>
+                </c:pt>
+                <c:pt idx="7">
+                  <c:v>3.90625</c:v>
+                </c:pt>
+              </c:numCache>
+            </c:numRef>
+          </c:xVal>
+          <c:yVal>
+            <c:numRef>
+              <c:f>Sheet1!$P$3:$W$3</c:f>
+              <c:numCache>
+                <c:formatCode>General</c:formatCode>
+                <c:ptCount val="8"/>
+                <c:pt idx="0">
+                  <c:v>6.3078313813422824</c:v>
+                </c:pt>
+                <c:pt idx="1">
+                  <c:v>3.1539156906711412</c:v>
+                </c:pt>
+                <c:pt idx="2">
+                  <c:v>1.5769578453355706</c:v>
+                </c:pt>
+                <c:pt idx="3">
+                  <c:v>0.7884789226677853</c:v>
+                </c:pt>
+                <c:pt idx="4">
+                  <c:v>0.39423946133389265</c:v>
+                </c:pt>
+                <c:pt idx="5">
+                  <c:v>0.19711973066694632</c:v>
+                </c:pt>
+                <c:pt idx="6">
+                  <c:v>9.8561126899749135E-2</c:v>
+                </c:pt>
+                <c:pt idx="7">
+                  <c:v>4.9279301883598609E-2</c:v>
+                </c:pt>
+              </c:numCache>
+            </c:numRef>
+          </c:yVal>
+          <c:smooth val="0"/>
+          <c:extLst>
+            <c:ext xmlns:c16="http://schemas.microsoft.com/office/drawing/2014/chart" uri="{C3380CC4-5D6E-409C-BE32-E72D297353CC}">
+              <c16:uniqueId val="{00000001-A80C-4654-A8AE-01D6AEE703EA}"/>
+            </c:ext>
+          </c:extLst>
+        </c:ser>
+        <c:dLbls>
+          <c:showLegendKey val="0"/>
+          <c:showVal val="0"/>
+          <c:showCatName val="0"/>
+          <c:showSerName val="0"/>
+          <c:showPercent val="0"/>
+          <c:showBubbleSize val="0"/>
+        </c:dLbls>
+        <c:axId val="642881968"/>
+        <c:axId val="642880048"/>
+      </c:scatterChart>
+      <c:valAx>
+        <c:axId val="642881968"/>
+        <c:scaling>
+          <c:logBase val="10"/>
+          <c:orientation val="minMax"/>
+        </c:scaling>
+        <c:delete val="0"/>
+        <c:axPos val="b"/>
+        <c:majorGridlines>
+          <c:spPr>
+            <a:ln w="9525" cap="flat" cmpd="sng" algn="ctr">
+              <a:solidFill>
+                <a:schemeClr val="tx1">
+                  <a:lumMod val="15000"/>
+                  <a:lumOff val="85000"/>
+                </a:schemeClr>
+              </a:solidFill>
+              <a:round/>
+            </a:ln>
+            <a:effectLst/>
+          </c:spPr>
+        </c:majorGridlines>
+        <c:numFmt formatCode="General" sourceLinked="1"/>
+        <c:majorTickMark val="none"/>
+        <c:minorTickMark val="none"/>
+        <c:tickLblPos val="nextTo"/>
+        <c:spPr>
+          <a:noFill/>
+          <a:ln w="9525" cap="flat" cmpd="sng" algn="ctr">
+            <a:solidFill>
+              <a:schemeClr val="tx1">
+                <a:lumMod val="25000"/>
+                <a:lumOff val="75000"/>
+              </a:schemeClr>
+            </a:solidFill>
+            <a:round/>
+          </a:ln>
+          <a:effectLst/>
+        </c:spPr>
+        <c:txPr>
+          <a:bodyPr rot="-60000000" spcFirstLastPara="1" vertOverflow="ellipsis" vert="horz" wrap="square" anchor="ctr" anchorCtr="1"/>
+          <a:lstStyle/>
+          <a:p>
+            <a:pPr>
+              <a:defRPr sz="900" b="0" i="0" u="none" strike="noStrike" kern="1200" baseline="0">
+                <a:solidFill>
+                  <a:schemeClr val="tx1">
+                    <a:lumMod val="65000"/>
+                    <a:lumOff val="35000"/>
+                  </a:schemeClr>
+                </a:solidFill>
+                <a:latin typeface="+mn-lt"/>
+                <a:ea typeface="+mn-ea"/>
+                <a:cs typeface="+mn-cs"/>
+              </a:defRPr>
+            </a:pPr>
+            <a:endParaRPr lang="en-US"/>
+          </a:p>
+        </c:txPr>
+        <c:crossAx val="642880048"/>
+        <c:crosses val="autoZero"/>
+        <c:crossBetween val="midCat"/>
+      </c:valAx>
+      <c:valAx>
+        <c:axId val="642880048"/>
+        <c:scaling>
+          <c:logBase val="10"/>
+          <c:orientation val="minMax"/>
+        </c:scaling>
+        <c:delete val="0"/>
+        <c:axPos val="l"/>
+        <c:majorGridlines>
+          <c:spPr>
+            <a:ln w="9525" cap="flat" cmpd="sng" algn="ctr">
+              <a:solidFill>
+                <a:schemeClr val="tx1">
+                  <a:lumMod val="15000"/>
+                  <a:lumOff val="85000"/>
+                </a:schemeClr>
+              </a:solidFill>
+              <a:round/>
+            </a:ln>
+            <a:effectLst/>
+          </c:spPr>
+        </c:majorGridlines>
+        <c:numFmt formatCode="General" sourceLinked="1"/>
+        <c:majorTickMark val="none"/>
+        <c:minorTickMark val="none"/>
+        <c:tickLblPos val="nextTo"/>
+        <c:spPr>
+          <a:noFill/>
+          <a:ln w="9525" cap="flat" cmpd="sng" algn="ctr">
+            <a:solidFill>
+              <a:schemeClr val="tx1">
+                <a:lumMod val="25000"/>
+                <a:lumOff val="75000"/>
+              </a:schemeClr>
+            </a:solidFill>
+            <a:round/>
+          </a:ln>
+          <a:effectLst/>
+        </c:spPr>
+        <c:txPr>
+          <a:bodyPr rot="-60000000" spcFirstLastPara="1" vertOverflow="ellipsis" vert="horz" wrap="square" anchor="ctr" anchorCtr="1"/>
+          <a:lstStyle/>
+          <a:p>
+            <a:pPr>
+              <a:defRPr sz="900" b="0" i="0" u="none" strike="noStrike" kern="1200" baseline="0">
+                <a:solidFill>
+                  <a:schemeClr val="tx1">
+                    <a:lumMod val="65000"/>
+                    <a:lumOff val="35000"/>
+                  </a:schemeClr>
+                </a:solidFill>
+                <a:latin typeface="+mn-lt"/>
+                <a:ea typeface="+mn-ea"/>
+                <a:cs typeface="+mn-cs"/>
+              </a:defRPr>
+            </a:pPr>
+            <a:endParaRPr lang="en-US"/>
+          </a:p>
+        </c:txPr>
+        <c:crossAx val="642881968"/>
+        <c:crosses val="autoZero"/>
+        <c:crossBetween val="midCat"/>
+      </c:valAx>
+      <c:spPr>
+        <a:noFill/>
+        <a:ln>
+          <a:noFill/>
+        </a:ln>
+        <a:effectLst/>
+      </c:spPr>
+    </c:plotArea>
+    <c:plotVisOnly val="1"/>
+    <c:dispBlanksAs val="gap"/>
+    <c:extLst>
+      <c:ext xmlns:c16r3="http://schemas.microsoft.com/office/drawing/2017/03/chart" uri="{56B9EC1D-385E-4148-901F-78D8002777C0}">
+        <c16r3:dataDisplayOptions16>
+          <c16r3:dispNaAsBlank val="1"/>
+        </c16r3:dataDisplayOptions16>
+      </c:ext>
+    </c:extLst>
+    <c:showDLblsOverMax val="0"/>
+  </c:chart>
+  <c:spPr>
+    <a:noFill/>
+    <a:ln>
+      <a:noFill/>
+    </a:ln>
+    <a:effectLst/>
+  </c:spPr>
+  <c:txPr>
+    <a:bodyPr/>
+    <a:lstStyle/>
+    <a:p>
+      <a:pPr>
+        <a:defRPr/>
+      </a:pPr>
+      <a:endParaRPr lang="en-US"/>
+    </a:p>
+  </c:txPr>
+  <c:externalData r:id="rId3">
+    <c:autoUpdate val="0"/>
+  </c:externalData>
+</c:chartSpace>
+</file>
+
+<file path=ppt/charts/chart4.xml><?xml version="1.0" encoding="utf-8"?>
+<c:chartSpace xmlns:c="http://schemas.openxmlformats.org/drawingml/2006/chart" xmlns:a="http://schemas.openxmlformats.org/drawingml/2006/main" xmlns:r="http://schemas.openxmlformats.org/officeDocument/2006/relationships" xmlns:c16r2="http://schemas.microsoft.com/office/drawing/2015/06/chart">
+  <c:date1904 val="0"/>
+  <c:lang val="en-US"/>
   <c:roundedCorners val="0"/>
   <mc:AlternateContent xmlns:mc="http://schemas.openxmlformats.org/markup-compatibility/2006">
     <mc:Choice xmlns:c14="http://schemas.microsoft.com/office/drawing/2007/8/2/chart" Requires="c14">
@@ -3757,7 +4164,7 @@
                   <a:cs typeface="+mn-cs"/>
                 </a:defRPr>
               </a:pPr>
-              <a:endParaRPr lang="fr-FR"/>
+              <a:endParaRPr lang="en-US"/>
             </a:p>
           </c:txPr>
         </c:title>
@@ -3795,7 +4202,7 @@
                 <a:cs typeface="+mn-cs"/>
               </a:defRPr>
             </a:pPr>
-            <a:endParaRPr lang="fr-FR"/>
+            <a:endParaRPr lang="en-US"/>
           </a:p>
         </c:txPr>
         <c:crossAx val="1457253920"/>
@@ -3875,7 +4282,7 @@
                   <a:cs typeface="+mn-cs"/>
                 </a:defRPr>
               </a:pPr>
-              <a:endParaRPr lang="fr-FR"/>
+              <a:endParaRPr lang="en-US"/>
             </a:p>
           </c:txPr>
         </c:title>
@@ -3913,7 +4320,7 @@
                 <a:cs typeface="+mn-cs"/>
               </a:defRPr>
             </a:pPr>
-            <a:endParaRPr lang="fr-FR"/>
+            <a:endParaRPr lang="en-US"/>
           </a:p>
         </c:txPr>
         <c:crossAx val="1457258720"/>
@@ -3953,7 +4360,7 @@
       <a:pPr>
         <a:defRPr/>
       </a:pPr>
-      <a:endParaRPr lang="fr-FR"/>
+      <a:endParaRPr lang="en-US"/>
     </a:p>
   </c:txPr>
   <c:externalData r:id="rId3">
@@ -3962,10 +4369,10 @@
 </c:chartSpace>
 </file>
 
-<file path=ppt/charts/chart4.xml><?xml version="1.0" encoding="utf-8"?>
+<file path=ppt/charts/chart5.xml><?xml version="1.0" encoding="utf-8"?>
 <c:chartSpace xmlns:c="http://schemas.openxmlformats.org/drawingml/2006/chart" xmlns:a="http://schemas.openxmlformats.org/drawingml/2006/main" xmlns:r="http://schemas.openxmlformats.org/officeDocument/2006/relationships" xmlns:c16r2="http://schemas.microsoft.com/office/drawing/2015/06/chart">
   <c:date1904 val="0"/>
-  <c:lang val="fr-FR"/>
+  <c:lang val="en-US"/>
   <c:roundedCorners val="0"/>
   <mc:AlternateContent xmlns:mc="http://schemas.openxmlformats.org/markup-compatibility/2006">
     <mc:Choice xmlns:c14="http://schemas.microsoft.com/office/drawing/2007/8/2/chart" Requires="c14">
@@ -4738,7 +5145,7 @@
                   <a:cs typeface="+mn-cs"/>
                 </a:defRPr>
               </a:pPr>
-              <a:endParaRPr lang="fr-FR"/>
+              <a:endParaRPr lang="en-US"/>
             </a:p>
           </c:txPr>
         </c:title>
@@ -4776,7 +5183,7 @@
                 <a:cs typeface="+mn-cs"/>
               </a:defRPr>
             </a:pPr>
-            <a:endParaRPr lang="fr-FR"/>
+            <a:endParaRPr lang="en-US"/>
           </a:p>
         </c:txPr>
         <c:crossAx val="2041938592"/>
@@ -4856,7 +5263,7 @@
                   <a:cs typeface="+mn-cs"/>
                 </a:defRPr>
               </a:pPr>
-              <a:endParaRPr lang="fr-FR"/>
+              <a:endParaRPr lang="en-US"/>
             </a:p>
           </c:txPr>
         </c:title>
@@ -4894,7 +5301,7 @@
                 <a:cs typeface="+mn-cs"/>
               </a:defRPr>
             </a:pPr>
-            <a:endParaRPr lang="fr-FR"/>
+            <a:endParaRPr lang="en-US"/>
           </a:p>
         </c:txPr>
         <c:crossAx val="2041944352"/>
@@ -4934,7 +5341,7 @@
       <a:pPr>
         <a:defRPr/>
       </a:pPr>
-      <a:endParaRPr lang="fr-FR"/>
+      <a:endParaRPr lang="en-US"/>
     </a:p>
   </c:txPr>
   <c:externalData r:id="rId3">
@@ -4943,10 +5350,10 @@
 </c:chartSpace>
 </file>
 
-<file path=ppt/charts/chart5.xml><?xml version="1.0" encoding="utf-8"?>
+<file path=ppt/charts/chart6.xml><?xml version="1.0" encoding="utf-8"?>
 <c:chartSpace xmlns:c="http://schemas.openxmlformats.org/drawingml/2006/chart" xmlns:a="http://schemas.openxmlformats.org/drawingml/2006/main" xmlns:r="http://schemas.openxmlformats.org/officeDocument/2006/relationships" xmlns:c16r2="http://schemas.microsoft.com/office/drawing/2015/06/chart">
   <c:date1904 val="0"/>
-  <c:lang val="fr-FR"/>
+  <c:lang val="en-US"/>
   <c:roundedCorners val="0"/>
   <mc:AlternateContent xmlns:mc="http://schemas.openxmlformats.org/markup-compatibility/2006">
     <mc:Choice xmlns:c14="http://schemas.microsoft.com/office/drawing/2007/8/2/chart" Requires="c14">
@@ -5753,7 +6160,7 @@
                   <a:cs typeface="+mn-cs"/>
                 </a:defRPr>
               </a:pPr>
-              <a:endParaRPr lang="fr-FR"/>
+              <a:endParaRPr lang="en-US"/>
             </a:p>
           </c:txPr>
         </c:title>
@@ -5791,7 +6198,7 @@
                 <a:cs typeface="+mn-cs"/>
               </a:defRPr>
             </a:pPr>
-            <a:endParaRPr lang="fr-FR"/>
+            <a:endParaRPr lang="en-US"/>
           </a:p>
         </c:txPr>
         <c:crossAx val="2041041472"/>
@@ -5871,7 +6278,7 @@
                   <a:cs typeface="+mn-cs"/>
                 </a:defRPr>
               </a:pPr>
-              <a:endParaRPr lang="fr-FR"/>
+              <a:endParaRPr lang="en-US"/>
             </a:p>
           </c:txPr>
         </c:title>
@@ -5909,7 +6316,7 @@
                 <a:cs typeface="+mn-cs"/>
               </a:defRPr>
             </a:pPr>
-            <a:endParaRPr lang="fr-FR"/>
+            <a:endParaRPr lang="en-US"/>
           </a:p>
         </c:txPr>
         <c:crossAx val="2041040032"/>
@@ -5949,7 +6356,7 @@
       <a:pPr>
         <a:defRPr/>
       </a:pPr>
-      <a:endParaRPr lang="fr-FR"/>
+      <a:endParaRPr lang="en-US"/>
     </a:p>
   </c:txPr>
   <c:externalData r:id="rId3">
@@ -5958,10 +6365,10 @@
 </c:chartSpace>
 </file>
 
-<file path=ppt/charts/chart6.xml><?xml version="1.0" encoding="utf-8"?>
+<file path=ppt/charts/chart7.xml><?xml version="1.0" encoding="utf-8"?>
 <c:chartSpace xmlns:c="http://schemas.openxmlformats.org/drawingml/2006/chart" xmlns:a="http://schemas.openxmlformats.org/drawingml/2006/main" xmlns:r="http://schemas.openxmlformats.org/officeDocument/2006/relationships" xmlns:c16r2="http://schemas.microsoft.com/office/drawing/2015/06/chart">
   <c:date1904 val="0"/>
-  <c:lang val="fr-FR"/>
+  <c:lang val="en-US"/>
   <c:roundedCorners val="0"/>
   <mc:AlternateContent xmlns:mc="http://schemas.openxmlformats.org/markup-compatibility/2006">
     <mc:Choice xmlns:c14="http://schemas.microsoft.com/office/drawing/2007/8/2/chart" Requires="c14">
@@ -6209,7 +6616,7 @@
                   <a:cs typeface="+mn-cs"/>
                 </a:defRPr>
               </a:pPr>
-              <a:endParaRPr lang="fr-FR"/>
+              <a:endParaRPr lang="en-US"/>
             </a:p>
           </c:txPr>
         </c:title>
@@ -6247,7 +6654,7 @@
                 <a:cs typeface="+mn-cs"/>
               </a:defRPr>
             </a:pPr>
-            <a:endParaRPr lang="fr-FR"/>
+            <a:endParaRPr lang="en-US"/>
           </a:p>
         </c:txPr>
         <c:crossAx val="1632011967"/>
@@ -6287,7 +6694,7 @@
       <a:pPr>
         <a:defRPr/>
       </a:pPr>
-      <a:endParaRPr lang="fr-FR"/>
+      <a:endParaRPr lang="en-US"/>
     </a:p>
   </c:txPr>
   <c:externalData r:id="rId3">
@@ -6497,6 +6904,46 @@
 </file>
 
 <file path=ppt/charts/colors6.xml><?xml version="1.0" encoding="utf-8"?>
+<cs:colorStyle xmlns:cs="http://schemas.microsoft.com/office/drawing/2012/chartStyle" xmlns:a="http://schemas.openxmlformats.org/drawingml/2006/main" meth="cycle" id="10">
+  <a:schemeClr val="accent1"/>
+  <a:schemeClr val="accent2"/>
+  <a:schemeClr val="accent3"/>
+  <a:schemeClr val="accent4"/>
+  <a:schemeClr val="accent5"/>
+  <a:schemeClr val="accent6"/>
+  <cs:variation/>
+  <cs:variation>
+    <a:lumMod val="60000"/>
+  </cs:variation>
+  <cs:variation>
+    <a:lumMod val="80000"/>
+    <a:lumOff val="20000"/>
+  </cs:variation>
+  <cs:variation>
+    <a:lumMod val="80000"/>
+  </cs:variation>
+  <cs:variation>
+    <a:lumMod val="60000"/>
+    <a:lumOff val="40000"/>
+  </cs:variation>
+  <cs:variation>
+    <a:lumMod val="50000"/>
+  </cs:variation>
+  <cs:variation>
+    <a:lumMod val="70000"/>
+    <a:lumOff val="30000"/>
+  </cs:variation>
+  <cs:variation>
+    <a:lumMod val="70000"/>
+  </cs:variation>
+  <cs:variation>
+    <a:lumMod val="50000"/>
+    <a:lumOff val="50000"/>
+  </cs:variation>
+</cs:colorStyle>
+</file>
+
+<file path=ppt/charts/colors7.xml><?xml version="1.0" encoding="utf-8"?>
 <cs:colorStyle xmlns:cs="http://schemas.microsoft.com/office/drawing/2012/chartStyle" xmlns:a="http://schemas.openxmlformats.org/drawingml/2006/main" meth="cycle" id="10">
   <a:schemeClr val="accent1"/>
   <a:schemeClr val="accent2"/>
@@ -9632,6 +10079,522 @@
 </cs:chartStyle>
 </file>
 
+<file path=ppt/charts/style7.xml><?xml version="1.0" encoding="utf-8"?>
+<cs:chartStyle xmlns:cs="http://schemas.microsoft.com/office/drawing/2012/chartStyle" xmlns:a="http://schemas.openxmlformats.org/drawingml/2006/main" id="240">
+  <cs:axisTitle>
+    <cs:lnRef idx="0"/>
+    <cs:fillRef idx="0"/>
+    <cs:effectRef idx="0"/>
+    <cs:fontRef idx="minor">
+      <a:schemeClr val="tx1">
+        <a:lumMod val="65000"/>
+        <a:lumOff val="35000"/>
+      </a:schemeClr>
+    </cs:fontRef>
+    <cs:defRPr sz="1000" kern="1200"/>
+  </cs:axisTitle>
+  <cs:categoryAxis>
+    <cs:lnRef idx="0"/>
+    <cs:fillRef idx="0"/>
+    <cs:effectRef idx="0"/>
+    <cs:fontRef idx="minor">
+      <a:schemeClr val="tx1">
+        <a:lumMod val="65000"/>
+        <a:lumOff val="35000"/>
+      </a:schemeClr>
+    </cs:fontRef>
+    <cs:spPr>
+      <a:ln w="9525" cap="flat" cmpd="sng" algn="ctr">
+        <a:solidFill>
+          <a:schemeClr val="tx1">
+            <a:lumMod val="25000"/>
+            <a:lumOff val="75000"/>
+          </a:schemeClr>
+        </a:solidFill>
+        <a:round/>
+      </a:ln>
+    </cs:spPr>
+    <cs:defRPr sz="900" kern="1200"/>
+  </cs:categoryAxis>
+  <cs:chartArea mods="allowNoFillOverride allowNoLineOverride">
+    <cs:lnRef idx="0"/>
+    <cs:fillRef idx="0"/>
+    <cs:effectRef idx="0"/>
+    <cs:fontRef idx="minor">
+      <a:schemeClr val="tx1"/>
+    </cs:fontRef>
+    <cs:spPr>
+      <a:solidFill>
+        <a:schemeClr val="bg1"/>
+      </a:solidFill>
+      <a:ln w="9525" cap="flat" cmpd="sng" algn="ctr">
+        <a:solidFill>
+          <a:schemeClr val="tx1">
+            <a:lumMod val="15000"/>
+            <a:lumOff val="85000"/>
+          </a:schemeClr>
+        </a:solidFill>
+        <a:round/>
+      </a:ln>
+    </cs:spPr>
+    <cs:defRPr sz="1000" kern="1200"/>
+  </cs:chartArea>
+  <cs:dataLabel>
+    <cs:lnRef idx="0"/>
+    <cs:fillRef idx="0"/>
+    <cs:effectRef idx="0"/>
+    <cs:fontRef idx="minor">
+      <a:schemeClr val="tx1">
+        <a:lumMod val="75000"/>
+        <a:lumOff val="25000"/>
+      </a:schemeClr>
+    </cs:fontRef>
+    <cs:defRPr sz="900" kern="1200"/>
+  </cs:dataLabel>
+  <cs:dataLabelCallout>
+    <cs:lnRef idx="0"/>
+    <cs:fillRef idx="0"/>
+    <cs:effectRef idx="0"/>
+    <cs:fontRef idx="minor">
+      <a:schemeClr val="dk1">
+        <a:lumMod val="65000"/>
+        <a:lumOff val="35000"/>
+      </a:schemeClr>
+    </cs:fontRef>
+    <cs:spPr>
+      <a:solidFill>
+        <a:schemeClr val="lt1"/>
+      </a:solidFill>
+      <a:ln>
+        <a:solidFill>
+          <a:schemeClr val="dk1">
+            <a:lumMod val="25000"/>
+            <a:lumOff val="75000"/>
+          </a:schemeClr>
+        </a:solidFill>
+      </a:ln>
+    </cs:spPr>
+    <cs:defRPr sz="900" kern="1200"/>
+    <cs:bodyPr rot="0" spcFirstLastPara="1" vertOverflow="clip" horzOverflow="clip" vert="horz" wrap="square" lIns="36576" tIns="18288" rIns="36576" bIns="18288" anchor="ctr" anchorCtr="1">
+      <a:spAutoFit/>
+    </cs:bodyPr>
+  </cs:dataLabelCallout>
+  <cs:dataPoint>
+    <cs:lnRef idx="0"/>
+    <cs:fillRef idx="1">
+      <cs:styleClr val="auto"/>
+    </cs:fillRef>
+    <cs:effectRef idx="0"/>
+    <cs:fontRef idx="minor">
+      <a:schemeClr val="tx1"/>
+    </cs:fontRef>
+  </cs:dataPoint>
+  <cs:dataPoint3D>
+    <cs:lnRef idx="0"/>
+    <cs:fillRef idx="1">
+      <cs:styleClr val="auto"/>
+    </cs:fillRef>
+    <cs:effectRef idx="0"/>
+    <cs:fontRef idx="minor">
+      <a:schemeClr val="tx1"/>
+    </cs:fontRef>
+  </cs:dataPoint3D>
+  <cs:dataPointLine>
+    <cs:lnRef idx="0">
+      <cs:styleClr val="auto"/>
+    </cs:lnRef>
+    <cs:fillRef idx="1"/>
+    <cs:effectRef idx="0"/>
+    <cs:fontRef idx="minor">
+      <a:schemeClr val="tx1"/>
+    </cs:fontRef>
+    <cs:spPr>
+      <a:ln w="19050" cap="rnd">
+        <a:solidFill>
+          <a:schemeClr val="phClr"/>
+        </a:solidFill>
+        <a:round/>
+      </a:ln>
+    </cs:spPr>
+  </cs:dataPointLine>
+  <cs:dataPointMarker>
+    <cs:lnRef idx="0">
+      <cs:styleClr val="auto"/>
+    </cs:lnRef>
+    <cs:fillRef idx="1">
+      <cs:styleClr val="auto"/>
+    </cs:fillRef>
+    <cs:effectRef idx="0"/>
+    <cs:fontRef idx="minor">
+      <a:schemeClr val="tx1"/>
+    </cs:fontRef>
+    <cs:spPr>
+      <a:ln w="9525">
+        <a:solidFill>
+          <a:schemeClr val="phClr"/>
+        </a:solidFill>
+      </a:ln>
+    </cs:spPr>
+  </cs:dataPointMarker>
+  <cs:dataPointMarkerLayout symbol="circle" size="5"/>
+  <cs:dataPointWireframe>
+    <cs:lnRef idx="0">
+      <cs:styleClr val="auto"/>
+    </cs:lnRef>
+    <cs:fillRef idx="0"/>
+    <cs:effectRef idx="0"/>
+    <cs:fontRef idx="minor">
+      <a:schemeClr val="dk1"/>
+    </cs:fontRef>
+    <cs:spPr>
+      <a:ln w="9525" cap="rnd">
+        <a:solidFill>
+          <a:schemeClr val="phClr"/>
+        </a:solidFill>
+        <a:round/>
+      </a:ln>
+    </cs:spPr>
+  </cs:dataPointWireframe>
+  <cs:dataTable>
+    <cs:lnRef idx="0"/>
+    <cs:fillRef idx="0"/>
+    <cs:effectRef idx="0"/>
+    <cs:fontRef idx="minor">
+      <a:schemeClr val="tx1">
+        <a:lumMod val="65000"/>
+        <a:lumOff val="35000"/>
+      </a:schemeClr>
+    </cs:fontRef>
+    <cs:spPr>
+      <a:noFill/>
+      <a:ln w="9525" cap="flat" cmpd="sng" algn="ctr">
+        <a:solidFill>
+          <a:schemeClr val="tx1">
+            <a:lumMod val="15000"/>
+            <a:lumOff val="85000"/>
+          </a:schemeClr>
+        </a:solidFill>
+        <a:round/>
+      </a:ln>
+    </cs:spPr>
+    <cs:defRPr sz="900" kern="1200"/>
+  </cs:dataTable>
+  <cs:downBar>
+    <cs:lnRef idx="0"/>
+    <cs:fillRef idx="0"/>
+    <cs:effectRef idx="0"/>
+    <cs:fontRef idx="minor">
+      <a:schemeClr val="tx1"/>
+    </cs:fontRef>
+    <cs:spPr>
+      <a:solidFill>
+        <a:schemeClr val="dk1">
+          <a:lumMod val="75000"/>
+          <a:lumOff val="25000"/>
+        </a:schemeClr>
+      </a:solidFill>
+      <a:ln w="9525" cap="flat" cmpd="sng" algn="ctr">
+        <a:solidFill>
+          <a:schemeClr val="tx1">
+            <a:lumMod val="65000"/>
+            <a:lumOff val="35000"/>
+          </a:schemeClr>
+        </a:solidFill>
+        <a:round/>
+      </a:ln>
+    </cs:spPr>
+  </cs:downBar>
+  <cs:dropLine>
+    <cs:lnRef idx="0"/>
+    <cs:fillRef idx="0"/>
+    <cs:effectRef idx="0"/>
+    <cs:fontRef idx="minor">
+      <a:schemeClr val="tx1"/>
+    </cs:fontRef>
+    <cs:spPr>
+      <a:ln w="9525" cap="flat" cmpd="sng" algn="ctr">
+        <a:solidFill>
+          <a:schemeClr val="tx1">
+            <a:lumMod val="35000"/>
+            <a:lumOff val="65000"/>
+          </a:schemeClr>
+        </a:solidFill>
+        <a:round/>
+      </a:ln>
+    </cs:spPr>
+  </cs:dropLine>
+  <cs:errorBar>
+    <cs:lnRef idx="0"/>
+    <cs:fillRef idx="0"/>
+    <cs:effectRef idx="0"/>
+    <cs:fontRef idx="minor">
+      <a:schemeClr val="tx1"/>
+    </cs:fontRef>
+    <cs:spPr>
+      <a:ln w="9525" cap="flat" cmpd="sng" algn="ctr">
+        <a:solidFill>
+          <a:schemeClr val="tx1">
+            <a:lumMod val="65000"/>
+            <a:lumOff val="35000"/>
+          </a:schemeClr>
+        </a:solidFill>
+        <a:round/>
+      </a:ln>
+    </cs:spPr>
+  </cs:errorBar>
+  <cs:floor>
+    <cs:lnRef idx="0"/>
+    <cs:fillRef idx="0"/>
+    <cs:effectRef idx="0"/>
+    <cs:fontRef idx="minor">
+      <a:schemeClr val="tx1"/>
+    </cs:fontRef>
+    <cs:spPr>
+      <a:noFill/>
+      <a:ln>
+        <a:noFill/>
+      </a:ln>
+    </cs:spPr>
+  </cs:floor>
+  <cs:gridlineMajor>
+    <cs:lnRef idx="0"/>
+    <cs:fillRef idx="0"/>
+    <cs:effectRef idx="0"/>
+    <cs:fontRef idx="minor">
+      <a:schemeClr val="tx1"/>
+    </cs:fontRef>
+    <cs:spPr>
+      <a:ln w="9525" cap="flat" cmpd="sng" algn="ctr">
+        <a:solidFill>
+          <a:schemeClr val="tx1">
+            <a:lumMod val="15000"/>
+            <a:lumOff val="85000"/>
+          </a:schemeClr>
+        </a:solidFill>
+        <a:round/>
+      </a:ln>
+    </cs:spPr>
+  </cs:gridlineMajor>
+  <cs:gridlineMinor>
+    <cs:lnRef idx="0"/>
+    <cs:fillRef idx="0"/>
+    <cs:effectRef idx="0"/>
+    <cs:fontRef idx="minor">
+      <a:schemeClr val="tx1"/>
+    </cs:fontRef>
+    <cs:spPr>
+      <a:ln w="9525" cap="flat" cmpd="sng" algn="ctr">
+        <a:solidFill>
+          <a:schemeClr val="tx1">
+            <a:lumMod val="5000"/>
+            <a:lumOff val="95000"/>
+          </a:schemeClr>
+        </a:solidFill>
+        <a:round/>
+      </a:ln>
+    </cs:spPr>
+  </cs:gridlineMinor>
+  <cs:hiLoLine>
+    <cs:lnRef idx="0"/>
+    <cs:fillRef idx="0"/>
+    <cs:effectRef idx="0"/>
+    <cs:fontRef idx="minor">
+      <a:schemeClr val="tx1"/>
+    </cs:fontRef>
+    <cs:spPr>
+      <a:ln w="9525" cap="flat" cmpd="sng" algn="ctr">
+        <a:solidFill>
+          <a:schemeClr val="tx1">
+            <a:lumMod val="50000"/>
+            <a:lumOff val="50000"/>
+          </a:schemeClr>
+        </a:solidFill>
+        <a:round/>
+      </a:ln>
+    </cs:spPr>
+  </cs:hiLoLine>
+  <cs:leaderLine>
+    <cs:lnRef idx="0"/>
+    <cs:fillRef idx="0"/>
+    <cs:effectRef idx="0"/>
+    <cs:fontRef idx="minor">
+      <a:schemeClr val="tx1"/>
+    </cs:fontRef>
+    <cs:spPr>
+      <a:ln w="9525" cap="flat" cmpd="sng" algn="ctr">
+        <a:solidFill>
+          <a:schemeClr val="tx1">
+            <a:lumMod val="35000"/>
+            <a:lumOff val="65000"/>
+          </a:schemeClr>
+        </a:solidFill>
+        <a:round/>
+      </a:ln>
+    </cs:spPr>
+  </cs:leaderLine>
+  <cs:legend>
+    <cs:lnRef idx="0"/>
+    <cs:fillRef idx="0"/>
+    <cs:effectRef idx="0"/>
+    <cs:fontRef idx="minor">
+      <a:schemeClr val="tx1">
+        <a:lumMod val="65000"/>
+        <a:lumOff val="35000"/>
+      </a:schemeClr>
+    </cs:fontRef>
+    <cs:defRPr sz="900" kern="1200"/>
+  </cs:legend>
+  <cs:plotArea mods="allowNoFillOverride allowNoLineOverride">
+    <cs:lnRef idx="0"/>
+    <cs:fillRef idx="0"/>
+    <cs:effectRef idx="0"/>
+    <cs:fontRef idx="minor">
+      <a:schemeClr val="tx1"/>
+    </cs:fontRef>
+  </cs:plotArea>
+  <cs:plotArea3D mods="allowNoFillOverride allowNoLineOverride">
+    <cs:lnRef idx="0"/>
+    <cs:fillRef idx="0"/>
+    <cs:effectRef idx="0"/>
+    <cs:fontRef idx="minor">
+      <a:schemeClr val="tx1"/>
+    </cs:fontRef>
+  </cs:plotArea3D>
+  <cs:seriesAxis>
+    <cs:lnRef idx="0"/>
+    <cs:fillRef idx="0"/>
+    <cs:effectRef idx="0"/>
+    <cs:fontRef idx="minor">
+      <a:schemeClr val="tx1">
+        <a:lumMod val="65000"/>
+        <a:lumOff val="35000"/>
+      </a:schemeClr>
+    </cs:fontRef>
+    <cs:defRPr sz="900" kern="1200"/>
+  </cs:seriesAxis>
+  <cs:seriesLine>
+    <cs:lnRef idx="0"/>
+    <cs:fillRef idx="0"/>
+    <cs:effectRef idx="0"/>
+    <cs:fontRef idx="minor">
+      <a:schemeClr val="tx1"/>
+    </cs:fontRef>
+    <cs:spPr>
+      <a:ln w="9525" cap="flat" cmpd="sng" algn="ctr">
+        <a:solidFill>
+          <a:schemeClr val="tx1">
+            <a:lumMod val="35000"/>
+            <a:lumOff val="65000"/>
+          </a:schemeClr>
+        </a:solidFill>
+        <a:round/>
+      </a:ln>
+    </cs:spPr>
+  </cs:seriesLine>
+  <cs:title>
+    <cs:lnRef idx="0"/>
+    <cs:fillRef idx="0"/>
+    <cs:effectRef idx="0"/>
+    <cs:fontRef idx="minor">
+      <a:schemeClr val="tx1">
+        <a:lumMod val="65000"/>
+        <a:lumOff val="35000"/>
+      </a:schemeClr>
+    </cs:fontRef>
+    <cs:defRPr sz="1400" b="0" kern="1200" spc="0" baseline="0"/>
+  </cs:title>
+  <cs:trendline>
+    <cs:lnRef idx="0">
+      <cs:styleClr val="auto"/>
+    </cs:lnRef>
+    <cs:fillRef idx="0"/>
+    <cs:effectRef idx="0"/>
+    <cs:fontRef idx="minor">
+      <a:schemeClr val="tx1"/>
+    </cs:fontRef>
+    <cs:spPr>
+      <a:ln w="19050" cap="rnd">
+        <a:solidFill>
+          <a:schemeClr val="phClr"/>
+        </a:solidFill>
+        <a:prstDash val="sysDot"/>
+      </a:ln>
+    </cs:spPr>
+  </cs:trendline>
+  <cs:trendlineLabel>
+    <cs:lnRef idx="0"/>
+    <cs:fillRef idx="0"/>
+    <cs:effectRef idx="0"/>
+    <cs:fontRef idx="minor">
+      <a:schemeClr val="tx1">
+        <a:lumMod val="65000"/>
+        <a:lumOff val="35000"/>
+      </a:schemeClr>
+    </cs:fontRef>
+    <cs:defRPr sz="900" kern="1200"/>
+  </cs:trendlineLabel>
+  <cs:upBar>
+    <cs:lnRef idx="0"/>
+    <cs:fillRef idx="0"/>
+    <cs:effectRef idx="0"/>
+    <cs:fontRef idx="minor">
+      <a:schemeClr val="tx1"/>
+    </cs:fontRef>
+    <cs:spPr>
+      <a:solidFill>
+        <a:schemeClr val="lt1"/>
+      </a:solidFill>
+      <a:ln w="9525" cap="flat" cmpd="sng" algn="ctr">
+        <a:solidFill>
+          <a:schemeClr val="tx1">
+            <a:lumMod val="65000"/>
+            <a:lumOff val="35000"/>
+          </a:schemeClr>
+        </a:solidFill>
+        <a:round/>
+      </a:ln>
+    </cs:spPr>
+  </cs:upBar>
+  <cs:valueAxis>
+    <cs:lnRef idx="0"/>
+    <cs:fillRef idx="0"/>
+    <cs:effectRef idx="0"/>
+    <cs:fontRef idx="minor">
+      <a:schemeClr val="tx1">
+        <a:lumMod val="65000"/>
+        <a:lumOff val="35000"/>
+      </a:schemeClr>
+    </cs:fontRef>
+    <cs:spPr>
+      <a:ln w="9525" cap="flat" cmpd="sng" algn="ctr">
+        <a:solidFill>
+          <a:schemeClr val="tx1">
+            <a:lumMod val="25000"/>
+            <a:lumOff val="75000"/>
+          </a:schemeClr>
+        </a:solidFill>
+        <a:round/>
+      </a:ln>
+    </cs:spPr>
+    <cs:defRPr sz="900" kern="1200"/>
+  </cs:valueAxis>
+  <cs:wall>
+    <cs:lnRef idx="0"/>
+    <cs:fillRef idx="0"/>
+    <cs:effectRef idx="0"/>
+    <cs:fontRef idx="minor">
+      <a:schemeClr val="tx1"/>
+    </cs:fontRef>
+    <cs:spPr>
+      <a:noFill/>
+      <a:ln>
+        <a:noFill/>
+      </a:ln>
+    </cs:spPr>
+  </cs:wall>
+</cs:chartStyle>
+</file>
+
 <file path=ppt/comments/modernComment_106_4791FEFC.xml><?xml version="1.0" encoding="utf-8"?>
 <p188:cmLst xmlns:a="http://schemas.openxmlformats.org/drawingml/2006/main" xmlns:r="http://schemas.openxmlformats.org/officeDocument/2006/relationships" xmlns:p188="http://schemas.microsoft.com/office/powerpoint/2018/8/main">
   <p188:cm id="{1275EE33-43A5-490E-A8D2-080E79EE55F8}" authorId="{4BB11620-EFBC-D13A-7B93-45F2C922ABDE}" created="2024-04-11T02:29:59.554">
@@ -9651,6 +10614,27 @@
         <a:r>
           <a:rPr lang="en-CA"/>
           <a:t>check</a:t>
+        </a:r>
+      </a:p>
+    </p188:txBody>
+  </p188:cm>
+  <p188:cm id="{3724C460-C9F0-49DB-9DE2-9E5AD2B8FA85}" authorId="{53E43574-7A34-154C-E512-F6CBCA51E7C2}" created="2024-04-13T02:50:35.708">
+    <ac:txMkLst xmlns:ac="http://schemas.microsoft.com/office/drawing/2013/main/command">
+      <pc:docMk xmlns:pc="http://schemas.microsoft.com/office/powerpoint/2013/main/command"/>
+      <pc:sldMk xmlns:pc="http://schemas.microsoft.com/office/powerpoint/2013/main/command" cId="1200750332" sldId="262"/>
+      <ac:spMk id="3" creationId="{57846E6E-541E-C380-2EC3-91AF5BEE61F6}"/>
+      <ac:txMk cp="413" len="347">
+        <ac:context len="865" hash="1272217592"/>
+      </ac:txMk>
+    </ac:txMkLst>
+    <p188:pos x="10506075" y="2002400"/>
+    <p188:txBody>
+      <a:bodyPr/>
+      <a:lstStyle/>
+      <a:p>
+        <a:r>
+          <a:rPr lang="en-CA"/>
+          <a:t>Est-ce qu'on garde cette partie là?</a:t>
         </a:r>
       </a:p>
     </p188:txBody>
@@ -9941,8 +10925,8 @@
       <pc:docMk xmlns:pc="http://schemas.microsoft.com/office/powerpoint/2013/main/command"/>
       <pc:sldMk xmlns:pc="http://schemas.microsoft.com/office/powerpoint/2013/main/command" cId="494895105" sldId="286"/>
       <ac:spMk id="3" creationId="{57846E6E-541E-C380-2EC3-91AF5BEE61F6}"/>
-      <ac:txMk cp="0" len="1">
-        <ac:context len="232" hash="3144641771"/>
+      <ac:txMk cp="0">
+        <ac:context len="641" hash="1044606716"/>
       </ac:txMk>
     </ac:txMkLst>
     <p188:pos x="10506075" y="2497701"/>
@@ -10056,7 +11040,7 @@
           <a:p>
             <a:fld id="{DAB5DE69-65B2-445A-B9D2-BC2BC199D49F}" type="datetimeFigureOut">
               <a:rPr lang="en-CA" smtClean="0"/>
-              <a:t>2024-04-11</a:t>
+              <a:t>2024-04-12</a:t>
             </a:fld>
             <a:endParaRPr lang="en-CA"/>
           </a:p>
@@ -10215,7 +11199,7 @@
           <a:p>
             <a:fld id="{603E9730-38DB-4F77-A139-6CE923099591}" type="slidenum">
               <a:rPr lang="en-CA" smtClean="0"/>
-              <a:t>‹N°›</a:t>
+              <a:t>‹#›</a:t>
             </a:fld>
             <a:endParaRPr lang="en-CA"/>
           </a:p>
@@ -10473,7 +11457,7 @@
           <a:p>
             <a:fld id="{CF633E34-DD75-4254-AB88-C9D2090F6CC5}" type="datetimeFigureOut">
               <a:rPr lang="en-CA" smtClean="0"/>
-              <a:t>2024-04-11</a:t>
+              <a:t>2024-04-12</a:t>
             </a:fld>
             <a:endParaRPr lang="en-CA"/>
           </a:p>
@@ -10527,7 +11511,7 @@
           <a:p>
             <a:fld id="{4BD3201E-7DF8-462B-AC18-61E63795AE0D}" type="slidenum">
               <a:rPr lang="en-CA" smtClean="0"/>
-              <a:t>‹N°›</a:t>
+              <a:t>‹#›</a:t>
             </a:fld>
             <a:endParaRPr lang="en-CA"/>
           </a:p>
@@ -10673,7 +11657,7 @@
           <a:p>
             <a:fld id="{CF633E34-DD75-4254-AB88-C9D2090F6CC5}" type="datetimeFigureOut">
               <a:rPr lang="en-CA" smtClean="0"/>
-              <a:t>2024-04-11</a:t>
+              <a:t>2024-04-12</a:t>
             </a:fld>
             <a:endParaRPr lang="en-CA"/>
           </a:p>
@@ -10727,7 +11711,7 @@
           <a:p>
             <a:fld id="{4BD3201E-7DF8-462B-AC18-61E63795AE0D}" type="slidenum">
               <a:rPr lang="en-CA" smtClean="0"/>
-              <a:t>‹N°›</a:t>
+              <a:t>‹#›</a:t>
             </a:fld>
             <a:endParaRPr lang="en-CA"/>
           </a:p>
@@ -10883,7 +11867,7 @@
           <a:p>
             <a:fld id="{CF633E34-DD75-4254-AB88-C9D2090F6CC5}" type="datetimeFigureOut">
               <a:rPr lang="en-CA" smtClean="0"/>
-              <a:t>2024-04-11</a:t>
+              <a:t>2024-04-12</a:t>
             </a:fld>
             <a:endParaRPr lang="en-CA"/>
           </a:p>
@@ -10937,7 +11921,7 @@
           <a:p>
             <a:fld id="{4BD3201E-7DF8-462B-AC18-61E63795AE0D}" type="slidenum">
               <a:rPr lang="en-CA" smtClean="0"/>
-              <a:t>‹N°›</a:t>
+              <a:t>‹#›</a:t>
             </a:fld>
             <a:endParaRPr lang="en-CA"/>
           </a:p>
@@ -11083,7 +12067,7 @@
           <a:p>
             <a:fld id="{CF633E34-DD75-4254-AB88-C9D2090F6CC5}" type="datetimeFigureOut">
               <a:rPr lang="en-CA" smtClean="0"/>
-              <a:t>2024-04-11</a:t>
+              <a:t>2024-04-12</a:t>
             </a:fld>
             <a:endParaRPr lang="en-CA"/>
           </a:p>
@@ -11137,7 +12121,7 @@
           <a:p>
             <a:fld id="{4BD3201E-7DF8-462B-AC18-61E63795AE0D}" type="slidenum">
               <a:rPr lang="en-CA" smtClean="0"/>
-              <a:t>‹N°›</a:t>
+              <a:t>‹#›</a:t>
             </a:fld>
             <a:endParaRPr lang="en-CA"/>
           </a:p>
@@ -11359,7 +12343,7 @@
           <a:p>
             <a:fld id="{CF633E34-DD75-4254-AB88-C9D2090F6CC5}" type="datetimeFigureOut">
               <a:rPr lang="en-CA" smtClean="0"/>
-              <a:t>2024-04-11</a:t>
+              <a:t>2024-04-12</a:t>
             </a:fld>
             <a:endParaRPr lang="en-CA"/>
           </a:p>
@@ -11413,7 +12397,7 @@
           <a:p>
             <a:fld id="{4BD3201E-7DF8-462B-AC18-61E63795AE0D}" type="slidenum">
               <a:rPr lang="en-CA" smtClean="0"/>
-              <a:t>‹N°›</a:t>
+              <a:t>‹#›</a:t>
             </a:fld>
             <a:endParaRPr lang="en-CA"/>
           </a:p>
@@ -11627,7 +12611,7 @@
           <a:p>
             <a:fld id="{CF633E34-DD75-4254-AB88-C9D2090F6CC5}" type="datetimeFigureOut">
               <a:rPr lang="en-CA" smtClean="0"/>
-              <a:t>2024-04-11</a:t>
+              <a:t>2024-04-12</a:t>
             </a:fld>
             <a:endParaRPr lang="en-CA"/>
           </a:p>
@@ -11681,7 +12665,7 @@
           <a:p>
             <a:fld id="{4BD3201E-7DF8-462B-AC18-61E63795AE0D}" type="slidenum">
               <a:rPr lang="en-CA" smtClean="0"/>
-              <a:t>‹N°›</a:t>
+              <a:t>‹#›</a:t>
             </a:fld>
             <a:endParaRPr lang="en-CA"/>
           </a:p>
@@ -12042,7 +13026,7 @@
           <a:p>
             <a:fld id="{CF633E34-DD75-4254-AB88-C9D2090F6CC5}" type="datetimeFigureOut">
               <a:rPr lang="en-CA" smtClean="0"/>
-              <a:t>2024-04-11</a:t>
+              <a:t>2024-04-12</a:t>
             </a:fld>
             <a:endParaRPr lang="en-CA"/>
           </a:p>
@@ -12096,7 +13080,7 @@
           <a:p>
             <a:fld id="{4BD3201E-7DF8-462B-AC18-61E63795AE0D}" type="slidenum">
               <a:rPr lang="en-CA" smtClean="0"/>
-              <a:t>‹N°›</a:t>
+              <a:t>‹#›</a:t>
             </a:fld>
             <a:endParaRPr lang="en-CA"/>
           </a:p>
@@ -12184,7 +13168,7 @@
           <a:p>
             <a:fld id="{CF633E34-DD75-4254-AB88-C9D2090F6CC5}" type="datetimeFigureOut">
               <a:rPr lang="en-CA" smtClean="0"/>
-              <a:t>2024-04-11</a:t>
+              <a:t>2024-04-12</a:t>
             </a:fld>
             <a:endParaRPr lang="en-CA"/>
           </a:p>
@@ -12238,7 +13222,7 @@
           <a:p>
             <a:fld id="{4BD3201E-7DF8-462B-AC18-61E63795AE0D}" type="slidenum">
               <a:rPr lang="en-CA" smtClean="0"/>
-              <a:t>‹N°›</a:t>
+              <a:t>‹#›</a:t>
             </a:fld>
             <a:endParaRPr lang="en-CA"/>
           </a:p>
@@ -12297,7 +13281,7 @@
           <a:p>
             <a:fld id="{CF633E34-DD75-4254-AB88-C9D2090F6CC5}" type="datetimeFigureOut">
               <a:rPr lang="en-CA" smtClean="0"/>
-              <a:t>2024-04-11</a:t>
+              <a:t>2024-04-12</a:t>
             </a:fld>
             <a:endParaRPr lang="en-CA"/>
           </a:p>
@@ -12351,7 +13335,7 @@
           <a:p>
             <a:fld id="{4BD3201E-7DF8-462B-AC18-61E63795AE0D}" type="slidenum">
               <a:rPr lang="en-CA" smtClean="0"/>
-              <a:t>‹N°›</a:t>
+              <a:t>‹#›</a:t>
             </a:fld>
             <a:endParaRPr lang="en-CA"/>
           </a:p>
@@ -12610,7 +13594,7 @@
           <a:p>
             <a:fld id="{CF633E34-DD75-4254-AB88-C9D2090F6CC5}" type="datetimeFigureOut">
               <a:rPr lang="en-CA" smtClean="0"/>
-              <a:t>2024-04-11</a:t>
+              <a:t>2024-04-12</a:t>
             </a:fld>
             <a:endParaRPr lang="en-CA"/>
           </a:p>
@@ -12664,7 +13648,7 @@
           <a:p>
             <a:fld id="{4BD3201E-7DF8-462B-AC18-61E63795AE0D}" type="slidenum">
               <a:rPr lang="en-CA" smtClean="0"/>
-              <a:t>‹N°›</a:t>
+              <a:t>‹#›</a:t>
             </a:fld>
             <a:endParaRPr lang="en-CA"/>
           </a:p>
@@ -12899,7 +13883,7 @@
           <a:p>
             <a:fld id="{CF633E34-DD75-4254-AB88-C9D2090F6CC5}" type="datetimeFigureOut">
               <a:rPr lang="en-CA" smtClean="0"/>
-              <a:t>2024-04-11</a:t>
+              <a:t>2024-04-12</a:t>
             </a:fld>
             <a:endParaRPr lang="en-CA"/>
           </a:p>
@@ -12953,7 +13937,7 @@
           <a:p>
             <a:fld id="{4BD3201E-7DF8-462B-AC18-61E63795AE0D}" type="slidenum">
               <a:rPr lang="en-CA" smtClean="0"/>
-              <a:t>‹N°›</a:t>
+              <a:t>‹#›</a:t>
             </a:fld>
             <a:endParaRPr lang="en-CA"/>
           </a:p>
@@ -13142,7 +14126,7 @@
           <a:p>
             <a:fld id="{CF633E34-DD75-4254-AB88-C9D2090F6CC5}" type="datetimeFigureOut">
               <a:rPr lang="en-CA" smtClean="0"/>
-              <a:t>2024-04-11</a:t>
+              <a:t>2024-04-12</a:t>
             </a:fld>
             <a:endParaRPr lang="en-CA"/>
           </a:p>
@@ -13232,7 +14216,7 @@
           <a:p>
             <a:fld id="{4BD3201E-7DF8-462B-AC18-61E63795AE0D}" type="slidenum">
               <a:rPr lang="en-CA" smtClean="0"/>
-              <a:t>‹N°›</a:t>
+              <a:t>‹#›</a:t>
             </a:fld>
             <a:endParaRPr lang="en-CA"/>
           </a:p>
@@ -14141,32 +15125,6 @@
                 <a:pPr marL="0" indent="0" algn="just">
                   <a:buNone/>
                 </a:pPr>
-                <a:r>
-                  <a:rPr lang="fr-CA" sz="1800" dirty="0"/>
-                  <a:t>On note aussi que malgré le fait d’avoir imposé un encastrement à l’extrémité inférieure de la poutre, ce qui devrait se traduire </a:t>
-                </a:r>
-                <a:r>
-                  <a:rPr lang="fr-FR" sz="1800" dirty="0"/>
-                  <a:t>par un angle nul au premier élément, cette condition ne peut pas être respectée par des éléments linéaires car ils ont un seul degré de liberté par nœud (la déplacement). Comme on peut le voir à la figure </a:t>
-                </a:r>
-                <a:r>
-                  <a:rPr lang="fr-FR" sz="1800" dirty="0">
-                    <a:highlight>
-                      <a:srgbClr val="FFFF00"/>
-                    </a:highlight>
-                  </a:rPr>
-                  <a:t>4</a:t>
-                </a:r>
-                <a:r>
-                  <a:rPr lang="fr-FR" sz="1800" dirty="0"/>
-                  <a:t> de la page suivante, le déplacement est nul à la base de la poutre mais l’angle ne l’est pas. Ceci introduit une erreur entre les nœuds dû à l'interpolation.</a:t>
-                </a:r>
-                <a:endParaRPr lang="fr-CA" sz="1800" dirty="0"/>
-              </a:p>
-              <a:p>
-                <a:pPr marL="0" indent="0" algn="just">
-                  <a:buNone/>
-                </a:pPr>
                 <a:endParaRPr lang="fr-CA" sz="1800" dirty="0"/>
               </a:p>
             </p:txBody>
@@ -14206,7 +15164,7 @@
               <a:lstStyle/>
               <a:p>
                 <a:r>
-                  <a:rPr lang="fr-FR">
+                  <a:rPr lang="en-CA">
                     <a:noFill/>
                   </a:rPr>
                   <a:t> </a:t>
@@ -14275,6 +15233,816 @@
           <a:lstStyle/>
           <a:p>
             <a:r>
+              <a:rPr lang="fr-FR" sz="3000"/>
+              <a:t>Vérification de code</a:t>
+            </a:r>
+            <a:endParaRPr lang="en-CA" sz="3000" dirty="0"/>
+          </a:p>
+        </p:txBody>
+      </p:sp>
+      <p:sp>
+        <p:nvSpPr>
+          <p:cNvPr id="3" name="Content Placeholder 2">
+            <a:extLst>
+              <a:ext uri="{FF2B5EF4-FFF2-40B4-BE49-F238E27FC236}">
+                <a16:creationId xmlns:a16="http://schemas.microsoft.com/office/drawing/2014/main" id="{57846E6E-541E-C380-2EC3-91AF5BEE61F6}"/>
+              </a:ext>
+            </a:extLst>
+          </p:cNvPr>
+          <p:cNvSpPr>
+            <a:spLocks noGrp="1"/>
+          </p:cNvSpPr>
+          <p:nvPr>
+            <p:ph idx="1"/>
+          </p:nvPr>
+        </p:nvSpPr>
+        <p:spPr>
+          <a:xfrm>
+            <a:off x="714375" y="1150374"/>
+            <a:ext cx="6715125" cy="5342501"/>
+          </a:xfrm>
+        </p:spPr>
+        <p:txBody>
+          <a:bodyPr>
+            <a:normAutofit/>
+          </a:bodyPr>
+          <a:lstStyle/>
+          <a:p>
+            <a:pPr marL="0" indent="0" algn="just">
+              <a:buNone/>
+            </a:pPr>
+            <a:r>
+              <a:rPr lang="fr-CA" sz="1800" dirty="0"/>
+              <a:t>On note aussi que malgré le fait d’avoir imposé un encastrement à l’extrémité inférieure de la poutre, ce qui devrait se traduire </a:t>
+            </a:r>
+            <a:r>
+              <a:rPr lang="fr-FR" sz="1800" dirty="0"/>
+              <a:t>par un angle nul au premier élément, cette condition ne peut pas être respectée par des éléments linéaires car ils ont un seul degré de liberté par nœud (la déplacement). Comme on peut le voir à la figure 4, le déplacement est nul à la base de la poutre mais l’angle ne l’est pas. Ceci introduit une erreur entre les nœuds dû à l'interpolation.</a:t>
+            </a:r>
+            <a:endParaRPr lang="fr-CA" sz="1800" dirty="0"/>
+          </a:p>
+          <a:p>
+            <a:pPr marL="0" indent="0" algn="just">
+              <a:buNone/>
+            </a:pPr>
+            <a:endParaRPr lang="en-CA" sz="1800" dirty="0">
+              <a:highlight>
+                <a:srgbClr val="FFFF00"/>
+              </a:highlight>
+            </a:endParaRPr>
+          </a:p>
+          <a:p>
+            <a:pPr marL="0" indent="0" algn="just">
+              <a:buNone/>
+            </a:pPr>
+            <a:endParaRPr lang="fr-CA" sz="1800" dirty="0"/>
+          </a:p>
+          <a:p>
+            <a:pPr marL="0" indent="0" algn="just">
+              <a:buNone/>
+            </a:pPr>
+            <a:r>
+              <a:rPr lang="fr-CA" sz="1800" dirty="0"/>
+              <a:t>Il est important de noter que cet écart ne remet pas en question la vérification du code de </a:t>
+            </a:r>
+            <a:r>
+              <a:rPr lang="fr-CA" sz="1800" dirty="0" err="1"/>
+              <a:t>SimCenter</a:t>
+            </a:r>
+            <a:r>
+              <a:rPr lang="fr-CA" sz="1800" dirty="0"/>
+              <a:t>/</a:t>
+            </a:r>
+            <a:r>
+              <a:rPr lang="fr-CA" sz="1800" dirty="0" err="1"/>
+              <a:t>Nastran</a:t>
+            </a:r>
+            <a:r>
+              <a:rPr lang="fr-CA" sz="1800" dirty="0"/>
+              <a:t> mais plutôt la méthode utilisée pour la vérification.</a:t>
+            </a:r>
+          </a:p>
+        </p:txBody>
+      </p:sp>
+      <p:pic>
+        <p:nvPicPr>
+          <p:cNvPr id="10" name="Picture 9">
+            <a:extLst>
+              <a:ext uri="{FF2B5EF4-FFF2-40B4-BE49-F238E27FC236}">
+                <a16:creationId xmlns:a16="http://schemas.microsoft.com/office/drawing/2014/main" id="{4C6094C8-647C-6C33-05D7-E0D0C50BE585}"/>
+              </a:ext>
+            </a:extLst>
+          </p:cNvPr>
+          <p:cNvPicPr>
+            <a:picLocks noChangeAspect="1"/>
+          </p:cNvPicPr>
+          <p:nvPr/>
+        </p:nvPicPr>
+        <p:blipFill>
+          <a:blip r:embed="rId3"/>
+          <a:stretch>
+            <a:fillRect/>
+          </a:stretch>
+        </p:blipFill>
+        <p:spPr>
+          <a:xfrm>
+            <a:off x="7746693" y="718420"/>
+            <a:ext cx="4261003" cy="4476750"/>
+          </a:xfrm>
+          <a:prstGeom prst="rect">
+            <a:avLst/>
+          </a:prstGeom>
+        </p:spPr>
+      </p:pic>
+      <p:sp>
+        <p:nvSpPr>
+          <p:cNvPr id="11" name="ZoneTexte 4">
+            <a:extLst>
+              <a:ext uri="{FF2B5EF4-FFF2-40B4-BE49-F238E27FC236}">
+                <a16:creationId xmlns:a16="http://schemas.microsoft.com/office/drawing/2014/main" id="{D45E035C-2C6B-E5B4-30DE-7A0788EED6B4}"/>
+              </a:ext>
+            </a:extLst>
+          </p:cNvPr>
+          <p:cNvSpPr txBox="1"/>
+          <p:nvPr/>
+        </p:nvSpPr>
+        <p:spPr>
+          <a:xfrm>
+            <a:off x="7746693" y="5271466"/>
+            <a:ext cx="5435048" cy="276999"/>
+          </a:xfrm>
+          <a:prstGeom prst="rect">
+            <a:avLst/>
+          </a:prstGeom>
+          <a:noFill/>
+        </p:spPr>
+        <p:txBody>
+          <a:bodyPr wrap="square" rtlCol="0">
+            <a:spAutoFit/>
+          </a:bodyPr>
+          <a:lstStyle/>
+          <a:p>
+            <a:r>
+              <a:rPr lang="fr-FR" sz="1200" dirty="0"/>
+              <a:t>Fig.3. Simulation d’une poutre encastrée-libre à un élément</a:t>
+            </a:r>
+          </a:p>
+        </p:txBody>
+      </p:sp>
+    </p:spTree>
+    <p:extLst>
+      <p:ext uri="{BB962C8B-B14F-4D97-AF65-F5344CB8AC3E}">
+        <p14:creationId xmlns:p14="http://schemas.microsoft.com/office/powerpoint/2010/main" val="494895105"/>
+      </p:ext>
+    </p:extLst>
+  </p:cSld>
+  <p:clrMapOvr>
+    <a:masterClrMapping/>
+  </p:clrMapOvr>
+  <p:extLst>
+    <p:ext uri="{6950BFC3-D8DA-4A85-94F7-54DA5524770B}">
+      <p188:commentRel xmlns:p188="http://schemas.microsoft.com/office/powerpoint/2018/8/main" r:id="rId2"/>
+    </p:ext>
+  </p:extLst>
+</p:sld>
+</file>
+
+<file path=ppt/slides/slide12.xml><?xml version="1.0" encoding="utf-8"?>
+<p:sld xmlns:a="http://schemas.openxmlformats.org/drawingml/2006/main" xmlns:r="http://schemas.openxmlformats.org/officeDocument/2006/relationships" xmlns:p="http://schemas.openxmlformats.org/presentationml/2006/main">
+  <p:cSld>
+    <p:spTree>
+      <p:nvGrpSpPr>
+        <p:cNvPr id="1" name=""/>
+        <p:cNvGrpSpPr/>
+        <p:nvPr/>
+      </p:nvGrpSpPr>
+      <p:grpSpPr>
+        <a:xfrm>
+          <a:off x="0" y="0"/>
+          <a:ext cx="0" cy="0"/>
+          <a:chOff x="0" y="0"/>
+          <a:chExt cx="0" cy="0"/>
+        </a:xfrm>
+      </p:grpSpPr>
+      <p:sp>
+        <p:nvSpPr>
+          <p:cNvPr id="2" name="Title 1">
+            <a:extLst>
+              <a:ext uri="{FF2B5EF4-FFF2-40B4-BE49-F238E27FC236}">
+                <a16:creationId xmlns:a16="http://schemas.microsoft.com/office/drawing/2014/main" id="{E0220718-7085-48D6-FCCC-6D486EF513A7}"/>
+              </a:ext>
+            </a:extLst>
+          </p:cNvPr>
+          <p:cNvSpPr>
+            <a:spLocks noGrp="1"/>
+          </p:cNvSpPr>
+          <p:nvPr>
+            <p:ph type="title"/>
+          </p:nvPr>
+        </p:nvSpPr>
+        <p:spPr>
+          <a:xfrm>
+            <a:off x="838200" y="365125"/>
+            <a:ext cx="9308690" cy="706591"/>
+          </a:xfrm>
+        </p:spPr>
+        <p:txBody>
+          <a:bodyPr>
+            <a:normAutofit/>
+          </a:bodyPr>
+          <a:lstStyle/>
+          <a:p>
+            <a:r>
+              <a:rPr lang="fr-FR" sz="3000" dirty="0"/>
+              <a:t>Vérification de code</a:t>
+            </a:r>
+            <a:endParaRPr lang="en-CA" sz="3000" dirty="0"/>
+          </a:p>
+        </p:txBody>
+      </p:sp>
+      <mc:AlternateContent xmlns:mc="http://schemas.openxmlformats.org/markup-compatibility/2006">
+        <mc:Choice xmlns:a14="http://schemas.microsoft.com/office/drawing/2010/main" Requires="a14">
+          <p:sp>
+            <p:nvSpPr>
+              <p:cNvPr id="3" name="Content Placeholder 2">
+                <a:extLst>
+                  <a:ext uri="{FF2B5EF4-FFF2-40B4-BE49-F238E27FC236}">
+                    <a16:creationId xmlns:a16="http://schemas.microsoft.com/office/drawing/2014/main" id="{57846E6E-541E-C380-2EC3-91AF5BEE61F6}"/>
+                  </a:ext>
+                </a:extLst>
+              </p:cNvPr>
+              <p:cNvSpPr>
+                <a:spLocks noGrp="1"/>
+              </p:cNvSpPr>
+              <p:nvPr>
+                <p:ph idx="1"/>
+              </p:nvPr>
+            </p:nvSpPr>
+            <p:spPr>
+              <a:xfrm>
+                <a:off x="838200" y="1150374"/>
+                <a:ext cx="10515600" cy="5342501"/>
+              </a:xfrm>
+            </p:spPr>
+            <p:txBody>
+              <a:bodyPr>
+                <a:normAutofit fontScale="92500" lnSpcReduction="20000"/>
+              </a:bodyPr>
+              <a:lstStyle/>
+              <a:p>
+                <a:pPr marL="0" indent="0" algn="just">
+                  <a:buNone/>
+                </a:pPr>
+                <a:r>
+                  <a:rPr lang="fr-CA" sz="1800" dirty="0"/>
+                  <a:t>Il est donc possible de remarquer qu’un différente méthode est nécessaire afin d’effectuer la vérification de code. Pour ce faire, il est possible d’utiliser l’énergie de déformation.</a:t>
+                </a:r>
+              </a:p>
+              <a:p>
+                <a:pPr marL="0" indent="0" algn="just">
+                  <a:buNone/>
+                </a:pPr>
+                <a:r>
+                  <a:rPr lang="fr-CA" sz="1800" dirty="0"/>
+                  <a:t>L’énergie de déformation par élément linéaire est définie comme:</a:t>
+                </a:r>
+              </a:p>
+              <a:p>
+                <a:pPr marL="0" indent="0" algn="just">
+                  <a:buNone/>
+                </a:pPr>
+                <a:endParaRPr lang="fr-CA" sz="1800" dirty="0"/>
+              </a:p>
+              <a:p>
+                <a:pPr marL="0" indent="0" algn="just">
+                  <a:buNone/>
+                </a:pPr>
+                <a14:m>
+                  <m:oMathPara xmlns:m="http://schemas.openxmlformats.org/officeDocument/2006/math">
+                    <m:oMathParaPr>
+                      <m:jc m:val="centerGroup"/>
+                    </m:oMathParaPr>
+                    <m:oMath xmlns:m="http://schemas.openxmlformats.org/officeDocument/2006/math">
+                      <m:r>
+                        <a:rPr lang="fr-CA" sz="1800" b="0" i="1" smtClean="0">
+                          <a:latin typeface="Cambria Math" panose="02040503050406030204" pitchFamily="18" charset="0"/>
+                        </a:rPr>
+                        <m:t>𝑈</m:t>
+                      </m:r>
+                      <m:r>
+                        <a:rPr lang="fr-CA" sz="1800" b="0" i="1" smtClean="0">
+                          <a:latin typeface="Cambria Math" panose="02040503050406030204" pitchFamily="18" charset="0"/>
+                        </a:rPr>
+                        <m:t>=</m:t>
+                      </m:r>
+                      <m:f>
+                        <m:fPr>
+                          <m:ctrlPr>
+                            <a:rPr lang="fr-CA" sz="1800" b="0" i="1" smtClean="0">
+                              <a:latin typeface="Cambria Math" panose="02040503050406030204" pitchFamily="18" charset="0"/>
+                            </a:rPr>
+                          </m:ctrlPr>
+                        </m:fPr>
+                        <m:num>
+                          <m:sSubSup>
+                            <m:sSubSupPr>
+                              <m:ctrlPr>
+                                <a:rPr lang="fr-CA" sz="1800" b="0" i="1" smtClean="0">
+                                  <a:latin typeface="Cambria Math" panose="02040503050406030204" pitchFamily="18" charset="0"/>
+                                </a:rPr>
+                              </m:ctrlPr>
+                            </m:sSubSupPr>
+                            <m:e>
+                              <m:r>
+                                <a:rPr lang="fr-CA" sz="1800" b="0" i="1" smtClean="0">
+                                  <a:latin typeface="Cambria Math" panose="02040503050406030204" pitchFamily="18" charset="0"/>
+                                </a:rPr>
+                                <m:t>𝑀</m:t>
+                              </m:r>
+                            </m:e>
+                            <m:sub>
+                              <m:r>
+                                <a:rPr lang="fr-CA" sz="1800" b="0" i="1" smtClean="0">
+                                  <a:latin typeface="Cambria Math" panose="02040503050406030204" pitchFamily="18" charset="0"/>
+                                </a:rPr>
+                                <m:t>𝑒𝑓</m:t>
+                              </m:r>
+                            </m:sub>
+                            <m:sup>
+                              <m:r>
+                                <a:rPr lang="fr-CA" sz="1800" b="0" i="1" smtClean="0">
+                                  <a:latin typeface="Cambria Math" panose="02040503050406030204" pitchFamily="18" charset="0"/>
+                                </a:rPr>
+                                <m:t>2</m:t>
+                              </m:r>
+                            </m:sup>
+                          </m:sSubSup>
+                        </m:num>
+                        <m:den>
+                          <m:r>
+                            <a:rPr lang="fr-CA" sz="1800" b="0" i="1" smtClean="0">
+                              <a:latin typeface="Cambria Math" panose="02040503050406030204" pitchFamily="18" charset="0"/>
+                            </a:rPr>
+                            <m:t>2 </m:t>
+                          </m:r>
+                          <m:r>
+                            <a:rPr lang="fr-CA" sz="1800" b="0" i="1" smtClean="0">
+                              <a:latin typeface="Cambria Math" panose="02040503050406030204" pitchFamily="18" charset="0"/>
+                            </a:rPr>
+                            <m:t>𝐸𝐼</m:t>
+                          </m:r>
+                        </m:den>
+                      </m:f>
+                      <m:r>
+                        <a:rPr lang="fr-CA" sz="1800" b="0" i="1" smtClean="0">
+                          <a:latin typeface="Cambria Math" panose="02040503050406030204" pitchFamily="18" charset="0"/>
+                        </a:rPr>
+                        <m:t> </m:t>
+                      </m:r>
+                      <m:r>
+                        <a:rPr lang="fr-CA" sz="1800" b="0" i="1" smtClean="0">
+                          <a:latin typeface="Cambria Math" panose="02040503050406030204" pitchFamily="18" charset="0"/>
+                        </a:rPr>
+                        <m:t>h</m:t>
+                      </m:r>
+                    </m:oMath>
+                  </m:oMathPara>
+                </a14:m>
+                <a:endParaRPr lang="fr-CA" sz="1800" dirty="0"/>
+              </a:p>
+              <a:p>
+                <a:pPr marL="0" indent="0" algn="just">
+                  <a:buNone/>
+                </a:pPr>
+                <a:endParaRPr lang="fr-CA" sz="1800" dirty="0"/>
+              </a:p>
+              <a:p>
+                <a:pPr marL="0" indent="0" algn="just">
+                  <a:buNone/>
+                </a:pPr>
+                <a:r>
+                  <a:rPr lang="fr-CA" sz="1800" dirty="0"/>
+                  <a:t>L’erreur locale de discrétisation est définie comme étant:</a:t>
+                </a:r>
+              </a:p>
+              <a:p>
+                <a:pPr marL="0" indent="0" algn="just">
+                  <a:buNone/>
+                </a:pPr>
+                <a:endParaRPr lang="fr-CA" sz="1800" dirty="0"/>
+              </a:p>
+              <a:p>
+                <a:pPr marL="0" indent="0" algn="just">
+                  <a:buNone/>
+                </a:pPr>
+                <a14:m>
+                  <m:oMathPara xmlns:m="http://schemas.openxmlformats.org/officeDocument/2006/math">
+                    <m:oMathParaPr>
+                      <m:jc m:val="centerGroup"/>
+                    </m:oMathParaPr>
+                    <m:oMath xmlns:m="http://schemas.openxmlformats.org/officeDocument/2006/math">
+                      <m:r>
+                        <a:rPr lang="fr-CA" sz="1800" b="0" i="1" smtClean="0">
+                          <a:latin typeface="Cambria Math" panose="02040503050406030204" pitchFamily="18" charset="0"/>
+                        </a:rPr>
+                        <m:t>𝑒</m:t>
+                      </m:r>
+                      <m:r>
+                        <a:rPr lang="fr-CA" sz="1800" b="0" i="1" smtClean="0">
+                          <a:latin typeface="Cambria Math" panose="02040503050406030204" pitchFamily="18" charset="0"/>
+                        </a:rPr>
+                        <m:t>=</m:t>
+                      </m:r>
+                      <m:sSub>
+                        <m:sSubPr>
+                          <m:ctrlPr>
+                            <a:rPr lang="fr-CA" sz="1800" b="0" i="1" smtClean="0">
+                              <a:latin typeface="Cambria Math" panose="02040503050406030204" pitchFamily="18" charset="0"/>
+                            </a:rPr>
+                          </m:ctrlPr>
+                        </m:sSubPr>
+                        <m:e>
+                          <m:r>
+                            <a:rPr lang="fr-CA" sz="1800" b="0" i="1" smtClean="0">
+                              <a:latin typeface="Cambria Math" panose="02040503050406030204" pitchFamily="18" charset="0"/>
+                            </a:rPr>
+                            <m:t>𝑀</m:t>
+                          </m:r>
+                        </m:e>
+                        <m:sub>
+                          <m:r>
+                            <a:rPr lang="fr-CA" sz="1800" b="0" i="1" smtClean="0">
+                              <a:latin typeface="Cambria Math" panose="02040503050406030204" pitchFamily="18" charset="0"/>
+                            </a:rPr>
+                            <m:t>𝑛𝑢𝑚</m:t>
+                          </m:r>
+                        </m:sub>
+                      </m:sSub>
+                      <m:r>
+                        <a:rPr lang="fr-CA" sz="1800" b="0" i="1" smtClean="0">
+                          <a:latin typeface="Cambria Math" panose="02040503050406030204" pitchFamily="18" charset="0"/>
+                        </a:rPr>
+                        <m:t>−</m:t>
+                      </m:r>
+                      <m:sSub>
+                        <m:sSubPr>
+                          <m:ctrlPr>
+                            <a:rPr lang="fr-CA" sz="1800" b="0" i="1" smtClean="0">
+                              <a:latin typeface="Cambria Math" panose="02040503050406030204" pitchFamily="18" charset="0"/>
+                            </a:rPr>
+                          </m:ctrlPr>
+                        </m:sSubPr>
+                        <m:e>
+                          <m:r>
+                            <a:rPr lang="fr-CA" sz="1800" b="0" i="1" smtClean="0">
+                              <a:latin typeface="Cambria Math" panose="02040503050406030204" pitchFamily="18" charset="0"/>
+                            </a:rPr>
+                            <m:t>𝑀</m:t>
+                          </m:r>
+                        </m:e>
+                        <m:sub>
+                          <m:r>
+                            <a:rPr lang="fr-CA" sz="1800" b="0" i="1" smtClean="0">
+                              <a:latin typeface="Cambria Math" panose="02040503050406030204" pitchFamily="18" charset="0"/>
+                            </a:rPr>
+                            <m:t>𝑟</m:t>
+                          </m:r>
+                          <m:r>
+                            <a:rPr lang="fr-CA" sz="1800" b="0" i="1" smtClean="0">
+                              <a:latin typeface="Cambria Math" panose="02040503050406030204" pitchFamily="18" charset="0"/>
+                            </a:rPr>
+                            <m:t>é</m:t>
+                          </m:r>
+                          <m:r>
+                            <a:rPr lang="fr-CA" sz="1800" b="0" i="1" smtClean="0">
+                              <a:latin typeface="Cambria Math" panose="02040503050406030204" pitchFamily="18" charset="0"/>
+                            </a:rPr>
+                            <m:t>𝑒𝑙</m:t>
+                          </m:r>
+                        </m:sub>
+                      </m:sSub>
+                    </m:oMath>
+                  </m:oMathPara>
+                </a14:m>
+                <a:endParaRPr lang="fr-CA" sz="1800" dirty="0"/>
+              </a:p>
+              <a:p>
+                <a:pPr marL="0" indent="0" algn="just">
+                  <a:buNone/>
+                </a:pPr>
+                <a:endParaRPr lang="fr-CA" sz="1800" dirty="0"/>
+              </a:p>
+              <a:p>
+                <a:pPr marL="0" indent="0" algn="just">
+                  <a:buNone/>
+                </a:pPr>
+                <a:r>
+                  <a:rPr lang="fr-CA" sz="1800" dirty="0"/>
+                  <a:t>De ce fait, l’erreur locale sur l’énergie de déformation peut être défini comme étant:</a:t>
+                </a:r>
+              </a:p>
+              <a:p>
+                <a:pPr marL="0" indent="0" algn="just">
+                  <a:buNone/>
+                </a:pPr>
+                <a:endParaRPr lang="fr-CA" sz="1800" dirty="0"/>
+              </a:p>
+              <a:p>
+                <a:pPr marL="0" indent="0" algn="just">
+                  <a:buNone/>
+                </a:pPr>
+                <a14:m>
+                  <m:oMathPara xmlns:m="http://schemas.openxmlformats.org/officeDocument/2006/math">
+                    <m:oMathParaPr>
+                      <m:jc m:val="centerGroup"/>
+                    </m:oMathParaPr>
+                    <m:oMath xmlns:m="http://schemas.openxmlformats.org/officeDocument/2006/math">
+                      <m:sSup>
+                        <m:sSupPr>
+                          <m:ctrlPr>
+                            <a:rPr lang="fr-CA" sz="1800" b="0" i="1" smtClean="0">
+                              <a:latin typeface="Cambria Math" panose="02040503050406030204" pitchFamily="18" charset="0"/>
+                            </a:rPr>
+                          </m:ctrlPr>
+                        </m:sSupPr>
+                        <m:e>
+                          <m:r>
+                            <a:rPr lang="fr-CA" sz="1800" b="0" i="1" smtClean="0">
+                              <a:latin typeface="Cambria Math" panose="02040503050406030204" pitchFamily="18" charset="0"/>
+                            </a:rPr>
+                            <m:t>𝐸</m:t>
+                          </m:r>
+                        </m:e>
+                        <m:sup>
+                          <m:r>
+                            <a:rPr lang="fr-CA" sz="1800" b="0" i="1" smtClean="0">
+                              <a:latin typeface="Cambria Math" panose="02040503050406030204" pitchFamily="18" charset="0"/>
+                            </a:rPr>
+                            <m:t>2</m:t>
+                          </m:r>
+                        </m:sup>
+                      </m:sSup>
+                      <m:r>
+                        <a:rPr lang="fr-CA" sz="1800" b="0" i="1" smtClean="0">
+                          <a:latin typeface="Cambria Math" panose="02040503050406030204" pitchFamily="18" charset="0"/>
+                        </a:rPr>
+                        <m:t>=</m:t>
+                      </m:r>
+                      <m:f>
+                        <m:fPr>
+                          <m:ctrlPr>
+                            <a:rPr lang="fr-CA" sz="1800" b="0" i="1" smtClean="0">
+                              <a:latin typeface="Cambria Math" panose="02040503050406030204" pitchFamily="18" charset="0"/>
+                            </a:rPr>
+                          </m:ctrlPr>
+                        </m:fPr>
+                        <m:num>
+                          <m:sSup>
+                            <m:sSupPr>
+                              <m:ctrlPr>
+                                <a:rPr lang="fr-CA" sz="1800" b="0" i="1" smtClean="0">
+                                  <a:latin typeface="Cambria Math" panose="02040503050406030204" pitchFamily="18" charset="0"/>
+                                </a:rPr>
+                              </m:ctrlPr>
+                            </m:sSupPr>
+                            <m:e>
+                              <m:r>
+                                <a:rPr lang="fr-CA" sz="1800" b="0" i="1" smtClean="0">
+                                  <a:latin typeface="Cambria Math" panose="02040503050406030204" pitchFamily="18" charset="0"/>
+                                </a:rPr>
+                                <m:t>𝑒</m:t>
+                              </m:r>
+                            </m:e>
+                            <m:sup>
+                              <m:r>
+                                <a:rPr lang="fr-CA" sz="1800" b="0" i="1" smtClean="0">
+                                  <a:latin typeface="Cambria Math" panose="02040503050406030204" pitchFamily="18" charset="0"/>
+                                </a:rPr>
+                                <m:t>2</m:t>
+                              </m:r>
+                            </m:sup>
+                          </m:sSup>
+                        </m:num>
+                        <m:den>
+                          <m:r>
+                            <a:rPr lang="fr-CA" sz="1800" b="0" i="1" smtClean="0">
+                              <a:latin typeface="Cambria Math" panose="02040503050406030204" pitchFamily="18" charset="0"/>
+                            </a:rPr>
+                            <m:t>2 </m:t>
+                          </m:r>
+                          <m:r>
+                            <a:rPr lang="fr-CA" sz="1800" b="0" i="1" smtClean="0">
+                              <a:latin typeface="Cambria Math" panose="02040503050406030204" pitchFamily="18" charset="0"/>
+                            </a:rPr>
+                            <m:t>𝐸𝐼</m:t>
+                          </m:r>
+                        </m:den>
+                      </m:f>
+                      <m:r>
+                        <a:rPr lang="fr-CA" sz="1800" b="0" i="1" smtClean="0">
+                          <a:latin typeface="Cambria Math" panose="02040503050406030204" pitchFamily="18" charset="0"/>
+                        </a:rPr>
+                        <m:t> </m:t>
+                      </m:r>
+                      <m:r>
+                        <a:rPr lang="fr-CA" sz="1800" b="0" i="1" smtClean="0">
+                          <a:latin typeface="Cambria Math" panose="02040503050406030204" pitchFamily="18" charset="0"/>
+                        </a:rPr>
+                        <m:t>h</m:t>
+                      </m:r>
+                    </m:oMath>
+                  </m:oMathPara>
+                </a14:m>
+                <a:endParaRPr lang="fr-CA" sz="1800" dirty="0"/>
+              </a:p>
+              <a:p>
+                <a:pPr marL="0" indent="0" algn="just">
+                  <a:buNone/>
+                </a:pPr>
+                <a:endParaRPr lang="fr-CA" sz="1800" dirty="0"/>
+              </a:p>
+              <a:p>
+                <a:pPr marL="0" indent="0" algn="just">
+                  <a:buNone/>
+                </a:pPr>
+                <a:r>
+                  <a:rPr lang="fr-CA" sz="1800" dirty="0"/>
+                  <a:t>Toutefois, elle peut également être défini à l’aide de la formulation de l’erreur de discrétisation d’une méthode par éléments finis, soit:</a:t>
+                </a:r>
+              </a:p>
+              <a:p>
+                <a:pPr marL="0" indent="0" algn="just">
+                  <a:buNone/>
+                </a:pPr>
+                <a14:m>
+                  <m:oMathPara xmlns:m="http://schemas.openxmlformats.org/officeDocument/2006/math">
+                    <m:oMathParaPr>
+                      <m:jc m:val="centerGroup"/>
+                    </m:oMathParaPr>
+                    <m:oMath xmlns:m="http://schemas.openxmlformats.org/officeDocument/2006/math">
+                      <m:r>
+                        <m:rPr>
+                          <m:sty m:val="p"/>
+                        </m:rPr>
+                        <a:rPr lang="fr-CA" sz="1800" b="0" i="0" smtClean="0">
+                          <a:latin typeface="Cambria Math" panose="02040503050406030204" pitchFamily="18" charset="0"/>
+                        </a:rPr>
+                        <m:t>E</m:t>
+                      </m:r>
+                      <m:r>
+                        <a:rPr lang="fr-CA" sz="1800" b="0" i="0" smtClean="0">
+                          <a:latin typeface="Cambria Math" panose="02040503050406030204" pitchFamily="18" charset="0"/>
+                        </a:rPr>
+                        <m:t>=</m:t>
+                      </m:r>
+                      <m:sSup>
+                        <m:sSupPr>
+                          <m:ctrlPr>
+                            <a:rPr lang="fr-CA" sz="1800" b="0" i="0" smtClean="0">
+                              <a:latin typeface="Cambria Math" panose="02040503050406030204" pitchFamily="18" charset="0"/>
+                            </a:rPr>
+                          </m:ctrlPr>
+                        </m:sSupPr>
+                        <m:e>
+                          <m:r>
+                            <m:rPr>
+                              <m:sty m:val="p"/>
+                            </m:rPr>
+                            <a:rPr lang="fr-CA" sz="1800" b="0" i="0" smtClean="0">
+                              <a:latin typeface="Cambria Math" panose="02040503050406030204" pitchFamily="18" charset="0"/>
+                            </a:rPr>
+                            <m:t>Ch</m:t>
+                          </m:r>
+                        </m:e>
+                        <m:sup>
+                          <m:r>
+                            <m:rPr>
+                              <m:sty m:val="p"/>
+                            </m:rPr>
+                            <a:rPr lang="fr-CA" sz="1800" b="0" i="0" smtClean="0">
+                              <a:latin typeface="Cambria Math" panose="02040503050406030204" pitchFamily="18" charset="0"/>
+                            </a:rPr>
+                            <m:t>p</m:t>
+                          </m:r>
+                        </m:sup>
+                      </m:sSup>
+                    </m:oMath>
+                  </m:oMathPara>
+                </a14:m>
+                <a:endParaRPr lang="fr-CA" sz="1800" dirty="0"/>
+              </a:p>
+              <a:p>
+                <a:pPr marL="0" indent="0" algn="just">
+                  <a:buNone/>
+                </a:pPr>
+                <a:endParaRPr lang="fr-CA" sz="1800" dirty="0"/>
+              </a:p>
+            </p:txBody>
+          </p:sp>
+        </mc:Choice>
+        <mc:Fallback>
+          <p:sp>
+            <p:nvSpPr>
+              <p:cNvPr id="3" name="Content Placeholder 2">
+                <a:extLst>
+                  <a:ext uri="{FF2B5EF4-FFF2-40B4-BE49-F238E27FC236}">
+                    <a16:creationId xmlns:a16="http://schemas.microsoft.com/office/drawing/2014/main" id="{57846E6E-541E-C380-2EC3-91AF5BEE61F6}"/>
+                  </a:ext>
+                </a:extLst>
+              </p:cNvPr>
+              <p:cNvSpPr>
+                <a:spLocks noGrp="1" noRot="1" noChangeAspect="1" noMove="1" noResize="1" noEditPoints="1" noAdjustHandles="1" noChangeArrowheads="1" noChangeShapeType="1" noTextEdit="1"/>
+              </p:cNvSpPr>
+              <p:nvPr>
+                <p:ph idx="1"/>
+              </p:nvPr>
+            </p:nvSpPr>
+            <p:spPr>
+              <a:xfrm>
+                <a:off x="838200" y="1150374"/>
+                <a:ext cx="10515600" cy="5342501"/>
+              </a:xfrm>
+              <a:blipFill>
+                <a:blip r:embed="rId2"/>
+                <a:stretch>
+                  <a:fillRect l="-406" t="-1598" r="-348"/>
+                </a:stretch>
+              </a:blipFill>
+            </p:spPr>
+            <p:txBody>
+              <a:bodyPr/>
+              <a:lstStyle/>
+              <a:p>
+                <a:r>
+                  <a:rPr lang="en-CA">
+                    <a:noFill/>
+                  </a:rPr>
+                  <a:t> </a:t>
+                </a:r>
+              </a:p>
+            </p:txBody>
+          </p:sp>
+        </mc:Fallback>
+      </mc:AlternateContent>
+    </p:spTree>
+    <p:extLst>
+      <p:ext uri="{BB962C8B-B14F-4D97-AF65-F5344CB8AC3E}">
+        <p14:creationId xmlns:p14="http://schemas.microsoft.com/office/powerpoint/2010/main" val="2581581720"/>
+      </p:ext>
+    </p:extLst>
+  </p:cSld>
+  <p:clrMapOvr>
+    <a:masterClrMapping/>
+  </p:clrMapOvr>
+</p:sld>
+</file>
+
+<file path=ppt/slides/slide13.xml><?xml version="1.0" encoding="utf-8"?>
+<p:sld xmlns:a="http://schemas.openxmlformats.org/drawingml/2006/main" xmlns:r="http://schemas.openxmlformats.org/officeDocument/2006/relationships" xmlns:p="http://schemas.openxmlformats.org/presentationml/2006/main">
+  <p:cSld>
+    <p:spTree>
+      <p:nvGrpSpPr>
+        <p:cNvPr id="1" name=""/>
+        <p:cNvGrpSpPr/>
+        <p:nvPr/>
+      </p:nvGrpSpPr>
+      <p:grpSpPr>
+        <a:xfrm>
+          <a:off x="0" y="0"/>
+          <a:ext cx="0" cy="0"/>
+          <a:chOff x="0" y="0"/>
+          <a:chExt cx="0" cy="0"/>
+        </a:xfrm>
+      </p:grpSpPr>
+      <p:sp>
+        <p:nvSpPr>
+          <p:cNvPr id="2" name="Title 1">
+            <a:extLst>
+              <a:ext uri="{FF2B5EF4-FFF2-40B4-BE49-F238E27FC236}">
+                <a16:creationId xmlns:a16="http://schemas.microsoft.com/office/drawing/2014/main" id="{E0220718-7085-48D6-FCCC-6D486EF513A7}"/>
+              </a:ext>
+            </a:extLst>
+          </p:cNvPr>
+          <p:cNvSpPr>
+            <a:spLocks noGrp="1"/>
+          </p:cNvSpPr>
+          <p:nvPr>
+            <p:ph type="title"/>
+          </p:nvPr>
+        </p:nvSpPr>
+        <p:spPr>
+          <a:xfrm>
+            <a:off x="838200" y="365125"/>
+            <a:ext cx="9308690" cy="706591"/>
+          </a:xfrm>
+        </p:spPr>
+        <p:txBody>
+          <a:bodyPr>
+            <a:normAutofit/>
+          </a:bodyPr>
+          <a:lstStyle/>
+          <a:p>
+            <a:r>
               <a:rPr lang="fr-FR" sz="3000" dirty="0"/>
               <a:t>Vérification de code</a:t>
             </a:r>
@@ -14314,73 +16082,18 @@
               <a:buNone/>
             </a:pPr>
             <a:r>
-              <a:rPr lang="en-CA" sz="1800" dirty="0">
-                <a:highlight>
-                  <a:srgbClr val="FFFF00"/>
-                </a:highlight>
-              </a:rPr>
-              <a:t>INSERER fig. 4 IMAGE DE LA SIMULATION AVEC ANGLE NON NUL</a:t>
+              <a:rPr lang="fr-CA" sz="1800" dirty="0"/>
+              <a:t>Ainsi, en réalisant des simulations qui augmente le nombre d’éléments (i.e. en diminuant h), on observe les résultats suivants:</a:t>
             </a:r>
           </a:p>
           <a:p>
             <a:pPr marL="0" indent="0" algn="just">
               <a:buNone/>
             </a:pPr>
-            <a:endParaRPr lang="en-CA" sz="1800" dirty="0"/>
-          </a:p>
-          <a:p>
-            <a:pPr marL="0" indent="0" algn="just">
-              <a:buNone/>
-            </a:pPr>
-            <a:endParaRPr lang="en-CA" sz="1800" dirty="0"/>
-          </a:p>
-          <a:p>
-            <a:pPr marL="0" indent="0" algn="just">
-              <a:buNone/>
-            </a:pPr>
-            <a:endParaRPr lang="en-CA" sz="1800" dirty="0"/>
-          </a:p>
-          <a:p>
-            <a:pPr marL="0" indent="0" algn="just">
-              <a:buNone/>
-            </a:pPr>
-            <a:endParaRPr lang="en-CA" sz="1800" dirty="0"/>
-          </a:p>
-          <a:p>
-            <a:pPr marL="0" indent="0" algn="just">
-              <a:buNone/>
-            </a:pPr>
-            <a:endParaRPr lang="en-CA" sz="1800" dirty="0"/>
-          </a:p>
-          <a:p>
-            <a:pPr marL="0" indent="0" algn="just">
-              <a:buNone/>
-            </a:pPr>
-            <a:endParaRPr lang="en-CA" sz="1800" dirty="0"/>
-          </a:p>
-          <a:p>
-            <a:pPr marL="0" indent="0" algn="just">
-              <a:buNone/>
-            </a:pPr>
-            <a:endParaRPr lang="en-CA" sz="1800" dirty="0"/>
-          </a:p>
-          <a:p>
-            <a:pPr marL="0" indent="0" algn="just">
-              <a:buNone/>
-            </a:pPr>
-            <a:endParaRPr lang="en-CA" sz="1800" dirty="0"/>
-          </a:p>
-          <a:p>
-            <a:pPr marL="0" indent="0" algn="just">
-              <a:buNone/>
-            </a:pPr>
-            <a:endParaRPr lang="en-CA" sz="1800" dirty="0"/>
-          </a:p>
-          <a:p>
-            <a:pPr marL="0" indent="0" algn="just">
-              <a:buNone/>
-            </a:pPr>
-            <a:endParaRPr lang="en-CA" sz="1800" dirty="0"/>
+            <a:r>
+              <a:rPr lang="fr-CA" sz="1800" dirty="0"/>
+              <a:t> </a:t>
+            </a:r>
           </a:p>
           <a:p>
             <a:pPr marL="0" indent="0" algn="just">
@@ -14388,44 +16101,1128 @@
             </a:pPr>
             <a:endParaRPr lang="fr-CA" sz="1800" dirty="0"/>
           </a:p>
+        </p:txBody>
+      </p:sp>
+      <p:graphicFrame>
+        <p:nvGraphicFramePr>
+          <p:cNvPr id="5" name="Tableau 4">
+            <a:extLst>
+              <a:ext uri="{FF2B5EF4-FFF2-40B4-BE49-F238E27FC236}">
+                <a16:creationId xmlns:a16="http://schemas.microsoft.com/office/drawing/2014/main" id="{1E3C8E96-FEA8-F541-ED57-035B52468DA4}"/>
+              </a:ext>
+            </a:extLst>
+          </p:cNvPr>
+          <p:cNvGraphicFramePr>
+            <a:graphicFrameLocks noGrp="1"/>
+          </p:cNvGraphicFramePr>
+          <p:nvPr>
+            <p:extLst>
+              <p:ext uri="{D42A27DB-BD31-4B8C-83A1-F6EECF244321}">
+                <p14:modId xmlns:p14="http://schemas.microsoft.com/office/powerpoint/2010/main" val="2676117715"/>
+              </p:ext>
+            </p:extLst>
+          </p:nvPr>
+        </p:nvGraphicFramePr>
+        <p:xfrm>
+          <a:off x="838200" y="1729331"/>
+          <a:ext cx="2583426" cy="4098138"/>
+        </p:xfrm>
+        <a:graphic>
+          <a:graphicData uri="http://schemas.openxmlformats.org/drawingml/2006/table">
+            <a:tbl>
+              <a:tblPr>
+                <a:tableStyleId>{5C22544A-7EE6-4342-B048-85BDC9FD1C3A}</a:tableStyleId>
+              </a:tblPr>
+              <a:tblGrid>
+                <a:gridCol w="861142">
+                  <a:extLst>
+                    <a:ext uri="{9D8B030D-6E8A-4147-A177-3AD203B41FA5}">
+                      <a16:colId xmlns:a16="http://schemas.microsoft.com/office/drawing/2014/main" val="1227360745"/>
+                    </a:ext>
+                  </a:extLst>
+                </a:gridCol>
+                <a:gridCol w="861142">
+                  <a:extLst>
+                    <a:ext uri="{9D8B030D-6E8A-4147-A177-3AD203B41FA5}">
+                      <a16:colId xmlns:a16="http://schemas.microsoft.com/office/drawing/2014/main" val="3107719020"/>
+                    </a:ext>
+                  </a:extLst>
+                </a:gridCol>
+                <a:gridCol w="861142">
+                  <a:extLst>
+                    <a:ext uri="{9D8B030D-6E8A-4147-A177-3AD203B41FA5}">
+                      <a16:colId xmlns:a16="http://schemas.microsoft.com/office/drawing/2014/main" val="1044542190"/>
+                    </a:ext>
+                  </a:extLst>
+                </a:gridCol>
+              </a:tblGrid>
+              <a:tr h="1060138">
+                <a:tc>
+                  <a:txBody>
+                    <a:bodyPr/>
+                    <a:lstStyle/>
+                    <a:p>
+                      <a:pPr algn="ctr" fontAlgn="ctr"/>
+                      <a:r>
+                        <a:rPr lang="fr-CA" sz="1100" u="none" strike="noStrike" dirty="0">
+                          <a:effectLst/>
+                        </a:rPr>
+                        <a:t>Nombre d’éléments</a:t>
+                      </a:r>
+                      <a:endParaRPr lang="fr-CA" sz="1100" b="0" i="0" u="none" strike="noStrike" dirty="0">
+                        <a:solidFill>
+                          <a:srgbClr val="000000"/>
+                        </a:solidFill>
+                        <a:effectLst/>
+                        <a:latin typeface="Calibri" panose="020F0502020204030204" pitchFamily="34" charset="0"/>
+                      </a:endParaRPr>
+                    </a:p>
+                  </a:txBody>
+                  <a:tcPr marL="7620" marR="7620" marT="7620" marB="0" anchor="ctr"/>
+                </a:tc>
+                <a:tc>
+                  <a:txBody>
+                    <a:bodyPr/>
+                    <a:lstStyle/>
+                    <a:p>
+                      <a:pPr algn="ctr" fontAlgn="ctr"/>
+                      <a:r>
+                        <a:rPr lang="fr-CA" sz="1100" b="0" i="0" u="none" strike="noStrike" dirty="0">
+                          <a:solidFill>
+                            <a:srgbClr val="000000"/>
+                          </a:solidFill>
+                          <a:effectLst/>
+                          <a:latin typeface="Calibri" panose="020F0502020204030204" pitchFamily="34" charset="0"/>
+                        </a:rPr>
+                        <a:t>Pas en espace dx [m]</a:t>
+                      </a:r>
+                    </a:p>
+                  </a:txBody>
+                  <a:tcPr marL="7620" marR="7620" marT="7620" marB="0" anchor="ctr"/>
+                </a:tc>
+                <a:tc>
+                  <a:txBody>
+                    <a:bodyPr/>
+                    <a:lstStyle/>
+                    <a:p>
+                      <a:pPr algn="ctr" fontAlgn="ctr"/>
+                      <a:r>
+                        <a:rPr lang="fr-CA" sz="1100" u="none" strike="noStrike" dirty="0">
+                          <a:effectLst/>
+                        </a:rPr>
+                        <a:t>Erreur de déformation</a:t>
+                      </a:r>
+                      <a:endParaRPr lang="fr-CA" sz="1100" b="0" i="0" u="none" strike="noStrike" dirty="0">
+                        <a:solidFill>
+                          <a:srgbClr val="000000"/>
+                        </a:solidFill>
+                        <a:effectLst/>
+                        <a:latin typeface="Calibri" panose="020F0502020204030204" pitchFamily="34" charset="0"/>
+                      </a:endParaRPr>
+                    </a:p>
+                  </a:txBody>
+                  <a:tcPr marL="7620" marR="7620" marT="7620" marB="0" anchor="ctr"/>
+                </a:tc>
+                <a:extLst>
+                  <a:ext uri="{0D108BD9-81ED-4DB2-BD59-A6C34878D82A}">
+                    <a16:rowId xmlns:a16="http://schemas.microsoft.com/office/drawing/2014/main" val="3343584684"/>
+                  </a:ext>
+                </a:extLst>
+              </a:tr>
+              <a:tr h="379750">
+                <a:tc>
+                  <a:txBody>
+                    <a:bodyPr/>
+                    <a:lstStyle/>
+                    <a:p>
+                      <a:pPr algn="ctr" fontAlgn="ctr"/>
+                      <a:r>
+                        <a:rPr lang="fr-CA" sz="1100" u="none" strike="noStrike">
+                          <a:effectLst/>
+                        </a:rPr>
+                        <a:t>1</a:t>
+                      </a:r>
+                      <a:endParaRPr lang="fr-CA" sz="1100" b="0" i="0" u="none" strike="noStrike">
+                        <a:solidFill>
+                          <a:srgbClr val="000000"/>
+                        </a:solidFill>
+                        <a:effectLst/>
+                        <a:latin typeface="Calibri" panose="020F0502020204030204" pitchFamily="34" charset="0"/>
+                      </a:endParaRPr>
+                    </a:p>
+                  </a:txBody>
+                  <a:tcPr marL="7620" marR="7620" marT="7620" marB="0" anchor="ctr"/>
+                </a:tc>
+                <a:tc>
+                  <a:txBody>
+                    <a:bodyPr/>
+                    <a:lstStyle/>
+                    <a:p>
+                      <a:pPr algn="ctr" fontAlgn="ctr"/>
+                      <a:r>
+                        <a:rPr lang="fr-CA" sz="1100" u="none" strike="noStrike">
+                          <a:effectLst/>
+                        </a:rPr>
+                        <a:t>500</a:t>
+                      </a:r>
+                      <a:endParaRPr lang="fr-CA" sz="1100" b="0" i="0" u="none" strike="noStrike">
+                        <a:solidFill>
+                          <a:srgbClr val="000000"/>
+                        </a:solidFill>
+                        <a:effectLst/>
+                        <a:latin typeface="Calibri" panose="020F0502020204030204" pitchFamily="34" charset="0"/>
+                      </a:endParaRPr>
+                    </a:p>
+                  </a:txBody>
+                  <a:tcPr marL="7620" marR="7620" marT="7620" marB="0" anchor="ctr"/>
+                </a:tc>
+                <a:tc>
+                  <a:txBody>
+                    <a:bodyPr/>
+                    <a:lstStyle/>
+                    <a:p>
+                      <a:pPr algn="ctr" fontAlgn="b"/>
+                      <a:r>
+                        <a:rPr lang="en-CA" sz="1100" b="0" i="0" u="none" strike="noStrike" dirty="0">
+                          <a:solidFill>
+                            <a:srgbClr val="000000"/>
+                          </a:solidFill>
+                          <a:effectLst/>
+                          <a:latin typeface="Aptos Narrow" panose="020B0004020202020204" pitchFamily="34" charset="0"/>
+                        </a:rPr>
+                        <a:t>6.3078314</a:t>
+                      </a:r>
+                    </a:p>
+                  </a:txBody>
+                  <a:tcPr marL="9525" marR="9525" marT="9525" marB="0" anchor="ctr"/>
+                </a:tc>
+                <a:extLst>
+                  <a:ext uri="{0D108BD9-81ED-4DB2-BD59-A6C34878D82A}">
+                    <a16:rowId xmlns:a16="http://schemas.microsoft.com/office/drawing/2014/main" val="2690500205"/>
+                  </a:ext>
+                </a:extLst>
+              </a:tr>
+              <a:tr h="379750">
+                <a:tc>
+                  <a:txBody>
+                    <a:bodyPr/>
+                    <a:lstStyle/>
+                    <a:p>
+                      <a:pPr algn="ctr" fontAlgn="ctr"/>
+                      <a:r>
+                        <a:rPr lang="fr-CA" sz="1100" u="none" strike="noStrike">
+                          <a:effectLst/>
+                        </a:rPr>
+                        <a:t>2</a:t>
+                      </a:r>
+                      <a:endParaRPr lang="fr-CA" sz="1100" b="0" i="0" u="none" strike="noStrike">
+                        <a:solidFill>
+                          <a:srgbClr val="000000"/>
+                        </a:solidFill>
+                        <a:effectLst/>
+                        <a:latin typeface="Calibri" panose="020F0502020204030204" pitchFamily="34" charset="0"/>
+                      </a:endParaRPr>
+                    </a:p>
+                  </a:txBody>
+                  <a:tcPr marL="7620" marR="7620" marT="7620" marB="0" anchor="ctr"/>
+                </a:tc>
+                <a:tc>
+                  <a:txBody>
+                    <a:bodyPr/>
+                    <a:lstStyle/>
+                    <a:p>
+                      <a:pPr algn="ctr" fontAlgn="ctr"/>
+                      <a:r>
+                        <a:rPr lang="fr-CA" sz="1100" u="none" strike="noStrike">
+                          <a:effectLst/>
+                        </a:rPr>
+                        <a:t>250</a:t>
+                      </a:r>
+                      <a:endParaRPr lang="fr-CA" sz="1100" b="0" i="0" u="none" strike="noStrike">
+                        <a:solidFill>
+                          <a:srgbClr val="000000"/>
+                        </a:solidFill>
+                        <a:effectLst/>
+                        <a:latin typeface="Calibri" panose="020F0502020204030204" pitchFamily="34" charset="0"/>
+                      </a:endParaRPr>
+                    </a:p>
+                  </a:txBody>
+                  <a:tcPr marL="7620" marR="7620" marT="7620" marB="0" anchor="ctr"/>
+                </a:tc>
+                <a:tc>
+                  <a:txBody>
+                    <a:bodyPr/>
+                    <a:lstStyle/>
+                    <a:p>
+                      <a:pPr algn="ctr" fontAlgn="b"/>
+                      <a:r>
+                        <a:rPr lang="en-CA" sz="1100" b="0" i="0" u="none" strike="noStrike" dirty="0">
+                          <a:solidFill>
+                            <a:srgbClr val="000000"/>
+                          </a:solidFill>
+                          <a:effectLst/>
+                          <a:latin typeface="Aptos Narrow" panose="020B0004020202020204" pitchFamily="34" charset="0"/>
+                        </a:rPr>
+                        <a:t>3.153916</a:t>
+                      </a:r>
+                    </a:p>
+                  </a:txBody>
+                  <a:tcPr marL="9525" marR="9525" marT="9525" marB="0" anchor="ctr"/>
+                </a:tc>
+                <a:extLst>
+                  <a:ext uri="{0D108BD9-81ED-4DB2-BD59-A6C34878D82A}">
+                    <a16:rowId xmlns:a16="http://schemas.microsoft.com/office/drawing/2014/main" val="85500179"/>
+                  </a:ext>
+                </a:extLst>
+              </a:tr>
+              <a:tr h="379750">
+                <a:tc>
+                  <a:txBody>
+                    <a:bodyPr/>
+                    <a:lstStyle/>
+                    <a:p>
+                      <a:pPr algn="ctr" fontAlgn="ctr"/>
+                      <a:r>
+                        <a:rPr lang="fr-CA" sz="1100" u="none" strike="noStrike">
+                          <a:effectLst/>
+                        </a:rPr>
+                        <a:t>4</a:t>
+                      </a:r>
+                      <a:endParaRPr lang="fr-CA" sz="1100" b="0" i="0" u="none" strike="noStrike">
+                        <a:solidFill>
+                          <a:srgbClr val="000000"/>
+                        </a:solidFill>
+                        <a:effectLst/>
+                        <a:latin typeface="Calibri" panose="020F0502020204030204" pitchFamily="34" charset="0"/>
+                      </a:endParaRPr>
+                    </a:p>
+                  </a:txBody>
+                  <a:tcPr marL="7620" marR="7620" marT="7620" marB="0" anchor="ctr"/>
+                </a:tc>
+                <a:tc>
+                  <a:txBody>
+                    <a:bodyPr/>
+                    <a:lstStyle/>
+                    <a:p>
+                      <a:pPr algn="ctr" fontAlgn="ctr"/>
+                      <a:r>
+                        <a:rPr lang="fr-CA" sz="1100" u="none" strike="noStrike">
+                          <a:effectLst/>
+                        </a:rPr>
+                        <a:t>125</a:t>
+                      </a:r>
+                      <a:endParaRPr lang="fr-CA" sz="1100" b="0" i="0" u="none" strike="noStrike">
+                        <a:solidFill>
+                          <a:srgbClr val="000000"/>
+                        </a:solidFill>
+                        <a:effectLst/>
+                        <a:latin typeface="Calibri" panose="020F0502020204030204" pitchFamily="34" charset="0"/>
+                      </a:endParaRPr>
+                    </a:p>
+                  </a:txBody>
+                  <a:tcPr marL="7620" marR="7620" marT="7620" marB="0" anchor="ctr"/>
+                </a:tc>
+                <a:tc>
+                  <a:txBody>
+                    <a:bodyPr/>
+                    <a:lstStyle/>
+                    <a:p>
+                      <a:pPr algn="ctr" fontAlgn="b"/>
+                      <a:r>
+                        <a:rPr lang="en-CA" sz="1100" b="0" i="0" u="none" strike="noStrike" dirty="0">
+                          <a:solidFill>
+                            <a:srgbClr val="000000"/>
+                          </a:solidFill>
+                          <a:effectLst/>
+                          <a:latin typeface="Aptos Narrow" panose="020B0004020202020204" pitchFamily="34" charset="0"/>
+                        </a:rPr>
+                        <a:t>1.576958</a:t>
+                      </a:r>
+                    </a:p>
+                  </a:txBody>
+                  <a:tcPr marL="9525" marR="9525" marT="9525" marB="0" anchor="ctr"/>
+                </a:tc>
+                <a:extLst>
+                  <a:ext uri="{0D108BD9-81ED-4DB2-BD59-A6C34878D82A}">
+                    <a16:rowId xmlns:a16="http://schemas.microsoft.com/office/drawing/2014/main" val="1329961423"/>
+                  </a:ext>
+                </a:extLst>
+              </a:tr>
+              <a:tr h="379750">
+                <a:tc>
+                  <a:txBody>
+                    <a:bodyPr/>
+                    <a:lstStyle/>
+                    <a:p>
+                      <a:pPr algn="ctr" fontAlgn="ctr"/>
+                      <a:r>
+                        <a:rPr lang="fr-CA" sz="1100" u="none" strike="noStrike">
+                          <a:effectLst/>
+                        </a:rPr>
+                        <a:t>8</a:t>
+                      </a:r>
+                      <a:endParaRPr lang="fr-CA" sz="1100" b="0" i="0" u="none" strike="noStrike">
+                        <a:solidFill>
+                          <a:srgbClr val="000000"/>
+                        </a:solidFill>
+                        <a:effectLst/>
+                        <a:latin typeface="Calibri" panose="020F0502020204030204" pitchFamily="34" charset="0"/>
+                      </a:endParaRPr>
+                    </a:p>
+                  </a:txBody>
+                  <a:tcPr marL="7620" marR="7620" marT="7620" marB="0" anchor="ctr"/>
+                </a:tc>
+                <a:tc>
+                  <a:txBody>
+                    <a:bodyPr/>
+                    <a:lstStyle/>
+                    <a:p>
+                      <a:pPr algn="ctr" fontAlgn="ctr"/>
+                      <a:r>
+                        <a:rPr lang="fr-CA" sz="1100" u="none" strike="noStrike">
+                          <a:effectLst/>
+                        </a:rPr>
+                        <a:t>62,5</a:t>
+                      </a:r>
+                      <a:endParaRPr lang="fr-CA" sz="1100" b="0" i="0" u="none" strike="noStrike">
+                        <a:solidFill>
+                          <a:srgbClr val="000000"/>
+                        </a:solidFill>
+                        <a:effectLst/>
+                        <a:latin typeface="Calibri" panose="020F0502020204030204" pitchFamily="34" charset="0"/>
+                      </a:endParaRPr>
+                    </a:p>
+                  </a:txBody>
+                  <a:tcPr marL="7620" marR="7620" marT="7620" marB="0" anchor="ctr"/>
+                </a:tc>
+                <a:tc>
+                  <a:txBody>
+                    <a:bodyPr/>
+                    <a:lstStyle/>
+                    <a:p>
+                      <a:pPr algn="ctr" fontAlgn="b"/>
+                      <a:r>
+                        <a:rPr lang="en-CA" sz="1100" b="0" i="0" u="none" strike="noStrike" dirty="0">
+                          <a:solidFill>
+                            <a:srgbClr val="000000"/>
+                          </a:solidFill>
+                          <a:effectLst/>
+                          <a:latin typeface="Aptos Narrow" panose="020B0004020202020204" pitchFamily="34" charset="0"/>
+                        </a:rPr>
+                        <a:t>0.788479</a:t>
+                      </a:r>
+                    </a:p>
+                  </a:txBody>
+                  <a:tcPr marL="9525" marR="9525" marT="9525" marB="0" anchor="ctr"/>
+                </a:tc>
+                <a:extLst>
+                  <a:ext uri="{0D108BD9-81ED-4DB2-BD59-A6C34878D82A}">
+                    <a16:rowId xmlns:a16="http://schemas.microsoft.com/office/drawing/2014/main" val="1029355492"/>
+                  </a:ext>
+                </a:extLst>
+              </a:tr>
+              <a:tr h="379750">
+                <a:tc>
+                  <a:txBody>
+                    <a:bodyPr/>
+                    <a:lstStyle/>
+                    <a:p>
+                      <a:pPr algn="ctr" fontAlgn="ctr"/>
+                      <a:r>
+                        <a:rPr lang="fr-CA" sz="1100" u="none" strike="noStrike">
+                          <a:effectLst/>
+                        </a:rPr>
+                        <a:t>16</a:t>
+                      </a:r>
+                      <a:endParaRPr lang="fr-CA" sz="1100" b="0" i="0" u="none" strike="noStrike">
+                        <a:solidFill>
+                          <a:srgbClr val="000000"/>
+                        </a:solidFill>
+                        <a:effectLst/>
+                        <a:latin typeface="Calibri" panose="020F0502020204030204" pitchFamily="34" charset="0"/>
+                      </a:endParaRPr>
+                    </a:p>
+                  </a:txBody>
+                  <a:tcPr marL="7620" marR="7620" marT="7620" marB="0" anchor="ctr"/>
+                </a:tc>
+                <a:tc>
+                  <a:txBody>
+                    <a:bodyPr/>
+                    <a:lstStyle/>
+                    <a:p>
+                      <a:pPr algn="ctr" fontAlgn="ctr"/>
+                      <a:r>
+                        <a:rPr lang="fr-CA" sz="1100" u="none" strike="noStrike">
+                          <a:effectLst/>
+                        </a:rPr>
+                        <a:t>31,25</a:t>
+                      </a:r>
+                      <a:endParaRPr lang="fr-CA" sz="1100" b="0" i="0" u="none" strike="noStrike">
+                        <a:solidFill>
+                          <a:srgbClr val="000000"/>
+                        </a:solidFill>
+                        <a:effectLst/>
+                        <a:latin typeface="Calibri" panose="020F0502020204030204" pitchFamily="34" charset="0"/>
+                      </a:endParaRPr>
+                    </a:p>
+                  </a:txBody>
+                  <a:tcPr marL="7620" marR="7620" marT="7620" marB="0" anchor="ctr"/>
+                </a:tc>
+                <a:tc>
+                  <a:txBody>
+                    <a:bodyPr/>
+                    <a:lstStyle/>
+                    <a:p>
+                      <a:pPr algn="ctr" fontAlgn="b"/>
+                      <a:r>
+                        <a:rPr lang="en-CA" sz="1100" b="0" i="0" u="none" strike="noStrike" dirty="0">
+                          <a:solidFill>
+                            <a:srgbClr val="000000"/>
+                          </a:solidFill>
+                          <a:effectLst/>
+                          <a:latin typeface="Aptos Narrow" panose="020B0004020202020204" pitchFamily="34" charset="0"/>
+                        </a:rPr>
+                        <a:t>0.394239</a:t>
+                      </a:r>
+                    </a:p>
+                  </a:txBody>
+                  <a:tcPr marL="9525" marR="9525" marT="9525" marB="0" anchor="ctr"/>
+                </a:tc>
+                <a:extLst>
+                  <a:ext uri="{0D108BD9-81ED-4DB2-BD59-A6C34878D82A}">
+                    <a16:rowId xmlns:a16="http://schemas.microsoft.com/office/drawing/2014/main" val="1431671733"/>
+                  </a:ext>
+                </a:extLst>
+              </a:tr>
+              <a:tr h="379750">
+                <a:tc>
+                  <a:txBody>
+                    <a:bodyPr/>
+                    <a:lstStyle/>
+                    <a:p>
+                      <a:pPr algn="ctr" fontAlgn="ctr"/>
+                      <a:r>
+                        <a:rPr lang="fr-CA" sz="1100" u="none" strike="noStrike" dirty="0">
+                          <a:effectLst/>
+                        </a:rPr>
+                        <a:t>32</a:t>
+                      </a:r>
+                      <a:endParaRPr lang="fr-CA" sz="1100" b="0" i="0" u="none" strike="noStrike" dirty="0">
+                        <a:solidFill>
+                          <a:srgbClr val="000000"/>
+                        </a:solidFill>
+                        <a:effectLst/>
+                        <a:latin typeface="Calibri" panose="020F0502020204030204" pitchFamily="34" charset="0"/>
+                      </a:endParaRPr>
+                    </a:p>
+                  </a:txBody>
+                  <a:tcPr marL="7620" marR="7620" marT="7620" marB="0" anchor="ctr"/>
+                </a:tc>
+                <a:tc>
+                  <a:txBody>
+                    <a:bodyPr/>
+                    <a:lstStyle/>
+                    <a:p>
+                      <a:pPr algn="ctr" fontAlgn="ctr"/>
+                      <a:r>
+                        <a:rPr lang="fr-CA" sz="1100" u="none" strike="noStrike">
+                          <a:effectLst/>
+                        </a:rPr>
+                        <a:t>15,625</a:t>
+                      </a:r>
+                      <a:endParaRPr lang="fr-CA" sz="1100" b="0" i="0" u="none" strike="noStrike">
+                        <a:solidFill>
+                          <a:srgbClr val="000000"/>
+                        </a:solidFill>
+                        <a:effectLst/>
+                        <a:latin typeface="Calibri" panose="020F0502020204030204" pitchFamily="34" charset="0"/>
+                      </a:endParaRPr>
+                    </a:p>
+                  </a:txBody>
+                  <a:tcPr marL="7620" marR="7620" marT="7620" marB="0" anchor="ctr"/>
+                </a:tc>
+                <a:tc>
+                  <a:txBody>
+                    <a:bodyPr/>
+                    <a:lstStyle/>
+                    <a:p>
+                      <a:pPr algn="ctr" fontAlgn="b"/>
+                      <a:r>
+                        <a:rPr lang="en-CA" sz="1100" b="0" i="0" u="none" strike="noStrike" dirty="0">
+                          <a:solidFill>
+                            <a:srgbClr val="000000"/>
+                          </a:solidFill>
+                          <a:effectLst/>
+                          <a:latin typeface="Aptos Narrow" panose="020B0004020202020204" pitchFamily="34" charset="0"/>
+                        </a:rPr>
+                        <a:t>0.19712</a:t>
+                      </a:r>
+                    </a:p>
+                  </a:txBody>
+                  <a:tcPr marL="9525" marR="9525" marT="9525" marB="0" anchor="ctr"/>
+                </a:tc>
+                <a:extLst>
+                  <a:ext uri="{0D108BD9-81ED-4DB2-BD59-A6C34878D82A}">
+                    <a16:rowId xmlns:a16="http://schemas.microsoft.com/office/drawing/2014/main" val="3712731881"/>
+                  </a:ext>
+                </a:extLst>
+              </a:tr>
+              <a:tr h="379750">
+                <a:tc>
+                  <a:txBody>
+                    <a:bodyPr/>
+                    <a:lstStyle/>
+                    <a:p>
+                      <a:pPr algn="ctr" fontAlgn="ctr"/>
+                      <a:r>
+                        <a:rPr lang="fr-CA" sz="1100" b="0" i="0" u="none" strike="noStrike" dirty="0">
+                          <a:solidFill>
+                            <a:srgbClr val="000000"/>
+                          </a:solidFill>
+                          <a:effectLst/>
+                          <a:latin typeface="Calibri" panose="020F0502020204030204" pitchFamily="34" charset="0"/>
+                        </a:rPr>
+                        <a:t>64</a:t>
+                      </a:r>
+                    </a:p>
+                  </a:txBody>
+                  <a:tcPr marL="7620" marR="7620" marT="7620" marB="0" anchor="ctr"/>
+                </a:tc>
+                <a:tc>
+                  <a:txBody>
+                    <a:bodyPr/>
+                    <a:lstStyle/>
+                    <a:p>
+                      <a:pPr algn="ctr" fontAlgn="b"/>
+                      <a:r>
+                        <a:rPr lang="en-CA" sz="1100" b="0" i="0" u="none" strike="noStrike" dirty="0">
+                          <a:solidFill>
+                            <a:srgbClr val="000000"/>
+                          </a:solidFill>
+                          <a:effectLst/>
+                          <a:latin typeface="Aptos Narrow" panose="020B0004020202020204" pitchFamily="34" charset="0"/>
+                        </a:rPr>
+                        <a:t>7.8125</a:t>
+                      </a:r>
+                    </a:p>
+                  </a:txBody>
+                  <a:tcPr marL="9525" marR="9525" marT="9525" marB="0" anchor="ctr"/>
+                </a:tc>
+                <a:tc>
+                  <a:txBody>
+                    <a:bodyPr/>
+                    <a:lstStyle/>
+                    <a:p>
+                      <a:pPr algn="ctr" fontAlgn="b"/>
+                      <a:r>
+                        <a:rPr lang="en-CA" sz="1100" b="0" i="0" u="none" strike="noStrike" dirty="0">
+                          <a:solidFill>
+                            <a:srgbClr val="000000"/>
+                          </a:solidFill>
+                          <a:effectLst/>
+                          <a:latin typeface="Aptos Narrow" panose="020B0004020202020204" pitchFamily="34" charset="0"/>
+                        </a:rPr>
+                        <a:t>0.098561</a:t>
+                      </a:r>
+                    </a:p>
+                  </a:txBody>
+                  <a:tcPr marL="9525" marR="9525" marT="9525" marB="0" anchor="ctr"/>
+                </a:tc>
+                <a:extLst>
+                  <a:ext uri="{0D108BD9-81ED-4DB2-BD59-A6C34878D82A}">
+                    <a16:rowId xmlns:a16="http://schemas.microsoft.com/office/drawing/2014/main" val="1479933162"/>
+                  </a:ext>
+                </a:extLst>
+              </a:tr>
+              <a:tr h="379750">
+                <a:tc>
+                  <a:txBody>
+                    <a:bodyPr/>
+                    <a:lstStyle/>
+                    <a:p>
+                      <a:pPr algn="ctr" fontAlgn="ctr"/>
+                      <a:r>
+                        <a:rPr lang="fr-CA" sz="1100" b="0" i="0" u="none" strike="noStrike" dirty="0">
+                          <a:solidFill>
+                            <a:srgbClr val="000000"/>
+                          </a:solidFill>
+                          <a:effectLst/>
+                          <a:latin typeface="Calibri" panose="020F0502020204030204" pitchFamily="34" charset="0"/>
+                        </a:rPr>
+                        <a:t>128</a:t>
+                      </a:r>
+                    </a:p>
+                  </a:txBody>
+                  <a:tcPr marL="7620" marR="7620" marT="7620" marB="0" anchor="ctr"/>
+                </a:tc>
+                <a:tc>
+                  <a:txBody>
+                    <a:bodyPr/>
+                    <a:lstStyle/>
+                    <a:p>
+                      <a:pPr algn="ctr" fontAlgn="b"/>
+                      <a:r>
+                        <a:rPr lang="en-CA" sz="1100" b="0" i="0" u="none" strike="noStrike" dirty="0">
+                          <a:solidFill>
+                            <a:srgbClr val="000000"/>
+                          </a:solidFill>
+                          <a:effectLst/>
+                          <a:latin typeface="Aptos Narrow" panose="020B0004020202020204" pitchFamily="34" charset="0"/>
+                        </a:rPr>
+                        <a:t>3.90625</a:t>
+                      </a:r>
+                    </a:p>
+                  </a:txBody>
+                  <a:tcPr marL="9525" marR="9525" marT="9525" marB="0" anchor="ctr"/>
+                </a:tc>
+                <a:tc>
+                  <a:txBody>
+                    <a:bodyPr/>
+                    <a:lstStyle/>
+                    <a:p>
+                      <a:pPr algn="ctr" fontAlgn="b"/>
+                      <a:r>
+                        <a:rPr lang="en-CA" sz="1100" b="0" i="0" u="none" strike="noStrike" dirty="0">
+                          <a:solidFill>
+                            <a:srgbClr val="000000"/>
+                          </a:solidFill>
+                          <a:effectLst/>
+                          <a:latin typeface="Aptos Narrow" panose="020B0004020202020204" pitchFamily="34" charset="0"/>
+                        </a:rPr>
+                        <a:t>0.049279</a:t>
+                      </a:r>
+                    </a:p>
+                  </a:txBody>
+                  <a:tcPr marL="9525" marR="9525" marT="9525" marB="0" anchor="ctr"/>
+                </a:tc>
+                <a:extLst>
+                  <a:ext uri="{0D108BD9-81ED-4DB2-BD59-A6C34878D82A}">
+                    <a16:rowId xmlns:a16="http://schemas.microsoft.com/office/drawing/2014/main" val="1093481435"/>
+                  </a:ext>
+                </a:extLst>
+              </a:tr>
+            </a:tbl>
+          </a:graphicData>
+        </a:graphic>
+      </p:graphicFrame>
+      <p:sp>
+        <p:nvSpPr>
+          <p:cNvPr id="4" name="ZoneTexte 4">
+            <a:extLst>
+              <a:ext uri="{FF2B5EF4-FFF2-40B4-BE49-F238E27FC236}">
+                <a16:creationId xmlns:a16="http://schemas.microsoft.com/office/drawing/2014/main" id="{1C1EA7A2-B906-0687-7FAB-E254C5ACBEF8}"/>
+              </a:ext>
+            </a:extLst>
+          </p:cNvPr>
+          <p:cNvSpPr txBox="1"/>
+          <p:nvPr/>
+        </p:nvSpPr>
+        <p:spPr>
+          <a:xfrm>
+            <a:off x="5420276" y="5866798"/>
+            <a:ext cx="5435048" cy="276999"/>
+          </a:xfrm>
+          <a:prstGeom prst="rect">
+            <a:avLst/>
+          </a:prstGeom>
+          <a:noFill/>
+        </p:spPr>
+        <p:txBody>
+          <a:bodyPr wrap="square" rtlCol="0">
+            <a:spAutoFit/>
+          </a:bodyPr>
+          <a:lstStyle/>
           <a:p>
-            <a:pPr marL="0" indent="0" algn="just">
-              <a:buNone/>
-            </a:pPr>
-            <a:r>
-              <a:rPr lang="fr-CA" sz="1800" dirty="0"/>
-              <a:t>Finalement, il faut noter que cet écart ne remet pas en question la vérification du Code de </a:t>
-            </a:r>
-            <a:r>
-              <a:rPr lang="fr-CA" sz="1800" dirty="0" err="1"/>
-              <a:t>SimCenter</a:t>
-            </a:r>
-            <a:r>
-              <a:rPr lang="fr-CA" sz="1800" dirty="0"/>
-              <a:t>/Nastran mais plutôt la méthode utilisée pour la vérification.</a:t>
-            </a:r>
+            <a:r>
+              <a:rPr lang="fr-FR" sz="1200" dirty="0"/>
+              <a:t>Fig.5. </a:t>
+            </a:r>
+            <a:r>
+              <a:rPr lang="en-CA" sz="1200" dirty="0"/>
+              <a:t>Convergence de </a:t>
+            </a:r>
+            <a:r>
+              <a:rPr lang="en-CA" sz="1200" dirty="0" err="1"/>
+              <a:t>l’erreur</a:t>
+            </a:r>
+            <a:r>
+              <a:rPr lang="en-CA" sz="1200" dirty="0"/>
+              <a:t> de deformation </a:t>
+            </a:r>
+            <a:r>
+              <a:rPr lang="en-CA" sz="1200" dirty="0" err="1"/>
+              <a:t>en</a:t>
+            </a:r>
+            <a:r>
+              <a:rPr lang="en-CA" sz="1200" dirty="0"/>
+              <a:t> </a:t>
+            </a:r>
+            <a:r>
+              <a:rPr lang="en-CA" sz="1200" dirty="0" err="1"/>
+              <a:t>fonction</a:t>
+            </a:r>
+            <a:r>
+              <a:rPr lang="en-CA" sz="1200" dirty="0"/>
+              <a:t> de h</a:t>
+            </a:r>
+            <a:endParaRPr lang="fr-FR" sz="1200" dirty="0"/>
           </a:p>
         </p:txBody>
       </p:sp>
+      <p:sp>
+        <p:nvSpPr>
+          <p:cNvPr id="7" name="ZoneTexte 4">
+            <a:extLst>
+              <a:ext uri="{FF2B5EF4-FFF2-40B4-BE49-F238E27FC236}">
+                <a16:creationId xmlns:a16="http://schemas.microsoft.com/office/drawing/2014/main" id="{D171DBA5-F2AB-1803-42AF-95DB866C9BD0}"/>
+              </a:ext>
+            </a:extLst>
+          </p:cNvPr>
+          <p:cNvSpPr txBox="1"/>
+          <p:nvPr/>
+        </p:nvSpPr>
+        <p:spPr>
+          <a:xfrm>
+            <a:off x="1113503" y="5866798"/>
+            <a:ext cx="2111477" cy="646331"/>
+          </a:xfrm>
+          <a:prstGeom prst="rect">
+            <a:avLst/>
+          </a:prstGeom>
+          <a:noFill/>
+        </p:spPr>
+        <p:txBody>
+          <a:bodyPr wrap="square" rtlCol="0">
+            <a:spAutoFit/>
+          </a:bodyPr>
+          <a:lstStyle/>
+          <a:p>
+            <a:r>
+              <a:rPr lang="fr-FR" sz="1200" dirty="0"/>
+              <a:t>Tableau 3. </a:t>
+            </a:r>
+            <a:r>
+              <a:rPr lang="en-CA" sz="1200" dirty="0"/>
+              <a:t>Valeur de </a:t>
+            </a:r>
+            <a:r>
+              <a:rPr lang="en-CA" sz="1200" dirty="0" err="1"/>
+              <a:t>l’erreur</a:t>
+            </a:r>
+            <a:r>
+              <a:rPr lang="en-CA" sz="1200" dirty="0"/>
+              <a:t> de deformation pour </a:t>
+            </a:r>
+            <a:r>
+              <a:rPr lang="en-CA" sz="1200" dirty="0" err="1"/>
+              <a:t>différents</a:t>
+            </a:r>
+            <a:r>
+              <a:rPr lang="en-CA" sz="1200" dirty="0"/>
+              <a:t> </a:t>
+            </a:r>
+            <a:r>
+              <a:rPr lang="en-CA" sz="1200" dirty="0" err="1"/>
+              <a:t>maillages</a:t>
+            </a:r>
+            <a:endParaRPr lang="fr-FR" sz="1200" dirty="0"/>
+          </a:p>
+        </p:txBody>
+      </p:sp>
+      <p:graphicFrame>
+        <p:nvGraphicFramePr>
+          <p:cNvPr id="8" name="Chart 7">
+            <a:extLst>
+              <a:ext uri="{FF2B5EF4-FFF2-40B4-BE49-F238E27FC236}">
+                <a16:creationId xmlns:a16="http://schemas.microsoft.com/office/drawing/2014/main" id="{6F0BDE2F-EA72-3241-7427-B88E7D002C01}"/>
+              </a:ext>
+            </a:extLst>
+          </p:cNvPr>
+          <p:cNvGraphicFramePr>
+            <a:graphicFrameLocks/>
+          </p:cNvGraphicFramePr>
+          <p:nvPr>
+            <p:extLst>
+              <p:ext uri="{D42A27DB-BD31-4B8C-83A1-F6EECF244321}">
+                <p14:modId xmlns:p14="http://schemas.microsoft.com/office/powerpoint/2010/main" val="2005764556"/>
+              </p:ext>
+            </p:extLst>
+          </p:nvPr>
+        </p:nvGraphicFramePr>
+        <p:xfrm>
+          <a:off x="4563344" y="1850608"/>
+          <a:ext cx="6291980" cy="3855584"/>
+        </p:xfrm>
+        <a:graphic>
+          <a:graphicData uri="http://schemas.openxmlformats.org/drawingml/2006/chart">
+            <c:chart xmlns:c="http://schemas.openxmlformats.org/drawingml/2006/chart" xmlns:r="http://schemas.openxmlformats.org/officeDocument/2006/relationships" r:id="rId2"/>
+          </a:graphicData>
+        </a:graphic>
+      </p:graphicFrame>
     </p:spTree>
     <p:extLst>
       <p:ext uri="{BB962C8B-B14F-4D97-AF65-F5344CB8AC3E}">
-        <p14:creationId xmlns:p14="http://schemas.microsoft.com/office/powerpoint/2010/main" val="494895105"/>
+        <p14:creationId xmlns:p14="http://schemas.microsoft.com/office/powerpoint/2010/main" val="3283470432"/>
       </p:ext>
     </p:extLst>
   </p:cSld>
   <p:clrMapOvr>
     <a:masterClrMapping/>
   </p:clrMapOvr>
-  <p:extLst>
-    <p:ext uri="{6950BFC3-D8DA-4A85-94F7-54DA5524770B}">
-      <p188:commentRel xmlns:p188="http://schemas.microsoft.com/office/powerpoint/2018/8/main" r:id="rId2"/>
-    </p:ext>
-  </p:extLst>
 </p:sld>
 </file>
 
-<file path=ppt/slides/slide12.xml><?xml version="1.0" encoding="utf-8"?>
+<file path=ppt/slides/slide14.xml><?xml version="1.0" encoding="utf-8"?>
+<p:sld xmlns:a="http://schemas.openxmlformats.org/drawingml/2006/main" xmlns:r="http://schemas.openxmlformats.org/officeDocument/2006/relationships" xmlns:p="http://schemas.openxmlformats.org/presentationml/2006/main">
+  <p:cSld>
+    <p:spTree>
+      <p:nvGrpSpPr>
+        <p:cNvPr id="1" name=""/>
+        <p:cNvGrpSpPr/>
+        <p:nvPr/>
+      </p:nvGrpSpPr>
+      <p:grpSpPr>
+        <a:xfrm>
+          <a:off x="0" y="0"/>
+          <a:ext cx="0" cy="0"/>
+          <a:chOff x="0" y="0"/>
+          <a:chExt cx="0" cy="0"/>
+        </a:xfrm>
+      </p:grpSpPr>
+      <p:sp>
+        <p:nvSpPr>
+          <p:cNvPr id="2" name="Title 1">
+            <a:extLst>
+              <a:ext uri="{FF2B5EF4-FFF2-40B4-BE49-F238E27FC236}">
+                <a16:creationId xmlns:a16="http://schemas.microsoft.com/office/drawing/2014/main" id="{E0220718-7085-48D6-FCCC-6D486EF513A7}"/>
+              </a:ext>
+            </a:extLst>
+          </p:cNvPr>
+          <p:cNvSpPr>
+            <a:spLocks noGrp="1"/>
+          </p:cNvSpPr>
+          <p:nvPr>
+            <p:ph type="title"/>
+          </p:nvPr>
+        </p:nvSpPr>
+        <p:spPr>
+          <a:xfrm>
+            <a:off x="838200" y="365125"/>
+            <a:ext cx="9308690" cy="706591"/>
+          </a:xfrm>
+        </p:spPr>
+        <p:txBody>
+          <a:bodyPr>
+            <a:normAutofit/>
+          </a:bodyPr>
+          <a:lstStyle/>
+          <a:p>
+            <a:r>
+              <a:rPr lang="fr-FR" sz="3000" dirty="0"/>
+              <a:t>Vérification de code</a:t>
+            </a:r>
+            <a:endParaRPr lang="en-CA" sz="3000" dirty="0"/>
+          </a:p>
+        </p:txBody>
+      </p:sp>
+      <mc:AlternateContent xmlns:mc="http://schemas.openxmlformats.org/markup-compatibility/2006">
+        <mc:Choice xmlns:a14="http://schemas.microsoft.com/office/drawing/2010/main" Requires="a14">
+          <p:sp>
+            <p:nvSpPr>
+              <p:cNvPr id="3" name="Content Placeholder 2">
+                <a:extLst>
+                  <a:ext uri="{FF2B5EF4-FFF2-40B4-BE49-F238E27FC236}">
+                    <a16:creationId xmlns:a16="http://schemas.microsoft.com/office/drawing/2014/main" id="{57846E6E-541E-C380-2EC3-91AF5BEE61F6}"/>
+                  </a:ext>
+                </a:extLst>
+              </p:cNvPr>
+              <p:cNvSpPr>
+                <a:spLocks noGrp="1"/>
+              </p:cNvSpPr>
+              <p:nvPr>
+                <p:ph idx="1"/>
+              </p:nvPr>
+            </p:nvSpPr>
+            <p:spPr>
+              <a:xfrm>
+                <a:off x="838200" y="1150374"/>
+                <a:ext cx="10515600" cy="5342501"/>
+              </a:xfrm>
+            </p:spPr>
+            <p:txBody>
+              <a:bodyPr>
+                <a:normAutofit/>
+              </a:bodyPr>
+              <a:lstStyle/>
+              <a:p>
+                <a:pPr marL="0" indent="0" algn="just">
+                  <a:buNone/>
+                </a:pPr>
+                <a:r>
+                  <a:rPr lang="fr-CA" sz="1800" dirty="0"/>
+                  <a:t>Il faut noter que cette méthode converge selon </a:t>
+                </a:r>
+                <a14:m>
+                  <m:oMath xmlns:m="http://schemas.openxmlformats.org/officeDocument/2006/math">
+                    <m:r>
+                      <m:rPr>
+                        <m:sty m:val="p"/>
+                      </m:rPr>
+                      <a:rPr lang="el-GR" sz="1800" i="1" smtClean="0">
+                        <a:latin typeface="Cambria Math" panose="02040503050406030204" pitchFamily="18" charset="0"/>
+                      </a:rPr>
+                      <m:t>Ο</m:t>
+                    </m:r>
+                    <m:r>
+                      <a:rPr lang="fr-CA" sz="1800" b="0" i="1" smtClean="0">
+                        <a:latin typeface="Cambria Math" panose="02040503050406030204" pitchFamily="18" charset="0"/>
+                      </a:rPr>
+                      <m:t>(</m:t>
+                    </m:r>
+                    <m:sSup>
+                      <m:sSupPr>
+                        <m:ctrlPr>
+                          <a:rPr lang="fr-CA" sz="1800" b="0" i="1" smtClean="0">
+                            <a:latin typeface="Cambria Math" panose="02040503050406030204" pitchFamily="18" charset="0"/>
+                          </a:rPr>
+                        </m:ctrlPr>
+                      </m:sSupPr>
+                      <m:e>
+                        <m:r>
+                          <a:rPr lang="fr-CA" sz="1800" b="0" i="1" smtClean="0">
+                            <a:latin typeface="Cambria Math" panose="02040503050406030204" pitchFamily="18" charset="0"/>
+                          </a:rPr>
+                          <m:t>h</m:t>
+                        </m:r>
+                      </m:e>
+                      <m:sup>
+                        <m:r>
+                          <a:rPr lang="fr-CA" sz="1800" b="0" i="1" smtClean="0">
+                            <a:latin typeface="Cambria Math" panose="02040503050406030204" pitchFamily="18" charset="0"/>
+                          </a:rPr>
+                          <m:t>𝑝</m:t>
+                        </m:r>
+                      </m:sup>
+                    </m:sSup>
+                    <m:r>
+                      <a:rPr lang="fr-CA" sz="1800" b="0" i="1" smtClean="0">
+                        <a:latin typeface="Cambria Math" panose="02040503050406030204" pitchFamily="18" charset="0"/>
+                      </a:rPr>
+                      <m:t>)</m:t>
+                    </m:r>
+                  </m:oMath>
+                </a14:m>
+                <a:r>
+                  <a:rPr lang="fr-CA" sz="1800" dirty="0"/>
+                  <a:t> où p est l’ordre de convergence. Il est donc possible de remarquer que cette méthode est beaucoup mieux adaptée pour analyser la convergence des éléments poutre. Les poutres utilisées par le logiciel Simcenter3D sont des éléments finis linéaire. Effectivement, elle ne possède pas de nœuds milieu permettant de prendre en compte la pente dans l’élément. </a:t>
+                </a:r>
+              </a:p>
+              <a:p>
+                <a:pPr marL="0" indent="0" algn="just">
+                  <a:buNone/>
+                </a:pPr>
+                <a:endParaRPr lang="fr-CA" sz="1800" dirty="0"/>
+              </a:p>
+              <a:p>
+                <a:pPr marL="0" indent="0" algn="just">
+                  <a:buNone/>
+                </a:pPr>
+                <a:r>
+                  <a:rPr lang="fr-CA" sz="1800" dirty="0"/>
+                  <a:t>Il est donc possible de remarquer que les éléments se comporte tel qu’attendu étant donné que l’erreur de déformation converge selon un ordre linéaire.</a:t>
+                </a:r>
+              </a:p>
+              <a:p>
+                <a:pPr marL="0" indent="0" algn="just">
+                  <a:buNone/>
+                </a:pPr>
+                <a:endParaRPr lang="fr-CA" sz="1800" dirty="0"/>
+              </a:p>
+              <a:p>
+                <a:pPr marL="0" indent="0" algn="just">
+                  <a:buNone/>
+                </a:pPr>
+                <a:r>
+                  <a:rPr lang="fr-CA" sz="1800" dirty="0"/>
+                  <a:t>De plus, la qualité de la régression vient ajouter de la validité à cette affirmation étant donné qu’elle est exactement de 1. Il est normal d’obtenir une telle régression étant donné que l’on utilise un logiciel commercial qui a dû être vérifié extensivement par Siemens.</a:t>
+                </a:r>
+              </a:p>
+              <a:p>
+                <a:pPr marL="0" indent="0" algn="just">
+                  <a:buNone/>
+                </a:pPr>
+                <a:endParaRPr lang="fr-CA" sz="1800" dirty="0"/>
+              </a:p>
+              <a:p>
+                <a:pPr marL="0" indent="0" algn="just">
+                  <a:buNone/>
+                </a:pPr>
+                <a:r>
+                  <a:rPr lang="fr-CA" sz="1800" dirty="0"/>
+                  <a:t>Il est donc possible de conclure que le code résout correctement les formulations mathématiques utilisé pour définir les éléments poutre.</a:t>
+                </a:r>
+              </a:p>
+            </p:txBody>
+          </p:sp>
+        </mc:Choice>
+        <mc:Fallback>
+          <p:sp>
+            <p:nvSpPr>
+              <p:cNvPr id="3" name="Content Placeholder 2">
+                <a:extLst>
+                  <a:ext uri="{FF2B5EF4-FFF2-40B4-BE49-F238E27FC236}">
+                    <a16:creationId xmlns:a16="http://schemas.microsoft.com/office/drawing/2014/main" id="{57846E6E-541E-C380-2EC3-91AF5BEE61F6}"/>
+                  </a:ext>
+                </a:extLst>
+              </p:cNvPr>
+              <p:cNvSpPr>
+                <a:spLocks noGrp="1" noRot="1" noChangeAspect="1" noMove="1" noResize="1" noEditPoints="1" noAdjustHandles="1" noChangeArrowheads="1" noChangeShapeType="1" noTextEdit="1"/>
+              </p:cNvSpPr>
+              <p:nvPr>
+                <p:ph idx="1"/>
+              </p:nvPr>
+            </p:nvSpPr>
+            <p:spPr>
+              <a:xfrm>
+                <a:off x="838200" y="1150374"/>
+                <a:ext cx="10515600" cy="5342501"/>
+              </a:xfrm>
+              <a:blipFill>
+                <a:blip r:embed="rId2"/>
+                <a:stretch>
+                  <a:fillRect l="-522" t="-1142" r="-464"/>
+                </a:stretch>
+              </a:blipFill>
+            </p:spPr>
+            <p:txBody>
+              <a:bodyPr/>
+              <a:lstStyle/>
+              <a:p>
+                <a:r>
+                  <a:rPr lang="en-CA">
+                    <a:noFill/>
+                  </a:rPr>
+                  <a:t> </a:t>
+                </a:r>
+              </a:p>
+            </p:txBody>
+          </p:sp>
+        </mc:Fallback>
+      </mc:AlternateContent>
+    </p:spTree>
+    <p:extLst>
+      <p:ext uri="{BB962C8B-B14F-4D97-AF65-F5344CB8AC3E}">
+        <p14:creationId xmlns:p14="http://schemas.microsoft.com/office/powerpoint/2010/main" val="4014962709"/>
+      </p:ext>
+    </p:extLst>
+  </p:cSld>
+  <p:clrMapOvr>
+    <a:masterClrMapping/>
+  </p:clrMapOvr>
+</p:sld>
+</file>
+
+<file path=ppt/slides/slide15.xml><?xml version="1.0" encoding="utf-8"?>
 <p:sld xmlns:a="http://schemas.openxmlformats.org/drawingml/2006/main" xmlns:r="http://schemas.openxmlformats.org/officeDocument/2006/relationships" xmlns:p="http://schemas.openxmlformats.org/presentationml/2006/main">
   <p:cSld>
     <p:spTree>
@@ -15427,7 +18224,7 @@
           <a:p>
             <a:r>
               <a:rPr lang="fr-FR" sz="1200" dirty="0"/>
-              <a:t>Tableau 3. </a:t>
+              <a:t>Tableau 4. </a:t>
             </a:r>
             <a:r>
               <a:rPr lang="en-CA" sz="1200" dirty="0" err="1"/>
@@ -15471,7 +18268,7 @@
 </p:sld>
 </file>
 
-<file path=ppt/slides/slide13.xml><?xml version="1.0" encoding="utf-8"?>
+<file path=ppt/slides/slide16.xml><?xml version="1.0" encoding="utf-8"?>
 <p:sld xmlns:a="http://schemas.openxmlformats.org/drawingml/2006/main" xmlns:r="http://schemas.openxmlformats.org/officeDocument/2006/relationships" xmlns:p="http://schemas.openxmlformats.org/presentationml/2006/main">
   <p:cSld>
     <p:spTree>
@@ -16482,7 +19279,7 @@
 </p:sld>
 </file>
 
-<file path=ppt/slides/slide14.xml><?xml version="1.0" encoding="utf-8"?>
+<file path=ppt/slides/slide17.xml><?xml version="1.0" encoding="utf-8"?>
 <p:sld xmlns:a="http://schemas.openxmlformats.org/drawingml/2006/main" xmlns:r="http://schemas.openxmlformats.org/officeDocument/2006/relationships" xmlns:p="http://schemas.openxmlformats.org/presentationml/2006/main">
   <p:cSld>
     <p:spTree>
@@ -16873,7 +19670,7 @@
 </p:sld>
 </file>
 
-<file path=ppt/slides/slide15.xml><?xml version="1.0" encoding="utf-8"?>
+<file path=ppt/slides/slide18.xml><?xml version="1.0" encoding="utf-8"?>
 <p:sld xmlns:a="http://schemas.openxmlformats.org/drawingml/2006/main" xmlns:r="http://schemas.openxmlformats.org/officeDocument/2006/relationships" xmlns:p="http://schemas.openxmlformats.org/presentationml/2006/main">
   <p:cSld>
     <p:spTree>
@@ -17047,7 +19844,7 @@
           <a:p>
             <a:r>
               <a:rPr lang="fr-FR" sz="1200" dirty="0"/>
-              <a:t>Fig. 5. </a:t>
+              <a:t>Fig. 6. </a:t>
             </a:r>
             <a:r>
               <a:rPr lang="en-CA" sz="1200" dirty="0"/>
@@ -17140,7 +19937,7 @@
 </p:sld>
 </file>
 
-<file path=ppt/slides/slide16.xml><?xml version="1.0" encoding="utf-8"?>
+<file path=ppt/slides/slide19.xml><?xml version="1.0" encoding="utf-8"?>
 <p:sld xmlns:a="http://schemas.openxmlformats.org/drawingml/2006/main" xmlns:r="http://schemas.openxmlformats.org/officeDocument/2006/relationships" xmlns:p="http://schemas.openxmlformats.org/presentationml/2006/main">
   <p:cSld>
     <p:spTree>
@@ -17390,7 +20187,7 @@
           <a:p>
             <a:r>
               <a:rPr lang="fr-FR" sz="1200" dirty="0"/>
-              <a:t>Fig. 6. </a:t>
+              <a:t>Fig. 7. </a:t>
             </a:r>
             <a:r>
               <a:rPr lang="en-CA" sz="1200" dirty="0"/>
@@ -17430,7 +20227,7 @@
           <a:p>
             <a:r>
               <a:rPr lang="fr-FR" sz="1200" dirty="0"/>
-              <a:t>Fig. 7. </a:t>
+              <a:t>Fig. 8. </a:t>
             </a:r>
             <a:r>
               <a:rPr lang="en-CA" sz="1200" dirty="0"/>
@@ -17453,7 +20250,295 @@
 </p:sld>
 </file>
 
-<file path=ppt/slides/slide17.xml><?xml version="1.0" encoding="utf-8"?>
+<file path=ppt/slides/slide2.xml><?xml version="1.0" encoding="utf-8"?>
+<p:sld xmlns:a="http://schemas.openxmlformats.org/drawingml/2006/main" xmlns:r="http://schemas.openxmlformats.org/officeDocument/2006/relationships" xmlns:p="http://schemas.openxmlformats.org/presentationml/2006/main">
+  <p:cSld>
+    <p:spTree>
+      <p:nvGrpSpPr>
+        <p:cNvPr id="1" name=""/>
+        <p:cNvGrpSpPr/>
+        <p:nvPr/>
+      </p:nvGrpSpPr>
+      <p:grpSpPr>
+        <a:xfrm>
+          <a:off x="0" y="0"/>
+          <a:ext cx="0" cy="0"/>
+          <a:chOff x="0" y="0"/>
+          <a:chExt cx="0" cy="0"/>
+        </a:xfrm>
+      </p:grpSpPr>
+      <p:sp>
+        <p:nvSpPr>
+          <p:cNvPr id="3" name="Content Placeholder 2">
+            <a:extLst>
+              <a:ext uri="{FF2B5EF4-FFF2-40B4-BE49-F238E27FC236}">
+                <a16:creationId xmlns:a16="http://schemas.microsoft.com/office/drawing/2014/main" id="{57846E6E-541E-C380-2EC3-91AF5BEE61F6}"/>
+              </a:ext>
+            </a:extLst>
+          </p:cNvPr>
+          <p:cNvSpPr>
+            <a:spLocks noGrp="1"/>
+          </p:cNvSpPr>
+          <p:nvPr>
+            <p:ph idx="1"/>
+          </p:nvPr>
+        </p:nvSpPr>
+        <p:spPr>
+          <a:xfrm>
+            <a:off x="838200" y="1140544"/>
+            <a:ext cx="10515600" cy="5154407"/>
+          </a:xfrm>
+        </p:spPr>
+        <p:txBody>
+          <a:bodyPr vert="horz" lIns="91440" tIns="45720" rIns="91440" bIns="45720" rtlCol="0" anchor="t">
+            <a:normAutofit fontScale="92500" lnSpcReduction="10000"/>
+          </a:bodyPr>
+          <a:lstStyle/>
+          <a:p>
+            <a:pPr marL="0" indent="0" algn="just">
+              <a:lnSpc>
+                <a:spcPct val="100000"/>
+              </a:lnSpc>
+              <a:buNone/>
+            </a:pPr>
+            <a:r>
+              <a:rPr lang="fr-CA" sz="1600" dirty="0"/>
+              <a:t>Le présent rapport couvre le processus de vérification et de validation d’un modèle d’éléments finis modélisant la section lombaire d’une colonne vertébrale.</a:t>
+            </a:r>
+          </a:p>
+          <a:p>
+            <a:pPr marL="0" indent="0" algn="just">
+              <a:lnSpc>
+                <a:spcPct val="100000"/>
+              </a:lnSpc>
+              <a:buNone/>
+            </a:pPr>
+            <a:r>
+              <a:rPr lang="fr-CA" sz="1600" dirty="0"/>
+              <a:t>Le modèle a été conçu dans le cadre du PI3 d’un des membres de l’équipe, et est basé sur des données expérimentales tirées des articles scientifiques </a:t>
+            </a:r>
+            <a:r>
+              <a:rPr lang="fr-FR" sz="1600" i="1" dirty="0"/>
+              <a:t>«</a:t>
+            </a:r>
+            <a:r>
+              <a:rPr lang="en-US" sz="1600" i="1" dirty="0"/>
+              <a:t> Stability of the human spine in neutral postures </a:t>
+            </a:r>
+            <a:r>
+              <a:rPr lang="fr-FR" sz="1600" i="1" dirty="0"/>
+              <a:t>» </a:t>
+            </a:r>
+            <a:r>
+              <a:rPr lang="fr-FR" sz="1600" dirty="0"/>
+              <a:t>(Kiefer et al., 1997)</a:t>
+            </a:r>
+            <a:r>
+              <a:rPr lang="fr-CA" sz="1600" dirty="0"/>
+              <a:t> et </a:t>
+            </a:r>
+            <a:r>
+              <a:rPr lang="fr-CA" sz="1600" i="1" dirty="0"/>
+              <a:t>« </a:t>
+            </a:r>
+            <a:r>
+              <a:rPr lang="en-US" sz="1600" i="1" dirty="0"/>
+              <a:t>Load-bearing and stress analysis of the human spine under a novel wrapping compression loading</a:t>
+            </a:r>
+            <a:r>
+              <a:rPr lang="fr-FR" sz="1600" i="1" dirty="0"/>
+              <a:t> »</a:t>
+            </a:r>
+            <a:r>
+              <a:rPr lang="en-US" sz="1600" i="1" dirty="0"/>
+              <a:t> </a:t>
+            </a:r>
+            <a:r>
+              <a:rPr lang="en-CA" sz="1600" dirty="0"/>
+              <a:t>(Shirazi-</a:t>
+            </a:r>
+            <a:r>
+              <a:rPr lang="en-CA" sz="1600" dirty="0" err="1"/>
+              <a:t>Adl</a:t>
+            </a:r>
+            <a:r>
+              <a:rPr lang="en-CA" sz="1600" dirty="0"/>
+              <a:t> &amp; Parnianpour, 2000), </a:t>
+            </a:r>
+            <a:r>
+              <a:rPr lang="fr-CA" sz="1600" dirty="0"/>
+              <a:t>ainsi que sur des données géométriques et propriétés physiques (coordonnées spatiales, sections, rigidités) issues des recherches personnelles de Prof. Aboulfazl Shirazi-Adl. Pour des raisons de confidentialité, ce fichier ne sera pas publié sur GitHub mais il peut être disponible sur demande.</a:t>
+            </a:r>
+          </a:p>
+          <a:p>
+            <a:pPr marL="0" indent="0" algn="just">
+              <a:lnSpc>
+                <a:spcPct val="100000"/>
+              </a:lnSpc>
+              <a:buNone/>
+            </a:pPr>
+            <a:r>
+              <a:rPr lang="fr-CA" sz="1600" dirty="0"/>
+              <a:t>En guise de validation lors du PI3, le membre de l’équipe avait simplement comparé visuellement l’allure et les ordres de grandeur des réponses obtenues par son modèle avec les courbes Force-Déplacement postérieur tirés des articles scientifiques de référence. Le projet final de MEC8211 est ainsi l’occasion idéale pour appliquer les acquis du cours et mettre à l’épreuve la validité de son modèle.</a:t>
+            </a:r>
+          </a:p>
+          <a:p>
+            <a:pPr marL="0" indent="0">
+              <a:lnSpc>
+                <a:spcPct val="100000"/>
+              </a:lnSpc>
+              <a:buNone/>
+            </a:pPr>
+            <a:r>
+              <a:rPr lang="fr-CA" sz="1600" dirty="0"/>
+              <a:t>Les étapes de V&amp;V entreprises consistent en ce qui suit:</a:t>
+            </a:r>
+          </a:p>
+          <a:p>
+            <a:pPr marL="342900" indent="-342900">
+              <a:lnSpc>
+                <a:spcPct val="100000"/>
+              </a:lnSpc>
+              <a:buFont typeface="+mj-lt"/>
+              <a:buAutoNum type="arabicPeriod"/>
+            </a:pPr>
+            <a:r>
+              <a:rPr lang="fr-CA" sz="1600" dirty="0"/>
+              <a:t>Présentation du modèle mathématique</a:t>
+            </a:r>
+          </a:p>
+          <a:p>
+            <a:pPr marL="342900" indent="-342900">
+              <a:lnSpc>
+                <a:spcPct val="100000"/>
+              </a:lnSpc>
+              <a:buFont typeface="+mj-lt"/>
+              <a:buAutoNum type="arabicPeriod"/>
+            </a:pPr>
+            <a:r>
+              <a:rPr lang="fr-CA" sz="1600" dirty="0"/>
+              <a:t>Description de la discrétisation choisie</a:t>
+            </a:r>
+          </a:p>
+          <a:p>
+            <a:pPr marL="342900" indent="-342900">
+              <a:lnSpc>
+                <a:spcPct val="100000"/>
+              </a:lnSpc>
+              <a:buFont typeface="+mj-lt"/>
+              <a:buAutoNum type="arabicPeriod"/>
+            </a:pPr>
+            <a:r>
+              <a:rPr lang="fr-CA" sz="1600" dirty="0"/>
+              <a:t>Vérification de code</a:t>
+            </a:r>
+          </a:p>
+          <a:p>
+            <a:pPr marL="342900" indent="-342900">
+              <a:lnSpc>
+                <a:spcPct val="100000"/>
+              </a:lnSpc>
+              <a:buFont typeface="+mj-lt"/>
+              <a:buAutoNum type="arabicPeriod"/>
+            </a:pPr>
+            <a:r>
+              <a:rPr lang="fr-CA" sz="1600" dirty="0"/>
+              <a:t>Vérification de solution</a:t>
+            </a:r>
+          </a:p>
+          <a:p>
+            <a:pPr marL="342900" indent="-342900">
+              <a:lnSpc>
+                <a:spcPct val="100000"/>
+              </a:lnSpc>
+              <a:buFont typeface="+mj-lt"/>
+              <a:buAutoNum type="arabicPeriod"/>
+            </a:pPr>
+            <a:r>
+              <a:rPr lang="fr-CA" sz="1600" dirty="0"/>
+              <a:t>Propagation des incertitudes</a:t>
+            </a:r>
+          </a:p>
+          <a:p>
+            <a:pPr marL="342900" indent="-342900">
+              <a:lnSpc>
+                <a:spcPct val="100000"/>
+              </a:lnSpc>
+              <a:buFont typeface="+mj-lt"/>
+              <a:buAutoNum type="arabicPeriod"/>
+            </a:pPr>
+            <a:r>
+              <a:rPr lang="fr-CA" sz="1600" dirty="0"/>
+              <a:t>Validation</a:t>
+            </a:r>
+          </a:p>
+          <a:p>
+            <a:pPr marL="0" indent="0">
+              <a:lnSpc>
+                <a:spcPct val="100000"/>
+              </a:lnSpc>
+              <a:buNone/>
+            </a:pPr>
+            <a:endParaRPr lang="fr-CA" sz="1600" dirty="0"/>
+          </a:p>
+          <a:p>
+            <a:pPr marL="0" indent="0">
+              <a:buNone/>
+            </a:pPr>
+            <a:endParaRPr lang="en-CA" sz="1800" dirty="0"/>
+          </a:p>
+        </p:txBody>
+      </p:sp>
+      <p:sp>
+        <p:nvSpPr>
+          <p:cNvPr id="8" name="Title 1">
+            <a:extLst>
+              <a:ext uri="{FF2B5EF4-FFF2-40B4-BE49-F238E27FC236}">
+                <a16:creationId xmlns:a16="http://schemas.microsoft.com/office/drawing/2014/main" id="{131056D3-4217-EA50-3282-5A33501AC195}"/>
+              </a:ext>
+            </a:extLst>
+          </p:cNvPr>
+          <p:cNvSpPr>
+            <a:spLocks noGrp="1"/>
+          </p:cNvSpPr>
+          <p:nvPr>
+            <p:ph type="title"/>
+          </p:nvPr>
+        </p:nvSpPr>
+        <p:spPr>
+          <a:xfrm>
+            <a:off x="838200" y="365125"/>
+            <a:ext cx="9308690" cy="706591"/>
+          </a:xfrm>
+        </p:spPr>
+        <p:txBody>
+          <a:bodyPr>
+            <a:normAutofit/>
+          </a:bodyPr>
+          <a:lstStyle/>
+          <a:p>
+            <a:r>
+              <a:rPr lang="fr-FR" sz="3000" dirty="0"/>
+              <a:t>Introduction et mise en contexte</a:t>
+            </a:r>
+            <a:endParaRPr lang="en-CA" sz="3000" dirty="0"/>
+          </a:p>
+        </p:txBody>
+      </p:sp>
+    </p:spTree>
+    <p:extLst>
+      <p:ext uri="{BB962C8B-B14F-4D97-AF65-F5344CB8AC3E}">
+        <p14:creationId xmlns:p14="http://schemas.microsoft.com/office/powerpoint/2010/main" val="2767786287"/>
+      </p:ext>
+    </p:extLst>
+  </p:cSld>
+  <p:clrMapOvr>
+    <a:masterClrMapping/>
+  </p:clrMapOvr>
+</p:sld>
+</file>
+
+<file path=ppt/slides/slide20.xml><?xml version="1.0" encoding="utf-8"?>
 <p:sld xmlns:a="http://schemas.openxmlformats.org/drawingml/2006/main" xmlns:r="http://schemas.openxmlformats.org/officeDocument/2006/relationships" xmlns:p="http://schemas.openxmlformats.org/presentationml/2006/main">
   <p:cSld>
     <p:spTree>
@@ -18196,7 +21281,7 @@
 </p:sld>
 </file>
 
-<file path=ppt/slides/slide18.xml><?xml version="1.0" encoding="utf-8"?>
+<file path=ppt/slides/slide21.xml><?xml version="1.0" encoding="utf-8"?>
 <p:sld xmlns:a="http://schemas.openxmlformats.org/drawingml/2006/main" xmlns:r="http://schemas.openxmlformats.org/officeDocument/2006/relationships" xmlns:p="http://schemas.openxmlformats.org/presentationml/2006/main">
   <p:cSld>
     <p:spTree>
@@ -19078,7 +22163,7 @@
             <a:pPr algn="ctr"/>
             <a:r>
               <a:rPr lang="fr-FR" sz="1200" dirty="0"/>
-              <a:t>Fig. 8. </a:t>
+              <a:t>Fig. 9. </a:t>
             </a:r>
             <a:r>
               <a:rPr lang="en-CA" sz="1200" dirty="0" err="1"/>
@@ -19467,7 +22552,7 @@
 </p:sld>
 </file>
 
-<file path=ppt/slides/slide19.xml><?xml version="1.0" encoding="utf-8"?>
+<file path=ppt/slides/slide22.xml><?xml version="1.0" encoding="utf-8"?>
 <p:sld xmlns:a="http://schemas.openxmlformats.org/drawingml/2006/main" xmlns:r="http://schemas.openxmlformats.org/officeDocument/2006/relationships" xmlns:p="http://schemas.openxmlformats.org/presentationml/2006/main">
   <p:cSld>
     <p:spTree>
@@ -20918,7 +24003,7 @@
         <p:spPr>
           <a:xfrm>
             <a:off x="8621604" y="6191934"/>
-            <a:ext cx="3233982" cy="307777"/>
+            <a:ext cx="3233982" cy="523220"/>
           </a:xfrm>
           <a:prstGeom prst="rect">
             <a:avLst/>
@@ -20933,7 +24018,7 @@
           <a:p>
             <a:r>
               <a:rPr lang="en-US" sz="1400" dirty="0"/>
-              <a:t>Fig.9. </a:t>
+              <a:t>Fig.10. </a:t>
             </a:r>
             <a:r>
               <a:rPr lang="en-US" sz="1400" dirty="0" err="1"/>
@@ -20960,6 +24045,41 @@
               <a:t>model</a:t>
             </a:r>
             <a:endParaRPr lang="en-US" sz="1400" dirty="0"/>
+          </a:p>
+        </p:txBody>
+      </p:sp>
+      <p:sp>
+        <p:nvSpPr>
+          <p:cNvPr id="5" name="ZoneTexte 4">
+            <a:extLst>
+              <a:ext uri="{FF2B5EF4-FFF2-40B4-BE49-F238E27FC236}">
+                <a16:creationId xmlns:a16="http://schemas.microsoft.com/office/drawing/2014/main" id="{CE3761A4-DB83-99C0-7B09-41073DF19926}"/>
+              </a:ext>
+            </a:extLst>
+          </p:cNvPr>
+          <p:cNvSpPr txBox="1"/>
+          <p:nvPr/>
+        </p:nvSpPr>
+        <p:spPr>
+          <a:xfrm>
+            <a:off x="8474430" y="906753"/>
+            <a:ext cx="4038600" cy="276999"/>
+          </a:xfrm>
+          <a:prstGeom prst="rect">
+            <a:avLst/>
+          </a:prstGeom>
+          <a:noFill/>
+        </p:spPr>
+        <p:txBody>
+          <a:bodyPr wrap="square" rtlCol="0">
+            <a:spAutoFit/>
+          </a:bodyPr>
+          <a:lstStyle/>
+          <a:p>
+            <a:r>
+              <a:rPr lang="fr-FR" sz="1200" dirty="0"/>
+              <a:t>Tableau 5. Tableau de l’erreur de simulation</a:t>
+            </a:r>
           </a:p>
         </p:txBody>
       </p:sp>
@@ -20976,295 +24096,7 @@
 </p:sld>
 </file>
 
-<file path=ppt/slides/slide2.xml><?xml version="1.0" encoding="utf-8"?>
-<p:sld xmlns:a="http://schemas.openxmlformats.org/drawingml/2006/main" xmlns:r="http://schemas.openxmlformats.org/officeDocument/2006/relationships" xmlns:p="http://schemas.openxmlformats.org/presentationml/2006/main">
-  <p:cSld>
-    <p:spTree>
-      <p:nvGrpSpPr>
-        <p:cNvPr id="1" name=""/>
-        <p:cNvGrpSpPr/>
-        <p:nvPr/>
-      </p:nvGrpSpPr>
-      <p:grpSpPr>
-        <a:xfrm>
-          <a:off x="0" y="0"/>
-          <a:ext cx="0" cy="0"/>
-          <a:chOff x="0" y="0"/>
-          <a:chExt cx="0" cy="0"/>
-        </a:xfrm>
-      </p:grpSpPr>
-      <p:sp>
-        <p:nvSpPr>
-          <p:cNvPr id="3" name="Content Placeholder 2">
-            <a:extLst>
-              <a:ext uri="{FF2B5EF4-FFF2-40B4-BE49-F238E27FC236}">
-                <a16:creationId xmlns:a16="http://schemas.microsoft.com/office/drawing/2014/main" id="{57846E6E-541E-C380-2EC3-91AF5BEE61F6}"/>
-              </a:ext>
-            </a:extLst>
-          </p:cNvPr>
-          <p:cNvSpPr>
-            <a:spLocks noGrp="1"/>
-          </p:cNvSpPr>
-          <p:nvPr>
-            <p:ph idx="1"/>
-          </p:nvPr>
-        </p:nvSpPr>
-        <p:spPr>
-          <a:xfrm>
-            <a:off x="838200" y="1140544"/>
-            <a:ext cx="10515600" cy="5154407"/>
-          </a:xfrm>
-        </p:spPr>
-        <p:txBody>
-          <a:bodyPr vert="horz" lIns="91440" tIns="45720" rIns="91440" bIns="45720" rtlCol="0" anchor="t">
-            <a:normAutofit fontScale="92500" lnSpcReduction="10000"/>
-          </a:bodyPr>
-          <a:lstStyle/>
-          <a:p>
-            <a:pPr marL="0" indent="0" algn="just">
-              <a:lnSpc>
-                <a:spcPct val="100000"/>
-              </a:lnSpc>
-              <a:buNone/>
-            </a:pPr>
-            <a:r>
-              <a:rPr lang="fr-CA" sz="1600" dirty="0"/>
-              <a:t>Le présent rapport couvre le processus de vérification et de validation d’un modèle d’éléments finis modélisant la section lombaire d’une colonne vertébrale.</a:t>
-            </a:r>
-          </a:p>
-          <a:p>
-            <a:pPr marL="0" indent="0" algn="just">
-              <a:lnSpc>
-                <a:spcPct val="100000"/>
-              </a:lnSpc>
-              <a:buNone/>
-            </a:pPr>
-            <a:r>
-              <a:rPr lang="fr-CA" sz="1600" dirty="0"/>
-              <a:t>Le modèle a été conçu dans le cadre du PI3 d’un des membres de l’équipe, et est basé sur des données expérimentales tirées des articles scientifiques </a:t>
-            </a:r>
-            <a:r>
-              <a:rPr lang="fr-FR" sz="1600" i="1" dirty="0"/>
-              <a:t>«</a:t>
-            </a:r>
-            <a:r>
-              <a:rPr lang="en-US" sz="1600" i="1" dirty="0"/>
-              <a:t> Stability of the human spine in neutral postures </a:t>
-            </a:r>
-            <a:r>
-              <a:rPr lang="fr-FR" sz="1600" i="1" dirty="0"/>
-              <a:t>» </a:t>
-            </a:r>
-            <a:r>
-              <a:rPr lang="fr-FR" sz="1600" dirty="0"/>
-              <a:t>(Kiefer et al., 1997)</a:t>
-            </a:r>
-            <a:r>
-              <a:rPr lang="fr-CA" sz="1600" dirty="0"/>
-              <a:t> et </a:t>
-            </a:r>
-            <a:r>
-              <a:rPr lang="fr-CA" sz="1600" i="1" dirty="0"/>
-              <a:t>« </a:t>
-            </a:r>
-            <a:r>
-              <a:rPr lang="en-US" sz="1600" i="1" dirty="0"/>
-              <a:t>Load-bearing and stress analysis of the human spine under a novel wrapping compression loading</a:t>
-            </a:r>
-            <a:r>
-              <a:rPr lang="fr-FR" sz="1600" i="1" dirty="0"/>
-              <a:t> »</a:t>
-            </a:r>
-            <a:r>
-              <a:rPr lang="en-US" sz="1600" i="1" dirty="0"/>
-              <a:t> </a:t>
-            </a:r>
-            <a:r>
-              <a:rPr lang="en-CA" sz="1600" dirty="0"/>
-              <a:t>(Shirazi-</a:t>
-            </a:r>
-            <a:r>
-              <a:rPr lang="en-CA" sz="1600" dirty="0" err="1"/>
-              <a:t>Adl</a:t>
-            </a:r>
-            <a:r>
-              <a:rPr lang="en-CA" sz="1600" dirty="0"/>
-              <a:t> &amp; Parnianpour, 2000), </a:t>
-            </a:r>
-            <a:r>
-              <a:rPr lang="fr-CA" sz="1600" dirty="0"/>
-              <a:t>ainsi que sur des données géométriques et propriétés physiques (coordonnées spatiales, sections, rigidités) issues des recherches personnelles de Prof. Aboulfazl Shirazi-Adl. Pour des raisons de confidentialité, ce fichier ne sera pas publié sur GitHub mais il peut être disponible sur demande.</a:t>
-            </a:r>
-          </a:p>
-          <a:p>
-            <a:pPr marL="0" indent="0" algn="just">
-              <a:lnSpc>
-                <a:spcPct val="100000"/>
-              </a:lnSpc>
-              <a:buNone/>
-            </a:pPr>
-            <a:r>
-              <a:rPr lang="fr-CA" sz="1600" dirty="0"/>
-              <a:t>En guise de validation lors du PI3, le membre de l’équipe avait simplement comparé visuellement l’allure et les ordres de grandeur des réponses obtenues par son modèle avec les courbes Force-Déplacement postérieur tirés des articles scientifiques de référence. Le projet final de MEC8211 est ainsi l’occasion idéale pour appliquer les acquis du cours et mettre à l’épreuve la validité de son modèle.</a:t>
-            </a:r>
-          </a:p>
-          <a:p>
-            <a:pPr marL="0" indent="0">
-              <a:lnSpc>
-                <a:spcPct val="100000"/>
-              </a:lnSpc>
-              <a:buNone/>
-            </a:pPr>
-            <a:r>
-              <a:rPr lang="fr-CA" sz="1600" dirty="0"/>
-              <a:t>Les étapes de V&amp;V entreprises consistent en ce qui suit:</a:t>
-            </a:r>
-          </a:p>
-          <a:p>
-            <a:pPr marL="342900" indent="-342900">
-              <a:lnSpc>
-                <a:spcPct val="100000"/>
-              </a:lnSpc>
-              <a:buFont typeface="+mj-lt"/>
-              <a:buAutoNum type="arabicPeriod"/>
-            </a:pPr>
-            <a:r>
-              <a:rPr lang="fr-CA" sz="1600" dirty="0"/>
-              <a:t>Présentation du modèle mathématique</a:t>
-            </a:r>
-          </a:p>
-          <a:p>
-            <a:pPr marL="342900" indent="-342900">
-              <a:lnSpc>
-                <a:spcPct val="100000"/>
-              </a:lnSpc>
-              <a:buFont typeface="+mj-lt"/>
-              <a:buAutoNum type="arabicPeriod"/>
-            </a:pPr>
-            <a:r>
-              <a:rPr lang="fr-CA" sz="1600" dirty="0"/>
-              <a:t>Description de la discrétisation choisie</a:t>
-            </a:r>
-          </a:p>
-          <a:p>
-            <a:pPr marL="342900" indent="-342900">
-              <a:lnSpc>
-                <a:spcPct val="100000"/>
-              </a:lnSpc>
-              <a:buFont typeface="+mj-lt"/>
-              <a:buAutoNum type="arabicPeriod"/>
-            </a:pPr>
-            <a:r>
-              <a:rPr lang="fr-CA" sz="1600" dirty="0"/>
-              <a:t>Vérification de code</a:t>
-            </a:r>
-          </a:p>
-          <a:p>
-            <a:pPr marL="342900" indent="-342900">
-              <a:lnSpc>
-                <a:spcPct val="100000"/>
-              </a:lnSpc>
-              <a:buFont typeface="+mj-lt"/>
-              <a:buAutoNum type="arabicPeriod"/>
-            </a:pPr>
-            <a:r>
-              <a:rPr lang="fr-CA" sz="1600" dirty="0"/>
-              <a:t>Vérification de solution</a:t>
-            </a:r>
-          </a:p>
-          <a:p>
-            <a:pPr marL="342900" indent="-342900">
-              <a:lnSpc>
-                <a:spcPct val="100000"/>
-              </a:lnSpc>
-              <a:buFont typeface="+mj-lt"/>
-              <a:buAutoNum type="arabicPeriod"/>
-            </a:pPr>
-            <a:r>
-              <a:rPr lang="fr-CA" sz="1600" dirty="0"/>
-              <a:t>Propagation des incertitudes</a:t>
-            </a:r>
-          </a:p>
-          <a:p>
-            <a:pPr marL="342900" indent="-342900">
-              <a:lnSpc>
-                <a:spcPct val="100000"/>
-              </a:lnSpc>
-              <a:buFont typeface="+mj-lt"/>
-              <a:buAutoNum type="arabicPeriod"/>
-            </a:pPr>
-            <a:r>
-              <a:rPr lang="fr-CA" sz="1600" dirty="0"/>
-              <a:t>Validation</a:t>
-            </a:r>
-          </a:p>
-          <a:p>
-            <a:pPr marL="0" indent="0">
-              <a:lnSpc>
-                <a:spcPct val="100000"/>
-              </a:lnSpc>
-              <a:buNone/>
-            </a:pPr>
-            <a:endParaRPr lang="fr-CA" sz="1600" dirty="0"/>
-          </a:p>
-          <a:p>
-            <a:pPr marL="0" indent="0">
-              <a:buNone/>
-            </a:pPr>
-            <a:endParaRPr lang="en-CA" sz="1800" dirty="0"/>
-          </a:p>
-        </p:txBody>
-      </p:sp>
-      <p:sp>
-        <p:nvSpPr>
-          <p:cNvPr id="8" name="Title 1">
-            <a:extLst>
-              <a:ext uri="{FF2B5EF4-FFF2-40B4-BE49-F238E27FC236}">
-                <a16:creationId xmlns:a16="http://schemas.microsoft.com/office/drawing/2014/main" id="{131056D3-4217-EA50-3282-5A33501AC195}"/>
-              </a:ext>
-            </a:extLst>
-          </p:cNvPr>
-          <p:cNvSpPr>
-            <a:spLocks noGrp="1"/>
-          </p:cNvSpPr>
-          <p:nvPr>
-            <p:ph type="title"/>
-          </p:nvPr>
-        </p:nvSpPr>
-        <p:spPr>
-          <a:xfrm>
-            <a:off x="838200" y="365125"/>
-            <a:ext cx="9308690" cy="706591"/>
-          </a:xfrm>
-        </p:spPr>
-        <p:txBody>
-          <a:bodyPr>
-            <a:normAutofit/>
-          </a:bodyPr>
-          <a:lstStyle/>
-          <a:p>
-            <a:r>
-              <a:rPr lang="fr-FR" sz="3000" dirty="0"/>
-              <a:t>Introduction et mise en contexte</a:t>
-            </a:r>
-            <a:endParaRPr lang="en-CA" sz="3000" dirty="0"/>
-          </a:p>
-        </p:txBody>
-      </p:sp>
-    </p:spTree>
-    <p:extLst>
-      <p:ext uri="{BB962C8B-B14F-4D97-AF65-F5344CB8AC3E}">
-        <p14:creationId xmlns:p14="http://schemas.microsoft.com/office/powerpoint/2010/main" val="2767786287"/>
-      </p:ext>
-    </p:extLst>
-  </p:cSld>
-  <p:clrMapOvr>
-    <a:masterClrMapping/>
-  </p:clrMapOvr>
-</p:sld>
-</file>
-
-<file path=ppt/slides/slide20.xml><?xml version="1.0" encoding="utf-8"?>
+<file path=ppt/slides/slide23.xml><?xml version="1.0" encoding="utf-8"?>
 <p:sld xmlns:a="http://schemas.openxmlformats.org/drawingml/2006/main" xmlns:r="http://schemas.openxmlformats.org/officeDocument/2006/relationships" xmlns:p="http://schemas.openxmlformats.org/presentationml/2006/main">
   <p:cSld>
     <p:spTree>
@@ -21674,7 +24506,7 @@
 </p:sld>
 </file>
 
-<file path=ppt/slides/slide21.xml><?xml version="1.0" encoding="utf-8"?>
+<file path=ppt/slides/slide24.xml><?xml version="1.0" encoding="utf-8"?>
 <p:sld xmlns:a="http://schemas.openxmlformats.org/drawingml/2006/main" xmlns:r="http://schemas.openxmlformats.org/officeDocument/2006/relationships" xmlns:p="http://schemas.openxmlformats.org/presentationml/2006/main">
   <p:cSld>
     <p:spTree>
@@ -22751,7 +25583,7 @@
 </p:sld>
 </file>
 
-<file path=ppt/slides/slide22.xml><?xml version="1.0" encoding="utf-8"?>
+<file path=ppt/slides/slide25.xml><?xml version="1.0" encoding="utf-8"?>
 <p:sld xmlns:a="http://schemas.openxmlformats.org/drawingml/2006/main" xmlns:r="http://schemas.openxmlformats.org/officeDocument/2006/relationships" xmlns:p="http://schemas.openxmlformats.org/presentationml/2006/main">
   <p:cSld>
     <p:spTree>
@@ -26904,26 +29736,6 @@
 </file>
 
 <file path=customXml/item1.xml><?xml version="1.0" encoding="utf-8"?>
-<?mso-contentType ?>
-<FormTemplates xmlns="http://schemas.microsoft.com/sharepoint/v3/contenttype/forms">
-  <Display>DocumentLibraryForm</Display>
-  <Edit>DocumentLibraryForm</Edit>
-  <New>DocumentLibraryForm</New>
-</FormTemplates>
-</file>
-
-<file path=customXml/item2.xml><?xml version="1.0" encoding="utf-8"?>
-<p:properties xmlns:p="http://schemas.microsoft.com/office/2006/metadata/properties" xmlns:xsi="http://www.w3.org/2001/XMLSchema-instance" xmlns:pc="http://schemas.microsoft.com/office/infopath/2007/PartnerControls">
-  <documentManagement>
-    <lcf76f155ced4ddcb4097134ff3c332f xmlns="ec825916-6f01-4646-bf11-4e97fdd06dc8">
-      <Terms xmlns="http://schemas.microsoft.com/office/infopath/2007/PartnerControls"/>
-    </lcf76f155ced4ddcb4097134ff3c332f>
-    <TaxCatchAll xmlns="10202d72-3646-4d36-9cf4-1feba2c78df0" xsi:nil="true"/>
-  </documentManagement>
-</p:properties>
-</file>
-
-<file path=customXml/item3.xml><?xml version="1.0" encoding="utf-8"?>
 <ct:contentTypeSchema xmlns:ct="http://schemas.microsoft.com/office/2006/metadata/contentType" xmlns:ma="http://schemas.microsoft.com/office/2006/metadata/properties/metaAttributes" ct:_="" ma:_="" ma:contentTypeName="Document" ma:contentTypeID="0x010100744768CFAF743F4A83B0523C20156377" ma:contentTypeVersion="11" ma:contentTypeDescription="Create a new document." ma:contentTypeScope="" ma:versionID="aafa440e1ffbdaf1b0956f4ac1c916a8">
   <xsd:schema xmlns:xsd="http://www.w3.org/2001/XMLSchema" xmlns:xs="http://www.w3.org/2001/XMLSchema" xmlns:p="http://schemas.microsoft.com/office/2006/metadata/properties" xmlns:ns2="ec825916-6f01-4646-bf11-4e97fdd06dc8" xmlns:ns3="10202d72-3646-4d36-9cf4-1feba2c78df0" targetNamespace="http://schemas.microsoft.com/office/2006/metadata/properties" ma:root="true" ma:fieldsID="7a73fe93b8aa32af4ca50956a2221801" ns2:_="" ns3:_="">
     <xsd:import namespace="ec825916-6f01-4646-bf11-4e97fdd06dc8"/>
@@ -27118,10 +29930,41 @@
 </ct:contentTypeSchema>
 </file>
 
+<file path=customXml/item2.xml><?xml version="1.0" encoding="utf-8"?>
+<p:properties xmlns:p="http://schemas.microsoft.com/office/2006/metadata/properties" xmlns:xsi="http://www.w3.org/2001/XMLSchema-instance" xmlns:pc="http://schemas.microsoft.com/office/infopath/2007/PartnerControls">
+  <documentManagement>
+    <lcf76f155ced4ddcb4097134ff3c332f xmlns="ec825916-6f01-4646-bf11-4e97fdd06dc8">
+      <Terms xmlns="http://schemas.microsoft.com/office/infopath/2007/PartnerControls"/>
+    </lcf76f155ced4ddcb4097134ff3c332f>
+    <TaxCatchAll xmlns="10202d72-3646-4d36-9cf4-1feba2c78df0" xsi:nil="true"/>
+  </documentManagement>
+</p:properties>
+</file>
+
+<file path=customXml/item3.xml><?xml version="1.0" encoding="utf-8"?>
+<?mso-contentType ?>
+<FormTemplates xmlns="http://schemas.microsoft.com/sharepoint/v3/contenttype/forms">
+  <Display>DocumentLibraryForm</Display>
+  <Edit>DocumentLibraryForm</Edit>
+  <New>DocumentLibraryForm</New>
+</FormTemplates>
+</file>
+
 <file path=customXml/itemProps1.xml><?xml version="1.0" encoding="utf-8"?>
-<ds:datastoreItem xmlns:ds="http://schemas.openxmlformats.org/officeDocument/2006/customXml" ds:itemID="{73F4A501-0066-4B8E-9AA2-A07CF344BF69}">
+<ds:datastoreItem xmlns:ds="http://schemas.openxmlformats.org/officeDocument/2006/customXml" ds:itemID="{4AB5C90D-8262-4EAC-95BF-2CC4C44D50EC}">
   <ds:schemaRefs>
-    <ds:schemaRef ds:uri="http://schemas.microsoft.com/sharepoint/v3/contenttype/forms"/>
+    <ds:schemaRef ds:uri="10202d72-3646-4d36-9cf4-1feba2c78df0"/>
+    <ds:schemaRef ds:uri="ec825916-6f01-4646-bf11-4e97fdd06dc8"/>
+    <ds:schemaRef ds:uri="http://purl.org/dc/elements/1.1/"/>
+    <ds:schemaRef ds:uri="http://purl.org/dc/terms/"/>
+    <ds:schemaRef ds:uri="http://schemas.microsoft.com/internal/obd"/>
+    <ds:schemaRef ds:uri="http://schemas.microsoft.com/office/2006/documentManagement/types"/>
+    <ds:schemaRef ds:uri="http://schemas.microsoft.com/office/2006/metadata/contentType"/>
+    <ds:schemaRef ds:uri="http://schemas.microsoft.com/office/2006/metadata/properties"/>
+    <ds:schemaRef ds:uri="http://schemas.microsoft.com/office/2006/metadata/properties/metaAttributes"/>
+    <ds:schemaRef ds:uri="http://schemas.microsoft.com/office/infopath/2007/PartnerControls"/>
+    <ds:schemaRef ds:uri="http://schemas.openxmlformats.org/package/2006/metadata/core-properties"/>
+    <ds:schemaRef ds:uri="http://www.w3.org/2001/XMLSchema"/>
   </ds:schemaRefs>
 </ds:datastoreItem>
 </file>
@@ -27144,20 +29987,9 @@
 </file>
 
 <file path=customXml/itemProps3.xml><?xml version="1.0" encoding="utf-8"?>
-<ds:datastoreItem xmlns:ds="http://schemas.openxmlformats.org/officeDocument/2006/customXml" ds:itemID="{4AB5C90D-8262-4EAC-95BF-2CC4C44D50EC}">
+<ds:datastoreItem xmlns:ds="http://schemas.openxmlformats.org/officeDocument/2006/customXml" ds:itemID="{73F4A501-0066-4B8E-9AA2-A07CF344BF69}">
   <ds:schemaRefs>
-    <ds:schemaRef ds:uri="10202d72-3646-4d36-9cf4-1feba2c78df0"/>
-    <ds:schemaRef ds:uri="ec825916-6f01-4646-bf11-4e97fdd06dc8"/>
-    <ds:schemaRef ds:uri="http://purl.org/dc/elements/1.1/"/>
-    <ds:schemaRef ds:uri="http://purl.org/dc/terms/"/>
-    <ds:schemaRef ds:uri="http://schemas.microsoft.com/internal/obd"/>
-    <ds:schemaRef ds:uri="http://schemas.microsoft.com/office/2006/documentManagement/types"/>
-    <ds:schemaRef ds:uri="http://schemas.microsoft.com/office/2006/metadata/contentType"/>
-    <ds:schemaRef ds:uri="http://schemas.microsoft.com/office/2006/metadata/properties"/>
-    <ds:schemaRef ds:uri="http://schemas.microsoft.com/office/2006/metadata/properties/metaAttributes"/>
-    <ds:schemaRef ds:uri="http://schemas.microsoft.com/office/infopath/2007/PartnerControls"/>
-    <ds:schemaRef ds:uri="http://schemas.openxmlformats.org/package/2006/metadata/core-properties"/>
-    <ds:schemaRef ds:uri="http://www.w3.org/2001/XMLSchema"/>
+    <ds:schemaRef ds:uri="http://schemas.microsoft.com/sharepoint/v3/contenttype/forms"/>
   </ds:schemaRefs>
 </ds:datastoreItem>
 </file>
</xml_diff>

<commit_message>
conclusion + code couleur des sections
</commit_message>
<xml_diff>
--- a/Rapport_Projet_V1.pptx
+++ b/Rapport_Projet_V1.pptx
@@ -10597,34 +10597,13 @@
 
 <file path=ppt/comments/modernComment_106_4791FEFC.xml><?xml version="1.0" encoding="utf-8"?>
 <p188:cmLst xmlns:a="http://schemas.openxmlformats.org/drawingml/2006/main" xmlns:r="http://schemas.openxmlformats.org/officeDocument/2006/relationships" xmlns:p188="http://schemas.microsoft.com/office/powerpoint/2018/8/main">
-  <p188:cm id="{1275EE33-43A5-490E-A8D2-080E79EE55F8}" authorId="{4BB11620-EFBC-D13A-7B93-45F2C922ABDE}" created="2024-04-11T02:29:59.554">
-    <ac:txMkLst xmlns:ac="http://schemas.microsoft.com/office/drawing/2013/main/command">
-      <pc:docMk xmlns:pc="http://schemas.microsoft.com/office/powerpoint/2013/main/command"/>
-      <pc:sldMk xmlns:pc="http://schemas.microsoft.com/office/powerpoint/2013/main/command" cId="1200750332" sldId="262"/>
-      <ac:spMk id="3" creationId="{57846E6E-541E-C380-2EC3-91AF5BEE61F6}"/>
-      <ac:txMk cp="340" len="9">
-        <ac:context len="865" hash="1272217592"/>
-      </ac:txMk>
-    </ac:txMkLst>
-    <p188:pos x="8941904" y="1394042"/>
-    <p188:txBody>
-      <a:bodyPr/>
-      <a:lstStyle/>
-      <a:p>
-        <a:r>
-          <a:rPr lang="en-CA"/>
-          <a:t>check</a:t>
-        </a:r>
-      </a:p>
-    </p188:txBody>
-  </p188:cm>
   <p188:cm id="{3724C460-C9F0-49DB-9DE2-9E5AD2B8FA85}" authorId="{53E43574-7A34-154C-E512-F6CBCA51E7C2}" created="2024-04-13T02:50:35.708">
     <ac:txMkLst xmlns:ac="http://schemas.microsoft.com/office/drawing/2013/main/command">
       <pc:docMk xmlns:pc="http://schemas.microsoft.com/office/powerpoint/2013/main/command"/>
       <pc:sldMk xmlns:pc="http://schemas.microsoft.com/office/powerpoint/2013/main/command" cId="1200750332" sldId="262"/>
       <ac:spMk id="3" creationId="{57846E6E-541E-C380-2EC3-91AF5BEE61F6}"/>
       <ac:txMk cp="413" len="347">
-        <ac:context len="865" hash="1272217592"/>
+        <ac:context len="934" hash="2870726881"/>
       </ac:txMk>
     </ac:txMkLst>
     <p188:pos x="10506075" y="2002400"/>
@@ -10674,7 +10653,7 @@
           <a:p>
             <a:r>
               <a:rPr lang="en-CA"/>
-              <a:t>Oui je sais qu' "une force" est en general une condition de neumann mais dans ce cas particulier je ne crois pas que le role de la force soit une condition frontiere car on l'utilise aussi comme variable d'entrée qui varie</a:t>
+              <a:t>Oui "une force" est en general une condition de neumann mais dans ce cas particulier je ne crois pas que le role de la force soit une condition frontiere car on l'utilise aussi comme variable d'entrée qui varie</a:t>
             </a:r>
           </a:p>
         </p188:txBody>
@@ -10687,270 +10666,6 @@
         <a:r>
           <a:rPr lang="en-CA"/>
           <a:t>La force ne peut pas etre une condition frontiere si c'est une donne d'entree</a:t>
-        </a:r>
-      </a:p>
-    </p188:txBody>
-  </p188:cm>
-</p188:cmLst>
-</file>
-
-<file path=ppt/comments/modernComment_10C_2EECC42B.xml><?xml version="1.0" encoding="utf-8"?>
-<p188:cmLst xmlns:a="http://schemas.openxmlformats.org/drawingml/2006/main" xmlns:r="http://schemas.openxmlformats.org/officeDocument/2006/relationships" xmlns:p188="http://schemas.microsoft.com/office/powerpoint/2018/8/main">
-  <p188:cm id="{FB552410-3568-487C-A036-1B1A7AA6A6BA}" authorId="{4BB11620-EFBC-D13A-7B93-45F2C922ABDE}" created="2024-04-06T22:20:24.107">
-    <ac:txMkLst xmlns:ac="http://schemas.microsoft.com/office/drawing/2013/main/command">
-      <pc:docMk xmlns:pc="http://schemas.microsoft.com/office/powerpoint/2013/main/command"/>
-      <pc:sldMk xmlns:pc="http://schemas.microsoft.com/office/powerpoint/2013/main/command" cId="787268651" sldId="268"/>
-      <ac:spMk id="3" creationId="{57846E6E-541E-C380-2EC3-91AF5BEE61F6}"/>
-      <ac:txMk cp="579">
-        <ac:context len="795" hash="312665447"/>
-      </ac:txMk>
-    </ac:txMkLst>
-    <p188:pos x="3940175" y="1481701"/>
-    <p188:replyLst>
-      <p188:reply id="{21130A69-027F-4B38-9582-7DA70CCE4EB0}" authorId="{E68F2F47-82E5-2BC7-0FEC-4F4EC863DDC3}" created="2024-04-11T03:57:20.340">
-        <p188:txBody>
-          <a:bodyPr/>
-          <a:lstStyle/>
-          <a:p>
-            <a:r>
-              <a:rPr lang="fr-FR"/>
-              <a:t>Il existe une solution analytique mais avec l'hypothèse de poutre élancée le terme en plus de la modélisation de Timoshenko est négligeable </a:t>
-            </a:r>
-          </a:p>
-        </p188:txBody>
-        <p188:extLst>
-          <p:ext xmlns:p="http://schemas.openxmlformats.org/presentationml/2006/main" uri="{57CB4572-C831-44C2-8A1C-0ADB6CCDFE69}">
-            <p223:reactions xmlns:p223="http://schemas.microsoft.com/office/powerpoint/2022/03/main">
-              <p223:rxn type="👍">
-                <p223:instance time="2024-04-11T04:53:19.686" authorId="{4BB11620-EFBC-D13A-7B93-45F2C922ABDE}"/>
-              </p223:rxn>
-            </p223:reactions>
-          </p:ext>
-        </p188:extLst>
-      </p188:reply>
-    </p188:replyLst>
-    <p188:txBody>
-      <a:bodyPr/>
-      <a:lstStyle/>
-      <a:p>
-        <a:r>
-          <a:rPr lang="en-CA"/>
-          <a:t>S'assurer qu'il ya vriament une solution analytique connue pour timoshenko - ou bien juste prendre EUler</a:t>
-        </a:r>
-      </a:p>
-    </p188:txBody>
-  </p188:cm>
-  <p188:cm id="{2C0822D0-CE0A-4B58-AA90-5DE2630D633E}" authorId="{4BB11620-EFBC-D13A-7B93-45F2C922ABDE}" created="2024-04-11T02:27:00.149">
-    <ac:txMkLst xmlns:ac="http://schemas.microsoft.com/office/drawing/2013/main/command">
-      <pc:docMk xmlns:pc="http://schemas.microsoft.com/office/powerpoint/2013/main/command"/>
-      <pc:sldMk xmlns:pc="http://schemas.microsoft.com/office/powerpoint/2013/main/command" cId="787268651" sldId="268"/>
-      <ac:graphicFrameMk id="7" creationId="{158B1993-4CA7-82B6-EE08-39866B522654}"/>
-      <ac:tblMk/>
-      <ac:tcMk rowId="1367851737" colId="3015167151"/>
-      <ac:txMk cp="0" len="1">
-        <ac:context len="2" hash="2422"/>
-      </ac:txMk>
-    </ac:txMkLst>
-    <p188:pos x="230257" y="1744289"/>
-    <p188:replyLst>
-      <p188:reply id="{DC6A1E44-243A-4112-8FE1-B97BFADAFD01}" authorId="{E68F2F47-82E5-2BC7-0FEC-4F4EC863DDC3}" created="2024-04-11T03:57:51.650">
-        <p188:txBody>
-          <a:bodyPr/>
-          <a:lstStyle/>
-          <a:p>
-            <a:r>
-              <a:rPr lang="fr-FR"/>
-              <a:t>@Alexandre peut tu fournir la valeur de I que t'as utilisée pour les simulations</a:t>
-            </a:r>
-          </a:p>
-        </p188:txBody>
-      </p188:reply>
-    </p188:replyLst>
-    <p188:txBody>
-      <a:bodyPr/>
-      <a:lstStyle/>
-      <a:p>
-        <a:r>
-          <a:rPr lang="en-CA"/>
-          <a:t> completer ou a enlever?</a:t>
-        </a:r>
-      </a:p>
-    </p188:txBody>
-  </p188:cm>
-</p188:cmLst>
-</file>
-
-<file path=ppt/comments/modernComment_117_A1977F2E.xml><?xml version="1.0" encoding="utf-8"?>
-<p188:cmLst xmlns:a="http://schemas.openxmlformats.org/drawingml/2006/main" xmlns:r="http://schemas.openxmlformats.org/officeDocument/2006/relationships" xmlns:p188="http://schemas.microsoft.com/office/powerpoint/2018/8/main">
-  <p188:cm id="{36D4ADF6-6359-4D91-B7F4-6568DFFEFBFC}" authorId="{4BB11620-EFBC-D13A-7B93-45F2C922ABDE}" created="2024-04-09T00:40:55.872">
-    <ac:txMkLst xmlns:ac="http://schemas.microsoft.com/office/drawing/2013/main/command">
-      <pc:docMk xmlns:pc="http://schemas.microsoft.com/office/powerpoint/2013/main/command"/>
-      <pc:sldMk xmlns:pc="http://schemas.microsoft.com/office/powerpoint/2013/main/command" cId="2711060270" sldId="279"/>
-      <ac:spMk id="3" creationId="{57846E6E-541E-C380-2EC3-91AF5BEE61F6}"/>
-      <ac:txMk cp="725">
-        <ac:context len="910" hash="690806682"/>
-      </ac:txMk>
-    </ac:txMkLst>
-    <p188:pos x="5886691" y="3282730"/>
-    <p188:txBody>
-      <a:bodyPr/>
-      <a:lstStyle/>
-      <a:p>
-        <a:r>
-          <a:rPr lang="en-CA"/>
-          <a:t>C'est pas 2*0.01786?</a:t>
-        </a:r>
-      </a:p>
-    </p188:txBody>
-  </p188:cm>
-</p188:cmLst>
-</file>
-
-<file path=ppt/comments/modernComment_119_D4A1683D.xml><?xml version="1.0" encoding="utf-8"?>
-<p188:cmLst xmlns:a="http://schemas.openxmlformats.org/drawingml/2006/main" xmlns:r="http://schemas.openxmlformats.org/officeDocument/2006/relationships" xmlns:p188="http://schemas.microsoft.com/office/powerpoint/2018/8/main">
-  <p188:cm id="{E5CD4D06-CBC4-4BBD-8A2F-2389111330B6}" authorId="{4BB11620-EFBC-D13A-7B93-45F2C922ABDE}" created="2024-04-06T22:52:32.116">
-    <ac:txMkLst xmlns:ac="http://schemas.microsoft.com/office/drawing/2013/main/command">
-      <pc:docMk xmlns:pc="http://schemas.microsoft.com/office/powerpoint/2013/main/command"/>
-      <pc:sldMk xmlns:pc="http://schemas.microsoft.com/office/powerpoint/2013/main/command" cId="3567347773" sldId="281"/>
-      <ac:spMk id="3" creationId="{57846E6E-541E-C380-2EC3-91AF5BEE61F6}"/>
-      <ac:txMk cp="1134" len="139">
-        <ac:context len="1363" hash="3672763890"/>
-      </ac:txMk>
-    </ac:txMkLst>
-    <p188:pos x="10184296" y="4306209"/>
-    <p188:replyLst>
-      <p188:reply id="{5BB1BFE5-C6BD-4BCE-B02D-C23A120FE53D}" authorId="{E68F2F47-82E5-2BC7-0FEC-4F4EC863DDC3}" created="2024-04-07T20:42:42.607">
-        <p188:txBody>
-          <a:bodyPr/>
-          <a:lstStyle/>
-          <a:p>
-            <a:r>
-              <a:rPr lang="fr-FR"/>
-              <a:t>L'ordre des elements +1</a:t>
-            </a:r>
-          </a:p>
-        </p188:txBody>
-      </p188:reply>
-      <p188:reply id="{1CA78D15-FBCE-45F2-9D50-3AC2207DF516}" authorId="{E68F2F47-82E5-2BC7-0FEC-4F4EC863DDC3}" created="2024-04-12T00:27:39.614">
-        <p188:txBody>
-          <a:bodyPr/>
-          <a:lstStyle/>
-          <a:p>
-            <a:r>
-              <a:rPr lang="fr-FR"/>
-              <a:t>C'est cette phrase qu'il faut enlever. Ce n'est pas l'ordre des PBEAM qui apparait c'est l'ordre des elements +1.
-L'ordre qui apparait c'est O(h^p+1) </a:t>
-            </a:r>
-          </a:p>
-        </p188:txBody>
-      </p188:reply>
-    </p188:replyLst>
-    <p188:txBody>
-      <a:bodyPr/>
-      <a:lstStyle/>
-      <a:p>
-        <a:r>
-          <a:rPr lang="en-CA"/>
-          <a:t>Est ce d'apres l'ordre des elements ou la formule de tomishenko qu'on a l'ordre 2?</a:t>
-        </a:r>
-      </a:p>
-    </p188:txBody>
-  </p188:cm>
-  <p188:cm id="{37F27A8D-EFA0-4410-B6C6-D9B44291E8C0}" authorId="{4BB11620-EFBC-D13A-7B93-45F2C922ABDE}" created="2024-04-06T23:02:52.806">
-    <ac:txMkLst xmlns:ac="http://schemas.microsoft.com/office/drawing/2013/main/command">
-      <pc:docMk xmlns:pc="http://schemas.microsoft.com/office/powerpoint/2013/main/command"/>
-      <pc:sldMk xmlns:pc="http://schemas.microsoft.com/office/powerpoint/2013/main/command" cId="3567347773" sldId="281"/>
-      <ac:spMk id="3" creationId="{57846E6E-541E-C380-2EC3-91AF5BEE61F6}"/>
-      <ac:txMk cp="255" len="67">
-        <ac:context len="1363" hash="3672763890"/>
-      </ac:txMk>
-    </ac:txMkLst>
-    <p188:pos x="8564217" y="748000"/>
-    <p188:replyLst>
-      <p188:reply id="{B34F2192-071B-4E6B-B768-4530513785EF}" authorId="{E68F2F47-82E5-2BC7-0FEC-4F4EC863DDC3}" created="2024-04-11T04:00:02.254">
-        <p188:txBody>
-          <a:bodyPr/>
-          <a:lstStyle/>
-          <a:p>
-            <a:r>
-              <a:rPr lang="fr-FR"/>
-              <a:t>Il faut enlever cette phrase</a:t>
-            </a:r>
-          </a:p>
-        </p188:txBody>
-      </p188:reply>
-      <p188:reply id="{BC82CEF8-FA9E-4B11-85B2-C869687F2122}" authorId="{4BB11620-EFBC-D13A-7B93-45F2C922ABDE}" created="2024-04-11T04:55:25.070">
-        <p188:txBody>
-          <a:bodyPr/>
-          <a:lstStyle/>
-          <a:p>
-            <a:r>
-              <a:rPr lang="en-CA"/>
-              <a:t>Pourquoi? Il ne faut pas preciser qu'on travaille à des conditions fixes pour la convergence?</a:t>
-            </a:r>
-          </a:p>
-        </p188:txBody>
-      </p188:reply>
-      <p188:reply id="{87FFEA0A-E9C0-4C9E-B4B6-7AC95E452E82}" authorId="{E68F2F47-82E5-2BC7-0FEC-4F4EC863DDC3}" created="2024-04-12T00:26:52.446">
-        <p188:txBody>
-          <a:bodyPr/>
-          <a:lstStyle/>
-          <a:p>
-            <a:r>
-              <a:rPr lang="fr-FR"/>
-              <a:t>Si, je viens de me rendre compte que je ne répond pas au bon commentaire. (Voir le commentaire plus haut)</a:t>
-            </a:r>
-          </a:p>
-        </p188:txBody>
-      </p188:reply>
-    </p188:replyLst>
-    <p188:txBody>
-      <a:bodyPr/>
-      <a:lstStyle/>
-      <a:p>
-        <a:r>
-          <a:rPr lang="en-CA"/>
-          <a:t>Qq1 peut confirmer?</a:t>
-        </a:r>
-      </a:p>
-    </p188:txBody>
-  </p188:cm>
-</p188:cmLst>
-</file>
-
-<file path=ppt/comments/modernComment_11E_1D7F8001.xml><?xml version="1.0" encoding="utf-8"?>
-<p188:cmLst xmlns:a="http://schemas.openxmlformats.org/drawingml/2006/main" xmlns:r="http://schemas.openxmlformats.org/officeDocument/2006/relationships" xmlns:p188="http://schemas.microsoft.com/office/powerpoint/2018/8/main">
-  <p188:cm id="{DAB7DD91-4611-4132-AA57-7C73CA635F1A}" authorId="{53E43574-7A34-154C-E512-F6CBCA51E7C2}" created="2024-04-10T23:30:28.627">
-    <ac:txMkLst xmlns:ac="http://schemas.microsoft.com/office/drawing/2013/main/command">
-      <pc:docMk xmlns:pc="http://schemas.microsoft.com/office/powerpoint/2013/main/command"/>
-      <pc:sldMk xmlns:pc="http://schemas.microsoft.com/office/powerpoint/2013/main/command" cId="494895105" sldId="286"/>
-      <ac:spMk id="3" creationId="{57846E6E-541E-C380-2EC3-91AF5BEE61F6}"/>
-      <ac:txMk cp="0">
-        <ac:context len="641" hash="1044606716"/>
-      </ac:txMk>
-    </ac:txMkLst>
-    <p188:pos x="10506075" y="2497701"/>
-    <p188:replyLst>
-      <p188:reply id="{D8296247-F255-453A-8959-8A72DECB77F6}" authorId="{4BB11620-EFBC-D13A-7B93-45F2C922ABDE}" created="2024-04-11T02:42:10.167">
-        <p188:txBody>
-          <a:bodyPr/>
-          <a:lstStyle/>
-          <a:p>
-            <a:r>
-              <a:rPr lang="en-CA"/>
-              <a:t>Ajouté à la diapo precedente</a:t>
-            </a:r>
-          </a:p>
-        </p188:txBody>
-      </p188:reply>
-    </p188:replyLst>
-    <p188:txBody>
-      <a:bodyPr/>
-      <a:lstStyle/>
-      <a:p>
-        <a:r>
-          <a:rPr lang="en-CA"/>
-          <a:t>On peut également parler du fait que l'encastrement impose un angle nulle qui ne peut pas être respecté par des élément linéaire ce qui introduit un erreur entre les nœuds dû à l'interpolation</a:t>
         </a:r>
       </a:p>
     </p188:txBody>
@@ -11040,7 +10755,7 @@
           <a:p>
             <a:fld id="{DAB5DE69-65B2-445A-B9D2-BC2BC199D49F}" type="datetimeFigureOut">
               <a:rPr lang="en-CA" smtClean="0"/>
-              <a:t>2024-04-12</a:t>
+              <a:t>2024-04-13</a:t>
             </a:fld>
             <a:endParaRPr lang="en-CA"/>
           </a:p>
@@ -11455,9 +11170,9 @@
           <a:bodyPr/>
           <a:lstStyle/>
           <a:p>
-            <a:fld id="{CF633E34-DD75-4254-AB88-C9D2090F6CC5}" type="datetimeFigureOut">
+            <a:fld id="{9EA6847D-0F1C-4E6B-9D14-F86603C90A34}" type="datetime1">
               <a:rPr lang="en-CA" smtClean="0"/>
-              <a:t>2024-04-12</a:t>
+              <a:t>2024-04-13</a:t>
             </a:fld>
             <a:endParaRPr lang="en-CA"/>
           </a:p>
@@ -11655,9 +11370,9 @@
           <a:bodyPr/>
           <a:lstStyle/>
           <a:p>
-            <a:fld id="{CF633E34-DD75-4254-AB88-C9D2090F6CC5}" type="datetimeFigureOut">
+            <a:fld id="{CADE0B10-915C-4E23-BF3D-3A60511C290D}" type="datetime1">
               <a:rPr lang="en-CA" smtClean="0"/>
-              <a:t>2024-04-12</a:t>
+              <a:t>2024-04-13</a:t>
             </a:fld>
             <a:endParaRPr lang="en-CA"/>
           </a:p>
@@ -11865,9 +11580,9 @@
           <a:bodyPr/>
           <a:lstStyle/>
           <a:p>
-            <a:fld id="{CF633E34-DD75-4254-AB88-C9D2090F6CC5}" type="datetimeFigureOut">
+            <a:fld id="{18C01E2C-5F1C-40DF-9FFA-058BE0208EC5}" type="datetime1">
               <a:rPr lang="en-CA" smtClean="0"/>
-              <a:t>2024-04-12</a:t>
+              <a:t>2024-04-13</a:t>
             </a:fld>
             <a:endParaRPr lang="en-CA"/>
           </a:p>
@@ -12065,9 +11780,9 @@
           <a:bodyPr/>
           <a:lstStyle/>
           <a:p>
-            <a:fld id="{CF633E34-DD75-4254-AB88-C9D2090F6CC5}" type="datetimeFigureOut">
+            <a:fld id="{C4E66924-F8B7-484E-9572-FEB480D73625}" type="datetime1">
               <a:rPr lang="en-CA" smtClean="0"/>
-              <a:t>2024-04-12</a:t>
+              <a:t>2024-04-13</a:t>
             </a:fld>
             <a:endParaRPr lang="en-CA"/>
           </a:p>
@@ -12341,9 +12056,9 @@
           <a:bodyPr/>
           <a:lstStyle/>
           <a:p>
-            <a:fld id="{CF633E34-DD75-4254-AB88-C9D2090F6CC5}" type="datetimeFigureOut">
+            <a:fld id="{8DF54FAA-8BEB-4397-B05D-7E067FAA1D51}" type="datetime1">
               <a:rPr lang="en-CA" smtClean="0"/>
-              <a:t>2024-04-12</a:t>
+              <a:t>2024-04-13</a:t>
             </a:fld>
             <a:endParaRPr lang="en-CA"/>
           </a:p>
@@ -12609,9 +12324,9 @@
           <a:bodyPr/>
           <a:lstStyle/>
           <a:p>
-            <a:fld id="{CF633E34-DD75-4254-AB88-C9D2090F6CC5}" type="datetimeFigureOut">
+            <a:fld id="{91E49129-39F5-406C-9780-EBCC397C408D}" type="datetime1">
               <a:rPr lang="en-CA" smtClean="0"/>
-              <a:t>2024-04-12</a:t>
+              <a:t>2024-04-13</a:t>
             </a:fld>
             <a:endParaRPr lang="en-CA"/>
           </a:p>
@@ -13024,9 +12739,9 @@
           <a:bodyPr/>
           <a:lstStyle/>
           <a:p>
-            <a:fld id="{CF633E34-DD75-4254-AB88-C9D2090F6CC5}" type="datetimeFigureOut">
+            <a:fld id="{842BEFE3-C6EA-474C-97FD-ABDEA347D9FB}" type="datetime1">
               <a:rPr lang="en-CA" smtClean="0"/>
-              <a:t>2024-04-12</a:t>
+              <a:t>2024-04-13</a:t>
             </a:fld>
             <a:endParaRPr lang="en-CA"/>
           </a:p>
@@ -13166,9 +12881,9 @@
           <a:bodyPr/>
           <a:lstStyle/>
           <a:p>
-            <a:fld id="{CF633E34-DD75-4254-AB88-C9D2090F6CC5}" type="datetimeFigureOut">
+            <a:fld id="{6E136DE9-66C8-4178-B1EE-68BA1DDA6AC1}" type="datetime1">
               <a:rPr lang="en-CA" smtClean="0"/>
-              <a:t>2024-04-12</a:t>
+              <a:t>2024-04-13</a:t>
             </a:fld>
             <a:endParaRPr lang="en-CA"/>
           </a:p>
@@ -13279,9 +12994,9 @@
           <a:bodyPr/>
           <a:lstStyle/>
           <a:p>
-            <a:fld id="{CF633E34-DD75-4254-AB88-C9D2090F6CC5}" type="datetimeFigureOut">
+            <a:fld id="{9FB45C08-7649-49AF-BD7B-580DB8C99B7A}" type="datetime1">
               <a:rPr lang="en-CA" smtClean="0"/>
-              <a:t>2024-04-12</a:t>
+              <a:t>2024-04-13</a:t>
             </a:fld>
             <a:endParaRPr lang="en-CA"/>
           </a:p>
@@ -13592,9 +13307,9 @@
           <a:bodyPr/>
           <a:lstStyle/>
           <a:p>
-            <a:fld id="{CF633E34-DD75-4254-AB88-C9D2090F6CC5}" type="datetimeFigureOut">
+            <a:fld id="{C892CBF7-3610-449C-AFF4-F9E06E0A3AE6}" type="datetime1">
               <a:rPr lang="en-CA" smtClean="0"/>
-              <a:t>2024-04-12</a:t>
+              <a:t>2024-04-13</a:t>
             </a:fld>
             <a:endParaRPr lang="en-CA"/>
           </a:p>
@@ -13881,9 +13596,9 @@
           <a:bodyPr/>
           <a:lstStyle/>
           <a:p>
-            <a:fld id="{CF633E34-DD75-4254-AB88-C9D2090F6CC5}" type="datetimeFigureOut">
+            <a:fld id="{FEBB46D6-6F0E-424D-BC97-33481DE3A81C}" type="datetime1">
               <a:rPr lang="en-CA" smtClean="0"/>
-              <a:t>2024-04-12</a:t>
+              <a:t>2024-04-13</a:t>
             </a:fld>
             <a:endParaRPr lang="en-CA"/>
           </a:p>
@@ -14124,9 +13839,9 @@
             </a:lvl1pPr>
           </a:lstStyle>
           <a:p>
-            <a:fld id="{CF633E34-DD75-4254-AB88-C9D2090F6CC5}" type="datetimeFigureOut">
+            <a:fld id="{B73E6E16-3168-468D-A621-C54C80625A51}" type="datetime1">
               <a:rPr lang="en-CA" smtClean="0"/>
-              <a:t>2024-04-12</a:t>
+              <a:t>2024-04-13</a:t>
             </a:fld>
             <a:endParaRPr lang="en-CA"/>
           </a:p>
@@ -14243,6 +13958,7 @@
     <p:sldLayoutId id="2147483658" r:id="rId10"/>
     <p:sldLayoutId id="2147483659" r:id="rId11"/>
   </p:sldLayoutIdLst>
+  <p:hf hdr="0" ftr="0" dt="0"/>
   <p:txStyles>
     <p:titleStyle>
       <a:lvl1pPr algn="l" defTabSz="914400" rtl="0" eaLnBrk="1" latinLnBrk="0" hangingPunct="1">
@@ -14918,6 +14634,35 @@
           </a:p>
         </p:txBody>
       </p:sp>
+      <p:sp>
+        <p:nvSpPr>
+          <p:cNvPr id="5" name="Slide Number Placeholder 4">
+            <a:extLst>
+              <a:ext uri="{FF2B5EF4-FFF2-40B4-BE49-F238E27FC236}">
+                <a16:creationId xmlns:a16="http://schemas.microsoft.com/office/drawing/2014/main" id="{48EF54F8-527A-34C8-885D-511EBC06BAD5}"/>
+              </a:ext>
+            </a:extLst>
+          </p:cNvPr>
+          <p:cNvSpPr>
+            <a:spLocks noGrp="1"/>
+          </p:cNvSpPr>
+          <p:nvPr>
+            <p:ph type="sldNum" sz="quarter" idx="12"/>
+          </p:nvPr>
+        </p:nvSpPr>
+        <p:spPr/>
+        <p:txBody>
+          <a:bodyPr/>
+          <a:lstStyle/>
+          <a:p>
+            <a:fld id="{4BD3201E-7DF8-462B-AC18-61E63795AE0D}" type="slidenum">
+              <a:rPr lang="en-CA" smtClean="0"/>
+              <a:t>1</a:t>
+            </a:fld>
+            <a:endParaRPr lang="en-CA"/>
+          </a:p>
+        </p:txBody>
+      </p:sp>
     </p:spTree>
     <p:extLst>
       <p:ext uri="{BB962C8B-B14F-4D97-AF65-F5344CB8AC3E}">
@@ -14984,8 +14729,8 @@
           </a:p>
         </p:txBody>
       </p:sp>
-      <mc:AlternateContent xmlns:mc="http://schemas.openxmlformats.org/markup-compatibility/2006">
-        <mc:Choice xmlns:a14="http://schemas.microsoft.com/office/drawing/2010/main" Requires="a14">
+      <mc:AlternateContent xmlns:mc="http://schemas.openxmlformats.org/markup-compatibility/2006" xmlns:a14="http://schemas.microsoft.com/office/drawing/2010/main">
+        <mc:Choice Requires="a14">
           <p:sp>
             <p:nvSpPr>
               <p:cNvPr id="3" name="Content Placeholder 2">
@@ -15044,15 +14789,23 @@
                 </a:r>
                 <a:r>
                   <a:rPr lang="fr-CA" sz="1800" dirty="0"/>
-                  <a:t> utilise des éléments linéaires donc l’ordre formel attendu est de p</a:t>
+                  <a:t> utilise des éléments linéaires donc l’ordre formel attendu est de </a:t>
                 </a:r>
                 <a:r>
-                  <a:rPr lang="fr-CA" sz="1800" baseline="-25000" dirty="0"/>
+                  <a:rPr lang="fr-CA" sz="1800" i="1" dirty="0"/>
+                  <a:t>p</a:t>
+                </a:r>
+                <a:r>
+                  <a:rPr lang="fr-CA" sz="1800" i="1" baseline="-25000" dirty="0"/>
                   <a:t>f</a:t>
                 </a:r>
                 <a:r>
+                  <a:rPr lang="fr-CA" sz="1800" i="1" dirty="0"/>
+                  <a:t>=2.</a:t>
+                </a:r>
+                <a:r>
                   <a:rPr lang="fr-CA" sz="1800" dirty="0"/>
-                  <a:t>=2. Cependant, il est possible d’observer sur l’analyse de convergence faite plus haut que l’ordre observée est de </a:t>
+                  <a:t> Cependant, il est possible d’observer sur l’analyse de convergence faite plus haut que l’ordre observée est de </a:t>
                 </a:r>
                 <a14:m>
                   <m:oMath xmlns:m="http://schemas.openxmlformats.org/officeDocument/2006/math">
@@ -15130,7 +14883,7 @@
             </p:txBody>
           </p:sp>
         </mc:Choice>
-        <mc:Fallback>
+        <mc:Fallback xmlns="">
           <p:sp>
             <p:nvSpPr>
               <p:cNvPr id="3" name="Content Placeholder 2">
@@ -15174,6 +14927,89 @@
           </p:sp>
         </mc:Fallback>
       </mc:AlternateContent>
+      <p:sp>
+        <p:nvSpPr>
+          <p:cNvPr id="5" name="Slide Number Placeholder 4">
+            <a:extLst>
+              <a:ext uri="{FF2B5EF4-FFF2-40B4-BE49-F238E27FC236}">
+                <a16:creationId xmlns:a16="http://schemas.microsoft.com/office/drawing/2014/main" id="{A552B322-FC02-A50A-ED20-6CE8DCF65154}"/>
+              </a:ext>
+            </a:extLst>
+          </p:cNvPr>
+          <p:cNvSpPr>
+            <a:spLocks noGrp="1"/>
+          </p:cNvSpPr>
+          <p:nvPr>
+            <p:ph type="sldNum" sz="quarter" idx="12"/>
+          </p:nvPr>
+        </p:nvSpPr>
+        <p:spPr/>
+        <p:txBody>
+          <a:bodyPr/>
+          <a:lstStyle/>
+          <a:p>
+            <a:fld id="{4BD3201E-7DF8-462B-AC18-61E63795AE0D}" type="slidenum">
+              <a:rPr lang="en-CA" smtClean="0"/>
+              <a:t>10</a:t>
+            </a:fld>
+            <a:endParaRPr lang="en-CA"/>
+          </a:p>
+        </p:txBody>
+      </p:sp>
+      <p:sp>
+        <p:nvSpPr>
+          <p:cNvPr id="4" name="Rectangle 3">
+            <a:extLst>
+              <a:ext uri="{FF2B5EF4-FFF2-40B4-BE49-F238E27FC236}">
+                <a16:creationId xmlns:a16="http://schemas.microsoft.com/office/drawing/2014/main" id="{90985DD7-71CB-4A32-AAEA-05B4DD6EC606}"/>
+              </a:ext>
+            </a:extLst>
+          </p:cNvPr>
+          <p:cNvSpPr/>
+          <p:nvPr/>
+        </p:nvSpPr>
+        <p:spPr>
+          <a:xfrm>
+            <a:off x="0" y="365125"/>
+            <a:ext cx="678427" cy="556649"/>
+          </a:xfrm>
+          <a:prstGeom prst="rect">
+            <a:avLst/>
+          </a:prstGeom>
+          <a:solidFill>
+            <a:schemeClr val="accent2">
+              <a:lumMod val="75000"/>
+            </a:schemeClr>
+          </a:solidFill>
+          <a:ln>
+            <a:noFill/>
+          </a:ln>
+        </p:spPr>
+        <p:style>
+          <a:lnRef idx="2">
+            <a:schemeClr val="accent1">
+              <a:shade val="15000"/>
+            </a:schemeClr>
+          </a:lnRef>
+          <a:fillRef idx="1">
+            <a:schemeClr val="accent1"/>
+          </a:fillRef>
+          <a:effectRef idx="0">
+            <a:schemeClr val="accent1"/>
+          </a:effectRef>
+          <a:fontRef idx="minor">
+            <a:schemeClr val="lt1"/>
+          </a:fontRef>
+        </p:style>
+        <p:txBody>
+          <a:bodyPr rtlCol="0" anchor="ctr"/>
+          <a:lstStyle/>
+          <a:p>
+            <a:pPr algn="ctr"/>
+            <a:endParaRPr lang="en-CA"/>
+          </a:p>
+        </p:txBody>
+      </p:sp>
     </p:spTree>
     <p:extLst>
       <p:ext uri="{BB962C8B-B14F-4D97-AF65-F5344CB8AC3E}">
@@ -15277,7 +15113,7 @@
             </a:r>
             <a:r>
               <a:rPr lang="fr-FR" sz="1800" dirty="0"/>
-              <a:t>par un angle nul au premier élément, cette condition ne peut pas être respectée par des éléments linéaires car ils ont un seul degré de liberté par nœud (la déplacement). Comme on peut le voir à la figure 4, le déplacement est nul à la base de la poutre mais l’angle ne l’est pas. Ceci introduit une erreur entre les nœuds dû à l'interpolation.</a:t>
+              <a:t>par un angle nul au premier élément, cette condition ne peut pas être respectée par des éléments linéaires car ils ont un seul degré de liberté par nœud (le déplacement). Comme on peut le voir à la figure 4, le déplacement est nul à la base de la poutre mais l’angle ne l’est pas. Ceci introduit une erreur entre les nœuds dû à l'interpolation.</a:t>
             </a:r>
             <a:endParaRPr lang="fr-CA" sz="1800" dirty="0"/>
           </a:p>
@@ -15339,7 +15175,7 @@
           <p:nvPr/>
         </p:nvPicPr>
         <p:blipFill>
-          <a:blip r:embed="rId3"/>
+          <a:blip r:embed="rId2"/>
           <a:stretch>
             <a:fillRect/>
           </a:stretch>
@@ -15384,8 +15220,91 @@
           <a:p>
             <a:r>
               <a:rPr lang="fr-FR" sz="1200" dirty="0"/>
-              <a:t>Fig.3. Simulation d’une poutre encastrée-libre à un élément</a:t>
-            </a:r>
+              <a:t>Fig.4. Simulation d’une poutre encastrée-libre à un élément</a:t>
+            </a:r>
+          </a:p>
+        </p:txBody>
+      </p:sp>
+      <p:sp>
+        <p:nvSpPr>
+          <p:cNvPr id="5" name="Slide Number Placeholder 4">
+            <a:extLst>
+              <a:ext uri="{FF2B5EF4-FFF2-40B4-BE49-F238E27FC236}">
+                <a16:creationId xmlns:a16="http://schemas.microsoft.com/office/drawing/2014/main" id="{843677EC-8660-9CDF-987F-72428454CDFB}"/>
+              </a:ext>
+            </a:extLst>
+          </p:cNvPr>
+          <p:cNvSpPr>
+            <a:spLocks noGrp="1"/>
+          </p:cNvSpPr>
+          <p:nvPr>
+            <p:ph type="sldNum" sz="quarter" idx="12"/>
+          </p:nvPr>
+        </p:nvSpPr>
+        <p:spPr/>
+        <p:txBody>
+          <a:bodyPr/>
+          <a:lstStyle/>
+          <a:p>
+            <a:fld id="{4BD3201E-7DF8-462B-AC18-61E63795AE0D}" type="slidenum">
+              <a:rPr lang="en-CA" smtClean="0"/>
+              <a:t>11</a:t>
+            </a:fld>
+            <a:endParaRPr lang="en-CA"/>
+          </a:p>
+        </p:txBody>
+      </p:sp>
+      <p:sp>
+        <p:nvSpPr>
+          <p:cNvPr id="4" name="Rectangle 3">
+            <a:extLst>
+              <a:ext uri="{FF2B5EF4-FFF2-40B4-BE49-F238E27FC236}">
+                <a16:creationId xmlns:a16="http://schemas.microsoft.com/office/drawing/2014/main" id="{A3671CCE-1689-1DD9-D97C-36F6EA41A1AF}"/>
+              </a:ext>
+            </a:extLst>
+          </p:cNvPr>
+          <p:cNvSpPr/>
+          <p:nvPr/>
+        </p:nvSpPr>
+        <p:spPr>
+          <a:xfrm>
+            <a:off x="0" y="365125"/>
+            <a:ext cx="678427" cy="556649"/>
+          </a:xfrm>
+          <a:prstGeom prst="rect">
+            <a:avLst/>
+          </a:prstGeom>
+          <a:solidFill>
+            <a:schemeClr val="accent2">
+              <a:lumMod val="75000"/>
+            </a:schemeClr>
+          </a:solidFill>
+          <a:ln>
+            <a:noFill/>
+          </a:ln>
+        </p:spPr>
+        <p:style>
+          <a:lnRef idx="2">
+            <a:schemeClr val="accent1">
+              <a:shade val="15000"/>
+            </a:schemeClr>
+          </a:lnRef>
+          <a:fillRef idx="1">
+            <a:schemeClr val="accent1"/>
+          </a:fillRef>
+          <a:effectRef idx="0">
+            <a:schemeClr val="accent1"/>
+          </a:effectRef>
+          <a:fontRef idx="minor">
+            <a:schemeClr val="lt1"/>
+          </a:fontRef>
+        </p:style>
+        <p:txBody>
+          <a:bodyPr rtlCol="0" anchor="ctr"/>
+          <a:lstStyle/>
+          <a:p>
+            <a:pPr algn="ctr"/>
+            <a:endParaRPr lang="en-CA"/>
           </a:p>
         </p:txBody>
       </p:sp>
@@ -15399,11 +15318,6 @@
   <p:clrMapOvr>
     <a:masterClrMapping/>
   </p:clrMapOvr>
-  <p:extLst>
-    <p:ext uri="{6950BFC3-D8DA-4A85-94F7-54DA5524770B}">
-      <p188:commentRel xmlns:p188="http://schemas.microsoft.com/office/powerpoint/2018/8/main" r:id="rId2"/>
-    </p:ext>
-  </p:extLst>
 </p:sld>
 </file>
 
@@ -15454,14 +15368,14 @@
           <a:p>
             <a:r>
               <a:rPr lang="fr-FR" sz="3000" dirty="0"/>
-              <a:t>Vérification de code</a:t>
+              <a:t>Vérification de code – méthode alternative</a:t>
             </a:r>
             <a:endParaRPr lang="en-CA" sz="3000" dirty="0"/>
           </a:p>
         </p:txBody>
       </p:sp>
-      <mc:AlternateContent xmlns:mc="http://schemas.openxmlformats.org/markup-compatibility/2006">
-        <mc:Choice xmlns:a14="http://schemas.microsoft.com/office/drawing/2010/main" Requires="a14">
+      <mc:AlternateContent xmlns:mc="http://schemas.openxmlformats.org/markup-compatibility/2006" xmlns:a14="http://schemas.microsoft.com/office/drawing/2010/main">
+        <mc:Choice Requires="a14">
           <p:sp>
             <p:nvSpPr>
               <p:cNvPr id="3" name="Content Placeholder 2">
@@ -15495,7 +15409,7 @@
                 </a:pPr>
                 <a:r>
                   <a:rPr lang="fr-CA" sz="1800" dirty="0"/>
-                  <a:t>Il est donc possible de remarquer qu’un différente méthode est nécessaire afin d’effectuer la vérification de code. Pour ce faire, il est possible d’utiliser l’énergie de déformation.</a:t>
+                  <a:t>Il est donc possible de remarquer qu’une différente méthode est nécessaire afin d’effectuer la vérification de code. Pour ce faire, il est possible d’utiliser l’énergie de déformation.</a:t>
                 </a:r>
               </a:p>
               <a:p>
@@ -15504,7 +15418,7 @@
                 </a:pPr>
                 <a:r>
                   <a:rPr lang="fr-CA" sz="1800" dirty="0"/>
-                  <a:t>L’énergie de déformation par élément linéaire est définie comme:</a:t>
+                  <a:t>L’énergie de déformation par élément linéaire est définie comme suit:</a:t>
                 </a:r>
               </a:p>
               <a:p>
@@ -15738,7 +15652,7 @@
                 </a:pPr>
                 <a:r>
                   <a:rPr lang="fr-CA" sz="1800" dirty="0"/>
-                  <a:t>De ce fait, l’erreur locale sur l’énergie de déformation peut être défini comme étant:</a:t>
+                  <a:t>De ce fait, l’erreur locale sur l’énergie de déformation peut être définie comme étant:</a:t>
                 </a:r>
               </a:p>
               <a:p>
@@ -15867,7 +15781,7 @@
                 </a:pPr>
                 <a:r>
                   <a:rPr lang="fr-CA" sz="1800" dirty="0"/>
-                  <a:t>Toutefois, elle peut également être défini à l’aide de la formulation de l’erreur de discrétisation d’une méthode par éléments finis, soit:</a:t>
+                  <a:t>Toutefois, elle peut également être définie à l’aide de la formulation de l’erreur de discrétisation d’une méthode par éléments finis, soit:</a:t>
                 </a:r>
               </a:p>
               <a:p>
@@ -15881,16 +15795,13 @@
                     </m:oMathParaPr>
                     <m:oMath xmlns:m="http://schemas.openxmlformats.org/officeDocument/2006/math">
                       <m:r>
-                        <m:rPr>
-                          <m:sty m:val="p"/>
-                        </m:rPr>
-                        <a:rPr lang="fr-CA" sz="1800" b="0" i="0" smtClean="0">
+                        <a:rPr lang="fr-CA" sz="1800" b="0" i="1" smtClean="0">
                           <a:latin typeface="Cambria Math" panose="02040503050406030204" pitchFamily="18" charset="0"/>
                         </a:rPr>
-                        <m:t>E</m:t>
+                        <m:t>𝐸</m:t>
                       </m:r>
                       <m:r>
-                        <a:rPr lang="fr-CA" sz="1800" b="0" i="0" smtClean="0">
+                        <a:rPr lang="fr-CA" sz="1800" b="0" i="1" smtClean="0">
                           <a:latin typeface="Cambria Math" panose="02040503050406030204" pitchFamily="18" charset="0"/>
                         </a:rPr>
                         <m:t>=</m:t>
@@ -15898,38 +15809,32 @@
                       <m:sSup>
                         <m:sSupPr>
                           <m:ctrlPr>
-                            <a:rPr lang="fr-CA" sz="1800" b="0" i="0" smtClean="0">
+                            <a:rPr lang="fr-CA" sz="1800" b="0" i="1" smtClean="0">
                               <a:latin typeface="Cambria Math" panose="02040503050406030204" pitchFamily="18" charset="0"/>
                             </a:rPr>
                           </m:ctrlPr>
                         </m:sSupPr>
                         <m:e>
                           <m:r>
-                            <m:rPr>
-                              <m:sty m:val="p"/>
-                            </m:rPr>
-                            <a:rPr lang="fr-CA" sz="1800" b="0" i="0" smtClean="0">
+                            <a:rPr lang="fr-CA" sz="1800" b="0" i="1" smtClean="0">
                               <a:latin typeface="Cambria Math" panose="02040503050406030204" pitchFamily="18" charset="0"/>
                             </a:rPr>
-                            <m:t>Ch</m:t>
+                            <m:t>𝐶h</m:t>
                           </m:r>
                         </m:e>
                         <m:sup>
                           <m:r>
-                            <m:rPr>
-                              <m:sty m:val="p"/>
-                            </m:rPr>
-                            <a:rPr lang="fr-CA" sz="1800" b="0" i="0" smtClean="0">
+                            <a:rPr lang="fr-CA" sz="1800" b="0" i="1" smtClean="0">
                               <a:latin typeface="Cambria Math" panose="02040503050406030204" pitchFamily="18" charset="0"/>
                             </a:rPr>
-                            <m:t>p</m:t>
+                            <m:t>𝑝</m:t>
                           </m:r>
                         </m:sup>
                       </m:sSup>
                     </m:oMath>
                   </m:oMathPara>
                 </a14:m>
-                <a:endParaRPr lang="fr-CA" sz="1800" dirty="0"/>
+                <a:endParaRPr lang="fr-CA" sz="1800" i="1" dirty="0"/>
               </a:p>
               <a:p>
                 <a:pPr marL="0" indent="0" algn="just">
@@ -15940,7 +15845,7 @@
             </p:txBody>
           </p:sp>
         </mc:Choice>
-        <mc:Fallback>
+        <mc:Fallback xmlns="">
           <p:sp>
             <p:nvSpPr>
               <p:cNvPr id="3" name="Content Placeholder 2">
@@ -15984,6 +15889,89 @@
           </p:sp>
         </mc:Fallback>
       </mc:AlternateContent>
+      <p:sp>
+        <p:nvSpPr>
+          <p:cNvPr id="5" name="Slide Number Placeholder 4">
+            <a:extLst>
+              <a:ext uri="{FF2B5EF4-FFF2-40B4-BE49-F238E27FC236}">
+                <a16:creationId xmlns:a16="http://schemas.microsoft.com/office/drawing/2014/main" id="{A10108A2-108C-9B6B-91B7-BD9E1C13032A}"/>
+              </a:ext>
+            </a:extLst>
+          </p:cNvPr>
+          <p:cNvSpPr>
+            <a:spLocks noGrp="1"/>
+          </p:cNvSpPr>
+          <p:nvPr>
+            <p:ph type="sldNum" sz="quarter" idx="12"/>
+          </p:nvPr>
+        </p:nvSpPr>
+        <p:spPr/>
+        <p:txBody>
+          <a:bodyPr/>
+          <a:lstStyle/>
+          <a:p>
+            <a:fld id="{4BD3201E-7DF8-462B-AC18-61E63795AE0D}" type="slidenum">
+              <a:rPr lang="en-CA" smtClean="0"/>
+              <a:t>12</a:t>
+            </a:fld>
+            <a:endParaRPr lang="en-CA"/>
+          </a:p>
+        </p:txBody>
+      </p:sp>
+      <p:sp>
+        <p:nvSpPr>
+          <p:cNvPr id="4" name="Rectangle 3">
+            <a:extLst>
+              <a:ext uri="{FF2B5EF4-FFF2-40B4-BE49-F238E27FC236}">
+                <a16:creationId xmlns:a16="http://schemas.microsoft.com/office/drawing/2014/main" id="{31BAE03D-CE65-1623-A78F-0B2B513D4140}"/>
+              </a:ext>
+            </a:extLst>
+          </p:cNvPr>
+          <p:cNvSpPr/>
+          <p:nvPr/>
+        </p:nvSpPr>
+        <p:spPr>
+          <a:xfrm>
+            <a:off x="0" y="365125"/>
+            <a:ext cx="678427" cy="556649"/>
+          </a:xfrm>
+          <a:prstGeom prst="rect">
+            <a:avLst/>
+          </a:prstGeom>
+          <a:solidFill>
+            <a:schemeClr val="accent2">
+              <a:lumMod val="75000"/>
+            </a:schemeClr>
+          </a:solidFill>
+          <a:ln>
+            <a:noFill/>
+          </a:ln>
+        </p:spPr>
+        <p:style>
+          <a:lnRef idx="2">
+            <a:schemeClr val="accent1">
+              <a:shade val="15000"/>
+            </a:schemeClr>
+          </a:lnRef>
+          <a:fillRef idx="1">
+            <a:schemeClr val="accent1"/>
+          </a:fillRef>
+          <a:effectRef idx="0">
+            <a:schemeClr val="accent1"/>
+          </a:effectRef>
+          <a:fontRef idx="minor">
+            <a:schemeClr val="lt1"/>
+          </a:fontRef>
+        </p:style>
+        <p:txBody>
+          <a:bodyPr rtlCol="0" anchor="ctr"/>
+          <a:lstStyle/>
+          <a:p>
+            <a:pPr algn="ctr"/>
+            <a:endParaRPr lang="en-CA"/>
+          </a:p>
+        </p:txBody>
+      </p:sp>
     </p:spTree>
     <p:extLst>
       <p:ext uri="{BB962C8B-B14F-4D97-AF65-F5344CB8AC3E}">
@@ -16044,7 +16032,7 @@
           <a:p>
             <a:r>
               <a:rPr lang="fr-FR" sz="3000" dirty="0"/>
-              <a:t>Vérification de code</a:t>
+              <a:t>Vérification de code – méthode alternative</a:t>
             </a:r>
             <a:endParaRPr lang="en-CA" sz="3000" dirty="0"/>
           </a:p>
@@ -16083,7 +16071,7 @@
             </a:pPr>
             <a:r>
               <a:rPr lang="fr-CA" sz="1800" dirty="0"/>
-              <a:t>Ainsi, en réalisant des simulations qui augmente le nombre d’éléments (i.e. en diminuant h), on observe les résultats suivants:</a:t>
+              <a:t>Ainsi, en réalisant des simulations qui augmentent le nombre d’éléments (i.e. en diminuant h), on observe les résultats suivants:</a:t>
             </a:r>
           </a:p>
           <a:p>
@@ -16847,7 +16835,15 @@
             </a:r>
             <a:r>
               <a:rPr lang="en-CA" sz="1200" dirty="0"/>
-              <a:t> de deformation </a:t>
+              <a:t> de </a:t>
+            </a:r>
+            <a:r>
+              <a:rPr lang="en-CA" sz="1200" dirty="0" err="1"/>
+              <a:t>déformation</a:t>
+            </a:r>
+            <a:r>
+              <a:rPr lang="en-CA" sz="1200" dirty="0"/>
+              <a:t> </a:t>
             </a:r>
             <a:r>
               <a:rPr lang="en-CA" sz="1200" dirty="0" err="1"/>
@@ -16883,8 +16879,8 @@
         </p:nvSpPr>
         <p:spPr>
           <a:xfrm>
-            <a:off x="1113503" y="5866798"/>
-            <a:ext cx="2111477" cy="646331"/>
+            <a:off x="776749" y="5866798"/>
+            <a:ext cx="2723536" cy="461665"/>
           </a:xfrm>
           <a:prstGeom prst="rect">
             <a:avLst/>
@@ -16911,7 +16907,15 @@
             </a:r>
             <a:r>
               <a:rPr lang="en-CA" sz="1200" dirty="0"/>
-              <a:t> de deformation pour </a:t>
+              <a:t> de </a:t>
+            </a:r>
+            <a:r>
+              <a:rPr lang="en-CA" sz="1200" dirty="0" err="1"/>
+              <a:t>déformation</a:t>
+            </a:r>
+            <a:r>
+              <a:rPr lang="en-CA" sz="1200" dirty="0"/>
+              <a:t> pour </a:t>
             </a:r>
             <a:r>
               <a:rPr lang="en-CA" sz="1200" dirty="0" err="1"/>
@@ -16959,6 +16963,89 @@
           </a:graphicData>
         </a:graphic>
       </p:graphicFrame>
+      <p:sp>
+        <p:nvSpPr>
+          <p:cNvPr id="9" name="Slide Number Placeholder 8">
+            <a:extLst>
+              <a:ext uri="{FF2B5EF4-FFF2-40B4-BE49-F238E27FC236}">
+                <a16:creationId xmlns:a16="http://schemas.microsoft.com/office/drawing/2014/main" id="{3A70F826-24CA-2337-5173-89A61B28C3D4}"/>
+              </a:ext>
+            </a:extLst>
+          </p:cNvPr>
+          <p:cNvSpPr>
+            <a:spLocks noGrp="1"/>
+          </p:cNvSpPr>
+          <p:nvPr>
+            <p:ph type="sldNum" sz="quarter" idx="12"/>
+          </p:nvPr>
+        </p:nvSpPr>
+        <p:spPr/>
+        <p:txBody>
+          <a:bodyPr/>
+          <a:lstStyle/>
+          <a:p>
+            <a:fld id="{4BD3201E-7DF8-462B-AC18-61E63795AE0D}" type="slidenum">
+              <a:rPr lang="en-CA" smtClean="0"/>
+              <a:t>13</a:t>
+            </a:fld>
+            <a:endParaRPr lang="en-CA"/>
+          </a:p>
+        </p:txBody>
+      </p:sp>
+      <p:sp>
+        <p:nvSpPr>
+          <p:cNvPr id="6" name="Rectangle 5">
+            <a:extLst>
+              <a:ext uri="{FF2B5EF4-FFF2-40B4-BE49-F238E27FC236}">
+                <a16:creationId xmlns:a16="http://schemas.microsoft.com/office/drawing/2014/main" id="{8BAE1BDF-8C82-BBE1-F14E-7EC7C361622A}"/>
+              </a:ext>
+            </a:extLst>
+          </p:cNvPr>
+          <p:cNvSpPr/>
+          <p:nvPr/>
+        </p:nvSpPr>
+        <p:spPr>
+          <a:xfrm>
+            <a:off x="0" y="365125"/>
+            <a:ext cx="678427" cy="556649"/>
+          </a:xfrm>
+          <a:prstGeom prst="rect">
+            <a:avLst/>
+          </a:prstGeom>
+          <a:solidFill>
+            <a:schemeClr val="accent2">
+              <a:lumMod val="75000"/>
+            </a:schemeClr>
+          </a:solidFill>
+          <a:ln>
+            <a:noFill/>
+          </a:ln>
+        </p:spPr>
+        <p:style>
+          <a:lnRef idx="2">
+            <a:schemeClr val="accent1">
+              <a:shade val="15000"/>
+            </a:schemeClr>
+          </a:lnRef>
+          <a:fillRef idx="1">
+            <a:schemeClr val="accent1"/>
+          </a:fillRef>
+          <a:effectRef idx="0">
+            <a:schemeClr val="accent1"/>
+          </a:effectRef>
+          <a:fontRef idx="minor">
+            <a:schemeClr val="lt1"/>
+          </a:fontRef>
+        </p:style>
+        <p:txBody>
+          <a:bodyPr rtlCol="0" anchor="ctr"/>
+          <a:lstStyle/>
+          <a:p>
+            <a:pPr algn="ctr"/>
+            <a:endParaRPr lang="en-CA"/>
+          </a:p>
+        </p:txBody>
+      </p:sp>
     </p:spTree>
     <p:extLst>
       <p:ext uri="{BB962C8B-B14F-4D97-AF65-F5344CB8AC3E}">
@@ -17019,14 +17106,14 @@
           <a:p>
             <a:r>
               <a:rPr lang="fr-FR" sz="3000" dirty="0"/>
-              <a:t>Vérification de code</a:t>
+              <a:t>Vérification de code – méthode alternative</a:t>
             </a:r>
             <a:endParaRPr lang="en-CA" sz="3000" dirty="0"/>
           </a:p>
         </p:txBody>
       </p:sp>
-      <mc:AlternateContent xmlns:mc="http://schemas.openxmlformats.org/markup-compatibility/2006">
-        <mc:Choice xmlns:a14="http://schemas.microsoft.com/office/drawing/2010/main" Requires="a14">
+      <mc:AlternateContent xmlns:mc="http://schemas.openxmlformats.org/markup-compatibility/2006" xmlns:a14="http://schemas.microsoft.com/office/drawing/2010/main">
+        <mc:Choice Requires="a14">
           <p:sp>
             <p:nvSpPr>
               <p:cNvPr id="3" name="Content Placeholder 2">
@@ -17114,7 +17201,7 @@
                 </a14:m>
                 <a:r>
                   <a:rPr lang="fr-CA" sz="1800" dirty="0"/>
-                  <a:t> où p est l’ordre de convergence. Il est donc possible de remarquer que cette méthode est beaucoup mieux adaptée pour analyser la convergence des éléments poutre. Les poutres utilisées par le logiciel Simcenter3D sont des éléments finis linéaire. Effectivement, elle ne possède pas de nœuds milieu permettant de prendre en compte la pente dans l’élément. </a:t>
+                  <a:t> où p est l’ordre de convergence. Il est donc possible de remarquer que cette méthode est beaucoup mieux adaptée pour analyser la convergence des éléments poutre. Les poutres utilisées par le logiciel Simcenter3D sont des éléments finis linéaires. Effectivement, elles ne possèdent pas de nœuds milieux permettant de prendre en compte la pente dans l’élément. </a:t>
                 </a:r>
               </a:p>
               <a:p>
@@ -17129,7 +17216,39 @@
                 </a:pPr>
                 <a:r>
                   <a:rPr lang="fr-CA" sz="1800" dirty="0"/>
-                  <a:t>Il est donc possible de remarquer que les éléments se comporte tel qu’attendu étant donné que l’erreur de déformation converge selon un ordre linéaire.</a:t>
+                  <a:t>Il est donc possible de remarquer que les éléments se comporte tel qu’attendu étant donné que l’erreur de déformation converge selon un ordre linéaire </a:t>
+                </a:r>
+                <a14:m>
+                  <m:oMath xmlns:m="http://schemas.openxmlformats.org/officeDocument/2006/math">
+                    <m:acc>
+                      <m:accPr>
+                        <m:chr m:val="̂"/>
+                        <m:ctrlPr>
+                          <a:rPr lang="en-CA" sz="1800" b="0" i="1" smtClean="0">
+                            <a:latin typeface="Cambria Math" panose="02040503050406030204" pitchFamily="18" charset="0"/>
+                          </a:rPr>
+                        </m:ctrlPr>
+                      </m:accPr>
+                      <m:e>
+                        <m:r>
+                          <a:rPr lang="en-CA" sz="1800" b="0" i="1" smtClean="0">
+                            <a:latin typeface="Cambria Math" panose="02040503050406030204" pitchFamily="18" charset="0"/>
+                          </a:rPr>
+                          <m:t>𝑝</m:t>
+                        </m:r>
+                      </m:e>
+                    </m:acc>
+                    <m:r>
+                      <a:rPr lang="en-CA" sz="1800" b="0" i="1" smtClean="0">
+                        <a:latin typeface="Cambria Math" panose="02040503050406030204" pitchFamily="18" charset="0"/>
+                      </a:rPr>
+                      <m:t>=1</m:t>
+                    </m:r>
+                  </m:oMath>
+                </a14:m>
+                <a:r>
+                  <a:rPr lang="fr-CA" sz="1800" dirty="0"/>
+                  <a:t>.</a:t>
                 </a:r>
               </a:p>
               <a:p>
@@ -17144,7 +17263,7 @@
                 </a:pPr>
                 <a:r>
                   <a:rPr lang="fr-CA" sz="1800" dirty="0"/>
-                  <a:t>De plus, la qualité de la régression vient ajouter de la validité à cette affirmation étant donné qu’elle est exactement de 1. Il est normal d’obtenir une telle régression étant donné que l’on utilise un logiciel commercial qui a dû être vérifié extensivement par Siemens.</a:t>
+                  <a:t>De plus, la qualité de la régression vient ajouter de la validité à cette affirmation étant donné qu’elle est exactement de R²=1. Il est normal d’obtenir une telle régression étant donné que l’on utilise un logiciel commercial qui a dû être vérifié extensivement par Siemens.</a:t>
                 </a:r>
               </a:p>
               <a:p>
@@ -17159,13 +17278,13 @@
                 </a:pPr>
                 <a:r>
                   <a:rPr lang="fr-CA" sz="1800" dirty="0"/>
-                  <a:t>Il est donc possible de conclure que le code résout correctement les formulations mathématiques utilisé pour définir les éléments poutre.</a:t>
+                  <a:t>Il est donc possible de conclure que le code résout correctement les formulations mathématiques utilisées pour définir les éléments poutre.</a:t>
                 </a:r>
               </a:p>
             </p:txBody>
           </p:sp>
         </mc:Choice>
-        <mc:Fallback>
+        <mc:Fallback xmlns="">
           <p:sp>
             <p:nvSpPr>
               <p:cNvPr id="3" name="Content Placeholder 2">
@@ -17209,6 +17328,89 @@
           </p:sp>
         </mc:Fallback>
       </mc:AlternateContent>
+      <p:sp>
+        <p:nvSpPr>
+          <p:cNvPr id="5" name="Slide Number Placeholder 4">
+            <a:extLst>
+              <a:ext uri="{FF2B5EF4-FFF2-40B4-BE49-F238E27FC236}">
+                <a16:creationId xmlns:a16="http://schemas.microsoft.com/office/drawing/2014/main" id="{212F9EB7-5C44-4FE9-1B5E-021AAFF119D8}"/>
+              </a:ext>
+            </a:extLst>
+          </p:cNvPr>
+          <p:cNvSpPr>
+            <a:spLocks noGrp="1"/>
+          </p:cNvSpPr>
+          <p:nvPr>
+            <p:ph type="sldNum" sz="quarter" idx="12"/>
+          </p:nvPr>
+        </p:nvSpPr>
+        <p:spPr/>
+        <p:txBody>
+          <a:bodyPr/>
+          <a:lstStyle/>
+          <a:p>
+            <a:fld id="{4BD3201E-7DF8-462B-AC18-61E63795AE0D}" type="slidenum">
+              <a:rPr lang="en-CA" smtClean="0"/>
+              <a:t>14</a:t>
+            </a:fld>
+            <a:endParaRPr lang="en-CA"/>
+          </a:p>
+        </p:txBody>
+      </p:sp>
+      <p:sp>
+        <p:nvSpPr>
+          <p:cNvPr id="4" name="Rectangle 3">
+            <a:extLst>
+              <a:ext uri="{FF2B5EF4-FFF2-40B4-BE49-F238E27FC236}">
+                <a16:creationId xmlns:a16="http://schemas.microsoft.com/office/drawing/2014/main" id="{3FCA21F0-3EF8-A580-58A8-28C04ECA4600}"/>
+              </a:ext>
+            </a:extLst>
+          </p:cNvPr>
+          <p:cNvSpPr/>
+          <p:nvPr/>
+        </p:nvSpPr>
+        <p:spPr>
+          <a:xfrm>
+            <a:off x="0" y="365125"/>
+            <a:ext cx="678427" cy="556649"/>
+          </a:xfrm>
+          <a:prstGeom prst="rect">
+            <a:avLst/>
+          </a:prstGeom>
+          <a:solidFill>
+            <a:schemeClr val="accent2">
+              <a:lumMod val="75000"/>
+            </a:schemeClr>
+          </a:solidFill>
+          <a:ln>
+            <a:noFill/>
+          </a:ln>
+        </p:spPr>
+        <p:style>
+          <a:lnRef idx="2">
+            <a:schemeClr val="accent1">
+              <a:shade val="15000"/>
+            </a:schemeClr>
+          </a:lnRef>
+          <a:fillRef idx="1">
+            <a:schemeClr val="accent1"/>
+          </a:fillRef>
+          <a:effectRef idx="0">
+            <a:schemeClr val="accent1"/>
+          </a:effectRef>
+          <a:fontRef idx="minor">
+            <a:schemeClr val="lt1"/>
+          </a:fontRef>
+        </p:style>
+        <p:txBody>
+          <a:bodyPr rtlCol="0" anchor="ctr"/>
+          <a:lstStyle/>
+          <a:p>
+            <a:pPr algn="ctr"/>
+            <a:endParaRPr lang="en-CA"/>
+          </a:p>
+        </p:txBody>
+      </p:sp>
     </p:spTree>
     <p:extLst>
       <p:ext uri="{BB962C8B-B14F-4D97-AF65-F5344CB8AC3E}">
@@ -17726,12 +17928,15 @@
                         </m:r>
                       </m:e>
                     </m:acc>
+                    <m:r>
+                      <a:rPr lang="en-CA" sz="1800" b="0" i="1" smtClean="0">
+                        <a:latin typeface="Cambria Math" panose="02040503050406030204" pitchFamily="18" charset="0"/>
+                      </a:rPr>
+                      <m:t>=2.055</m:t>
+                    </m:r>
                   </m:oMath>
                 </a14:m>
-                <a:r>
-                  <a:rPr lang="fr-CA" sz="1800" dirty="0"/>
-                  <a:t>= 2,055.</a:t>
-                </a:r>
+                <a:endParaRPr lang="fr-CA" sz="1800" dirty="0"/>
               </a:p>
               <a:p>
                 <a:pPr marL="0" indent="0" algn="just">
@@ -17798,23 +18003,36 @@
                   <a:rPr lang="fr-CA" sz="1800" dirty="0"/>
                   <a:t>					</a:t>
                 </a:r>
+              </a:p>
+              <a:p>
+                <a:pPr marL="0" indent="0" algn="just">
+                  <a:lnSpc>
+                    <a:spcPct val="100000"/>
+                  </a:lnSpc>
+                  <a:buNone/>
+                </a:pPr>
+                <a:endParaRPr lang="fr-CA" sz="1800" dirty="0"/>
+              </a:p>
+              <a:p>
+                <a:pPr marL="0" indent="0" algn="just">
+                  <a:lnSpc>
+                    <a:spcPct val="100000"/>
+                  </a:lnSpc>
+                  <a:buNone/>
+                </a:pPr>
                 <a:r>
-                  <a:rPr lang="fr-CA" sz="1800" dirty="0">
-                    <a:highlight>
-                      <a:srgbClr val="FFFF00"/>
-                    </a:highlight>
-                  </a:rPr>
-                  <a:t>(l’ordre formel est obtenu d’après l’ordre du type 							d’éléments utilisés en FEM – or ici les PBEAM sont des 						éléments d’ordre 2).</a:t>
+                  <a:rPr lang="fr-CA" sz="1800" dirty="0"/>
+                  <a:t>h</a:t>
                 </a:r>
               </a:p>
               <a:p>
                 <a:pPr marL="0" indent="0" algn="just">
+                  <a:lnSpc>
+                    <a:spcPct val="100000"/>
+                  </a:lnSpc>
                   <a:buNone/>
                 </a:pPr>
-                <a:r>
-                  <a:rPr lang="fr-CA" sz="1800" dirty="0"/>
-                  <a:t>                                                                                        </a:t>
-                </a:r>
+                <a:endParaRPr lang="fr-CA" sz="1800" dirty="0"/>
               </a:p>
             </p:txBody>
           </p:sp>
@@ -17842,7 +18060,7 @@
                 <a:ext cx="10515600" cy="5342501"/>
               </a:xfrm>
               <a:blipFill>
-                <a:blip r:embed="rId3"/>
+                <a:blip r:embed="rId2"/>
                 <a:stretch>
                   <a:fillRect l="-406" t="-342" r="-348"/>
                 </a:stretch>
@@ -17853,7 +18071,7 @@
               <a:lstStyle/>
               <a:p>
                 <a:r>
-                  <a:rPr lang="fr-FR">
+                  <a:rPr lang="en-CA">
                     <a:noFill/>
                   </a:rPr>
                   <a:t> </a:t>
@@ -18250,6 +18468,87 @@
           </a:p>
         </p:txBody>
       </p:sp>
+      <p:sp>
+        <p:nvSpPr>
+          <p:cNvPr id="7" name="Slide Number Placeholder 6">
+            <a:extLst>
+              <a:ext uri="{FF2B5EF4-FFF2-40B4-BE49-F238E27FC236}">
+                <a16:creationId xmlns:a16="http://schemas.microsoft.com/office/drawing/2014/main" id="{DD148BCD-C241-BB2E-E9AD-C1F06CCEAA7D}"/>
+              </a:ext>
+            </a:extLst>
+          </p:cNvPr>
+          <p:cNvSpPr>
+            <a:spLocks noGrp="1"/>
+          </p:cNvSpPr>
+          <p:nvPr>
+            <p:ph type="sldNum" sz="quarter" idx="12"/>
+          </p:nvPr>
+        </p:nvSpPr>
+        <p:spPr/>
+        <p:txBody>
+          <a:bodyPr/>
+          <a:lstStyle/>
+          <a:p>
+            <a:fld id="{4BD3201E-7DF8-462B-AC18-61E63795AE0D}" type="slidenum">
+              <a:rPr lang="en-CA" smtClean="0"/>
+              <a:t>15</a:t>
+            </a:fld>
+            <a:endParaRPr lang="en-CA"/>
+          </a:p>
+        </p:txBody>
+      </p:sp>
+      <p:sp>
+        <p:nvSpPr>
+          <p:cNvPr id="8" name="Rectangle 7">
+            <a:extLst>
+              <a:ext uri="{FF2B5EF4-FFF2-40B4-BE49-F238E27FC236}">
+                <a16:creationId xmlns:a16="http://schemas.microsoft.com/office/drawing/2014/main" id="{82B54652-20EC-AFF4-D07D-253BEB78361C}"/>
+              </a:ext>
+            </a:extLst>
+          </p:cNvPr>
+          <p:cNvSpPr/>
+          <p:nvPr/>
+        </p:nvSpPr>
+        <p:spPr>
+          <a:xfrm>
+            <a:off x="0" y="365125"/>
+            <a:ext cx="678427" cy="556649"/>
+          </a:xfrm>
+          <a:prstGeom prst="rect">
+            <a:avLst/>
+          </a:prstGeom>
+          <a:solidFill>
+            <a:schemeClr val="accent5"/>
+          </a:solidFill>
+          <a:ln>
+            <a:noFill/>
+          </a:ln>
+        </p:spPr>
+        <p:style>
+          <a:lnRef idx="2">
+            <a:schemeClr val="accent1">
+              <a:shade val="15000"/>
+            </a:schemeClr>
+          </a:lnRef>
+          <a:fillRef idx="1">
+            <a:schemeClr val="accent1"/>
+          </a:fillRef>
+          <a:effectRef idx="0">
+            <a:schemeClr val="accent1"/>
+          </a:effectRef>
+          <a:fontRef idx="minor">
+            <a:schemeClr val="lt1"/>
+          </a:fontRef>
+        </p:style>
+        <p:txBody>
+          <a:bodyPr rtlCol="0" anchor="ctr"/>
+          <a:lstStyle/>
+          <a:p>
+            <a:pPr algn="ctr"/>
+            <a:endParaRPr lang="en-CA"/>
+          </a:p>
+        </p:txBody>
+      </p:sp>
     </p:spTree>
     <p:extLst>
       <p:ext uri="{BB962C8B-B14F-4D97-AF65-F5344CB8AC3E}">
@@ -18260,11 +18559,6 @@
   <p:clrMapOvr>
     <a:masterClrMapping/>
   </p:clrMapOvr>
-  <p:extLst>
-    <p:ext uri="{6950BFC3-D8DA-4A85-94F7-54DA5524770B}">
-      <p188:commentRel xmlns:p188="http://schemas.microsoft.com/office/powerpoint/2018/8/main" r:id="rId2"/>
-    </p:ext>
-  </p:extLst>
 </p:sld>
 </file>
 
@@ -19266,6 +19560,87 @@
           </p:sp>
         </mc:Fallback>
       </mc:AlternateContent>
+      <p:sp>
+        <p:nvSpPr>
+          <p:cNvPr id="5" name="Slide Number Placeholder 4">
+            <a:extLst>
+              <a:ext uri="{FF2B5EF4-FFF2-40B4-BE49-F238E27FC236}">
+                <a16:creationId xmlns:a16="http://schemas.microsoft.com/office/drawing/2014/main" id="{1AA84267-AC5A-1C68-8A3C-87E1592EE454}"/>
+              </a:ext>
+            </a:extLst>
+          </p:cNvPr>
+          <p:cNvSpPr>
+            <a:spLocks noGrp="1"/>
+          </p:cNvSpPr>
+          <p:nvPr>
+            <p:ph type="sldNum" sz="quarter" idx="12"/>
+          </p:nvPr>
+        </p:nvSpPr>
+        <p:spPr/>
+        <p:txBody>
+          <a:bodyPr/>
+          <a:lstStyle/>
+          <a:p>
+            <a:fld id="{4BD3201E-7DF8-462B-AC18-61E63795AE0D}" type="slidenum">
+              <a:rPr lang="en-CA" smtClean="0"/>
+              <a:t>16</a:t>
+            </a:fld>
+            <a:endParaRPr lang="en-CA"/>
+          </a:p>
+        </p:txBody>
+      </p:sp>
+      <p:sp>
+        <p:nvSpPr>
+          <p:cNvPr id="4" name="Rectangle 3">
+            <a:extLst>
+              <a:ext uri="{FF2B5EF4-FFF2-40B4-BE49-F238E27FC236}">
+                <a16:creationId xmlns:a16="http://schemas.microsoft.com/office/drawing/2014/main" id="{AACD4DC8-3AB0-24BE-F53B-C9C09D574F2C}"/>
+              </a:ext>
+            </a:extLst>
+          </p:cNvPr>
+          <p:cNvSpPr/>
+          <p:nvPr/>
+        </p:nvSpPr>
+        <p:spPr>
+          <a:xfrm>
+            <a:off x="0" y="365125"/>
+            <a:ext cx="678427" cy="556649"/>
+          </a:xfrm>
+          <a:prstGeom prst="rect">
+            <a:avLst/>
+          </a:prstGeom>
+          <a:solidFill>
+            <a:schemeClr val="accent5"/>
+          </a:solidFill>
+          <a:ln>
+            <a:noFill/>
+          </a:ln>
+        </p:spPr>
+        <p:style>
+          <a:lnRef idx="2">
+            <a:schemeClr val="accent1">
+              <a:shade val="15000"/>
+            </a:schemeClr>
+          </a:lnRef>
+          <a:fillRef idx="1">
+            <a:schemeClr val="accent1"/>
+          </a:fillRef>
+          <a:effectRef idx="0">
+            <a:schemeClr val="accent1"/>
+          </a:effectRef>
+          <a:fontRef idx="minor">
+            <a:schemeClr val="lt1"/>
+          </a:fontRef>
+        </p:style>
+        <p:txBody>
+          <a:bodyPr rtlCol="0" anchor="ctr"/>
+          <a:lstStyle/>
+          <a:p>
+            <a:pPr algn="ctr"/>
+            <a:endParaRPr lang="en-CA"/>
+          </a:p>
+        </p:txBody>
+      </p:sp>
     </p:spTree>
     <p:extLst>
       <p:ext uri="{BB962C8B-B14F-4D97-AF65-F5344CB8AC3E}">
@@ -19657,6 +20032,84 @@
           </p:sp>
         </mc:Fallback>
       </mc:AlternateContent>
+      <p:sp>
+        <p:nvSpPr>
+          <p:cNvPr id="5" name="Slide Number Placeholder 4">
+            <a:extLst>
+              <a:ext uri="{FF2B5EF4-FFF2-40B4-BE49-F238E27FC236}">
+                <a16:creationId xmlns:a16="http://schemas.microsoft.com/office/drawing/2014/main" id="{C8650017-5619-589C-654E-C76AC441D7EF}"/>
+              </a:ext>
+            </a:extLst>
+          </p:cNvPr>
+          <p:cNvSpPr>
+            <a:spLocks noGrp="1"/>
+          </p:cNvSpPr>
+          <p:nvPr>
+            <p:ph type="sldNum" sz="quarter" idx="12"/>
+          </p:nvPr>
+        </p:nvSpPr>
+        <p:spPr/>
+        <p:txBody>
+          <a:bodyPr/>
+          <a:lstStyle/>
+          <a:p>
+            <a:fld id="{4BD3201E-7DF8-462B-AC18-61E63795AE0D}" type="slidenum">
+              <a:rPr lang="en-CA" smtClean="0"/>
+              <a:t>17</a:t>
+            </a:fld>
+            <a:endParaRPr lang="en-CA"/>
+          </a:p>
+        </p:txBody>
+      </p:sp>
+      <p:sp>
+        <p:nvSpPr>
+          <p:cNvPr id="4" name="Rectangle 3">
+            <a:extLst>
+              <a:ext uri="{FF2B5EF4-FFF2-40B4-BE49-F238E27FC236}">
+                <a16:creationId xmlns:a16="http://schemas.microsoft.com/office/drawing/2014/main" id="{C6162948-1810-85BB-22E9-A5D9B9F6D4A7}"/>
+              </a:ext>
+            </a:extLst>
+          </p:cNvPr>
+          <p:cNvSpPr/>
+          <p:nvPr/>
+        </p:nvSpPr>
+        <p:spPr>
+          <a:xfrm>
+            <a:off x="0" y="365125"/>
+            <a:ext cx="678427" cy="556649"/>
+          </a:xfrm>
+          <a:prstGeom prst="rect">
+            <a:avLst/>
+          </a:prstGeom>
+          <a:ln>
+            <a:noFill/>
+          </a:ln>
+        </p:spPr>
+        <p:style>
+          <a:lnRef idx="2">
+            <a:schemeClr val="accent1">
+              <a:shade val="15000"/>
+            </a:schemeClr>
+          </a:lnRef>
+          <a:fillRef idx="1">
+            <a:schemeClr val="accent1"/>
+          </a:fillRef>
+          <a:effectRef idx="0">
+            <a:schemeClr val="accent1"/>
+          </a:effectRef>
+          <a:fontRef idx="minor">
+            <a:schemeClr val="lt1"/>
+          </a:fontRef>
+        </p:style>
+        <p:txBody>
+          <a:bodyPr rtlCol="0" anchor="ctr"/>
+          <a:lstStyle/>
+          <a:p>
+            <a:pPr algn="ctr"/>
+            <a:endParaRPr lang="en-CA"/>
+          </a:p>
+        </p:txBody>
+      </p:sp>
     </p:spTree>
     <p:extLst>
       <p:ext uri="{BB962C8B-B14F-4D97-AF65-F5344CB8AC3E}">
@@ -19924,6 +20377,84 @@
           </a:graphicData>
         </a:graphic>
       </p:graphicFrame>
+      <p:sp>
+        <p:nvSpPr>
+          <p:cNvPr id="7" name="Slide Number Placeholder 6">
+            <a:extLst>
+              <a:ext uri="{FF2B5EF4-FFF2-40B4-BE49-F238E27FC236}">
+                <a16:creationId xmlns:a16="http://schemas.microsoft.com/office/drawing/2014/main" id="{711FE1AE-3B4C-153A-C1BB-9CD43A0DCB44}"/>
+              </a:ext>
+            </a:extLst>
+          </p:cNvPr>
+          <p:cNvSpPr>
+            <a:spLocks noGrp="1"/>
+          </p:cNvSpPr>
+          <p:nvPr>
+            <p:ph type="sldNum" sz="quarter" idx="12"/>
+          </p:nvPr>
+        </p:nvSpPr>
+        <p:spPr/>
+        <p:txBody>
+          <a:bodyPr/>
+          <a:lstStyle/>
+          <a:p>
+            <a:fld id="{4BD3201E-7DF8-462B-AC18-61E63795AE0D}" type="slidenum">
+              <a:rPr lang="en-CA" smtClean="0"/>
+              <a:t>18</a:t>
+            </a:fld>
+            <a:endParaRPr lang="en-CA"/>
+          </a:p>
+        </p:txBody>
+      </p:sp>
+      <p:sp>
+        <p:nvSpPr>
+          <p:cNvPr id="4" name="Rectangle 3">
+            <a:extLst>
+              <a:ext uri="{FF2B5EF4-FFF2-40B4-BE49-F238E27FC236}">
+                <a16:creationId xmlns:a16="http://schemas.microsoft.com/office/drawing/2014/main" id="{D2059B86-05EF-7F4E-CA23-5A114F6DB1CB}"/>
+              </a:ext>
+            </a:extLst>
+          </p:cNvPr>
+          <p:cNvSpPr/>
+          <p:nvPr/>
+        </p:nvSpPr>
+        <p:spPr>
+          <a:xfrm>
+            <a:off x="0" y="365125"/>
+            <a:ext cx="678427" cy="556649"/>
+          </a:xfrm>
+          <a:prstGeom prst="rect">
+            <a:avLst/>
+          </a:prstGeom>
+          <a:ln>
+            <a:noFill/>
+          </a:ln>
+        </p:spPr>
+        <p:style>
+          <a:lnRef idx="2">
+            <a:schemeClr val="accent1">
+              <a:shade val="15000"/>
+            </a:schemeClr>
+          </a:lnRef>
+          <a:fillRef idx="1">
+            <a:schemeClr val="accent1"/>
+          </a:fillRef>
+          <a:effectRef idx="0">
+            <a:schemeClr val="accent1"/>
+          </a:effectRef>
+          <a:fontRef idx="minor">
+            <a:schemeClr val="lt1"/>
+          </a:fontRef>
+        </p:style>
+        <p:txBody>
+          <a:bodyPr rtlCol="0" anchor="ctr"/>
+          <a:lstStyle/>
+          <a:p>
+            <a:pPr algn="ctr"/>
+            <a:endParaRPr lang="en-CA"/>
+          </a:p>
+        </p:txBody>
+      </p:sp>
     </p:spTree>
     <p:extLst>
       <p:ext uri="{BB962C8B-B14F-4D97-AF65-F5344CB8AC3E}">
@@ -20237,6 +20768,84 @@
           </a:p>
         </p:txBody>
       </p:sp>
+      <p:sp>
+        <p:nvSpPr>
+          <p:cNvPr id="9" name="Slide Number Placeholder 8">
+            <a:extLst>
+              <a:ext uri="{FF2B5EF4-FFF2-40B4-BE49-F238E27FC236}">
+                <a16:creationId xmlns:a16="http://schemas.microsoft.com/office/drawing/2014/main" id="{0F15210A-0CDF-0DE2-1E9C-BAAC3450F38B}"/>
+              </a:ext>
+            </a:extLst>
+          </p:cNvPr>
+          <p:cNvSpPr>
+            <a:spLocks noGrp="1"/>
+          </p:cNvSpPr>
+          <p:nvPr>
+            <p:ph type="sldNum" sz="quarter" idx="12"/>
+          </p:nvPr>
+        </p:nvSpPr>
+        <p:spPr/>
+        <p:txBody>
+          <a:bodyPr/>
+          <a:lstStyle/>
+          <a:p>
+            <a:fld id="{4BD3201E-7DF8-462B-AC18-61E63795AE0D}" type="slidenum">
+              <a:rPr lang="en-CA" smtClean="0"/>
+              <a:t>19</a:t>
+            </a:fld>
+            <a:endParaRPr lang="en-CA"/>
+          </a:p>
+        </p:txBody>
+      </p:sp>
+      <p:sp>
+        <p:nvSpPr>
+          <p:cNvPr id="8" name="Rectangle 7">
+            <a:extLst>
+              <a:ext uri="{FF2B5EF4-FFF2-40B4-BE49-F238E27FC236}">
+                <a16:creationId xmlns:a16="http://schemas.microsoft.com/office/drawing/2014/main" id="{FB62AE11-F5D2-8B5F-C7BD-2995DC6C76B0}"/>
+              </a:ext>
+            </a:extLst>
+          </p:cNvPr>
+          <p:cNvSpPr/>
+          <p:nvPr/>
+        </p:nvSpPr>
+        <p:spPr>
+          <a:xfrm>
+            <a:off x="0" y="365125"/>
+            <a:ext cx="678427" cy="556649"/>
+          </a:xfrm>
+          <a:prstGeom prst="rect">
+            <a:avLst/>
+          </a:prstGeom>
+          <a:ln>
+            <a:noFill/>
+          </a:ln>
+        </p:spPr>
+        <p:style>
+          <a:lnRef idx="2">
+            <a:schemeClr val="accent1">
+              <a:shade val="15000"/>
+            </a:schemeClr>
+          </a:lnRef>
+          <a:fillRef idx="1">
+            <a:schemeClr val="accent1"/>
+          </a:fillRef>
+          <a:effectRef idx="0">
+            <a:schemeClr val="accent1"/>
+          </a:effectRef>
+          <a:fontRef idx="minor">
+            <a:schemeClr val="lt1"/>
+          </a:fontRef>
+        </p:style>
+        <p:txBody>
+          <a:bodyPr rtlCol="0" anchor="ctr"/>
+          <a:lstStyle/>
+          <a:p>
+            <a:pPr algn="ctr"/>
+            <a:endParaRPr lang="en-CA"/>
+          </a:p>
+        </p:txBody>
+      </p:sp>
     </p:spTree>
     <p:extLst>
       <p:ext uri="{BB962C8B-B14F-4D97-AF65-F5344CB8AC3E}">
@@ -20522,6 +21131,87 @@
               <a:t>Introduction et mise en contexte</a:t>
             </a:r>
             <a:endParaRPr lang="en-CA" sz="3000" dirty="0"/>
+          </a:p>
+        </p:txBody>
+      </p:sp>
+      <p:sp>
+        <p:nvSpPr>
+          <p:cNvPr id="4" name="Slide Number Placeholder 3">
+            <a:extLst>
+              <a:ext uri="{FF2B5EF4-FFF2-40B4-BE49-F238E27FC236}">
+                <a16:creationId xmlns:a16="http://schemas.microsoft.com/office/drawing/2014/main" id="{DADD488D-5AB2-D172-10C4-9D5B2F1CCA21}"/>
+              </a:ext>
+            </a:extLst>
+          </p:cNvPr>
+          <p:cNvSpPr>
+            <a:spLocks noGrp="1"/>
+          </p:cNvSpPr>
+          <p:nvPr>
+            <p:ph type="sldNum" sz="quarter" idx="12"/>
+          </p:nvPr>
+        </p:nvSpPr>
+        <p:spPr/>
+        <p:txBody>
+          <a:bodyPr/>
+          <a:lstStyle/>
+          <a:p>
+            <a:fld id="{4BD3201E-7DF8-462B-AC18-61E63795AE0D}" type="slidenum">
+              <a:rPr lang="en-CA" smtClean="0"/>
+              <a:t>2</a:t>
+            </a:fld>
+            <a:endParaRPr lang="en-CA"/>
+          </a:p>
+        </p:txBody>
+      </p:sp>
+      <p:sp>
+        <p:nvSpPr>
+          <p:cNvPr id="2" name="Rectangle 1">
+            <a:extLst>
+              <a:ext uri="{FF2B5EF4-FFF2-40B4-BE49-F238E27FC236}">
+                <a16:creationId xmlns:a16="http://schemas.microsoft.com/office/drawing/2014/main" id="{026E126C-8AC9-1FA2-80F5-9075AEE896A7}"/>
+              </a:ext>
+            </a:extLst>
+          </p:cNvPr>
+          <p:cNvSpPr/>
+          <p:nvPr/>
+        </p:nvSpPr>
+        <p:spPr>
+          <a:xfrm>
+            <a:off x="0" y="365125"/>
+            <a:ext cx="678427" cy="556649"/>
+          </a:xfrm>
+          <a:prstGeom prst="rect">
+            <a:avLst/>
+          </a:prstGeom>
+          <a:solidFill>
+            <a:schemeClr val="accent6"/>
+          </a:solidFill>
+          <a:ln>
+            <a:noFill/>
+          </a:ln>
+        </p:spPr>
+        <p:style>
+          <a:lnRef idx="2">
+            <a:schemeClr val="accent1">
+              <a:shade val="15000"/>
+            </a:schemeClr>
+          </a:lnRef>
+          <a:fillRef idx="1">
+            <a:schemeClr val="accent1"/>
+          </a:fillRef>
+          <a:effectRef idx="0">
+            <a:schemeClr val="accent1"/>
+          </a:effectRef>
+          <a:fontRef idx="minor">
+            <a:schemeClr val="lt1"/>
+          </a:fontRef>
+        </p:style>
+        <p:txBody>
+          <a:bodyPr rtlCol="0" anchor="ctr"/>
+          <a:lstStyle/>
+          <a:p>
+            <a:pPr algn="ctr"/>
+            <a:endParaRPr lang="en-CA"/>
           </a:p>
         </p:txBody>
       </p:sp>
@@ -20694,10 +21384,10 @@
                       </m:sSubPr>
                       <m:e>
                         <m:r>
-                          <a:rPr lang="fr-FR" sz="1600" i="1" smtClean="0">
+                          <a:rPr lang="en-CA" sz="1600" b="0" i="1" smtClean="0">
                             <a:latin typeface="Cambria Math" panose="02040503050406030204" pitchFamily="18" charset="0"/>
                           </a:rPr>
-                          <m:t>𝑈</m:t>
+                          <m:t>𝑢</m:t>
                         </m:r>
                       </m:e>
                       <m:sub>
@@ -21268,6 +21958,84 @@
           </p:sp>
         </mc:Fallback>
       </mc:AlternateContent>
+      <p:sp>
+        <p:nvSpPr>
+          <p:cNvPr id="5" name="Slide Number Placeholder 4">
+            <a:extLst>
+              <a:ext uri="{FF2B5EF4-FFF2-40B4-BE49-F238E27FC236}">
+                <a16:creationId xmlns:a16="http://schemas.microsoft.com/office/drawing/2014/main" id="{9DA74A6D-9267-4A22-E27F-E31B47CF2221}"/>
+              </a:ext>
+            </a:extLst>
+          </p:cNvPr>
+          <p:cNvSpPr>
+            <a:spLocks noGrp="1"/>
+          </p:cNvSpPr>
+          <p:nvPr>
+            <p:ph type="sldNum" sz="quarter" idx="12"/>
+          </p:nvPr>
+        </p:nvSpPr>
+        <p:spPr/>
+        <p:txBody>
+          <a:bodyPr/>
+          <a:lstStyle/>
+          <a:p>
+            <a:fld id="{4BD3201E-7DF8-462B-AC18-61E63795AE0D}" type="slidenum">
+              <a:rPr lang="en-CA" smtClean="0"/>
+              <a:t>20</a:t>
+            </a:fld>
+            <a:endParaRPr lang="en-CA"/>
+          </a:p>
+        </p:txBody>
+      </p:sp>
+      <p:sp>
+        <p:nvSpPr>
+          <p:cNvPr id="4" name="Rectangle 3">
+            <a:extLst>
+              <a:ext uri="{FF2B5EF4-FFF2-40B4-BE49-F238E27FC236}">
+                <a16:creationId xmlns:a16="http://schemas.microsoft.com/office/drawing/2014/main" id="{AB6B6D6F-627F-6A22-B742-4796E38ADDB5}"/>
+              </a:ext>
+            </a:extLst>
+          </p:cNvPr>
+          <p:cNvSpPr/>
+          <p:nvPr/>
+        </p:nvSpPr>
+        <p:spPr>
+          <a:xfrm>
+            <a:off x="0" y="365125"/>
+            <a:ext cx="678427" cy="556649"/>
+          </a:xfrm>
+          <a:prstGeom prst="rect">
+            <a:avLst/>
+          </a:prstGeom>
+          <a:ln>
+            <a:noFill/>
+          </a:ln>
+        </p:spPr>
+        <p:style>
+          <a:lnRef idx="2">
+            <a:schemeClr val="accent1">
+              <a:shade val="15000"/>
+            </a:schemeClr>
+          </a:lnRef>
+          <a:fillRef idx="1">
+            <a:schemeClr val="accent1"/>
+          </a:fillRef>
+          <a:effectRef idx="0">
+            <a:schemeClr val="accent1"/>
+          </a:effectRef>
+          <a:fontRef idx="minor">
+            <a:schemeClr val="lt1"/>
+          </a:fontRef>
+        </p:style>
+        <p:txBody>
+          <a:bodyPr rtlCol="0" anchor="ctr"/>
+          <a:lstStyle/>
+          <a:p>
+            <a:pPr algn="ctr"/>
+            <a:endParaRPr lang="en-CA"/>
+          </a:p>
+        </p:txBody>
+      </p:sp>
     </p:spTree>
     <p:extLst>
       <p:ext uri="{BB962C8B-B14F-4D97-AF65-F5344CB8AC3E}">
@@ -21854,7 +22622,7 @@
                 </a:r>
                 <a:r>
                   <a:rPr lang="fr-FR" sz="1600" dirty="0"/>
-                  <a:t> pour F=150N on mesure un déplacement D = 17.86 mm au niveau de la vertèbre L1 (voir trait vert sur la fig. 8). Ce qui se traduit par une incertitude de ± 0.01786 </a:t>
+                  <a:t> pour F=150N on mesure un déplacement D = 17.86 mm au niveau de la vertèbre L1 (voir trait vert sur la fig.9). Ce qui se traduit par une incertitude de ± 0.01786 </a:t>
                 </a:r>
                 <a:r>
                   <a:rPr lang="fr-FR" sz="1600" dirty="0" err="1"/>
@@ -22076,7 +22844,7 @@
                 <a:ext cx="6042283" cy="5427407"/>
               </a:xfrm>
               <a:blipFill>
-                <a:blip r:embed="rId3"/>
+                <a:blip r:embed="rId2"/>
                 <a:stretch>
                   <a:fillRect l="-605" t="-337" r="-505"/>
                 </a:stretch>
@@ -22112,7 +22880,7 @@
           <p:nvPr/>
         </p:nvPicPr>
         <p:blipFill rotWithShape="1">
-          <a:blip r:embed="rId4">
+          <a:blip r:embed="rId3">
             <a:extLst>
               <a:ext uri="{28A0092B-C50C-407E-A947-70E740481C1C}">
                 <a14:useLocalDpi xmlns:a14="http://schemas.microsoft.com/office/drawing/2010/main" val="0"/>
@@ -22534,6 +23302,84 @@
           </p:sp>
         </mc:Fallback>
       </mc:AlternateContent>
+      <p:sp>
+        <p:nvSpPr>
+          <p:cNvPr id="7" name="Slide Number Placeholder 6">
+            <a:extLst>
+              <a:ext uri="{FF2B5EF4-FFF2-40B4-BE49-F238E27FC236}">
+                <a16:creationId xmlns:a16="http://schemas.microsoft.com/office/drawing/2014/main" id="{491FC1DB-91C1-B770-677B-778C6EC4EDAB}"/>
+              </a:ext>
+            </a:extLst>
+          </p:cNvPr>
+          <p:cNvSpPr>
+            <a:spLocks noGrp="1"/>
+          </p:cNvSpPr>
+          <p:nvPr>
+            <p:ph type="sldNum" sz="quarter" idx="12"/>
+          </p:nvPr>
+        </p:nvSpPr>
+        <p:spPr/>
+        <p:txBody>
+          <a:bodyPr/>
+          <a:lstStyle/>
+          <a:p>
+            <a:fld id="{4BD3201E-7DF8-462B-AC18-61E63795AE0D}" type="slidenum">
+              <a:rPr lang="en-CA" smtClean="0"/>
+              <a:t>21</a:t>
+            </a:fld>
+            <a:endParaRPr lang="en-CA"/>
+          </a:p>
+        </p:txBody>
+      </p:sp>
+      <p:sp>
+        <p:nvSpPr>
+          <p:cNvPr id="4" name="Rectangle 3">
+            <a:extLst>
+              <a:ext uri="{FF2B5EF4-FFF2-40B4-BE49-F238E27FC236}">
+                <a16:creationId xmlns:a16="http://schemas.microsoft.com/office/drawing/2014/main" id="{8D04AFA7-E406-9EF6-FFE8-57224C2858E7}"/>
+              </a:ext>
+            </a:extLst>
+          </p:cNvPr>
+          <p:cNvSpPr/>
+          <p:nvPr/>
+        </p:nvSpPr>
+        <p:spPr>
+          <a:xfrm>
+            <a:off x="0" y="365125"/>
+            <a:ext cx="678427" cy="556649"/>
+          </a:xfrm>
+          <a:prstGeom prst="rect">
+            <a:avLst/>
+          </a:prstGeom>
+          <a:ln>
+            <a:noFill/>
+          </a:ln>
+        </p:spPr>
+        <p:style>
+          <a:lnRef idx="2">
+            <a:schemeClr val="accent1">
+              <a:shade val="15000"/>
+            </a:schemeClr>
+          </a:lnRef>
+          <a:fillRef idx="1">
+            <a:schemeClr val="accent1"/>
+          </a:fillRef>
+          <a:effectRef idx="0">
+            <a:schemeClr val="accent1"/>
+          </a:effectRef>
+          <a:fontRef idx="minor">
+            <a:schemeClr val="lt1"/>
+          </a:fontRef>
+        </p:style>
+        <p:txBody>
+          <a:bodyPr rtlCol="0" anchor="ctr"/>
+          <a:lstStyle/>
+          <a:p>
+            <a:pPr algn="ctr"/>
+            <a:endParaRPr lang="en-CA"/>
+          </a:p>
+        </p:txBody>
+      </p:sp>
     </p:spTree>
     <p:extLst>
       <p:ext uri="{BB962C8B-B14F-4D97-AF65-F5344CB8AC3E}">
@@ -22544,11 +23390,6 @@
   <p:clrMapOvr>
     <a:masterClrMapping/>
   </p:clrMapOvr>
-  <p:extLst>
-    <p:ext uri="{6950BFC3-D8DA-4A85-94F7-54DA5524770B}">
-      <p188:commentRel xmlns:p188="http://schemas.microsoft.com/office/powerpoint/2018/8/main" r:id="rId2"/>
-    </p:ext>
-  </p:extLst>
 </p:sld>
 </file>
 
@@ -22675,7 +23516,7 @@
                 </a:pPr>
                 <a:r>
                   <a:rPr lang="fr-FR" sz="1700" dirty="0"/>
-                  <a:t>On compare le résultat « S » du déplacement postérieur à L1 obtenu par simulation pour F=150N, avec la valeur expérimentale « D » du déplacement mesurée à cette même force (voir fig. 8-page précédente), d’où l’erreur de simulation E:</a:t>
+                  <a:t>On compare le résultat « S » du déplacement postérieur à L1 obtenu par simulation pour F=150N, avec la valeur expérimentale « D » du déplacement mesurée à cette même force (voir fig.9-page précédente), d’où l’erreur de simulation E présentée au tableau 5:</a:t>
                 </a:r>
               </a:p>
               <a:p>
@@ -24003,7 +24844,7 @@
         <p:spPr>
           <a:xfrm>
             <a:off x="8621604" y="6191934"/>
-            <a:ext cx="3233982" cy="523220"/>
+            <a:ext cx="3334422" cy="307777"/>
           </a:xfrm>
           <a:prstGeom prst="rect">
             <a:avLst/>
@@ -24080,6 +24921,84 @@
               <a:rPr lang="fr-FR" sz="1200" dirty="0"/>
               <a:t>Tableau 5. Tableau de l’erreur de simulation</a:t>
             </a:r>
+          </a:p>
+        </p:txBody>
+      </p:sp>
+      <p:sp>
+        <p:nvSpPr>
+          <p:cNvPr id="9" name="Slide Number Placeholder 8">
+            <a:extLst>
+              <a:ext uri="{FF2B5EF4-FFF2-40B4-BE49-F238E27FC236}">
+                <a16:creationId xmlns:a16="http://schemas.microsoft.com/office/drawing/2014/main" id="{440B8553-23AC-D3AA-A797-4A00EB88EB0E}"/>
+              </a:ext>
+            </a:extLst>
+          </p:cNvPr>
+          <p:cNvSpPr>
+            <a:spLocks noGrp="1"/>
+          </p:cNvSpPr>
+          <p:nvPr>
+            <p:ph type="sldNum" sz="quarter" idx="12"/>
+          </p:nvPr>
+        </p:nvSpPr>
+        <p:spPr/>
+        <p:txBody>
+          <a:bodyPr/>
+          <a:lstStyle/>
+          <a:p>
+            <a:fld id="{4BD3201E-7DF8-462B-AC18-61E63795AE0D}" type="slidenum">
+              <a:rPr lang="en-CA" smtClean="0"/>
+              <a:t>22</a:t>
+            </a:fld>
+            <a:endParaRPr lang="en-CA"/>
+          </a:p>
+        </p:txBody>
+      </p:sp>
+      <p:sp>
+        <p:nvSpPr>
+          <p:cNvPr id="8" name="Rectangle 7">
+            <a:extLst>
+              <a:ext uri="{FF2B5EF4-FFF2-40B4-BE49-F238E27FC236}">
+                <a16:creationId xmlns:a16="http://schemas.microsoft.com/office/drawing/2014/main" id="{6F736270-6293-5487-761C-FBB5F4BE1578}"/>
+              </a:ext>
+            </a:extLst>
+          </p:cNvPr>
+          <p:cNvSpPr/>
+          <p:nvPr/>
+        </p:nvSpPr>
+        <p:spPr>
+          <a:xfrm>
+            <a:off x="0" y="365125"/>
+            <a:ext cx="678427" cy="556649"/>
+          </a:xfrm>
+          <a:prstGeom prst="rect">
+            <a:avLst/>
+          </a:prstGeom>
+          <a:ln>
+            <a:noFill/>
+          </a:ln>
+        </p:spPr>
+        <p:style>
+          <a:lnRef idx="2">
+            <a:schemeClr val="accent1">
+              <a:shade val="15000"/>
+            </a:schemeClr>
+          </a:lnRef>
+          <a:fillRef idx="1">
+            <a:schemeClr val="accent1"/>
+          </a:fillRef>
+          <a:effectRef idx="0">
+            <a:schemeClr val="accent1"/>
+          </a:effectRef>
+          <a:fontRef idx="minor">
+            <a:schemeClr val="lt1"/>
+          </a:fontRef>
+        </p:style>
+        <p:txBody>
+          <a:bodyPr rtlCol="0" anchor="ctr"/>
+          <a:lstStyle/>
+          <a:p>
+            <a:pPr algn="ctr"/>
+            <a:endParaRPr lang="en-CA"/>
           </a:p>
         </p:txBody>
       </p:sp>
@@ -24493,6 +25412,84 @@
           </p:sp>
         </mc:Fallback>
       </mc:AlternateContent>
+      <p:sp>
+        <p:nvSpPr>
+          <p:cNvPr id="5" name="Slide Number Placeholder 4">
+            <a:extLst>
+              <a:ext uri="{FF2B5EF4-FFF2-40B4-BE49-F238E27FC236}">
+                <a16:creationId xmlns:a16="http://schemas.microsoft.com/office/drawing/2014/main" id="{E5147425-65D7-37E2-94C4-C8DE409FE9A3}"/>
+              </a:ext>
+            </a:extLst>
+          </p:cNvPr>
+          <p:cNvSpPr>
+            <a:spLocks noGrp="1"/>
+          </p:cNvSpPr>
+          <p:nvPr>
+            <p:ph type="sldNum" sz="quarter" idx="12"/>
+          </p:nvPr>
+        </p:nvSpPr>
+        <p:spPr/>
+        <p:txBody>
+          <a:bodyPr/>
+          <a:lstStyle/>
+          <a:p>
+            <a:fld id="{4BD3201E-7DF8-462B-AC18-61E63795AE0D}" type="slidenum">
+              <a:rPr lang="en-CA" smtClean="0"/>
+              <a:t>23</a:t>
+            </a:fld>
+            <a:endParaRPr lang="en-CA"/>
+          </a:p>
+        </p:txBody>
+      </p:sp>
+      <p:sp>
+        <p:nvSpPr>
+          <p:cNvPr id="4" name="Rectangle 3">
+            <a:extLst>
+              <a:ext uri="{FF2B5EF4-FFF2-40B4-BE49-F238E27FC236}">
+                <a16:creationId xmlns:a16="http://schemas.microsoft.com/office/drawing/2014/main" id="{E8BA408E-8F21-2E99-63F6-15F587C524E1}"/>
+              </a:ext>
+            </a:extLst>
+          </p:cNvPr>
+          <p:cNvSpPr/>
+          <p:nvPr/>
+        </p:nvSpPr>
+        <p:spPr>
+          <a:xfrm>
+            <a:off x="0" y="365125"/>
+            <a:ext cx="678427" cy="556649"/>
+          </a:xfrm>
+          <a:prstGeom prst="rect">
+            <a:avLst/>
+          </a:prstGeom>
+          <a:ln>
+            <a:noFill/>
+          </a:ln>
+        </p:spPr>
+        <p:style>
+          <a:lnRef idx="2">
+            <a:schemeClr val="accent1">
+              <a:shade val="15000"/>
+            </a:schemeClr>
+          </a:lnRef>
+          <a:fillRef idx="1">
+            <a:schemeClr val="accent1"/>
+          </a:fillRef>
+          <a:effectRef idx="0">
+            <a:schemeClr val="accent1"/>
+          </a:effectRef>
+          <a:fontRef idx="minor">
+            <a:schemeClr val="lt1"/>
+          </a:fontRef>
+        </p:style>
+        <p:txBody>
+          <a:bodyPr rtlCol="0" anchor="ctr"/>
+          <a:lstStyle/>
+          <a:p>
+            <a:pPr algn="ctr"/>
+            <a:endParaRPr lang="en-CA"/>
+          </a:p>
+        </p:txBody>
+      </p:sp>
     </p:spTree>
     <p:extLst>
       <p:ext uri="{BB962C8B-B14F-4D97-AF65-F5344CB8AC3E}">
@@ -24585,771 +25582,146 @@
             </p:spPr>
             <p:txBody>
               <a:bodyPr>
-                <a:normAutofit/>
+                <a:normAutofit fontScale="92500" lnSpcReduction="20000"/>
               </a:bodyPr>
               <a:lstStyle/>
               <a:p>
                 <a:pPr marL="0" indent="0" algn="just">
+                  <a:lnSpc>
+                    <a:spcPct val="110000"/>
+                  </a:lnSpc>
+                  <a:spcAft>
+                    <a:spcPts val="1200"/>
+                  </a:spcAft>
                   <a:buNone/>
                 </a:pPr>
                 <a:r>
-                  <a:rPr lang="en-CA" sz="1800" dirty="0">
-                    <a:highlight>
-                      <a:srgbClr val="FFFF00"/>
-                    </a:highlight>
-                  </a:rPr>
-                  <a:t>La verification de code montre … </a:t>
+                  <a:rPr lang="fr-CA" sz="1800" dirty="0"/>
+                  <a:t>En voulant effectuer la vérification de code sur le logiciel </a:t>
                 </a:r>
                 <a:r>
-                  <a:rPr lang="en-CA" sz="1800" dirty="0" err="1">
-                    <a:highlight>
-                      <a:srgbClr val="FFFF00"/>
-                    </a:highlight>
-                  </a:rPr>
-                  <a:t>ce</a:t>
+                  <a:rPr lang="fr-CA" sz="1800" dirty="0" err="1"/>
+                  <a:t>SimCenter</a:t>
                 </a:r>
                 <a:r>
-                  <a:rPr lang="en-CA" sz="1800" dirty="0">
-                    <a:highlight>
-                      <a:srgbClr val="FFFF00"/>
-                    </a:highlight>
-                  </a:rPr>
-                  <a:t> </a:t>
+                  <a:rPr lang="fr-CA" sz="1800" dirty="0"/>
+                  <a:t> 3D, le problème rencontré réside dans l’incompatibilité de la solution analytique choisie pour la vérification (Formulation d’une poutre d’Euler qui est une équation différentielle d’ordre 4) avec la nature des éléments poutre implémentés par </a:t>
                 </a:r>
                 <a:r>
-                  <a:rPr lang="en-CA" sz="1800" dirty="0" err="1">
-                    <a:highlight>
-                      <a:srgbClr val="FFFF00"/>
-                    </a:highlight>
-                  </a:rPr>
-                  <a:t>n’etait</a:t>
+                  <a:rPr lang="fr-CA" sz="1800" dirty="0" err="1"/>
+                  <a:t>SimCenter</a:t>
                 </a:r>
                 <a:r>
-                  <a:rPr lang="en-CA" sz="1800" dirty="0">
-                    <a:highlight>
-                      <a:srgbClr val="FFFF00"/>
-                    </a:highlight>
-                  </a:rPr>
-                  <a:t> pas </a:t>
-                </a:r>
-                <a:r>
-                  <a:rPr lang="en-CA" sz="1800" dirty="0" err="1">
-                    <a:highlight>
-                      <a:srgbClr val="FFFF00"/>
-                    </a:highlight>
-                  </a:rPr>
-                  <a:t>directement</a:t>
-                </a:r>
-                <a:r>
-                  <a:rPr lang="en-CA" sz="1800" dirty="0">
-                    <a:highlight>
-                      <a:srgbClr val="FFFF00"/>
-                    </a:highlight>
-                  </a:rPr>
-                  <a:t> </a:t>
-                </a:r>
-                <a:r>
-                  <a:rPr lang="en-CA" sz="1800" dirty="0" err="1">
-                    <a:highlight>
-                      <a:srgbClr val="FFFF00"/>
-                    </a:highlight>
-                  </a:rPr>
-                  <a:t>une</a:t>
-                </a:r>
-                <a:r>
-                  <a:rPr lang="en-CA" sz="1800" dirty="0">
-                    <a:highlight>
-                      <a:srgbClr val="FFFF00"/>
-                    </a:highlight>
-                  </a:rPr>
-                  <a:t> verification du MEF de la </a:t>
-                </a:r>
-                <a:r>
-                  <a:rPr lang="en-CA" sz="1800" dirty="0" err="1">
-                    <a:highlight>
-                      <a:srgbClr val="FFFF00"/>
-                    </a:highlight>
-                  </a:rPr>
-                  <a:t>colonne</a:t>
-                </a:r>
-                <a:r>
-                  <a:rPr lang="en-CA" sz="1800" dirty="0">
-                    <a:highlight>
-                      <a:srgbClr val="FFFF00"/>
-                    </a:highlight>
-                  </a:rPr>
-                  <a:t> </a:t>
-                </a:r>
-                <a:r>
-                  <a:rPr lang="en-CA" sz="1800" dirty="0" err="1">
-                    <a:highlight>
-                      <a:srgbClr val="FFFF00"/>
-                    </a:highlight>
-                  </a:rPr>
-                  <a:t>vertebrale</a:t>
-                </a:r>
-                <a:r>
-                  <a:rPr lang="en-CA" sz="1800" dirty="0">
-                    <a:highlight>
-                      <a:srgbClr val="FFFF00"/>
-                    </a:highlight>
-                  </a:rPr>
-                  <a:t> </a:t>
-                </a:r>
-                <a:r>
-                  <a:rPr lang="en-CA" sz="1800" dirty="0" err="1">
-                    <a:highlight>
-                      <a:srgbClr val="FFFF00"/>
-                    </a:highlight>
-                  </a:rPr>
-                  <a:t>mais</a:t>
-                </a:r>
-                <a:r>
-                  <a:rPr lang="en-CA" sz="1800" dirty="0">
-                    <a:highlight>
-                      <a:srgbClr val="FFFF00"/>
-                    </a:highlight>
-                  </a:rPr>
-                  <a:t> </a:t>
-                </a:r>
-                <a:r>
-                  <a:rPr lang="en-CA" sz="1800" dirty="0" err="1">
-                    <a:highlight>
-                      <a:srgbClr val="FFFF00"/>
-                    </a:highlight>
-                  </a:rPr>
-                  <a:t>plutot</a:t>
-                </a:r>
-                <a:r>
-                  <a:rPr lang="en-CA" sz="1800" dirty="0">
-                    <a:highlight>
-                      <a:srgbClr val="FFFF00"/>
-                    </a:highlight>
-                  </a:rPr>
-                  <a:t> de </a:t>
-                </a:r>
-                <a:r>
-                  <a:rPr lang="en-CA" sz="1800" dirty="0" err="1">
-                    <a:highlight>
-                      <a:srgbClr val="FFFF00"/>
-                    </a:highlight>
-                  </a:rPr>
-                  <a:t>simcenter</a:t>
-                </a:r>
-                <a:r>
-                  <a:rPr lang="en-CA" sz="1800" dirty="0">
-                    <a:highlight>
-                      <a:srgbClr val="FFFF00"/>
-                    </a:highlight>
-                  </a:rPr>
-                  <a:t>…</a:t>
+                  <a:rPr lang="fr-CA" sz="1800" dirty="0"/>
+                  <a:t> (qui sont des poutres de Timoshenko, équation différentielle d’ordre m=2, donc interpolation d’ordre m-1=1). Ainsi l’interpolation entre deux nœuds de la poutre d’Euler était linéaire et l’erreur L2 ne convergeait pas vers l’ordre formel attendu. Cependant, en utilisant une méthode de convergence basée sur les énergies de déformation, et qui converge à l’ordre p, on réussit à retrouver l’ordre p=1 d’un élément linéaire. Le code est donc vérifié, tel qu’attendu vu que c’est un logiciel commercial qui a normalement déjà subit toutes les étapes de V&amp;V.</a:t>
                 </a:r>
               </a:p>
               <a:p>
                 <a:pPr marL="0" indent="0" algn="just">
+                  <a:lnSpc>
+                    <a:spcPct val="110000"/>
+                  </a:lnSpc>
+                  <a:spcAft>
+                    <a:spcPts val="1200"/>
+                  </a:spcAft>
                   <a:buNone/>
                 </a:pPr>
                 <a:r>
-                  <a:rPr lang="en-CA" sz="1800" dirty="0">
-                    <a:highlight>
-                      <a:srgbClr val="FFFF00"/>
-                    </a:highlight>
-                  </a:rPr>
-                  <a:t>La verification de solution </a:t>
+                  <a:rPr lang="fr-CA" sz="1800" dirty="0"/>
+                  <a:t>Pour la vérification de solution, on se base sur l’ordre formel de l’équation d’une poutre de Timoshenko (</a:t>
                 </a:r>
+                <a14:m>
+                  <m:oMath xmlns:m="http://schemas.openxmlformats.org/officeDocument/2006/math">
+                    <m:sSub>
+                      <m:sSubPr>
+                        <m:ctrlPr>
+                          <a:rPr lang="en-CA" sz="1800" b="0" i="1" smtClean="0">
+                            <a:latin typeface="Cambria Math" panose="02040503050406030204" pitchFamily="18" charset="0"/>
+                          </a:rPr>
+                        </m:ctrlPr>
+                      </m:sSubPr>
+                      <m:e>
+                        <m:r>
+                          <a:rPr lang="en-CA" sz="1800" b="0" i="1" smtClean="0">
+                            <a:latin typeface="Cambria Math" panose="02040503050406030204" pitchFamily="18" charset="0"/>
+                          </a:rPr>
+                          <m:t>𝑝</m:t>
+                        </m:r>
+                      </m:e>
+                      <m:sub>
+                        <m:r>
+                          <a:rPr lang="en-CA" sz="1800" b="0" i="1" smtClean="0">
+                            <a:latin typeface="Cambria Math" panose="02040503050406030204" pitchFamily="18" charset="0"/>
+                          </a:rPr>
+                          <m:t>𝑓</m:t>
+                        </m:r>
+                      </m:sub>
+                    </m:sSub>
+                    <m:r>
+                      <a:rPr lang="en-CA" sz="1800" b="0" i="1" smtClean="0">
+                        <a:latin typeface="Cambria Math" panose="02040503050406030204" pitchFamily="18" charset="0"/>
+                      </a:rPr>
+                      <m:t>=2</m:t>
+                    </m:r>
+                    <m:r>
+                      <a:rPr lang="en-CA" sz="1800" b="0" i="0" smtClean="0">
+                        <a:latin typeface="Cambria Math" panose="02040503050406030204" pitchFamily="18" charset="0"/>
+                      </a:rPr>
+                      <m:t>).</m:t>
+                    </m:r>
+                  </m:oMath>
+                </a14:m>
                 <a:r>
-                  <a:rPr lang="en-CA" sz="1800" dirty="0" err="1">
-                    <a:highlight>
-                      <a:srgbClr val="FFFF00"/>
-                    </a:highlight>
-                  </a:rPr>
-                  <a:t>donne</a:t>
+                  <a:rPr lang="fr-CA" sz="1800" dirty="0"/>
+                  <a:t> Ainsi on obtient </a:t>
                 </a:r>
+                <a14:m>
+                  <m:oMath xmlns:m="http://schemas.openxmlformats.org/officeDocument/2006/math">
+                    <m:acc>
+                      <m:accPr>
+                        <m:chr m:val="̂"/>
+                        <m:ctrlPr>
+                          <a:rPr lang="en-CA" sz="1800" b="0" i="1" smtClean="0">
+                            <a:latin typeface="Cambria Math" panose="02040503050406030204" pitchFamily="18" charset="0"/>
+                          </a:rPr>
+                        </m:ctrlPr>
+                      </m:accPr>
+                      <m:e>
+                        <m:r>
+                          <a:rPr lang="en-CA" sz="1800" b="0" i="1" smtClean="0">
+                            <a:latin typeface="Cambria Math" panose="02040503050406030204" pitchFamily="18" charset="0"/>
+                          </a:rPr>
+                          <m:t>𝑝</m:t>
+                        </m:r>
+                      </m:e>
+                    </m:acc>
+                    <m:r>
+                      <a:rPr lang="en-CA" sz="1800" b="0" i="1" smtClean="0">
+                        <a:latin typeface="Cambria Math" panose="02040503050406030204" pitchFamily="18" charset="0"/>
+                      </a:rPr>
+                      <m:t>=2.055</m:t>
+                    </m:r>
+                  </m:oMath>
+                </a14:m>
                 <a:r>
-                  <a:rPr lang="en-CA" sz="1800" dirty="0">
-                    <a:highlight>
-                      <a:srgbClr val="FFFF00"/>
-                    </a:highlight>
-                  </a:rPr>
-                  <a:t> un </a:t>
+                  <a:rPr lang="fr-CA" sz="1800" dirty="0"/>
+                  <a:t> en utilisant 3 maillages, ce qui donne un écart relatif ~3% . Avec un tel écart proche de 1% on trouve qu’une approximation de la solution par une extrapolation de Richardson est possible, donc l’incertitude est nulle, et la solution est vérifiée.</a:t>
                 </a:r>
-                <a:r>
-                  <a:rPr lang="en-CA" sz="1800" dirty="0" err="1">
-                    <a:highlight>
-                      <a:srgbClr val="FFFF00"/>
-                    </a:highlight>
-                  </a:rPr>
-                  <a:t>estimé</a:t>
-                </a:r>
-                <a:r>
-                  <a:rPr lang="en-CA" sz="1800" dirty="0">
-                    <a:highlight>
-                      <a:srgbClr val="FFFF00"/>
-                    </a:highlight>
-                  </a:rPr>
-                  <a:t> de </a:t>
-                </a:r>
-                <a:r>
-                  <a:rPr lang="en-CA" sz="1800" dirty="0" err="1">
-                    <a:highlight>
-                      <a:srgbClr val="FFFF00"/>
-                    </a:highlight>
-                  </a:rPr>
-                  <a:t>l’erreur</a:t>
-                </a:r>
-                <a:r>
-                  <a:rPr lang="en-CA" sz="1800" dirty="0">
-                    <a:highlight>
-                      <a:srgbClr val="FFFF00"/>
-                    </a:highlight>
-                  </a:rPr>
-                  <a:t> de ?? Et on </a:t>
-                </a:r>
-                <a:r>
-                  <a:rPr lang="en-CA" sz="1800" dirty="0" err="1">
-                    <a:highlight>
-                      <a:srgbClr val="FFFF00"/>
-                    </a:highlight>
-                  </a:rPr>
-                  <a:t>trouve</a:t>
-                </a:r>
-                <a:r>
-                  <a:rPr lang="en-CA" sz="1800" dirty="0">
-                    <a:highlight>
-                      <a:srgbClr val="FFFF00"/>
-                    </a:highlight>
-                  </a:rPr>
-                  <a:t> </a:t>
-                </a:r>
-                <a:r>
-                  <a:rPr lang="en-CA" sz="1800" dirty="0" err="1">
-                    <a:highlight>
-                      <a:srgbClr val="FFFF00"/>
-                    </a:highlight>
-                  </a:rPr>
-                  <a:t>qu’une</a:t>
-                </a:r>
-                <a:r>
-                  <a:rPr lang="en-CA" sz="1800" dirty="0">
-                    <a:highlight>
-                      <a:srgbClr val="FFFF00"/>
-                    </a:highlight>
-                  </a:rPr>
-                  <a:t> approximation de la solution par </a:t>
-                </a:r>
-                <a:r>
-                  <a:rPr lang="en-CA" sz="1800" dirty="0" err="1">
-                    <a:highlight>
-                      <a:srgbClr val="FFFF00"/>
-                    </a:highlight>
-                  </a:rPr>
-                  <a:t>une</a:t>
-                </a:r>
-                <a:r>
-                  <a:rPr lang="en-CA" sz="1800" dirty="0">
-                    <a:highlight>
-                      <a:srgbClr val="FFFF00"/>
-                    </a:highlight>
-                  </a:rPr>
-                  <a:t> extrapolation de Richardson </a:t>
-                </a:r>
-                <a:r>
-                  <a:rPr lang="en-CA" sz="1800" dirty="0" err="1">
-                    <a:highlight>
-                      <a:srgbClr val="FFFF00"/>
-                    </a:highlight>
-                  </a:rPr>
-                  <a:t>est</a:t>
-                </a:r>
-                <a:r>
-                  <a:rPr lang="en-CA" sz="1800" dirty="0">
-                    <a:highlight>
-                      <a:srgbClr val="FFFF00"/>
-                    </a:highlight>
-                  </a:rPr>
-                  <a:t> possible </a:t>
-                </a:r>
-                <a:r>
-                  <a:rPr lang="en-CA" sz="1800" dirty="0" err="1">
-                    <a:highlight>
-                      <a:srgbClr val="FFFF00"/>
-                    </a:highlight>
-                  </a:rPr>
-                  <a:t>blablabla</a:t>
-                </a:r>
-                <a:endParaRPr lang="en-CA" sz="1800" dirty="0">
-                  <a:highlight>
-                    <a:srgbClr val="FFFF00"/>
-                  </a:highlight>
-                </a:endParaRPr>
               </a:p>
               <a:p>
                 <a:pPr marL="0" indent="0" algn="just">
+                  <a:lnSpc>
+                    <a:spcPct val="110000"/>
+                  </a:lnSpc>
                   <a:buNone/>
                 </a:pPr>
                 <a:r>
-                  <a:rPr lang="en-CA" sz="1800" dirty="0" err="1">
-                    <a:highlight>
-                      <a:srgbClr val="FFFF00"/>
-                    </a:highlight>
-                  </a:rPr>
-                  <a:t>Arrivee</a:t>
+                  <a:rPr lang="fr-CA" sz="1800" dirty="0"/>
+                  <a:t>Arrivée l’étape de validation, plusieurs hypothèses ont dû être effectuées pour pallier le manque d’information des articles scientifiques sur la distribution des données d’entrée, ainsi que les erreurs de mesure de ces données, mais aussi sur les expériences de validation et les mesures de la SRQ. Ceci fait que malgré le fait que l’intervalle d’incertitude sur l'erreur du modèle contient la valeur 0, l’intervalle est beaucoup trop large pour pouvoir affirmer que le modèle est complètement fiable. Des efforts de réduction</a:t>
                 </a:r>
                 <a:r>
-                  <a:rPr lang="en-CA" sz="1800" dirty="0">
-                    <a:highlight>
-                      <a:srgbClr val="FFFF00"/>
-                    </a:highlight>
-                  </a:rPr>
-                  <a:t> a </a:t>
-                </a:r>
-                <a:r>
-                  <a:rPr lang="en-CA" sz="1800" dirty="0" err="1">
-                    <a:highlight>
-                      <a:srgbClr val="FFFF00"/>
-                    </a:highlight>
-                  </a:rPr>
-                  <a:t>l’etape</a:t>
-                </a:r>
-                <a:r>
-                  <a:rPr lang="en-CA" sz="1800" dirty="0">
-                    <a:highlight>
-                      <a:srgbClr val="FFFF00"/>
-                    </a:highlight>
-                  </a:rPr>
-                  <a:t> de validation, </a:t>
-                </a:r>
-                <a:r>
-                  <a:rPr lang="en-CA" sz="1800" dirty="0" err="1">
-                    <a:highlight>
-                      <a:srgbClr val="FFFF00"/>
-                    </a:highlight>
-                  </a:rPr>
-                  <a:t>plusieurs</a:t>
-                </a:r>
-                <a:r>
-                  <a:rPr lang="en-CA" sz="1800" dirty="0">
-                    <a:highlight>
-                      <a:srgbClr val="FFFF00"/>
-                    </a:highlight>
-                  </a:rPr>
-                  <a:t> hypotheses </a:t>
-                </a:r>
-                <a:r>
-                  <a:rPr lang="en-CA" sz="1800" dirty="0" err="1">
-                    <a:highlight>
-                      <a:srgbClr val="FFFF00"/>
-                    </a:highlight>
-                  </a:rPr>
-                  <a:t>ont</a:t>
-                </a:r>
-                <a:r>
-                  <a:rPr lang="en-CA" sz="1800" dirty="0">
-                    <a:highlight>
-                      <a:srgbClr val="FFFF00"/>
-                    </a:highlight>
-                  </a:rPr>
-                  <a:t> du </a:t>
-                </a:r>
-                <a:r>
-                  <a:rPr lang="en-CA" sz="1800" dirty="0" err="1">
-                    <a:highlight>
-                      <a:srgbClr val="FFFF00"/>
-                    </a:highlight>
-                  </a:rPr>
-                  <a:t>etre</a:t>
-                </a:r>
-                <a:r>
-                  <a:rPr lang="en-CA" sz="1800" dirty="0">
-                    <a:highlight>
-                      <a:srgbClr val="FFFF00"/>
-                    </a:highlight>
-                  </a:rPr>
-                  <a:t> </a:t>
-                </a:r>
-                <a:r>
-                  <a:rPr lang="en-CA" sz="1800" dirty="0" err="1">
-                    <a:highlight>
-                      <a:srgbClr val="FFFF00"/>
-                    </a:highlight>
-                  </a:rPr>
-                  <a:t>effectuees</a:t>
-                </a:r>
-                <a:r>
-                  <a:rPr lang="en-CA" sz="1800" dirty="0">
-                    <a:highlight>
-                      <a:srgbClr val="FFFF00"/>
-                    </a:highlight>
-                  </a:rPr>
-                  <a:t> pour pallier aux manque </a:t>
-                </a:r>
-                <a:r>
-                  <a:rPr lang="en-CA" sz="1800" dirty="0" err="1">
-                    <a:highlight>
-                      <a:srgbClr val="FFFF00"/>
-                    </a:highlight>
-                  </a:rPr>
-                  <a:t>d’information</a:t>
-                </a:r>
-                <a:r>
-                  <a:rPr lang="en-CA" sz="1800" dirty="0">
-                    <a:highlight>
-                      <a:srgbClr val="FFFF00"/>
-                    </a:highlight>
-                  </a:rPr>
-                  <a:t> des articles </a:t>
-                </a:r>
-                <a:r>
-                  <a:rPr lang="en-CA" sz="1800" dirty="0" err="1">
-                    <a:highlight>
-                      <a:srgbClr val="FFFF00"/>
-                    </a:highlight>
-                  </a:rPr>
-                  <a:t>scientifiques</a:t>
-                </a:r>
-                <a:r>
-                  <a:rPr lang="en-CA" sz="1800" dirty="0">
-                    <a:highlight>
-                      <a:srgbClr val="FFFF00"/>
-                    </a:highlight>
-                  </a:rPr>
-                  <a:t> sur la distribution des </a:t>
-                </a:r>
-                <a:r>
-                  <a:rPr lang="en-CA" sz="1800" dirty="0" err="1">
-                    <a:highlight>
-                      <a:srgbClr val="FFFF00"/>
-                    </a:highlight>
-                  </a:rPr>
-                  <a:t>donnees</a:t>
-                </a:r>
-                <a:r>
-                  <a:rPr lang="en-CA" sz="1800" dirty="0">
-                    <a:highlight>
-                      <a:srgbClr val="FFFF00"/>
-                    </a:highlight>
-                  </a:rPr>
-                  <a:t> </a:t>
-                </a:r>
-                <a:r>
-                  <a:rPr lang="en-CA" sz="1800" dirty="0" err="1">
-                    <a:highlight>
-                      <a:srgbClr val="FFFF00"/>
-                    </a:highlight>
-                  </a:rPr>
-                  <a:t>d’entrees</a:t>
-                </a:r>
-                <a:r>
-                  <a:rPr lang="en-CA" sz="1800" dirty="0">
-                    <a:highlight>
-                      <a:srgbClr val="FFFF00"/>
-                    </a:highlight>
-                  </a:rPr>
-                  <a:t>, </a:t>
-                </a:r>
-                <a:r>
-                  <a:rPr lang="en-CA" sz="1800" dirty="0" err="1">
-                    <a:highlight>
-                      <a:srgbClr val="FFFF00"/>
-                    </a:highlight>
-                  </a:rPr>
-                  <a:t>ainsi</a:t>
-                </a:r>
-                <a:r>
-                  <a:rPr lang="en-CA" sz="1800" dirty="0">
-                    <a:highlight>
-                      <a:srgbClr val="FFFF00"/>
-                    </a:highlight>
-                  </a:rPr>
-                  <a:t> que les </a:t>
-                </a:r>
-                <a:r>
-                  <a:rPr lang="en-CA" sz="1800" dirty="0" err="1">
-                    <a:highlight>
-                      <a:srgbClr val="FFFF00"/>
-                    </a:highlight>
-                  </a:rPr>
-                  <a:t>erreurs</a:t>
-                </a:r>
-                <a:r>
-                  <a:rPr lang="en-CA" sz="1800" dirty="0">
-                    <a:highlight>
-                      <a:srgbClr val="FFFF00"/>
-                    </a:highlight>
-                  </a:rPr>
+                  <a:rPr lang="en-CA" sz="1800" dirty="0"/>
                   <a:t> de </a:t>
-                </a:r>
-                <a:r>
-                  <a:rPr lang="en-CA" sz="1800" dirty="0" err="1">
-                    <a:highlight>
-                      <a:srgbClr val="FFFF00"/>
-                    </a:highlight>
-                  </a:rPr>
-                  <a:t>mesure</a:t>
-                </a:r>
-                <a:r>
-                  <a:rPr lang="en-CA" sz="1800" dirty="0">
-                    <a:highlight>
-                      <a:srgbClr val="FFFF00"/>
-                    </a:highlight>
-                  </a:rPr>
-                  <a:t>  de </a:t>
-                </a:r>
-                <a:r>
-                  <a:rPr lang="en-CA" sz="1800" dirty="0" err="1">
-                    <a:highlight>
-                      <a:srgbClr val="FFFF00"/>
-                    </a:highlight>
-                  </a:rPr>
-                  <a:t>ces</a:t>
-                </a:r>
-                <a:r>
-                  <a:rPr lang="en-CA" sz="1800" dirty="0">
-                    <a:highlight>
-                      <a:srgbClr val="FFFF00"/>
-                    </a:highlight>
-                  </a:rPr>
-                  <a:t> </a:t>
-                </a:r>
-                <a:r>
-                  <a:rPr lang="en-CA" sz="1800" dirty="0" err="1">
-                    <a:highlight>
-                      <a:srgbClr val="FFFF00"/>
-                    </a:highlight>
-                  </a:rPr>
-                  <a:t>donnees</a:t>
-                </a:r>
-                <a:r>
-                  <a:rPr lang="en-CA" sz="1800" dirty="0">
-                    <a:highlight>
-                      <a:srgbClr val="FFFF00"/>
-                    </a:highlight>
-                  </a:rPr>
-                  <a:t> </a:t>
-                </a:r>
-                <a:r>
-                  <a:rPr lang="en-CA" sz="1800" dirty="0" err="1">
-                    <a:highlight>
-                      <a:srgbClr val="FFFF00"/>
-                    </a:highlight>
-                  </a:rPr>
-                  <a:t>mais</a:t>
-                </a:r>
-                <a:r>
-                  <a:rPr lang="en-CA" sz="1800" dirty="0">
-                    <a:highlight>
-                      <a:srgbClr val="FFFF00"/>
-                    </a:highlight>
-                  </a:rPr>
-                  <a:t> </a:t>
-                </a:r>
-                <a:r>
-                  <a:rPr lang="en-CA" sz="1800" dirty="0" err="1">
-                    <a:highlight>
-                      <a:srgbClr val="FFFF00"/>
-                    </a:highlight>
-                  </a:rPr>
-                  <a:t>aussi</a:t>
-                </a:r>
-                <a:r>
-                  <a:rPr lang="en-CA" sz="1800" dirty="0">
-                    <a:highlight>
-                      <a:srgbClr val="FFFF00"/>
-                    </a:highlight>
-                  </a:rPr>
-                  <a:t> sur les experiences de validation et les </a:t>
-                </a:r>
-                <a:r>
-                  <a:rPr lang="en-CA" sz="1800" dirty="0" err="1">
-                    <a:highlight>
-                      <a:srgbClr val="FFFF00"/>
-                    </a:highlight>
-                  </a:rPr>
-                  <a:t>mesures</a:t>
-                </a:r>
-                <a:r>
-                  <a:rPr lang="en-CA" sz="1800" dirty="0">
-                    <a:highlight>
-                      <a:srgbClr val="FFFF00"/>
-                    </a:highlight>
-                  </a:rPr>
-                  <a:t> de la SRQ. Ceci fait que malgré un </a:t>
-                </a:r>
-                <a:r>
-                  <a:rPr lang="en-CA" sz="1800" dirty="0" err="1">
-                    <a:highlight>
-                      <a:srgbClr val="FFFF00"/>
-                    </a:highlight>
-                  </a:rPr>
-                  <a:t>intervalle</a:t>
-                </a:r>
-                <a:r>
-                  <a:rPr lang="en-CA" sz="1800" dirty="0">
-                    <a:highlight>
-                      <a:srgbClr val="FFFF00"/>
-                    </a:highlight>
-                  </a:rPr>
-                  <a:t> </a:t>
-                </a:r>
-                <a:r>
-                  <a:rPr lang="en-CA" sz="1800" dirty="0" err="1">
-                    <a:highlight>
-                      <a:srgbClr val="FFFF00"/>
-                    </a:highlight>
-                  </a:rPr>
-                  <a:t>d’incertitude</a:t>
-                </a:r>
-                <a:r>
-                  <a:rPr lang="en-CA" sz="1800" dirty="0">
-                    <a:highlight>
-                      <a:srgbClr val="FFFF00"/>
-                    </a:highlight>
-                  </a:rPr>
-                  <a:t> sur </a:t>
-                </a:r>
-                <a:r>
-                  <a:rPr lang="en-CA" sz="1800" dirty="0" err="1">
-                    <a:highlight>
-                      <a:srgbClr val="FFFF00"/>
-                    </a:highlight>
-                  </a:rPr>
-                  <a:t>l;erreure</a:t>
-                </a:r>
-                <a:r>
-                  <a:rPr lang="en-CA" sz="1800" dirty="0">
-                    <a:highlight>
-                      <a:srgbClr val="FFFF00"/>
-                    </a:highlight>
-                  </a:rPr>
-                  <a:t> du </a:t>
-                </a:r>
-                <a:r>
-                  <a:rPr lang="en-CA" sz="1800" dirty="0" err="1">
-                    <a:highlight>
-                      <a:srgbClr val="FFFF00"/>
-                    </a:highlight>
-                  </a:rPr>
-                  <a:t>modele</a:t>
-                </a:r>
-                <a:r>
-                  <a:rPr lang="en-CA" sz="1800" dirty="0">
-                    <a:highlight>
-                      <a:srgbClr val="FFFF00"/>
-                    </a:highlight>
-                  </a:rPr>
-                  <a:t> qui englobe la </a:t>
-                </a:r>
-                <a:r>
-                  <a:rPr lang="en-CA" sz="1800" dirty="0" err="1">
-                    <a:highlight>
-                      <a:srgbClr val="FFFF00"/>
-                    </a:highlight>
-                  </a:rPr>
-                  <a:t>valeur</a:t>
-                </a:r>
-                <a:r>
-                  <a:rPr lang="en-CA" sz="1800" dirty="0">
-                    <a:highlight>
-                      <a:srgbClr val="FFFF00"/>
-                    </a:highlight>
-                  </a:rPr>
-                  <a:t> 0, </a:t>
-                </a:r>
-                <a:r>
-                  <a:rPr lang="en-CA" sz="1800" dirty="0" err="1">
-                    <a:highlight>
-                      <a:srgbClr val="FFFF00"/>
-                    </a:highlight>
-                  </a:rPr>
-                  <a:t>l’intervalle</a:t>
-                </a:r>
-                <a:r>
-                  <a:rPr lang="en-CA" sz="1800" dirty="0">
-                    <a:highlight>
-                      <a:srgbClr val="FFFF00"/>
-                    </a:highlight>
-                  </a:rPr>
-                  <a:t> </a:t>
-                </a:r>
-                <a:r>
-                  <a:rPr lang="en-CA" sz="1800" dirty="0" err="1">
-                    <a:highlight>
-                      <a:srgbClr val="FFFF00"/>
-                    </a:highlight>
-                  </a:rPr>
-                  <a:t>est</a:t>
-                </a:r>
-                <a:r>
-                  <a:rPr lang="en-CA" sz="1800" dirty="0">
-                    <a:highlight>
-                      <a:srgbClr val="FFFF00"/>
-                    </a:highlight>
-                  </a:rPr>
-                  <a:t> beaucoup trop large pour </a:t>
-                </a:r>
-                <a:r>
-                  <a:rPr lang="en-CA" sz="1800" dirty="0" err="1">
-                    <a:highlight>
-                      <a:srgbClr val="FFFF00"/>
-                    </a:highlight>
-                  </a:rPr>
-                  <a:t>pouvoir</a:t>
-                </a:r>
-                <a:r>
-                  <a:rPr lang="en-CA" sz="1800" dirty="0">
-                    <a:highlight>
-                      <a:srgbClr val="FFFF00"/>
-                    </a:highlight>
-                  </a:rPr>
-                  <a:t> affirmer que le </a:t>
-                </a:r>
-                <a:r>
-                  <a:rPr lang="en-CA" sz="1800" dirty="0" err="1">
-                    <a:highlight>
-                      <a:srgbClr val="FFFF00"/>
-                    </a:highlight>
-                  </a:rPr>
-                  <a:t>modele</a:t>
-                </a:r>
-                <a:r>
-                  <a:rPr lang="en-CA" sz="1800" dirty="0">
-                    <a:highlight>
-                      <a:srgbClr val="FFFF00"/>
-                    </a:highlight>
-                  </a:rPr>
-                  <a:t> </a:t>
-                </a:r>
-                <a:r>
-                  <a:rPr lang="en-CA" sz="1800" dirty="0" err="1">
-                    <a:highlight>
-                      <a:srgbClr val="FFFF00"/>
-                    </a:highlight>
-                  </a:rPr>
-                  <a:t>est</a:t>
-                </a:r>
-                <a:r>
-                  <a:rPr lang="en-CA" sz="1800" dirty="0">
-                    <a:highlight>
-                      <a:srgbClr val="FFFF00"/>
-                    </a:highlight>
-                  </a:rPr>
-                  <a:t> completement </a:t>
-                </a:r>
-                <a:r>
-                  <a:rPr lang="en-CA" sz="1800" dirty="0" err="1">
-                    <a:highlight>
-                      <a:srgbClr val="FFFF00"/>
-                    </a:highlight>
-                  </a:rPr>
-                  <a:t>fiable</a:t>
-                </a:r>
-                <a:r>
-                  <a:rPr lang="en-CA" sz="1800" dirty="0">
-                    <a:highlight>
-                      <a:srgbClr val="FFFF00"/>
-                    </a:highlight>
-                  </a:rPr>
-                  <a:t>. Des efforts de reduction de </a:t>
                 </a:r>
                 <a14:m>
                   <m:oMath xmlns:m="http://schemas.openxmlformats.org/officeDocument/2006/math">
@@ -25357,9 +25729,6 @@
                       <m:sSubPr>
                         <m:ctrlPr>
                           <a:rPr lang="en-CA" sz="1800" i="1" dirty="0">
-                            <a:highlight>
-                              <a:srgbClr val="FFFF00"/>
-                            </a:highlight>
                             <a:latin typeface="Cambria Math" panose="02040503050406030204" pitchFamily="18" charset="0"/>
                           </a:rPr>
                         </m:ctrlPr>
@@ -25367,9 +25736,6 @@
                       <m:e>
                         <m:r>
                           <a:rPr lang="en-CA" sz="1800" dirty="0">
-                            <a:highlight>
-                              <a:srgbClr val="FFFF00"/>
-                            </a:highlight>
                             <a:latin typeface="Cambria Math" panose="02040503050406030204" pitchFamily="18" charset="0"/>
                           </a:rPr>
                           <m:t>𝑢</m:t>
@@ -25378,18 +25744,12 @@
                       <m:sub>
                         <m:r>
                           <a:rPr lang="en-CA" sz="1800" b="0" i="1" dirty="0" smtClean="0">
-                            <a:highlight>
-                              <a:srgbClr val="FFFF00"/>
-                            </a:highlight>
                             <a:latin typeface="Cambria Math" panose="02040503050406030204" pitchFamily="18" charset="0"/>
                           </a:rPr>
                           <m:t>𝑣𝑎𝑙</m:t>
                         </m:r>
                         <m:r>
                           <a:rPr lang="en-CA" sz="1800" i="1" dirty="0">
-                            <a:highlight>
-                              <a:srgbClr val="FFFF00"/>
-                            </a:highlight>
                             <a:latin typeface="Cambria Math" panose="02040503050406030204" pitchFamily="18" charset="0"/>
                           </a:rPr>
                           <m:t> </m:t>
@@ -25399,52 +25759,8 @@
                   </m:oMath>
                 </a14:m>
                 <a:r>
-                  <a:rPr lang="en-CA" sz="1800" dirty="0" err="1">
-                    <a:highlight>
-                      <a:srgbClr val="FFFF00"/>
-                    </a:highlight>
-                  </a:rPr>
-                  <a:t>doivent</a:t>
-                </a:r>
-                <a:r>
-                  <a:rPr lang="en-CA" sz="1800" dirty="0">
-                    <a:highlight>
-                      <a:srgbClr val="FFFF00"/>
-                    </a:highlight>
-                  </a:rPr>
-                  <a:t> </a:t>
-                </a:r>
-                <a:r>
-                  <a:rPr lang="en-CA" sz="1800" dirty="0" err="1">
-                    <a:highlight>
-                      <a:srgbClr val="FFFF00"/>
-                    </a:highlight>
-                  </a:rPr>
-                  <a:t>etre</a:t>
-                </a:r>
-                <a:r>
-                  <a:rPr lang="en-CA" sz="1800" dirty="0">
-                    <a:highlight>
-                      <a:srgbClr val="FFFF00"/>
-                    </a:highlight>
-                  </a:rPr>
-                  <a:t> </a:t>
-                </a:r>
-                <a:r>
-                  <a:rPr lang="en-CA" sz="1800" dirty="0" err="1">
-                    <a:highlight>
-                      <a:srgbClr val="FFFF00"/>
-                    </a:highlight>
-                  </a:rPr>
-                  <a:t>entrepris</a:t>
-                </a:r>
-                <a:r>
-                  <a:rPr lang="en-CA" sz="1800" dirty="0">
-                    <a:highlight>
-                      <a:srgbClr val="FFFF00"/>
-                    </a:highlight>
-                  </a:rPr>
-                  <a:t> a travers la reduction de </a:t>
+                  <a:rPr lang="fr-FR" sz="1800" dirty="0"/>
+                  <a:t>doivent être entrepris à travers la réduction de </a:t>
                 </a:r>
                 <a14:m>
                   <m:oMath xmlns:m="http://schemas.openxmlformats.org/officeDocument/2006/math">
@@ -25515,11 +25831,7 @@
                   </m:oMath>
                 </a14:m>
                 <a:r>
-                  <a:rPr lang="en-CA" sz="1800" dirty="0">
-                    <a:highlight>
-                      <a:srgbClr val="FFFF00"/>
-                    </a:highlight>
-                  </a:rPr>
+                  <a:rPr lang="en-CA" sz="1800" dirty="0"/>
                   <a:t>.</a:t>
                 </a:r>
               </a:p>
@@ -25551,7 +25863,7 @@
               <a:blipFill>
                 <a:blip r:embed="rId2"/>
                 <a:stretch>
-                  <a:fillRect l="-522" t="-1142" r="-870"/>
+                  <a:fillRect l="-406" t="-799" r="-348"/>
                 </a:stretch>
               </a:blipFill>
             </p:spPr>
@@ -25570,6 +25882,87 @@
           </p:sp>
         </mc:Fallback>
       </mc:AlternateContent>
+      <p:sp>
+        <p:nvSpPr>
+          <p:cNvPr id="5" name="Slide Number Placeholder 4">
+            <a:extLst>
+              <a:ext uri="{FF2B5EF4-FFF2-40B4-BE49-F238E27FC236}">
+                <a16:creationId xmlns:a16="http://schemas.microsoft.com/office/drawing/2014/main" id="{CC554A85-9FD4-A3A3-F781-8C6ACBA4D72A}"/>
+              </a:ext>
+            </a:extLst>
+          </p:cNvPr>
+          <p:cNvSpPr>
+            <a:spLocks noGrp="1"/>
+          </p:cNvSpPr>
+          <p:nvPr>
+            <p:ph type="sldNum" sz="quarter" idx="12"/>
+          </p:nvPr>
+        </p:nvSpPr>
+        <p:spPr/>
+        <p:txBody>
+          <a:bodyPr/>
+          <a:lstStyle/>
+          <a:p>
+            <a:fld id="{4BD3201E-7DF8-462B-AC18-61E63795AE0D}" type="slidenum">
+              <a:rPr lang="en-CA" smtClean="0"/>
+              <a:t>24</a:t>
+            </a:fld>
+            <a:endParaRPr lang="en-CA"/>
+          </a:p>
+        </p:txBody>
+      </p:sp>
+      <p:sp>
+        <p:nvSpPr>
+          <p:cNvPr id="4" name="Rectangle 3">
+            <a:extLst>
+              <a:ext uri="{FF2B5EF4-FFF2-40B4-BE49-F238E27FC236}">
+                <a16:creationId xmlns:a16="http://schemas.microsoft.com/office/drawing/2014/main" id="{4E9F394D-3B01-35AF-A608-94FCD1B86ADC}"/>
+              </a:ext>
+            </a:extLst>
+          </p:cNvPr>
+          <p:cNvSpPr/>
+          <p:nvPr/>
+        </p:nvSpPr>
+        <p:spPr>
+          <a:xfrm>
+            <a:off x="0" y="365125"/>
+            <a:ext cx="678427" cy="556649"/>
+          </a:xfrm>
+          <a:prstGeom prst="rect">
+            <a:avLst/>
+          </a:prstGeom>
+          <a:solidFill>
+            <a:schemeClr val="accent6"/>
+          </a:solidFill>
+          <a:ln>
+            <a:noFill/>
+          </a:ln>
+        </p:spPr>
+        <p:style>
+          <a:lnRef idx="2">
+            <a:schemeClr val="accent1">
+              <a:shade val="15000"/>
+            </a:schemeClr>
+          </a:lnRef>
+          <a:fillRef idx="1">
+            <a:schemeClr val="accent1"/>
+          </a:fillRef>
+          <a:effectRef idx="0">
+            <a:schemeClr val="accent1"/>
+          </a:effectRef>
+          <a:fontRef idx="minor">
+            <a:schemeClr val="lt1"/>
+          </a:fontRef>
+        </p:style>
+        <p:txBody>
+          <a:bodyPr rtlCol="0" anchor="ctr"/>
+          <a:lstStyle/>
+          <a:p>
+            <a:pPr algn="ctr"/>
+            <a:endParaRPr lang="en-CA"/>
+          </a:p>
+        </p:txBody>
+      </p:sp>
     </p:spTree>
     <p:extLst>
       <p:ext uri="{BB962C8B-B14F-4D97-AF65-F5344CB8AC3E}">
@@ -26015,6 +26408,87 @@
                 <a:srgbClr val="FFFF00"/>
               </a:highlight>
             </a:endParaRPr>
+          </a:p>
+        </p:txBody>
+      </p:sp>
+      <p:sp>
+        <p:nvSpPr>
+          <p:cNvPr id="5" name="Slide Number Placeholder 4">
+            <a:extLst>
+              <a:ext uri="{FF2B5EF4-FFF2-40B4-BE49-F238E27FC236}">
+                <a16:creationId xmlns:a16="http://schemas.microsoft.com/office/drawing/2014/main" id="{AEC53A60-E2F1-78C3-773E-241090D039CD}"/>
+              </a:ext>
+            </a:extLst>
+          </p:cNvPr>
+          <p:cNvSpPr>
+            <a:spLocks noGrp="1"/>
+          </p:cNvSpPr>
+          <p:nvPr>
+            <p:ph type="sldNum" sz="quarter" idx="12"/>
+          </p:nvPr>
+        </p:nvSpPr>
+        <p:spPr/>
+        <p:txBody>
+          <a:bodyPr/>
+          <a:lstStyle/>
+          <a:p>
+            <a:fld id="{4BD3201E-7DF8-462B-AC18-61E63795AE0D}" type="slidenum">
+              <a:rPr lang="en-CA" smtClean="0"/>
+              <a:t>25</a:t>
+            </a:fld>
+            <a:endParaRPr lang="en-CA"/>
+          </a:p>
+        </p:txBody>
+      </p:sp>
+      <p:sp>
+        <p:nvSpPr>
+          <p:cNvPr id="4" name="Rectangle 3">
+            <a:extLst>
+              <a:ext uri="{FF2B5EF4-FFF2-40B4-BE49-F238E27FC236}">
+                <a16:creationId xmlns:a16="http://schemas.microsoft.com/office/drawing/2014/main" id="{3847DF2F-2D95-F5EB-B88C-9AABFAF26E74}"/>
+              </a:ext>
+            </a:extLst>
+          </p:cNvPr>
+          <p:cNvSpPr/>
+          <p:nvPr/>
+        </p:nvSpPr>
+        <p:spPr>
+          <a:xfrm>
+            <a:off x="0" y="365125"/>
+            <a:ext cx="678427" cy="556649"/>
+          </a:xfrm>
+          <a:prstGeom prst="rect">
+            <a:avLst/>
+          </a:prstGeom>
+          <a:solidFill>
+            <a:schemeClr val="accent6"/>
+          </a:solidFill>
+          <a:ln>
+            <a:noFill/>
+          </a:ln>
+        </p:spPr>
+        <p:style>
+          <a:lnRef idx="2">
+            <a:schemeClr val="accent1">
+              <a:shade val="15000"/>
+            </a:schemeClr>
+          </a:lnRef>
+          <a:fillRef idx="1">
+            <a:schemeClr val="accent1"/>
+          </a:fillRef>
+          <a:effectRef idx="0">
+            <a:schemeClr val="accent1"/>
+          </a:effectRef>
+          <a:fontRef idx="minor">
+            <a:schemeClr val="lt1"/>
+          </a:fontRef>
+        </p:style>
+        <p:txBody>
+          <a:bodyPr rtlCol="0" anchor="ctr"/>
+          <a:lstStyle/>
+          <a:p>
+            <a:pPr algn="ctr"/>
+            <a:endParaRPr lang="en-CA"/>
           </a:p>
         </p:txBody>
       </p:sp>
@@ -26707,6 +27181,89 @@
           </a:p>
         </p:txBody>
       </p:sp>
+      <p:sp>
+        <p:nvSpPr>
+          <p:cNvPr id="4" name="Slide Number Placeholder 3">
+            <a:extLst>
+              <a:ext uri="{FF2B5EF4-FFF2-40B4-BE49-F238E27FC236}">
+                <a16:creationId xmlns:a16="http://schemas.microsoft.com/office/drawing/2014/main" id="{1FC4FC90-A619-F30E-62A9-A165114ECF67}"/>
+              </a:ext>
+            </a:extLst>
+          </p:cNvPr>
+          <p:cNvSpPr>
+            <a:spLocks noGrp="1"/>
+          </p:cNvSpPr>
+          <p:nvPr>
+            <p:ph type="sldNum" sz="quarter" idx="12"/>
+          </p:nvPr>
+        </p:nvSpPr>
+        <p:spPr/>
+        <p:txBody>
+          <a:bodyPr/>
+          <a:lstStyle/>
+          <a:p>
+            <a:fld id="{4BD3201E-7DF8-462B-AC18-61E63795AE0D}" type="slidenum">
+              <a:rPr lang="en-CA" smtClean="0"/>
+              <a:t>3</a:t>
+            </a:fld>
+            <a:endParaRPr lang="en-CA"/>
+          </a:p>
+        </p:txBody>
+      </p:sp>
+      <p:sp>
+        <p:nvSpPr>
+          <p:cNvPr id="2" name="Rectangle 1">
+            <a:extLst>
+              <a:ext uri="{FF2B5EF4-FFF2-40B4-BE49-F238E27FC236}">
+                <a16:creationId xmlns:a16="http://schemas.microsoft.com/office/drawing/2014/main" id="{6464FEFB-F182-CF13-DBC8-0BA7513CA55E}"/>
+              </a:ext>
+            </a:extLst>
+          </p:cNvPr>
+          <p:cNvSpPr/>
+          <p:nvPr/>
+        </p:nvSpPr>
+        <p:spPr>
+          <a:xfrm>
+            <a:off x="0" y="365125"/>
+            <a:ext cx="678427" cy="556649"/>
+          </a:xfrm>
+          <a:prstGeom prst="rect">
+            <a:avLst/>
+          </a:prstGeom>
+          <a:solidFill>
+            <a:schemeClr val="accent2">
+              <a:lumMod val="75000"/>
+            </a:schemeClr>
+          </a:solidFill>
+          <a:ln>
+            <a:noFill/>
+          </a:ln>
+        </p:spPr>
+        <p:style>
+          <a:lnRef idx="2">
+            <a:schemeClr val="accent1">
+              <a:shade val="15000"/>
+            </a:schemeClr>
+          </a:lnRef>
+          <a:fillRef idx="1">
+            <a:schemeClr val="accent1"/>
+          </a:fillRef>
+          <a:effectRef idx="0">
+            <a:schemeClr val="accent1"/>
+          </a:effectRef>
+          <a:fontRef idx="minor">
+            <a:schemeClr val="lt1"/>
+          </a:fontRef>
+        </p:style>
+        <p:txBody>
+          <a:bodyPr rtlCol="0" anchor="ctr"/>
+          <a:lstStyle/>
+          <a:p>
+            <a:pPr algn="ctr"/>
+            <a:endParaRPr lang="en-CA"/>
+          </a:p>
+        </p:txBody>
+      </p:sp>
     </p:spTree>
     <p:extLst>
       <p:ext uri="{BB962C8B-B14F-4D97-AF65-F5344CB8AC3E}">
@@ -26972,6 +27529,89 @@
           </a:extLst>
         </p:spPr>
       </p:pic>
+      <p:sp>
+        <p:nvSpPr>
+          <p:cNvPr id="6" name="Slide Number Placeholder 5">
+            <a:extLst>
+              <a:ext uri="{FF2B5EF4-FFF2-40B4-BE49-F238E27FC236}">
+                <a16:creationId xmlns:a16="http://schemas.microsoft.com/office/drawing/2014/main" id="{2927BF17-FF71-1575-5407-9904723134DF}"/>
+              </a:ext>
+            </a:extLst>
+          </p:cNvPr>
+          <p:cNvSpPr>
+            <a:spLocks noGrp="1"/>
+          </p:cNvSpPr>
+          <p:nvPr>
+            <p:ph type="sldNum" sz="quarter" idx="12"/>
+          </p:nvPr>
+        </p:nvSpPr>
+        <p:spPr/>
+        <p:txBody>
+          <a:bodyPr/>
+          <a:lstStyle/>
+          <a:p>
+            <a:fld id="{4BD3201E-7DF8-462B-AC18-61E63795AE0D}" type="slidenum">
+              <a:rPr lang="en-CA" smtClean="0"/>
+              <a:t>4</a:t>
+            </a:fld>
+            <a:endParaRPr lang="en-CA"/>
+          </a:p>
+        </p:txBody>
+      </p:sp>
+      <p:sp>
+        <p:nvSpPr>
+          <p:cNvPr id="4" name="Rectangle 3">
+            <a:extLst>
+              <a:ext uri="{FF2B5EF4-FFF2-40B4-BE49-F238E27FC236}">
+                <a16:creationId xmlns:a16="http://schemas.microsoft.com/office/drawing/2014/main" id="{7F11DAA0-7588-79D3-E560-D79065B15B25}"/>
+              </a:ext>
+            </a:extLst>
+          </p:cNvPr>
+          <p:cNvSpPr/>
+          <p:nvPr/>
+        </p:nvSpPr>
+        <p:spPr>
+          <a:xfrm>
+            <a:off x="0" y="365125"/>
+            <a:ext cx="678427" cy="556649"/>
+          </a:xfrm>
+          <a:prstGeom prst="rect">
+            <a:avLst/>
+          </a:prstGeom>
+          <a:solidFill>
+            <a:schemeClr val="accent2">
+              <a:lumMod val="75000"/>
+            </a:schemeClr>
+          </a:solidFill>
+          <a:ln>
+            <a:noFill/>
+          </a:ln>
+        </p:spPr>
+        <p:style>
+          <a:lnRef idx="2">
+            <a:schemeClr val="accent1">
+              <a:shade val="15000"/>
+            </a:schemeClr>
+          </a:lnRef>
+          <a:fillRef idx="1">
+            <a:schemeClr val="accent1"/>
+          </a:fillRef>
+          <a:effectRef idx="0">
+            <a:schemeClr val="accent1"/>
+          </a:effectRef>
+          <a:fontRef idx="minor">
+            <a:schemeClr val="lt1"/>
+          </a:fontRef>
+        </p:style>
+        <p:txBody>
+          <a:bodyPr rtlCol="0" anchor="ctr"/>
+          <a:lstStyle/>
+          <a:p>
+            <a:pPr algn="ctr"/>
+            <a:endParaRPr lang="en-CA"/>
+          </a:p>
+        </p:txBody>
+      </p:sp>
     </p:spTree>
     <p:extLst>
       <p:ext uri="{BB962C8B-B14F-4D97-AF65-F5344CB8AC3E}">
@@ -27246,6 +27886,89 @@
           </a:p>
         </p:txBody>
       </p:sp>
+      <p:sp>
+        <p:nvSpPr>
+          <p:cNvPr id="4" name="Slide Number Placeholder 3">
+            <a:extLst>
+              <a:ext uri="{FF2B5EF4-FFF2-40B4-BE49-F238E27FC236}">
+                <a16:creationId xmlns:a16="http://schemas.microsoft.com/office/drawing/2014/main" id="{A13536B1-BF66-356D-1714-B061885C2D9F}"/>
+              </a:ext>
+            </a:extLst>
+          </p:cNvPr>
+          <p:cNvSpPr>
+            <a:spLocks noGrp="1"/>
+          </p:cNvSpPr>
+          <p:nvPr>
+            <p:ph type="sldNum" sz="quarter" idx="12"/>
+          </p:nvPr>
+        </p:nvSpPr>
+        <p:spPr/>
+        <p:txBody>
+          <a:bodyPr/>
+          <a:lstStyle/>
+          <a:p>
+            <a:fld id="{4BD3201E-7DF8-462B-AC18-61E63795AE0D}" type="slidenum">
+              <a:rPr lang="en-CA" smtClean="0"/>
+              <a:t>5</a:t>
+            </a:fld>
+            <a:endParaRPr lang="en-CA"/>
+          </a:p>
+        </p:txBody>
+      </p:sp>
+      <p:sp>
+        <p:nvSpPr>
+          <p:cNvPr id="2" name="Rectangle 1">
+            <a:extLst>
+              <a:ext uri="{FF2B5EF4-FFF2-40B4-BE49-F238E27FC236}">
+                <a16:creationId xmlns:a16="http://schemas.microsoft.com/office/drawing/2014/main" id="{DE39F9C8-0EC1-A0D7-DDEE-74703ED4A43A}"/>
+              </a:ext>
+            </a:extLst>
+          </p:cNvPr>
+          <p:cNvSpPr/>
+          <p:nvPr/>
+        </p:nvSpPr>
+        <p:spPr>
+          <a:xfrm>
+            <a:off x="0" y="365125"/>
+            <a:ext cx="678427" cy="556649"/>
+          </a:xfrm>
+          <a:prstGeom prst="rect">
+            <a:avLst/>
+          </a:prstGeom>
+          <a:solidFill>
+            <a:schemeClr val="accent2">
+              <a:lumMod val="75000"/>
+            </a:schemeClr>
+          </a:solidFill>
+          <a:ln>
+            <a:noFill/>
+          </a:ln>
+        </p:spPr>
+        <p:style>
+          <a:lnRef idx="2">
+            <a:schemeClr val="accent1">
+              <a:shade val="15000"/>
+            </a:schemeClr>
+          </a:lnRef>
+          <a:fillRef idx="1">
+            <a:schemeClr val="accent1"/>
+          </a:fillRef>
+          <a:effectRef idx="0">
+            <a:schemeClr val="accent1"/>
+          </a:effectRef>
+          <a:fontRef idx="minor">
+            <a:schemeClr val="lt1"/>
+          </a:fontRef>
+        </p:style>
+        <p:txBody>
+          <a:bodyPr rtlCol="0" anchor="ctr"/>
+          <a:lstStyle/>
+          <a:p>
+            <a:pPr algn="ctr"/>
+            <a:endParaRPr lang="en-CA"/>
+          </a:p>
+        </p:txBody>
+      </p:sp>
     </p:spTree>
     <p:extLst>
       <p:ext uri="{BB962C8B-B14F-4D97-AF65-F5344CB8AC3E}">
@@ -27367,19 +28090,7 @@
                 </a:pPr>
                 <a:r>
                   <a:rPr lang="fr-CA" sz="1800" dirty="0"/>
-                  <a:t>Cependant, notre modèle FEM de la colonne vertébrale est formé de 2 types d’éléments différents. Alors nous avons choisi, dans une tentative d’effectuer la vérification de code du logiciel SimCenter, de comparer la solution qu’il génère pour une poutre encastrée-libre (ce sera la solution numérique), avec le résultat la solution analytique connue</a:t>
-                </a:r>
-                <a:r>
-                  <a:rPr lang="fr-CA" sz="1800" dirty="0">
-                    <a:highlight>
-                      <a:srgbClr val="FFFF00"/>
-                    </a:highlight>
-                  </a:rPr>
-                  <a:t> </a:t>
-                </a:r>
-                <a:r>
-                  <a:rPr lang="fr-CA" sz="1800" dirty="0"/>
-                  <a:t>d’une poutre d’Euler soit </a:t>
+                  <a:t>Cependant, notre modèle FEM de la colonne vertébrale est formé de 2 types d’éléments différents. Alors nous avons choisi, dans une tentative d’effectuer la vérification de code du logiciel SimCenter, de comparer la solution qu’il génère pour une poutre encastrée-libre (ce sera la solution numérique), avec le résultat la solution analytique connue d’une poutre d’Euler soit </a:t>
                 </a:r>
                 <a14:m>
                   <m:oMath xmlns:m="http://schemas.openxmlformats.org/officeDocument/2006/math">
@@ -27555,7 +28266,7 @@
                 <a:ext cx="10515600" cy="5342501"/>
               </a:xfrm>
               <a:blipFill>
-                <a:blip r:embed="rId3"/>
+                <a:blip r:embed="rId2"/>
                 <a:stretch>
                   <a:fillRect l="-522" t="-571" r="-464"/>
                 </a:stretch>
@@ -27591,7 +28302,7 @@
           <p:nvPr>
             <p:extLst>
               <p:ext uri="{D42A27DB-BD31-4B8C-83A1-F6EECF244321}">
-                <p14:modId xmlns:p14="http://schemas.microsoft.com/office/powerpoint/2010/main" val="2053614699"/>
+                <p14:modId xmlns:p14="http://schemas.microsoft.com/office/powerpoint/2010/main" val="1877698152"/>
               </p:ext>
             </p:extLst>
           </p:nvPr>
@@ -27773,7 +28484,10 @@
                     <a:bodyPr/>
                     <a:lstStyle/>
                     <a:p>
-                      <a:endParaRPr lang="fr-FR" dirty="0"/>
+                      <a:r>
+                        <a:rPr lang="fr-FR" dirty="0"/>
+                        <a:t>7853.9814 mm⁴</a:t>
+                      </a:r>
                     </a:p>
                   </a:txBody>
                   <a:tcPr/>
@@ -27856,6 +28570,89 @@
           </a:p>
         </p:txBody>
       </p:sp>
+      <p:sp>
+        <p:nvSpPr>
+          <p:cNvPr id="5" name="Slide Number Placeholder 4">
+            <a:extLst>
+              <a:ext uri="{FF2B5EF4-FFF2-40B4-BE49-F238E27FC236}">
+                <a16:creationId xmlns:a16="http://schemas.microsoft.com/office/drawing/2014/main" id="{51C90362-E83D-C107-EA4F-FE82C4D2EACF}"/>
+              </a:ext>
+            </a:extLst>
+          </p:cNvPr>
+          <p:cNvSpPr>
+            <a:spLocks noGrp="1"/>
+          </p:cNvSpPr>
+          <p:nvPr>
+            <p:ph type="sldNum" sz="quarter" idx="12"/>
+          </p:nvPr>
+        </p:nvSpPr>
+        <p:spPr/>
+        <p:txBody>
+          <a:bodyPr/>
+          <a:lstStyle/>
+          <a:p>
+            <a:fld id="{4BD3201E-7DF8-462B-AC18-61E63795AE0D}" type="slidenum">
+              <a:rPr lang="en-CA" smtClean="0"/>
+              <a:t>6</a:t>
+            </a:fld>
+            <a:endParaRPr lang="en-CA"/>
+          </a:p>
+        </p:txBody>
+      </p:sp>
+      <p:sp>
+        <p:nvSpPr>
+          <p:cNvPr id="4" name="Rectangle 3">
+            <a:extLst>
+              <a:ext uri="{FF2B5EF4-FFF2-40B4-BE49-F238E27FC236}">
+                <a16:creationId xmlns:a16="http://schemas.microsoft.com/office/drawing/2014/main" id="{69B3D440-4D98-84F9-690C-0C2493438E13}"/>
+              </a:ext>
+            </a:extLst>
+          </p:cNvPr>
+          <p:cNvSpPr/>
+          <p:nvPr/>
+        </p:nvSpPr>
+        <p:spPr>
+          <a:xfrm>
+            <a:off x="0" y="365125"/>
+            <a:ext cx="678427" cy="556649"/>
+          </a:xfrm>
+          <a:prstGeom prst="rect">
+            <a:avLst/>
+          </a:prstGeom>
+          <a:solidFill>
+            <a:schemeClr val="accent2">
+              <a:lumMod val="75000"/>
+            </a:schemeClr>
+          </a:solidFill>
+          <a:ln>
+            <a:noFill/>
+          </a:ln>
+        </p:spPr>
+        <p:style>
+          <a:lnRef idx="2">
+            <a:schemeClr val="accent1">
+              <a:shade val="15000"/>
+            </a:schemeClr>
+          </a:lnRef>
+          <a:fillRef idx="1">
+            <a:schemeClr val="accent1"/>
+          </a:fillRef>
+          <a:effectRef idx="0">
+            <a:schemeClr val="accent1"/>
+          </a:effectRef>
+          <a:fontRef idx="minor">
+            <a:schemeClr val="lt1"/>
+          </a:fontRef>
+        </p:style>
+        <p:txBody>
+          <a:bodyPr rtlCol="0" anchor="ctr"/>
+          <a:lstStyle/>
+          <a:p>
+            <a:pPr algn="ctr"/>
+            <a:endParaRPr lang="en-CA"/>
+          </a:p>
+        </p:txBody>
+      </p:sp>
     </p:spTree>
     <p:extLst>
       <p:ext uri="{BB962C8B-B14F-4D97-AF65-F5344CB8AC3E}">
@@ -27866,11 +28663,6 @@
   <p:clrMapOvr>
     <a:masterClrMapping/>
   </p:clrMapOvr>
-  <p:extLst>
-    <p:ext uri="{6950BFC3-D8DA-4A85-94F7-54DA5524770B}">
-      <p188:commentRel xmlns:p188="http://schemas.microsoft.com/office/powerpoint/2018/8/main" r:id="rId2"/>
-    </p:ext>
-  </p:extLst>
 </p:sld>
 </file>
 
@@ -28012,8 +28804,91 @@
             </a:pPr>
             <a:r>
               <a:rPr lang="fr-FR" sz="1800" dirty="0"/>
-              <a:t>Les tentatives et résultats de notre analyse de convergence sont quand même présentés dans ce qui suit.</a:t>
-            </a:r>
+              <a:t>Les tentatives et résultats de notre analyse de convergence sont quand même présentés dans ce qui suit, ainsi qu’une méthode alternative basée sur l'énergie de déformation.</a:t>
+            </a:r>
+          </a:p>
+        </p:txBody>
+      </p:sp>
+      <p:sp>
+        <p:nvSpPr>
+          <p:cNvPr id="5" name="Slide Number Placeholder 4">
+            <a:extLst>
+              <a:ext uri="{FF2B5EF4-FFF2-40B4-BE49-F238E27FC236}">
+                <a16:creationId xmlns:a16="http://schemas.microsoft.com/office/drawing/2014/main" id="{0CC49781-8CB8-2B3A-3054-49AF4F2B1593}"/>
+              </a:ext>
+            </a:extLst>
+          </p:cNvPr>
+          <p:cNvSpPr>
+            <a:spLocks noGrp="1"/>
+          </p:cNvSpPr>
+          <p:nvPr>
+            <p:ph type="sldNum" sz="quarter" idx="12"/>
+          </p:nvPr>
+        </p:nvSpPr>
+        <p:spPr/>
+        <p:txBody>
+          <a:bodyPr/>
+          <a:lstStyle/>
+          <a:p>
+            <a:fld id="{4BD3201E-7DF8-462B-AC18-61E63795AE0D}" type="slidenum">
+              <a:rPr lang="en-CA" smtClean="0"/>
+              <a:t>7</a:t>
+            </a:fld>
+            <a:endParaRPr lang="en-CA"/>
+          </a:p>
+        </p:txBody>
+      </p:sp>
+      <p:sp>
+        <p:nvSpPr>
+          <p:cNvPr id="4" name="Rectangle 3">
+            <a:extLst>
+              <a:ext uri="{FF2B5EF4-FFF2-40B4-BE49-F238E27FC236}">
+                <a16:creationId xmlns:a16="http://schemas.microsoft.com/office/drawing/2014/main" id="{A6A18B2F-0561-C2D4-5B62-F517B3CC666A}"/>
+              </a:ext>
+            </a:extLst>
+          </p:cNvPr>
+          <p:cNvSpPr/>
+          <p:nvPr/>
+        </p:nvSpPr>
+        <p:spPr>
+          <a:xfrm>
+            <a:off x="0" y="365125"/>
+            <a:ext cx="678427" cy="556649"/>
+          </a:xfrm>
+          <a:prstGeom prst="rect">
+            <a:avLst/>
+          </a:prstGeom>
+          <a:solidFill>
+            <a:schemeClr val="accent2">
+              <a:lumMod val="75000"/>
+            </a:schemeClr>
+          </a:solidFill>
+          <a:ln>
+            <a:noFill/>
+          </a:ln>
+        </p:spPr>
+        <p:style>
+          <a:lnRef idx="2">
+            <a:schemeClr val="accent1">
+              <a:shade val="15000"/>
+            </a:schemeClr>
+          </a:lnRef>
+          <a:fillRef idx="1">
+            <a:schemeClr val="accent1"/>
+          </a:fillRef>
+          <a:effectRef idx="0">
+            <a:schemeClr val="accent1"/>
+          </a:effectRef>
+          <a:fontRef idx="minor">
+            <a:schemeClr val="lt1"/>
+          </a:fontRef>
+        </p:style>
+        <p:txBody>
+          <a:bodyPr rtlCol="0" anchor="ctr"/>
+          <a:lstStyle/>
+          <a:p>
+            <a:pPr algn="ctr"/>
+            <a:endParaRPr lang="en-CA"/>
           </a:p>
         </p:txBody>
       </p:sp>
@@ -28158,13 +29033,13 @@
           <p:nvPr>
             <p:extLst>
               <p:ext uri="{D42A27DB-BD31-4B8C-83A1-F6EECF244321}">
-                <p14:modId xmlns:p14="http://schemas.microsoft.com/office/powerpoint/2010/main" val="1112944858"/>
+                <p14:modId xmlns:p14="http://schemas.microsoft.com/office/powerpoint/2010/main" val="1018683162"/>
               </p:ext>
             </p:extLst>
           </p:nvPr>
         </p:nvGraphicFramePr>
         <p:xfrm>
-          <a:off x="4149214" y="909489"/>
+          <a:off x="4149214" y="850497"/>
           <a:ext cx="7852856" cy="5530644"/>
         </p:xfrm>
         <a:graphic>
@@ -28187,7 +29062,7 @@
         </p:nvSpPr>
         <p:spPr>
           <a:xfrm>
-            <a:off x="5740284" y="6440133"/>
+            <a:off x="5740284" y="6400805"/>
             <a:ext cx="5435048" cy="276999"/>
           </a:xfrm>
           <a:prstGeom prst="rect">
@@ -28230,6 +29105,89 @@
               <a:t> pour la verification de code</a:t>
             </a:r>
             <a:endParaRPr lang="fr-FR" sz="1200" dirty="0"/>
+          </a:p>
+        </p:txBody>
+      </p:sp>
+      <p:sp>
+        <p:nvSpPr>
+          <p:cNvPr id="7" name="Slide Number Placeholder 6">
+            <a:extLst>
+              <a:ext uri="{FF2B5EF4-FFF2-40B4-BE49-F238E27FC236}">
+                <a16:creationId xmlns:a16="http://schemas.microsoft.com/office/drawing/2014/main" id="{8EF3E544-C0B6-3487-B0B5-77EF553CD81F}"/>
+              </a:ext>
+            </a:extLst>
+          </p:cNvPr>
+          <p:cNvSpPr>
+            <a:spLocks noGrp="1"/>
+          </p:cNvSpPr>
+          <p:nvPr>
+            <p:ph type="sldNum" sz="quarter" idx="12"/>
+          </p:nvPr>
+        </p:nvSpPr>
+        <p:spPr/>
+        <p:txBody>
+          <a:bodyPr/>
+          <a:lstStyle/>
+          <a:p>
+            <a:fld id="{4BD3201E-7DF8-462B-AC18-61E63795AE0D}" type="slidenum">
+              <a:rPr lang="en-CA" smtClean="0"/>
+              <a:t>8</a:t>
+            </a:fld>
+            <a:endParaRPr lang="en-CA"/>
+          </a:p>
+        </p:txBody>
+      </p:sp>
+      <p:sp>
+        <p:nvSpPr>
+          <p:cNvPr id="6" name="Rectangle 5">
+            <a:extLst>
+              <a:ext uri="{FF2B5EF4-FFF2-40B4-BE49-F238E27FC236}">
+                <a16:creationId xmlns:a16="http://schemas.microsoft.com/office/drawing/2014/main" id="{0D518649-14CB-488E-A106-4F0F4B3ACC5E}"/>
+              </a:ext>
+            </a:extLst>
+          </p:cNvPr>
+          <p:cNvSpPr/>
+          <p:nvPr/>
+        </p:nvSpPr>
+        <p:spPr>
+          <a:xfrm>
+            <a:off x="0" y="365125"/>
+            <a:ext cx="678427" cy="556649"/>
+          </a:xfrm>
+          <a:prstGeom prst="rect">
+            <a:avLst/>
+          </a:prstGeom>
+          <a:solidFill>
+            <a:schemeClr val="accent2">
+              <a:lumMod val="75000"/>
+            </a:schemeClr>
+          </a:solidFill>
+          <a:ln>
+            <a:noFill/>
+          </a:ln>
+        </p:spPr>
+        <p:style>
+          <a:lnRef idx="2">
+            <a:schemeClr val="accent1">
+              <a:shade val="15000"/>
+            </a:schemeClr>
+          </a:lnRef>
+          <a:fillRef idx="1">
+            <a:schemeClr val="accent1"/>
+          </a:fillRef>
+          <a:effectRef idx="0">
+            <a:schemeClr val="accent1"/>
+          </a:effectRef>
+          <a:fontRef idx="minor">
+            <a:schemeClr val="lt1"/>
+          </a:fontRef>
+        </p:style>
+        <p:txBody>
+          <a:bodyPr rtlCol="0" anchor="ctr"/>
+          <a:lstStyle/>
+          <a:p>
+            <a:pPr algn="ctr"/>
+            <a:endParaRPr lang="en-CA"/>
           </a:p>
         </p:txBody>
       </p:sp>
@@ -29092,6 +30050,89 @@
           </a:p>
         </p:txBody>
       </p:sp>
+      <p:sp>
+        <p:nvSpPr>
+          <p:cNvPr id="9" name="Slide Number Placeholder 8">
+            <a:extLst>
+              <a:ext uri="{FF2B5EF4-FFF2-40B4-BE49-F238E27FC236}">
+                <a16:creationId xmlns:a16="http://schemas.microsoft.com/office/drawing/2014/main" id="{52DAC177-6727-0924-9725-9DE4004A16F6}"/>
+              </a:ext>
+            </a:extLst>
+          </p:cNvPr>
+          <p:cNvSpPr>
+            <a:spLocks noGrp="1"/>
+          </p:cNvSpPr>
+          <p:nvPr>
+            <p:ph type="sldNum" sz="quarter" idx="12"/>
+          </p:nvPr>
+        </p:nvSpPr>
+        <p:spPr/>
+        <p:txBody>
+          <a:bodyPr/>
+          <a:lstStyle/>
+          <a:p>
+            <a:fld id="{4BD3201E-7DF8-462B-AC18-61E63795AE0D}" type="slidenum">
+              <a:rPr lang="en-CA" smtClean="0"/>
+              <a:t>9</a:t>
+            </a:fld>
+            <a:endParaRPr lang="en-CA"/>
+          </a:p>
+        </p:txBody>
+      </p:sp>
+      <p:sp>
+        <p:nvSpPr>
+          <p:cNvPr id="8" name="Rectangle 7">
+            <a:extLst>
+              <a:ext uri="{FF2B5EF4-FFF2-40B4-BE49-F238E27FC236}">
+                <a16:creationId xmlns:a16="http://schemas.microsoft.com/office/drawing/2014/main" id="{4D8DAECE-8177-8147-E454-C7C5008EB363}"/>
+              </a:ext>
+            </a:extLst>
+          </p:cNvPr>
+          <p:cNvSpPr/>
+          <p:nvPr/>
+        </p:nvSpPr>
+        <p:spPr>
+          <a:xfrm>
+            <a:off x="0" y="365125"/>
+            <a:ext cx="678427" cy="556649"/>
+          </a:xfrm>
+          <a:prstGeom prst="rect">
+            <a:avLst/>
+          </a:prstGeom>
+          <a:solidFill>
+            <a:schemeClr val="accent2">
+              <a:lumMod val="75000"/>
+            </a:schemeClr>
+          </a:solidFill>
+          <a:ln>
+            <a:noFill/>
+          </a:ln>
+        </p:spPr>
+        <p:style>
+          <a:lnRef idx="2">
+            <a:schemeClr val="accent1">
+              <a:shade val="15000"/>
+            </a:schemeClr>
+          </a:lnRef>
+          <a:fillRef idx="1">
+            <a:schemeClr val="accent1"/>
+          </a:fillRef>
+          <a:effectRef idx="0">
+            <a:schemeClr val="accent1"/>
+          </a:effectRef>
+          <a:fontRef idx="minor">
+            <a:schemeClr val="lt1"/>
+          </a:fontRef>
+        </p:style>
+        <p:txBody>
+          <a:bodyPr rtlCol="0" anchor="ctr"/>
+          <a:lstStyle/>
+          <a:p>
+            <a:pPr algn="ctr"/>
+            <a:endParaRPr lang="en-CA"/>
+          </a:p>
+        </p:txBody>
+      </p:sp>
     </p:spTree>
     <p:extLst>
       <p:ext uri="{BB962C8B-B14F-4D97-AF65-F5344CB8AC3E}">
@@ -29736,6 +30777,26 @@
 </file>
 
 <file path=customXml/item1.xml><?xml version="1.0" encoding="utf-8"?>
+<?mso-contentType ?>
+<FormTemplates xmlns="http://schemas.microsoft.com/sharepoint/v3/contenttype/forms">
+  <Display>DocumentLibraryForm</Display>
+  <Edit>DocumentLibraryForm</Edit>
+  <New>DocumentLibraryForm</New>
+</FormTemplates>
+</file>
+
+<file path=customXml/item2.xml><?xml version="1.0" encoding="utf-8"?>
+<p:properties xmlns:p="http://schemas.microsoft.com/office/2006/metadata/properties" xmlns:xsi="http://www.w3.org/2001/XMLSchema-instance" xmlns:pc="http://schemas.microsoft.com/office/infopath/2007/PartnerControls">
+  <documentManagement>
+    <lcf76f155ced4ddcb4097134ff3c332f xmlns="ec825916-6f01-4646-bf11-4e97fdd06dc8">
+      <Terms xmlns="http://schemas.microsoft.com/office/infopath/2007/PartnerControls"/>
+    </lcf76f155ced4ddcb4097134ff3c332f>
+    <TaxCatchAll xmlns="10202d72-3646-4d36-9cf4-1feba2c78df0" xsi:nil="true"/>
+  </documentManagement>
+</p:properties>
+</file>
+
+<file path=customXml/item3.xml><?xml version="1.0" encoding="utf-8"?>
 <ct:contentTypeSchema xmlns:ct="http://schemas.microsoft.com/office/2006/metadata/contentType" xmlns:ma="http://schemas.microsoft.com/office/2006/metadata/properties/metaAttributes" ct:_="" ma:_="" ma:contentTypeName="Document" ma:contentTypeID="0x010100744768CFAF743F4A83B0523C20156377" ma:contentTypeVersion="11" ma:contentTypeDescription="Create a new document." ma:contentTypeScope="" ma:versionID="aafa440e1ffbdaf1b0956f4ac1c916a8">
   <xsd:schema xmlns:xsd="http://www.w3.org/2001/XMLSchema" xmlns:xs="http://www.w3.org/2001/XMLSchema" xmlns:p="http://schemas.microsoft.com/office/2006/metadata/properties" xmlns:ns2="ec825916-6f01-4646-bf11-4e97fdd06dc8" xmlns:ns3="10202d72-3646-4d36-9cf4-1feba2c78df0" targetNamespace="http://schemas.microsoft.com/office/2006/metadata/properties" ma:root="true" ma:fieldsID="7a73fe93b8aa32af4ca50956a2221801" ns2:_="" ns3:_="">
     <xsd:import namespace="ec825916-6f01-4646-bf11-4e97fdd06dc8"/>
@@ -29930,41 +30991,10 @@
 </ct:contentTypeSchema>
 </file>
 
-<file path=customXml/item2.xml><?xml version="1.0" encoding="utf-8"?>
-<p:properties xmlns:p="http://schemas.microsoft.com/office/2006/metadata/properties" xmlns:xsi="http://www.w3.org/2001/XMLSchema-instance" xmlns:pc="http://schemas.microsoft.com/office/infopath/2007/PartnerControls">
-  <documentManagement>
-    <lcf76f155ced4ddcb4097134ff3c332f xmlns="ec825916-6f01-4646-bf11-4e97fdd06dc8">
-      <Terms xmlns="http://schemas.microsoft.com/office/infopath/2007/PartnerControls"/>
-    </lcf76f155ced4ddcb4097134ff3c332f>
-    <TaxCatchAll xmlns="10202d72-3646-4d36-9cf4-1feba2c78df0" xsi:nil="true"/>
-  </documentManagement>
-</p:properties>
-</file>
-
-<file path=customXml/item3.xml><?xml version="1.0" encoding="utf-8"?>
-<?mso-contentType ?>
-<FormTemplates xmlns="http://schemas.microsoft.com/sharepoint/v3/contenttype/forms">
-  <Display>DocumentLibraryForm</Display>
-  <Edit>DocumentLibraryForm</Edit>
-  <New>DocumentLibraryForm</New>
-</FormTemplates>
-</file>
-
 <file path=customXml/itemProps1.xml><?xml version="1.0" encoding="utf-8"?>
-<ds:datastoreItem xmlns:ds="http://schemas.openxmlformats.org/officeDocument/2006/customXml" ds:itemID="{4AB5C90D-8262-4EAC-95BF-2CC4C44D50EC}">
+<ds:datastoreItem xmlns:ds="http://schemas.openxmlformats.org/officeDocument/2006/customXml" ds:itemID="{73F4A501-0066-4B8E-9AA2-A07CF344BF69}">
   <ds:schemaRefs>
-    <ds:schemaRef ds:uri="10202d72-3646-4d36-9cf4-1feba2c78df0"/>
-    <ds:schemaRef ds:uri="ec825916-6f01-4646-bf11-4e97fdd06dc8"/>
-    <ds:schemaRef ds:uri="http://purl.org/dc/elements/1.1/"/>
-    <ds:schemaRef ds:uri="http://purl.org/dc/terms/"/>
-    <ds:schemaRef ds:uri="http://schemas.microsoft.com/internal/obd"/>
-    <ds:schemaRef ds:uri="http://schemas.microsoft.com/office/2006/documentManagement/types"/>
-    <ds:schemaRef ds:uri="http://schemas.microsoft.com/office/2006/metadata/contentType"/>
-    <ds:schemaRef ds:uri="http://schemas.microsoft.com/office/2006/metadata/properties"/>
-    <ds:schemaRef ds:uri="http://schemas.microsoft.com/office/2006/metadata/properties/metaAttributes"/>
-    <ds:schemaRef ds:uri="http://schemas.microsoft.com/office/infopath/2007/PartnerControls"/>
-    <ds:schemaRef ds:uri="http://schemas.openxmlformats.org/package/2006/metadata/core-properties"/>
-    <ds:schemaRef ds:uri="http://www.w3.org/2001/XMLSchema"/>
+    <ds:schemaRef ds:uri="http://schemas.microsoft.com/sharepoint/v3/contenttype/forms"/>
   </ds:schemaRefs>
 </ds:datastoreItem>
 </file>
@@ -29987,9 +31017,20 @@
 </file>
 
 <file path=customXml/itemProps3.xml><?xml version="1.0" encoding="utf-8"?>
-<ds:datastoreItem xmlns:ds="http://schemas.openxmlformats.org/officeDocument/2006/customXml" ds:itemID="{73F4A501-0066-4B8E-9AA2-A07CF344BF69}">
+<ds:datastoreItem xmlns:ds="http://schemas.openxmlformats.org/officeDocument/2006/customXml" ds:itemID="{4AB5C90D-8262-4EAC-95BF-2CC4C44D50EC}">
   <ds:schemaRefs>
-    <ds:schemaRef ds:uri="http://schemas.microsoft.com/sharepoint/v3/contenttype/forms"/>
+    <ds:schemaRef ds:uri="10202d72-3646-4d36-9cf4-1feba2c78df0"/>
+    <ds:schemaRef ds:uri="ec825916-6f01-4646-bf11-4e97fdd06dc8"/>
+    <ds:schemaRef ds:uri="http://purl.org/dc/elements/1.1/"/>
+    <ds:schemaRef ds:uri="http://purl.org/dc/terms/"/>
+    <ds:schemaRef ds:uri="http://schemas.microsoft.com/internal/obd"/>
+    <ds:schemaRef ds:uri="http://schemas.microsoft.com/office/2006/documentManagement/types"/>
+    <ds:schemaRef ds:uri="http://schemas.microsoft.com/office/2006/metadata/contentType"/>
+    <ds:schemaRef ds:uri="http://schemas.microsoft.com/office/2006/metadata/properties"/>
+    <ds:schemaRef ds:uri="http://schemas.microsoft.com/office/2006/metadata/properties/metaAttributes"/>
+    <ds:schemaRef ds:uri="http://schemas.microsoft.com/office/infopath/2007/PartnerControls"/>
+    <ds:schemaRef ds:uri="http://schemas.openxmlformats.org/package/2006/metadata/core-properties"/>
+    <ds:schemaRef ds:uri="http://www.w3.org/2001/XMLSchema"/>
   </ds:schemaRefs>
 </ds:datastoreItem>
 </file>
</xml_diff>